<commit_message>
Adding placeholders for code.
</commit_message>
<xml_diff>
--- a/Async_Discussion_9_29_15.pptx
+++ b/Async_Discussion_9_29_15.pptx
@@ -3425,7 +3425,7 @@
             </a:r>
             <a:r>
               <a:rPr lang="en-US" dirty="0" smtClean="0"/>
-              <a:t>until the callback queue is empty.</a:t>
+              <a:t>until the callback queue is empty, and then waits for further messages.</a:t>
             </a:r>
           </a:p>
           <a:p>
@@ -3456,7 +3456,306 @@
   <p:timing>
     <p:tnLst>
       <p:par>
-        <p:cTn xmlns:p14="http://schemas.microsoft.com/office/powerpoint/2010/main" id="1" dur="indefinite" restart="never" nodeType="tmRoot"/>
+        <p:cTn xmlns:p14="http://schemas.microsoft.com/office/powerpoint/2010/main" id="1" dur="indefinite" restart="never" nodeType="tmRoot">
+          <p:childTnLst>
+            <p:seq concurrent="1" nextAc="seek">
+              <p:cTn id="2" dur="indefinite" nodeType="mainSeq">
+                <p:childTnLst>
+                  <p:par>
+                    <p:cTn id="3" fill="hold">
+                      <p:stCondLst>
+                        <p:cond delay="indefinite"/>
+                      </p:stCondLst>
+                      <p:childTnLst>
+                        <p:par>
+                          <p:cTn id="4" fill="hold">
+                            <p:stCondLst>
+                              <p:cond delay="0"/>
+                            </p:stCondLst>
+                            <p:childTnLst>
+                              <p:par>
+                                <p:cTn id="5" presetID="1" presetClass="entr" presetSubtype="0" fill="hold" nodeType="clickEffect">
+                                  <p:stCondLst>
+                                    <p:cond delay="0"/>
+                                  </p:stCondLst>
+                                  <p:childTnLst>
+                                    <p:set>
+                                      <p:cBhvr>
+                                        <p:cTn id="6" dur="1" fill="hold">
+                                          <p:stCondLst>
+                                            <p:cond delay="0"/>
+                                          </p:stCondLst>
+                                        </p:cTn>
+                                        <p:tgtEl>
+                                          <p:spTgt spid="3">
+                                            <p:txEl>
+                                              <p:pRg st="0" end="0"/>
+                                            </p:txEl>
+                                          </p:spTgt>
+                                        </p:tgtEl>
+                                        <p:attrNameLst>
+                                          <p:attrName>style.visibility</p:attrName>
+                                        </p:attrNameLst>
+                                      </p:cBhvr>
+                                      <p:to>
+                                        <p:strVal val="visible"/>
+                                      </p:to>
+                                    </p:set>
+                                  </p:childTnLst>
+                                </p:cTn>
+                              </p:par>
+                            </p:childTnLst>
+                          </p:cTn>
+                        </p:par>
+                      </p:childTnLst>
+                    </p:cTn>
+                  </p:par>
+                  <p:par>
+                    <p:cTn id="7" fill="hold">
+                      <p:stCondLst>
+                        <p:cond delay="indefinite"/>
+                      </p:stCondLst>
+                      <p:childTnLst>
+                        <p:par>
+                          <p:cTn id="8" fill="hold">
+                            <p:stCondLst>
+                              <p:cond delay="0"/>
+                            </p:stCondLst>
+                            <p:childTnLst>
+                              <p:par>
+                                <p:cTn id="9" presetID="1" presetClass="entr" presetSubtype="0" fill="hold" nodeType="clickEffect">
+                                  <p:stCondLst>
+                                    <p:cond delay="0"/>
+                                  </p:stCondLst>
+                                  <p:childTnLst>
+                                    <p:set>
+                                      <p:cBhvr>
+                                        <p:cTn id="10" dur="1" fill="hold">
+                                          <p:stCondLst>
+                                            <p:cond delay="0"/>
+                                          </p:stCondLst>
+                                        </p:cTn>
+                                        <p:tgtEl>
+                                          <p:spTgt spid="3">
+                                            <p:txEl>
+                                              <p:pRg st="1" end="1"/>
+                                            </p:txEl>
+                                          </p:spTgt>
+                                        </p:tgtEl>
+                                        <p:attrNameLst>
+                                          <p:attrName>style.visibility</p:attrName>
+                                        </p:attrNameLst>
+                                      </p:cBhvr>
+                                      <p:to>
+                                        <p:strVal val="visible"/>
+                                      </p:to>
+                                    </p:set>
+                                  </p:childTnLst>
+                                </p:cTn>
+                              </p:par>
+                            </p:childTnLst>
+                          </p:cTn>
+                        </p:par>
+                      </p:childTnLst>
+                    </p:cTn>
+                  </p:par>
+                  <p:par>
+                    <p:cTn id="11" fill="hold">
+                      <p:stCondLst>
+                        <p:cond delay="indefinite"/>
+                      </p:stCondLst>
+                      <p:childTnLst>
+                        <p:par>
+                          <p:cTn id="12" fill="hold">
+                            <p:stCondLst>
+                              <p:cond delay="0"/>
+                            </p:stCondLst>
+                            <p:childTnLst>
+                              <p:par>
+                                <p:cTn id="13" presetID="1" presetClass="entr" presetSubtype="0" fill="hold" nodeType="clickEffect">
+                                  <p:stCondLst>
+                                    <p:cond delay="0"/>
+                                  </p:stCondLst>
+                                  <p:childTnLst>
+                                    <p:set>
+                                      <p:cBhvr>
+                                        <p:cTn id="14" dur="1" fill="hold">
+                                          <p:stCondLst>
+                                            <p:cond delay="0"/>
+                                          </p:stCondLst>
+                                        </p:cTn>
+                                        <p:tgtEl>
+                                          <p:spTgt spid="3">
+                                            <p:txEl>
+                                              <p:pRg st="2" end="2"/>
+                                            </p:txEl>
+                                          </p:spTgt>
+                                        </p:tgtEl>
+                                        <p:attrNameLst>
+                                          <p:attrName>style.visibility</p:attrName>
+                                        </p:attrNameLst>
+                                      </p:cBhvr>
+                                      <p:to>
+                                        <p:strVal val="visible"/>
+                                      </p:to>
+                                    </p:set>
+                                  </p:childTnLst>
+                                </p:cTn>
+                              </p:par>
+                            </p:childTnLst>
+                          </p:cTn>
+                        </p:par>
+                      </p:childTnLst>
+                    </p:cTn>
+                  </p:par>
+                  <p:par>
+                    <p:cTn id="15" fill="hold">
+                      <p:stCondLst>
+                        <p:cond delay="indefinite"/>
+                      </p:stCondLst>
+                      <p:childTnLst>
+                        <p:par>
+                          <p:cTn id="16" fill="hold">
+                            <p:stCondLst>
+                              <p:cond delay="0"/>
+                            </p:stCondLst>
+                            <p:childTnLst>
+                              <p:par>
+                                <p:cTn id="17" presetID="1" presetClass="entr" presetSubtype="0" fill="hold" nodeType="clickEffect">
+                                  <p:stCondLst>
+                                    <p:cond delay="0"/>
+                                  </p:stCondLst>
+                                  <p:childTnLst>
+                                    <p:set>
+                                      <p:cBhvr>
+                                        <p:cTn id="18" dur="1" fill="hold">
+                                          <p:stCondLst>
+                                            <p:cond delay="0"/>
+                                          </p:stCondLst>
+                                        </p:cTn>
+                                        <p:tgtEl>
+                                          <p:spTgt spid="3">
+                                            <p:txEl>
+                                              <p:pRg st="3" end="3"/>
+                                            </p:txEl>
+                                          </p:spTgt>
+                                        </p:tgtEl>
+                                        <p:attrNameLst>
+                                          <p:attrName>style.visibility</p:attrName>
+                                        </p:attrNameLst>
+                                      </p:cBhvr>
+                                      <p:to>
+                                        <p:strVal val="visible"/>
+                                      </p:to>
+                                    </p:set>
+                                  </p:childTnLst>
+                                </p:cTn>
+                              </p:par>
+                            </p:childTnLst>
+                          </p:cTn>
+                        </p:par>
+                      </p:childTnLst>
+                    </p:cTn>
+                  </p:par>
+                  <p:par>
+                    <p:cTn id="19" fill="hold">
+                      <p:stCondLst>
+                        <p:cond delay="indefinite"/>
+                      </p:stCondLst>
+                      <p:childTnLst>
+                        <p:par>
+                          <p:cTn id="20" fill="hold">
+                            <p:stCondLst>
+                              <p:cond delay="0"/>
+                            </p:stCondLst>
+                            <p:childTnLst>
+                              <p:par>
+                                <p:cTn id="21" presetID="1" presetClass="entr" presetSubtype="0" fill="hold" nodeType="clickEffect">
+                                  <p:stCondLst>
+                                    <p:cond delay="0"/>
+                                  </p:stCondLst>
+                                  <p:childTnLst>
+                                    <p:set>
+                                      <p:cBhvr>
+                                        <p:cTn id="22" dur="1" fill="hold">
+                                          <p:stCondLst>
+                                            <p:cond delay="0"/>
+                                          </p:stCondLst>
+                                        </p:cTn>
+                                        <p:tgtEl>
+                                          <p:spTgt spid="3">
+                                            <p:txEl>
+                                              <p:pRg st="4" end="4"/>
+                                            </p:txEl>
+                                          </p:spTgt>
+                                        </p:tgtEl>
+                                        <p:attrNameLst>
+                                          <p:attrName>style.visibility</p:attrName>
+                                        </p:attrNameLst>
+                                      </p:cBhvr>
+                                      <p:to>
+                                        <p:strVal val="visible"/>
+                                      </p:to>
+                                    </p:set>
+                                  </p:childTnLst>
+                                </p:cTn>
+                              </p:par>
+                              <p:par>
+                                <p:cTn id="23" presetID="1" presetClass="entr" presetSubtype="0" fill="hold" nodeType="withEffect">
+                                  <p:stCondLst>
+                                    <p:cond delay="0"/>
+                                  </p:stCondLst>
+                                  <p:childTnLst>
+                                    <p:set>
+                                      <p:cBhvr>
+                                        <p:cTn id="24" dur="1" fill="hold">
+                                          <p:stCondLst>
+                                            <p:cond delay="0"/>
+                                          </p:stCondLst>
+                                        </p:cTn>
+                                        <p:tgtEl>
+                                          <p:spTgt spid="3">
+                                            <p:txEl>
+                                              <p:pRg st="5" end="5"/>
+                                            </p:txEl>
+                                          </p:spTgt>
+                                        </p:tgtEl>
+                                        <p:attrNameLst>
+                                          <p:attrName>style.visibility</p:attrName>
+                                        </p:attrNameLst>
+                                      </p:cBhvr>
+                                      <p:to>
+                                        <p:strVal val="visible"/>
+                                      </p:to>
+                                    </p:set>
+                                  </p:childTnLst>
+                                </p:cTn>
+                              </p:par>
+                            </p:childTnLst>
+                          </p:cTn>
+                        </p:par>
+                      </p:childTnLst>
+                    </p:cTn>
+                  </p:par>
+                </p:childTnLst>
+              </p:cTn>
+              <p:prevCondLst>
+                <p:cond evt="onPrev" delay="0">
+                  <p:tgtEl>
+                    <p:sldTgt/>
+                  </p:tgtEl>
+                </p:cond>
+              </p:prevCondLst>
+              <p:nextCondLst>
+                <p:cond evt="onNext" delay="0">
+                  <p:tgtEl>
+                    <p:sldTgt/>
+                  </p:tgtEl>
+                </p:cond>
+              </p:nextCondLst>
+            </p:seq>
+          </p:childTnLst>
+        </p:cTn>
       </p:par>
     </p:tnLst>
   </p:timing>
@@ -6804,7 +7103,22 @@
               <a:rPr lang="en-US" dirty="0" smtClean="0"/>
               <a:t>”</a:t>
             </a:r>
-            <a:endParaRPr lang="en-US" dirty="0"/>
+            <a:r>
+              <a:rPr lang="en-US" dirty="0" smtClean="0">
+                <a:solidFill>
+                  <a:srgbClr val="FF0000"/>
+                </a:solidFill>
+                <a:latin typeface="ＭＳ ゴシック"/>
+                <a:ea typeface="ＭＳ ゴシック"/>
+                <a:cs typeface="ＭＳ ゴシック"/>
+              </a:rPr>
+              <a:t>♬</a:t>
+            </a:r>
+            <a:endParaRPr lang="en-US" dirty="0">
+              <a:solidFill>
+                <a:srgbClr val="FF0000"/>
+              </a:solidFill>
+            </a:endParaRPr>
           </a:p>
         </p:txBody>
       </p:sp>
@@ -6821,7 +7135,226 @@
   <p:timing>
     <p:tnLst>
       <p:par>
-        <p:cTn xmlns:p14="http://schemas.microsoft.com/office/powerpoint/2010/main" id="1" dur="indefinite" restart="never" nodeType="tmRoot"/>
+        <p:cTn xmlns:p14="http://schemas.microsoft.com/office/powerpoint/2010/main" id="1" dur="indefinite" restart="never" nodeType="tmRoot">
+          <p:childTnLst>
+            <p:seq concurrent="1" nextAc="seek">
+              <p:cTn id="2" dur="indefinite" nodeType="mainSeq">
+                <p:childTnLst>
+                  <p:par>
+                    <p:cTn id="3" fill="hold">
+                      <p:stCondLst>
+                        <p:cond delay="indefinite"/>
+                      </p:stCondLst>
+                      <p:childTnLst>
+                        <p:par>
+                          <p:cTn id="4" fill="hold">
+                            <p:stCondLst>
+                              <p:cond delay="0"/>
+                            </p:stCondLst>
+                            <p:childTnLst>
+                              <p:par>
+                                <p:cTn id="5" presetID="1" presetClass="entr" presetSubtype="0" fill="hold" nodeType="clickEffect">
+                                  <p:stCondLst>
+                                    <p:cond delay="0"/>
+                                  </p:stCondLst>
+                                  <p:childTnLst>
+                                    <p:set>
+                                      <p:cBhvr>
+                                        <p:cTn id="6" dur="1" fill="hold">
+                                          <p:stCondLst>
+                                            <p:cond delay="0"/>
+                                          </p:stCondLst>
+                                        </p:cTn>
+                                        <p:tgtEl>
+                                          <p:spTgt spid="3">
+                                            <p:txEl>
+                                              <p:pRg st="1" end="1"/>
+                                            </p:txEl>
+                                          </p:spTgt>
+                                        </p:tgtEl>
+                                        <p:attrNameLst>
+                                          <p:attrName>style.visibility</p:attrName>
+                                        </p:attrNameLst>
+                                      </p:cBhvr>
+                                      <p:to>
+                                        <p:strVal val="visible"/>
+                                      </p:to>
+                                    </p:set>
+                                  </p:childTnLst>
+                                </p:cTn>
+                              </p:par>
+                            </p:childTnLst>
+                          </p:cTn>
+                        </p:par>
+                      </p:childTnLst>
+                    </p:cTn>
+                  </p:par>
+                  <p:par>
+                    <p:cTn id="7" fill="hold">
+                      <p:stCondLst>
+                        <p:cond delay="indefinite"/>
+                      </p:stCondLst>
+                      <p:childTnLst>
+                        <p:par>
+                          <p:cTn id="8" fill="hold">
+                            <p:stCondLst>
+                              <p:cond delay="0"/>
+                            </p:stCondLst>
+                            <p:childTnLst>
+                              <p:par>
+                                <p:cTn id="9" presetID="1" presetClass="entr" presetSubtype="0" fill="hold" nodeType="clickEffect">
+                                  <p:stCondLst>
+                                    <p:cond delay="0"/>
+                                  </p:stCondLst>
+                                  <p:childTnLst>
+                                    <p:set>
+                                      <p:cBhvr>
+                                        <p:cTn id="10" dur="1" fill="hold">
+                                          <p:stCondLst>
+                                            <p:cond delay="0"/>
+                                          </p:stCondLst>
+                                        </p:cTn>
+                                        <p:tgtEl>
+                                          <p:spTgt spid="3">
+                                            <p:txEl>
+                                              <p:pRg st="2" end="2"/>
+                                            </p:txEl>
+                                          </p:spTgt>
+                                        </p:tgtEl>
+                                        <p:attrNameLst>
+                                          <p:attrName>style.visibility</p:attrName>
+                                        </p:attrNameLst>
+                                      </p:cBhvr>
+                                      <p:to>
+                                        <p:strVal val="visible"/>
+                                      </p:to>
+                                    </p:set>
+                                  </p:childTnLst>
+                                </p:cTn>
+                              </p:par>
+                            </p:childTnLst>
+                          </p:cTn>
+                        </p:par>
+                      </p:childTnLst>
+                    </p:cTn>
+                  </p:par>
+                  <p:par>
+                    <p:cTn id="11" fill="hold">
+                      <p:stCondLst>
+                        <p:cond delay="indefinite"/>
+                      </p:stCondLst>
+                      <p:childTnLst>
+                        <p:par>
+                          <p:cTn id="12" fill="hold">
+                            <p:stCondLst>
+                              <p:cond delay="0"/>
+                            </p:stCondLst>
+                            <p:childTnLst>
+                              <p:par>
+                                <p:cTn id="13" presetID="1" presetClass="entr" presetSubtype="0" fill="hold" nodeType="clickEffect">
+                                  <p:stCondLst>
+                                    <p:cond delay="0"/>
+                                  </p:stCondLst>
+                                  <p:childTnLst>
+                                    <p:set>
+                                      <p:cBhvr>
+                                        <p:cTn id="14" dur="1" fill="hold">
+                                          <p:stCondLst>
+                                            <p:cond delay="0"/>
+                                          </p:stCondLst>
+                                        </p:cTn>
+                                        <p:tgtEl>
+                                          <p:spTgt spid="3">
+                                            <p:txEl>
+                                              <p:pRg st="3" end="3"/>
+                                            </p:txEl>
+                                          </p:spTgt>
+                                        </p:tgtEl>
+                                        <p:attrNameLst>
+                                          <p:attrName>style.visibility</p:attrName>
+                                        </p:attrNameLst>
+                                      </p:cBhvr>
+                                      <p:to>
+                                        <p:strVal val="visible"/>
+                                      </p:to>
+                                    </p:set>
+                                  </p:childTnLst>
+                                </p:cTn>
+                              </p:par>
+                            </p:childTnLst>
+                          </p:cTn>
+                        </p:par>
+                      </p:childTnLst>
+                    </p:cTn>
+                  </p:par>
+                  <p:par>
+                    <p:cTn id="15" fill="hold">
+                      <p:stCondLst>
+                        <p:cond delay="indefinite"/>
+                      </p:stCondLst>
+                      <p:childTnLst>
+                        <p:par>
+                          <p:cTn id="16" fill="hold">
+                            <p:stCondLst>
+                              <p:cond delay="0"/>
+                            </p:stCondLst>
+                            <p:childTnLst>
+                              <p:par>
+                                <p:cTn id="17" presetID="1" presetClass="entr" presetSubtype="0" fill="hold" nodeType="clickEffect">
+                                  <p:stCondLst>
+                                    <p:cond delay="0"/>
+                                  </p:stCondLst>
+                                  <p:childTnLst>
+                                    <p:set>
+                                      <p:cBhvr>
+                                        <p:cTn id="18" dur="1" fill="hold">
+                                          <p:stCondLst>
+                                            <p:cond delay="0"/>
+                                          </p:stCondLst>
+                                        </p:cTn>
+                                        <p:tgtEl>
+                                          <p:spTgt spid="3">
+                                            <p:txEl>
+                                              <p:pRg st="4" end="4"/>
+                                            </p:txEl>
+                                          </p:spTgt>
+                                        </p:tgtEl>
+                                        <p:attrNameLst>
+                                          <p:attrName>style.visibility</p:attrName>
+                                        </p:attrNameLst>
+                                      </p:cBhvr>
+                                      <p:to>
+                                        <p:strVal val="visible"/>
+                                      </p:to>
+                                    </p:set>
+                                  </p:childTnLst>
+                                </p:cTn>
+                              </p:par>
+                            </p:childTnLst>
+                          </p:cTn>
+                        </p:par>
+                      </p:childTnLst>
+                    </p:cTn>
+                  </p:par>
+                </p:childTnLst>
+              </p:cTn>
+              <p:prevCondLst>
+                <p:cond evt="onPrev" delay="0">
+                  <p:tgtEl>
+                    <p:sldTgt/>
+                  </p:tgtEl>
+                </p:cond>
+              </p:prevCondLst>
+              <p:nextCondLst>
+                <p:cond evt="onNext" delay="0">
+                  <p:tgtEl>
+                    <p:sldTgt/>
+                  </p:tgtEl>
+                </p:cond>
+              </p:nextCondLst>
+            </p:seq>
+          </p:childTnLst>
+        </p:cTn>
       </p:par>
     </p:tnLst>
   </p:timing>
@@ -6997,7 +7530,226 @@
   <p:timing>
     <p:tnLst>
       <p:par>
-        <p:cTn xmlns:p14="http://schemas.microsoft.com/office/powerpoint/2010/main" id="1" dur="indefinite" restart="never" nodeType="tmRoot"/>
+        <p:cTn xmlns:p14="http://schemas.microsoft.com/office/powerpoint/2010/main" id="1" dur="indefinite" restart="never" nodeType="tmRoot">
+          <p:childTnLst>
+            <p:seq concurrent="1" nextAc="seek">
+              <p:cTn id="2" dur="indefinite" nodeType="mainSeq">
+                <p:childTnLst>
+                  <p:par>
+                    <p:cTn id="3" fill="hold">
+                      <p:stCondLst>
+                        <p:cond delay="indefinite"/>
+                      </p:stCondLst>
+                      <p:childTnLst>
+                        <p:par>
+                          <p:cTn id="4" fill="hold">
+                            <p:stCondLst>
+                              <p:cond delay="0"/>
+                            </p:stCondLst>
+                            <p:childTnLst>
+                              <p:par>
+                                <p:cTn id="5" presetID="1" presetClass="entr" presetSubtype="0" fill="hold" nodeType="clickEffect">
+                                  <p:stCondLst>
+                                    <p:cond delay="0"/>
+                                  </p:stCondLst>
+                                  <p:childTnLst>
+                                    <p:set>
+                                      <p:cBhvr>
+                                        <p:cTn id="6" dur="1" fill="hold">
+                                          <p:stCondLst>
+                                            <p:cond delay="0"/>
+                                          </p:stCondLst>
+                                        </p:cTn>
+                                        <p:tgtEl>
+                                          <p:spTgt spid="3">
+                                            <p:txEl>
+                                              <p:pRg st="1" end="1"/>
+                                            </p:txEl>
+                                          </p:spTgt>
+                                        </p:tgtEl>
+                                        <p:attrNameLst>
+                                          <p:attrName>style.visibility</p:attrName>
+                                        </p:attrNameLst>
+                                      </p:cBhvr>
+                                      <p:to>
+                                        <p:strVal val="visible"/>
+                                      </p:to>
+                                    </p:set>
+                                  </p:childTnLst>
+                                </p:cTn>
+                              </p:par>
+                            </p:childTnLst>
+                          </p:cTn>
+                        </p:par>
+                      </p:childTnLst>
+                    </p:cTn>
+                  </p:par>
+                  <p:par>
+                    <p:cTn id="7" fill="hold">
+                      <p:stCondLst>
+                        <p:cond delay="indefinite"/>
+                      </p:stCondLst>
+                      <p:childTnLst>
+                        <p:par>
+                          <p:cTn id="8" fill="hold">
+                            <p:stCondLst>
+                              <p:cond delay="0"/>
+                            </p:stCondLst>
+                            <p:childTnLst>
+                              <p:par>
+                                <p:cTn id="9" presetID="1" presetClass="entr" presetSubtype="0" fill="hold" nodeType="clickEffect">
+                                  <p:stCondLst>
+                                    <p:cond delay="0"/>
+                                  </p:stCondLst>
+                                  <p:childTnLst>
+                                    <p:set>
+                                      <p:cBhvr>
+                                        <p:cTn id="10" dur="1" fill="hold">
+                                          <p:stCondLst>
+                                            <p:cond delay="0"/>
+                                          </p:stCondLst>
+                                        </p:cTn>
+                                        <p:tgtEl>
+                                          <p:spTgt spid="3">
+                                            <p:txEl>
+                                              <p:pRg st="2" end="2"/>
+                                            </p:txEl>
+                                          </p:spTgt>
+                                        </p:tgtEl>
+                                        <p:attrNameLst>
+                                          <p:attrName>style.visibility</p:attrName>
+                                        </p:attrNameLst>
+                                      </p:cBhvr>
+                                      <p:to>
+                                        <p:strVal val="visible"/>
+                                      </p:to>
+                                    </p:set>
+                                  </p:childTnLst>
+                                </p:cTn>
+                              </p:par>
+                            </p:childTnLst>
+                          </p:cTn>
+                        </p:par>
+                      </p:childTnLst>
+                    </p:cTn>
+                  </p:par>
+                  <p:par>
+                    <p:cTn id="11" fill="hold">
+                      <p:stCondLst>
+                        <p:cond delay="indefinite"/>
+                      </p:stCondLst>
+                      <p:childTnLst>
+                        <p:par>
+                          <p:cTn id="12" fill="hold">
+                            <p:stCondLst>
+                              <p:cond delay="0"/>
+                            </p:stCondLst>
+                            <p:childTnLst>
+                              <p:par>
+                                <p:cTn id="13" presetID="1" presetClass="entr" presetSubtype="0" fill="hold" nodeType="clickEffect">
+                                  <p:stCondLst>
+                                    <p:cond delay="0"/>
+                                  </p:stCondLst>
+                                  <p:childTnLst>
+                                    <p:set>
+                                      <p:cBhvr>
+                                        <p:cTn id="14" dur="1" fill="hold">
+                                          <p:stCondLst>
+                                            <p:cond delay="0"/>
+                                          </p:stCondLst>
+                                        </p:cTn>
+                                        <p:tgtEl>
+                                          <p:spTgt spid="3">
+                                            <p:txEl>
+                                              <p:pRg st="3" end="3"/>
+                                            </p:txEl>
+                                          </p:spTgt>
+                                        </p:tgtEl>
+                                        <p:attrNameLst>
+                                          <p:attrName>style.visibility</p:attrName>
+                                        </p:attrNameLst>
+                                      </p:cBhvr>
+                                      <p:to>
+                                        <p:strVal val="visible"/>
+                                      </p:to>
+                                    </p:set>
+                                  </p:childTnLst>
+                                </p:cTn>
+                              </p:par>
+                            </p:childTnLst>
+                          </p:cTn>
+                        </p:par>
+                      </p:childTnLst>
+                    </p:cTn>
+                  </p:par>
+                  <p:par>
+                    <p:cTn id="15" fill="hold">
+                      <p:stCondLst>
+                        <p:cond delay="indefinite"/>
+                      </p:stCondLst>
+                      <p:childTnLst>
+                        <p:par>
+                          <p:cTn id="16" fill="hold">
+                            <p:stCondLst>
+                              <p:cond delay="0"/>
+                            </p:stCondLst>
+                            <p:childTnLst>
+                              <p:par>
+                                <p:cTn id="17" presetID="1" presetClass="entr" presetSubtype="0" fill="hold" nodeType="clickEffect">
+                                  <p:stCondLst>
+                                    <p:cond delay="0"/>
+                                  </p:stCondLst>
+                                  <p:childTnLst>
+                                    <p:set>
+                                      <p:cBhvr>
+                                        <p:cTn id="18" dur="1" fill="hold">
+                                          <p:stCondLst>
+                                            <p:cond delay="0"/>
+                                          </p:stCondLst>
+                                        </p:cTn>
+                                        <p:tgtEl>
+                                          <p:spTgt spid="3">
+                                            <p:txEl>
+                                              <p:pRg st="4" end="4"/>
+                                            </p:txEl>
+                                          </p:spTgt>
+                                        </p:tgtEl>
+                                        <p:attrNameLst>
+                                          <p:attrName>style.visibility</p:attrName>
+                                        </p:attrNameLst>
+                                      </p:cBhvr>
+                                      <p:to>
+                                        <p:strVal val="visible"/>
+                                      </p:to>
+                                    </p:set>
+                                  </p:childTnLst>
+                                </p:cTn>
+                              </p:par>
+                            </p:childTnLst>
+                          </p:cTn>
+                        </p:par>
+                      </p:childTnLst>
+                    </p:cTn>
+                  </p:par>
+                </p:childTnLst>
+              </p:cTn>
+              <p:prevCondLst>
+                <p:cond evt="onPrev" delay="0">
+                  <p:tgtEl>
+                    <p:sldTgt/>
+                  </p:tgtEl>
+                </p:cond>
+              </p:prevCondLst>
+              <p:nextCondLst>
+                <p:cond evt="onNext" delay="0">
+                  <p:tgtEl>
+                    <p:sldTgt/>
+                  </p:tgtEl>
+                </p:cond>
+              </p:nextCondLst>
+            </p:seq>
+          </p:childTnLst>
+        </p:cTn>
       </p:par>
     </p:tnLst>
   </p:timing>
@@ -7179,6 +7931,18 @@
               <a:rPr lang="en-US" dirty="0" smtClean="0"/>
               <a:t>.</a:t>
             </a:r>
+            <a:r>
+              <a:rPr lang="en-US" dirty="0">
+                <a:solidFill>
+                  <a:srgbClr val="FF0000"/>
+                </a:solidFill>
+                <a:latin typeface="ＭＳ ゴシック"/>
+                <a:ea typeface="ＭＳ ゴシック"/>
+                <a:cs typeface="ＭＳ ゴシック"/>
+              </a:rPr>
+              <a:t> ♬</a:t>
+            </a:r>
+            <a:endParaRPr lang="en-US" dirty="0" smtClean="0"/>
           </a:p>
         </p:txBody>
       </p:sp>
@@ -7498,7 +8262,18 @@
             </a:r>
             <a:r>
               <a:rPr lang="en-US" dirty="0" smtClean="0"/>
-              <a:t>. When you see a return statement in a handler, what is actually returned is a Promise that resolves to that return value.</a:t>
+              <a:t>. When you see a return statement in a handler, what is actually returned is a promise that resolves to that return value.</a:t>
+            </a:r>
+            <a:r>
+              <a:rPr lang="en-US" dirty="0">
+                <a:solidFill>
+                  <a:srgbClr val="FF0000"/>
+                </a:solidFill>
+                <a:latin typeface="ＭＳ ゴシック"/>
+                <a:ea typeface="ＭＳ ゴシック"/>
+                <a:cs typeface="ＭＳ ゴシック"/>
+              </a:rPr>
+              <a:t> ♬</a:t>
             </a:r>
             <a:endParaRPr lang="en-US" dirty="0"/>
           </a:p>
@@ -7647,6 +8422,18 @@
               <a:rPr lang="en-US" dirty="0" smtClean="0"/>
               <a:t>.</a:t>
             </a:r>
+            <a:r>
+              <a:rPr lang="en-US" dirty="0">
+                <a:solidFill>
+                  <a:srgbClr val="FF0000"/>
+                </a:solidFill>
+                <a:latin typeface="ＭＳ ゴシック"/>
+                <a:ea typeface="ＭＳ ゴシック"/>
+                <a:cs typeface="ＭＳ ゴシック"/>
+              </a:rPr>
+              <a:t> ♬</a:t>
+            </a:r>
+            <a:endParaRPr lang="en-US" dirty="0" smtClean="0"/>
           </a:p>
           <a:p>
             <a:pPr lvl="1"/>
@@ -7801,6 +8588,17 @@
             <a:r>
               <a:rPr lang="en-US" dirty="0" smtClean="0"/>
               <a:t>callback.)</a:t>
+            </a:r>
+            <a:r>
+              <a:rPr lang="en-US" dirty="0">
+                <a:solidFill>
+                  <a:srgbClr val="FF0000"/>
+                </a:solidFill>
+                <a:latin typeface="ＭＳ ゴシック"/>
+                <a:ea typeface="ＭＳ ゴシック"/>
+                <a:cs typeface="ＭＳ ゴシック"/>
+              </a:rPr>
+              <a:t> ♬</a:t>
             </a:r>
             <a:endParaRPr lang="en-US" dirty="0"/>
           </a:p>
@@ -8286,8 +9084,24 @@
             </a:r>
             <a:r>
               <a:rPr lang="en-US" dirty="0"/>
-              <a:t>, and pass back a result or an error, respectively.</a:t>
-            </a:r>
+              <a:t>, and pass back a result or an error, respectively</a:t>
+            </a:r>
+            <a:r>
+              <a:rPr lang="en-US" dirty="0" smtClean="0"/>
+              <a:t>.</a:t>
+            </a:r>
+            <a:r>
+              <a:rPr lang="en-US" dirty="0">
+                <a:solidFill>
+                  <a:srgbClr val="FF0000"/>
+                </a:solidFill>
+                <a:latin typeface="ＭＳ ゴシック"/>
+                <a:ea typeface="ＭＳ ゴシック"/>
+                <a:cs typeface="ＭＳ ゴシック"/>
+              </a:rPr>
+              <a:t> ♬</a:t>
+            </a:r>
+            <a:endParaRPr lang="en-US" dirty="0"/>
           </a:p>
           <a:p>
             <a:endParaRPr lang="en-US" dirty="0"/>
@@ -8304,6 +9118,13 @@
   <p:clrMapOvr>
     <a:masterClrMapping/>
   </p:clrMapOvr>
+  <p:timing>
+    <p:tnLst>
+      <p:par>
+        <p:cTn xmlns:p14="http://schemas.microsoft.com/office/powerpoint/2010/main" id="1" dur="indefinite" restart="never" nodeType="tmRoot"/>
+      </p:par>
+    </p:tnLst>
+  </p:timing>
 </p:sld>
 </file>
 
@@ -8489,6 +9310,13 @@
   <p:clrMapOvr>
     <a:masterClrMapping/>
   </p:clrMapOvr>
+  <p:timing>
+    <p:tnLst>
+      <p:par>
+        <p:cTn xmlns:p14="http://schemas.microsoft.com/office/powerpoint/2010/main" id="1" dur="indefinite" restart="never" nodeType="tmRoot"/>
+      </p:par>
+    </p:tnLst>
+  </p:timing>
 </p:sld>
 </file>
 
@@ -8636,6 +9464,13 @@
   <p:clrMapOvr>
     <a:masterClrMapping/>
   </p:clrMapOvr>
+  <p:timing>
+    <p:tnLst>
+      <p:par>
+        <p:cTn xmlns:p14="http://schemas.microsoft.com/office/powerpoint/2010/main" id="1" dur="indefinite" restart="never" nodeType="tmRoot"/>
+      </p:par>
+    </p:tnLst>
+  </p:timing>
 </p:sld>
 </file>
 
@@ -8797,6 +9632,17 @@
               <a:rPr lang="en-US" dirty="0" smtClean="0"/>
               <a:t>The array of results will be in the order that their promises were passed in.</a:t>
             </a:r>
+            <a:r>
+              <a:rPr lang="en-US" dirty="0">
+                <a:solidFill>
+                  <a:srgbClr val="FF0000"/>
+                </a:solidFill>
+                <a:latin typeface="ＭＳ ゴシック"/>
+                <a:ea typeface="ＭＳ ゴシック"/>
+                <a:cs typeface="ＭＳ ゴシック"/>
+              </a:rPr>
+              <a:t> ♬</a:t>
+            </a:r>
             <a:endParaRPr lang="en-US" dirty="0"/>
           </a:p>
           <a:p>
@@ -8814,6 +9660,13 @@
   <p:clrMapOvr>
     <a:masterClrMapping/>
   </p:clrMapOvr>
+  <p:timing>
+    <p:tnLst>
+      <p:par>
+        <p:cTn xmlns:p14="http://schemas.microsoft.com/office/powerpoint/2010/main" id="1" dur="indefinite" restart="never" nodeType="tmRoot"/>
+      </p:par>
+    </p:tnLst>
+  </p:timing>
 </p:sld>
 </file>
 
@@ -8975,6 +9828,13 @@
   <p:clrMapOvr>
     <a:masterClrMapping/>
   </p:clrMapOvr>
+  <p:timing>
+    <p:tnLst>
+      <p:par>
+        <p:cTn xmlns:p14="http://schemas.microsoft.com/office/powerpoint/2010/main" id="1" dur="indefinite" restart="never" nodeType="tmRoot"/>
+      </p:par>
+    </p:tnLst>
+  </p:timing>
 </p:sld>
 </file>
 
@@ -9016,11 +9876,7 @@
             </a:r>
             <a:r>
               <a:rPr lang="en-US" dirty="0" smtClean="0"/>
-              <a:t> </a:t>
-            </a:r>
-            <a:r>
-              <a:rPr lang="en-US" dirty="0" err="1" smtClean="0"/>
-              <a:t>Deferreds</a:t>
+              <a:t> Deferreds</a:t>
             </a:r>
             <a:endParaRPr lang="en-US" dirty="0"/>
           </a:p>
@@ -9078,12 +9934,8 @@
           </a:p>
           <a:p>
             <a:r>
-              <a:rPr lang="en-US" dirty="0" err="1"/>
-              <a:t>Deferreds</a:t>
-            </a:r>
-            <a:r>
-              <a:rPr lang="en-US" dirty="0"/>
-              <a:t> were made available first, and so have a different set of states and functions, which can make handling them confusing, especially when they end up being used </a:t>
+              <a:rPr lang="en-US" dirty="0"/>
+              <a:t>Deferreds were made available first, and so have a different set of states and functions, which can make handling them confusing, especially when they end up being used </a:t>
             </a:r>
             <a:r>
               <a:rPr lang="en-US" dirty="0" smtClean="0"/>
@@ -9103,6 +9955,13 @@
   <p:clrMapOvr>
     <a:masterClrMapping/>
   </p:clrMapOvr>
+  <p:timing>
+    <p:tnLst>
+      <p:par>
+        <p:cTn xmlns:p14="http://schemas.microsoft.com/office/powerpoint/2010/main" id="1" dur="indefinite" restart="never" nodeType="tmRoot"/>
+      </p:par>
+    </p:tnLst>
+  </p:timing>
 </p:sld>
 </file>
 
@@ -9144,11 +10003,7 @@
             </a:r>
             <a:r>
               <a:rPr lang="en-US" dirty="0" smtClean="0"/>
-              <a:t> </a:t>
-            </a:r>
-            <a:r>
-              <a:rPr lang="en-US" dirty="0" err="1" smtClean="0"/>
-              <a:t>Deferreds</a:t>
+              <a:t> Deferreds</a:t>
             </a:r>
             <a:endParaRPr lang="en-US" dirty="0"/>
           </a:p>
@@ -9246,40 +10101,15 @@
               <a:t>, </a:t>
             </a:r>
             <a:r>
-              <a:rPr lang="en-US" dirty="0" err="1">
-                <a:latin typeface="Courier"/>
-                <a:cs typeface="Courier"/>
-              </a:rPr>
-              <a:t>resolveWith</a:t>
-            </a:r>
-            <a:r>
-              <a:rPr lang="en-US" dirty="0"/>
-              <a:t>: resolve the deferred</a:t>
-            </a:r>
-          </a:p>
-          <a:p>
-            <a:pPr lvl="1"/>
-            <a:r>
               <a:rPr lang="en-US" dirty="0">
                 <a:latin typeface="Courier"/>
                 <a:cs typeface="Courier"/>
               </a:rPr>
-              <a:t>reject</a:t>
-            </a:r>
-            <a:r>
-              <a:rPr lang="en-US" dirty="0"/>
-              <a:t>, </a:t>
-            </a:r>
-            <a:r>
-              <a:rPr lang="en-US" dirty="0" err="1">
-                <a:latin typeface="Courier"/>
-                <a:cs typeface="Courier"/>
-              </a:rPr>
-              <a:t>rejectWith</a:t>
-            </a:r>
-            <a:r>
-              <a:rPr lang="en-US" dirty="0"/>
-              <a:t>: reject the deferred</a:t>
+              <a:t>resolveWith</a:t>
+            </a:r>
+            <a:r>
+              <a:rPr lang="en-US" dirty="0"/>
+              <a:t>: resolve the deferred</a:t>
             </a:r>
           </a:p>
           <a:p>
@@ -9289,70 +10119,71 @@
                 <a:latin typeface="Courier"/>
                 <a:cs typeface="Courier"/>
               </a:rPr>
-              <a:t>when</a:t>
-            </a:r>
-            <a:r>
-              <a:rPr lang="en-US" dirty="0"/>
-              <a:t>: converts one or more objects to a promise, works similarly to </a:t>
-            </a:r>
-            <a:r>
-              <a:rPr lang="en-US" dirty="0" err="1">
-                <a:latin typeface="Courier"/>
-                <a:cs typeface="Courier"/>
-              </a:rPr>
-              <a:t>Promise.all</a:t>
-            </a:r>
-            <a:endParaRPr lang="en-US" dirty="0">
-              <a:latin typeface="Courier"/>
-              <a:cs typeface="Courier"/>
-            </a:endParaRPr>
-          </a:p>
-          <a:p>
-            <a:pPr lvl="1"/>
+              <a:t>reject</a:t>
+            </a:r>
+            <a:r>
+              <a:rPr lang="en-US" dirty="0"/>
+              <a:t>, </a:t>
+            </a:r>
             <a:r>
               <a:rPr lang="en-US" dirty="0">
                 <a:latin typeface="Courier"/>
                 <a:cs typeface="Courier"/>
               </a:rPr>
+              <a:t>rejectWith</a:t>
+            </a:r>
+            <a:r>
+              <a:rPr lang="en-US" dirty="0"/>
+              <a:t>: reject the deferred</a:t>
+            </a:r>
+          </a:p>
+          <a:p>
+            <a:pPr lvl="1"/>
+            <a:r>
+              <a:rPr lang="en-US" dirty="0">
+                <a:latin typeface="Courier"/>
+                <a:cs typeface="Courier"/>
+              </a:rPr>
+              <a:t>when</a:t>
+            </a:r>
+            <a:r>
+              <a:rPr lang="en-US" dirty="0"/>
+              <a:t>: converts one or more objects to a promise, works similarly to </a:t>
+            </a:r>
+            <a:r>
+              <a:rPr lang="en-US" dirty="0">
+                <a:latin typeface="Courier"/>
+                <a:cs typeface="Courier"/>
+              </a:rPr>
+              <a:t>Promise.all</a:t>
+            </a:r>
+          </a:p>
+          <a:p>
+            <a:pPr lvl="1"/>
+            <a:r>
+              <a:rPr lang="en-US" dirty="0">
+                <a:latin typeface="Courier"/>
+                <a:cs typeface="Courier"/>
+              </a:rPr>
               <a:t>promise</a:t>
             </a:r>
             <a:r>
               <a:rPr lang="en-US" dirty="0"/>
-              <a:t>: retrieve the </a:t>
-            </a:r>
-            <a:r>
-              <a:rPr lang="en-US" dirty="0" err="1"/>
-              <a:t>deferred’s</a:t>
-            </a:r>
-            <a:r>
-              <a:rPr lang="en-US" dirty="0"/>
-              <a:t> promise object</a:t>
-            </a:r>
-          </a:p>
-          <a:p>
-            <a:r>
-              <a:rPr lang="en-US" dirty="0" err="1"/>
+              <a:t>: retrieve the deferred’s promise object</a:t>
+            </a:r>
+          </a:p>
+          <a:p>
+            <a:r>
+              <a:rPr lang="en-US" dirty="0"/>
               <a:t>D</a:t>
             </a:r>
             <a:r>
-              <a:rPr lang="en-US" dirty="0" err="1" smtClean="0"/>
-              <a:t>eferreds</a:t>
-            </a:r>
-            <a:r>
-              <a:rPr lang="en-US" dirty="0" smtClean="0"/>
-              <a:t> </a:t>
-            </a:r>
-            <a:r>
-              <a:rPr lang="en-US" dirty="0"/>
-              <a:t>are </a:t>
-            </a:r>
-            <a:r>
-              <a:rPr lang="en-US" dirty="0" err="1"/>
-              <a:t>thenables</a:t>
-            </a:r>
-            <a:r>
-              <a:rPr lang="en-US" dirty="0"/>
-              <a:t>, </a:t>
+              <a:rPr lang="en-US" dirty="0" smtClean="0"/>
+              <a:t>eferreds </a:t>
+            </a:r>
+            <a:r>
+              <a:rPr lang="en-US" dirty="0"/>
+              <a:t>are thenables, </a:t>
             </a:r>
             <a:r>
               <a:rPr lang="en-US" dirty="0" smtClean="0"/>
@@ -9383,6 +10214,13 @@
   <p:clrMapOvr>
     <a:masterClrMapping/>
   </p:clrMapOvr>
+  <p:timing>
+    <p:tnLst>
+      <p:par>
+        <p:cTn xmlns:p14="http://schemas.microsoft.com/office/powerpoint/2010/main" id="1" dur="indefinite" restart="never" nodeType="tmRoot"/>
+      </p:par>
+    </p:tnLst>
+  </p:timing>
 </p:sld>
 </file>
 
@@ -9439,7 +10277,7 @@
         <p:spPr/>
         <p:txBody>
           <a:bodyPr>
-            <a:normAutofit lnSpcReduction="10000"/>
+            <a:normAutofit fontScale="92500"/>
           </a:bodyPr>
           <a:lstStyle/>
           <a:p>
@@ -9496,8 +10334,24 @@
             <a:pPr lvl="1"/>
             <a:r>
               <a:rPr lang="en-US" dirty="0"/>
-              <a:t>Another way of using fetch is to pass a Request object, where you can specify the URL as well as configuration data, such as the request headers or the method of the request (GET, POST, etc.).</a:t>
-            </a:r>
+              <a:t>Another way of using fetch is to pass a Request object, where you can specify the URL as well as configuration data, such as the request headers or the method of the request (GET, POST, etc.)</a:t>
+            </a:r>
+            <a:r>
+              <a:rPr lang="en-US" dirty="0" smtClean="0"/>
+              <a:t>.</a:t>
+            </a:r>
+            <a:r>
+              <a:rPr lang="en-US" dirty="0">
+                <a:solidFill>
+                  <a:srgbClr val="FF0000"/>
+                </a:solidFill>
+                <a:latin typeface="ＭＳ ゴシック"/>
+                <a:ea typeface="ＭＳ ゴシック"/>
+                <a:cs typeface="ＭＳ ゴシック"/>
+              </a:rPr>
+              <a:t> ♬</a:t>
+            </a:r>
+            <a:endParaRPr lang="en-US" dirty="0"/>
           </a:p>
           <a:p>
             <a:pPr lvl="1"/>
@@ -9523,6 +10377,13 @@
   <p:clrMapOvr>
     <a:masterClrMapping/>
   </p:clrMapOvr>
+  <p:timing>
+    <p:tnLst>
+      <p:par>
+        <p:cTn xmlns:p14="http://schemas.microsoft.com/office/powerpoint/2010/main" id="1" dur="indefinite" restart="never" nodeType="tmRoot"/>
+      </p:par>
+    </p:tnLst>
+  </p:timing>
 </p:sld>
 </file>
 
@@ -9699,6 +10560,13 @@
   <p:clrMapOvr>
     <a:masterClrMapping/>
   </p:clrMapOvr>
+  <p:timing>
+    <p:tnLst>
+      <p:par>
+        <p:cTn xmlns:p14="http://schemas.microsoft.com/office/powerpoint/2010/main" id="1" dur="indefinite" restart="never" nodeType="tmRoot"/>
+      </p:par>
+    </p:tnLst>
+  </p:timing>
 </p:sld>
 </file>
 
@@ -9885,6 +10753,18 @@
               <a:rPr lang="en-US" dirty="0" smtClean="0"/>
               <a:t> function, test for the result you would expect from the resolve promise.</a:t>
             </a:r>
+            <a:r>
+              <a:rPr lang="en-US" dirty="0">
+                <a:solidFill>
+                  <a:srgbClr val="FF0000"/>
+                </a:solidFill>
+                <a:latin typeface="ＭＳ ゴシック"/>
+                <a:ea typeface="ＭＳ ゴシック"/>
+                <a:cs typeface="ＭＳ ゴシック"/>
+              </a:rPr>
+              <a:t> ♬</a:t>
+            </a:r>
+            <a:endParaRPr lang="en-US" dirty="0" smtClean="0"/>
           </a:p>
           <a:p>
             <a:pPr lvl="1"/>
@@ -9902,6 +10782,17 @@
             <a:r>
               <a:rPr lang="en-US" dirty="0" smtClean="0"/>
               <a:t> function, test for the result you would expect from the rejected promise.</a:t>
+            </a:r>
+            <a:r>
+              <a:rPr lang="en-US" dirty="0">
+                <a:solidFill>
+                  <a:srgbClr val="FF0000"/>
+                </a:solidFill>
+                <a:latin typeface="ＭＳ ゴシック"/>
+                <a:ea typeface="ＭＳ ゴシック"/>
+                <a:cs typeface="ＭＳ ゴシック"/>
+              </a:rPr>
+              <a:t> ♬</a:t>
             </a:r>
             <a:endParaRPr lang="en-US" dirty="0"/>
           </a:p>
@@ -9917,6 +10808,13 @@
   <p:clrMapOvr>
     <a:masterClrMapping/>
   </p:clrMapOvr>
+  <p:timing>
+    <p:tnLst>
+      <p:par>
+        <p:cTn xmlns:p14="http://schemas.microsoft.com/office/powerpoint/2010/main" id="1" dur="indefinite" restart="never" nodeType="tmRoot"/>
+      </p:par>
+    </p:tnLst>
+  </p:timing>
 </p:sld>
 </file>
 
@@ -10274,6 +11172,18 @@
               <a:rPr lang="en-US" dirty="0" smtClean="0"/>
               <a:t>Spy on the function that returns the promise, and have it return a promise that is always resolved (or rejected).</a:t>
             </a:r>
+            <a:r>
+              <a:rPr lang="en-US" dirty="0">
+                <a:solidFill>
+                  <a:srgbClr val="FF0000"/>
+                </a:solidFill>
+                <a:latin typeface="ＭＳ ゴシック"/>
+                <a:ea typeface="ＭＳ ゴシック"/>
+                <a:cs typeface="ＭＳ ゴシック"/>
+              </a:rPr>
+              <a:t> ♬</a:t>
+            </a:r>
+            <a:endParaRPr lang="en-US" dirty="0" smtClean="0"/>
           </a:p>
           <a:p>
             <a:pPr lvl="1"/>
@@ -10419,6 +11329,18 @@
               <a:rPr lang="en-US" dirty="0" smtClean="0"/>
               <a:t>, you can use a similar technique.</a:t>
             </a:r>
+            <a:r>
+              <a:rPr lang="en-US" dirty="0">
+                <a:solidFill>
+                  <a:srgbClr val="FF0000"/>
+                </a:solidFill>
+                <a:latin typeface="ＭＳ ゴシック"/>
+                <a:ea typeface="ＭＳ ゴシック"/>
+                <a:cs typeface="ＭＳ ゴシック"/>
+              </a:rPr>
+              <a:t> ♬</a:t>
+            </a:r>
+            <a:endParaRPr lang="en-US" dirty="0" smtClean="0"/>
           </a:p>
           <a:p>
             <a:pPr lvl="1"/>
@@ -10578,6 +11500,13 @@
   <p:clrMapOvr>
     <a:masterClrMapping/>
   </p:clrMapOvr>
+  <p:timing>
+    <p:tnLst>
+      <p:par>
+        <p:cTn xmlns:p14="http://schemas.microsoft.com/office/powerpoint/2010/main" id="1" dur="indefinite" restart="never" nodeType="tmRoot"/>
+      </p:par>
+    </p:tnLst>
+  </p:timing>
 </p:sld>
 </file>
 
@@ -10671,13 +11600,8 @@
             </a:r>
             <a:r>
               <a:rPr lang="en-US" dirty="0" smtClean="0"/>
-              <a:t>: Allows you to “fake” server responses, which aides in testing how your application responds when AJAX calls succeed </a:t>
-            </a:r>
-            <a:r>
-              <a:rPr lang="en-US" smtClean="0"/>
-              <a:t>or fail.</a:t>
-            </a:r>
-            <a:endParaRPr lang="en-US" dirty="0" smtClean="0"/>
+              <a:t>: Allows you to “fake” server responses, which aides in testing how your application responds when AJAX calls succeed or fail.</a:t>
+            </a:r>
           </a:p>
         </p:txBody>
       </p:sp>
@@ -10691,6 +11615,13 @@
   <p:clrMapOvr>
     <a:masterClrMapping/>
   </p:clrMapOvr>
+  <p:timing>
+    <p:tnLst>
+      <p:par>
+        <p:cTn xmlns:p14="http://schemas.microsoft.com/office/powerpoint/2010/main" id="1" dur="indefinite" restart="never" nodeType="tmRoot"/>
+      </p:par>
+    </p:tnLst>
+  </p:timing>
 </p:sld>
 </file>
 
@@ -10836,6 +11767,13 @@
   <p:clrMapOvr>
     <a:masterClrMapping/>
   </p:clrMapOvr>
+  <p:timing>
+    <p:tnLst>
+      <p:par>
+        <p:cTn xmlns:p14="http://schemas.microsoft.com/office/powerpoint/2010/main" id="1" dur="indefinite" restart="never" nodeType="tmRoot"/>
+      </p:par>
+    </p:tnLst>
+  </p:timing>
 </p:sld>
 </file>
 
@@ -10913,7 +11851,15 @@
             </a:r>
             <a:r>
               <a:rPr lang="en-US" b="1" dirty="0"/>
-              <a:t>We no longer need to use calls to resolve and reject</a:t>
+              <a:t>We no longer need to </a:t>
+            </a:r>
+            <a:r>
+              <a:rPr lang="en-US" b="1" dirty="0" smtClean="0"/>
+              <a:t>call resolve </a:t>
+            </a:r>
+            <a:r>
+              <a:rPr lang="en-US" b="1" dirty="0"/>
+              <a:t>and reject</a:t>
             </a:r>
             <a:r>
               <a:rPr lang="en-US" b="1" dirty="0" smtClean="0"/>
@@ -10949,8 +11895,24 @@
             </a:r>
             <a:r>
               <a:rPr lang="en-US" dirty="0"/>
-              <a:t>. This will force the function to wait until the asynchronous operation has completed. The resolved value or rejected error will be returned.</a:t>
-            </a:r>
+              <a:t>. This will force the function to wait until the asynchronous operation has completed. The resolved value or rejected error will be returned</a:t>
+            </a:r>
+            <a:r>
+              <a:rPr lang="en-US" dirty="0" smtClean="0"/>
+              <a:t>.</a:t>
+            </a:r>
+            <a:r>
+              <a:rPr lang="en-US" dirty="0">
+                <a:solidFill>
+                  <a:srgbClr val="FF0000"/>
+                </a:solidFill>
+                <a:latin typeface="ＭＳ ゴシック"/>
+                <a:ea typeface="ＭＳ ゴシック"/>
+                <a:cs typeface="ＭＳ ゴシック"/>
+              </a:rPr>
+              <a:t> ♬</a:t>
+            </a:r>
+            <a:endParaRPr lang="en-US" dirty="0"/>
           </a:p>
           <a:p>
             <a:r>
@@ -11011,6 +11973,13 @@
   <p:clrMapOvr>
     <a:masterClrMapping/>
   </p:clrMapOvr>
+  <p:timing>
+    <p:tnLst>
+      <p:par>
+        <p:cTn xmlns:p14="http://schemas.microsoft.com/office/powerpoint/2010/main" id="1" dur="indefinite" restart="never" nodeType="tmRoot"/>
+      </p:par>
+    </p:tnLst>
+  </p:timing>
 </p:sld>
 </file>
 
@@ -11169,6 +12138,13 @@
   <p:clrMapOvr>
     <a:masterClrMapping/>
   </p:clrMapOvr>
+  <p:timing>
+    <p:tnLst>
+      <p:par>
+        <p:cTn xmlns:p14="http://schemas.microsoft.com/office/powerpoint/2010/main" id="1" dur="indefinite" restart="never" nodeType="tmRoot"/>
+      </p:par>
+    </p:tnLst>
+  </p:timing>
 </p:sld>
 </file>
 
@@ -11281,8 +12257,24 @@
             <a:pPr lvl="1"/>
             <a:r>
               <a:rPr lang="en-US" dirty="0"/>
-              <a:t>Something that is special about generators is that the communication goes both ways - a value is passed to the caller, AND the value sent to the next next call is passed BACK to the generator. This becomes the value that the yield expression evaluates to.</a:t>
-            </a:r>
+              <a:t>Something that is special about generators is that the communication goes both ways - a value is passed to the caller, AND the value sent to the next next call is passed BACK to the generator. This becomes the value that the yield expression evaluates to</a:t>
+            </a:r>
+            <a:r>
+              <a:rPr lang="en-US" dirty="0" smtClean="0"/>
+              <a:t>.</a:t>
+            </a:r>
+            <a:r>
+              <a:rPr lang="en-US" dirty="0">
+                <a:solidFill>
+                  <a:srgbClr val="FF0000"/>
+                </a:solidFill>
+                <a:latin typeface="ＭＳ ゴシック"/>
+                <a:ea typeface="ＭＳ ゴシック"/>
+                <a:cs typeface="ＭＳ ゴシック"/>
+              </a:rPr>
+              <a:t> ♬</a:t>
+            </a:r>
+            <a:endParaRPr lang="en-US" dirty="0"/>
           </a:p>
           <a:p>
             <a:endParaRPr lang="en-US" dirty="0"/>
@@ -11299,6 +12291,13 @@
   <p:clrMapOvr>
     <a:masterClrMapping/>
   </p:clrMapOvr>
+  <p:timing>
+    <p:tnLst>
+      <p:par>
+        <p:cTn xmlns:p14="http://schemas.microsoft.com/office/powerpoint/2010/main" id="1" dur="indefinite" restart="never" nodeType="tmRoot"/>
+      </p:par>
+    </p:tnLst>
+  </p:timing>
 </p:sld>
 </file>
 
@@ -11446,6 +12445,13 @@
   <p:clrMapOvr>
     <a:masterClrMapping/>
   </p:clrMapOvr>
+  <p:timing>
+    <p:tnLst>
+      <p:par>
+        <p:cTn xmlns:p14="http://schemas.microsoft.com/office/powerpoint/2010/main" id="1" dur="indefinite" restart="never" nodeType="tmRoot"/>
+      </p:par>
+    </p:tnLst>
+  </p:timing>
 </p:sld>
 </file>
 
@@ -11643,6 +12649,18 @@
               <a:rPr lang="en-US" dirty="0" smtClean="0"/>
               <a:t>.</a:t>
             </a:r>
+            <a:r>
+              <a:rPr lang="en-US" dirty="0">
+                <a:solidFill>
+                  <a:srgbClr val="FF0000"/>
+                </a:solidFill>
+                <a:latin typeface="ＭＳ ゴシック"/>
+                <a:ea typeface="ＭＳ ゴシック"/>
+                <a:cs typeface="ＭＳ ゴシック"/>
+              </a:rPr>
+              <a:t> ♬</a:t>
+            </a:r>
+            <a:endParaRPr lang="en-US" dirty="0" smtClean="0"/>
           </a:p>
         </p:txBody>
       </p:sp>
@@ -11656,6 +12674,13 @@
   <p:clrMapOvr>
     <a:masterClrMapping/>
   </p:clrMapOvr>
+  <p:timing>
+    <p:tnLst>
+      <p:par>
+        <p:cTn xmlns:p14="http://schemas.microsoft.com/office/powerpoint/2010/main" id="1" dur="indefinite" restart="never" nodeType="tmRoot"/>
+      </p:par>
+    </p:tnLst>
+  </p:timing>
 </p:sld>
 </file>
 
@@ -11724,23 +12749,36 @@
             </a:r>
           </a:p>
           <a:p>
-            <a:r>
-              <a:rPr lang="en-US" dirty="0" smtClean="0"/>
-              <a:t>Using </a:t>
-            </a:r>
-            <a:r>
-              <a:rPr lang="en-US" dirty="0"/>
-              <a:t>delegation, combined with promises, allows us to define async/</a:t>
-            </a:r>
-            <a:r>
-              <a:rPr lang="en-US" dirty="0" smtClean="0"/>
-              <a:t>await.</a:t>
-            </a:r>
-          </a:p>
-          <a:p>
-            <a:r>
-              <a:rPr lang="en-US" dirty="0" smtClean="0"/>
-              <a:t>By using a generator iterator we can start a function that will make an async call, and then use the same iterator to return the result of the operation back to the calling function.</a:t>
+            <a:pPr marL="342900" lvl="1">
+              <a:buClr>
+                <a:schemeClr val="accent1"/>
+              </a:buClr>
+            </a:pPr>
+            <a:r>
+              <a:rPr lang="en-US" sz="2200" dirty="0" smtClean="0"/>
+              <a:t>By using a generator iterator we can start a function that will make an async call, and then use the same iterator to return the result of the operation back to the calling function. Using delegation, combined with promises, allows us to define async/await.</a:t>
+            </a:r>
+            <a:r>
+              <a:rPr lang="en-US" sz="2200" dirty="0">
+                <a:solidFill>
+                  <a:srgbClr val="FF0000"/>
+                </a:solidFill>
+                <a:latin typeface="ＭＳ ゴシック"/>
+                <a:ea typeface="ＭＳ ゴシック"/>
+                <a:cs typeface="ＭＳ ゴシック"/>
+              </a:rPr>
+              <a:t> </a:t>
+            </a:r>
+            <a:r>
+              <a:rPr lang="en-US" dirty="0" smtClean="0">
+                <a:solidFill>
+                  <a:srgbClr val="FF0000"/>
+                </a:solidFill>
+                <a:latin typeface="ＭＳ ゴシック"/>
+                <a:ea typeface="ＭＳ ゴシック"/>
+                <a:cs typeface="ＭＳ ゴシック"/>
+              </a:rPr>
+              <a:t>♬</a:t>
             </a:r>
             <a:endParaRPr lang="en-US" dirty="0"/>
           </a:p>
@@ -11756,6 +12794,13 @@
   <p:clrMapOvr>
     <a:masterClrMapping/>
   </p:clrMapOvr>
+  <p:timing>
+    <p:tnLst>
+      <p:par>
+        <p:cTn xmlns:p14="http://schemas.microsoft.com/office/powerpoint/2010/main" id="1" dur="indefinite" restart="never" nodeType="tmRoot"/>
+      </p:par>
+    </p:tnLst>
+  </p:timing>
 </p:sld>
 </file>
 
@@ -11881,6 +12926,13 @@
   <p:clrMapOvr>
     <a:masterClrMapping/>
   </p:clrMapOvr>
+  <p:timing>
+    <p:tnLst>
+      <p:par>
+        <p:cTn xmlns:p14="http://schemas.microsoft.com/office/powerpoint/2010/main" id="1" dur="indefinite" restart="never" nodeType="tmRoot"/>
+      </p:par>
+    </p:tnLst>
+  </p:timing>
 </p:sld>
 </file>
 
@@ -11941,8 +12993,24 @@
           <a:p>
             <a:r>
               <a:rPr lang="en-US" dirty="0" smtClean="0"/>
-              <a:t>What is the major downside of coding this way?</a:t>
-            </a:r>
+              <a:t>What is the major downside of coding this way</a:t>
+            </a:r>
+            <a:r>
+              <a:rPr lang="en-US" dirty="0" smtClean="0"/>
+              <a:t>?</a:t>
+            </a:r>
+            <a:r>
+              <a:rPr lang="en-US" dirty="0">
+                <a:solidFill>
+                  <a:srgbClr val="FF0000"/>
+                </a:solidFill>
+                <a:latin typeface="ＭＳ ゴシック"/>
+                <a:ea typeface="ＭＳ ゴシック"/>
+                <a:cs typeface="ＭＳ ゴシック"/>
+              </a:rPr>
+              <a:t> ♬</a:t>
+            </a:r>
+            <a:endParaRPr lang="en-US" dirty="0" smtClean="0"/>
           </a:p>
           <a:p>
             <a:pPr lvl="1"/>
@@ -12554,6 +13622,13 @@
   <p:clrMapOvr>
     <a:masterClrMapping/>
   </p:clrMapOvr>
+  <p:timing>
+    <p:tnLst>
+      <p:par>
+        <p:cTn xmlns:p14="http://schemas.microsoft.com/office/powerpoint/2010/main" id="1" dur="indefinite" restart="never" nodeType="tmRoot"/>
+      </p:par>
+    </p:tnLst>
+  </p:timing>
 </p:sld>
 </file>
 
@@ -13209,8 +14284,24 @@
             <a:pPr lvl="1"/>
             <a:r>
               <a:rPr lang="en-US" dirty="0" smtClean="0"/>
-              <a:t>When the asynchronous function is called, we pass these callback functions as arguments, and the code in these functions will be executed when the main operations of the asynchronous function have completed.</a:t>
-            </a:r>
+              <a:t>When the asynchronous function is called, we pass these callback functions as arguments, and the code in these functions will be executed when the main operations of the asynchronous function have completed</a:t>
+            </a:r>
+            <a:r>
+              <a:rPr lang="en-US" dirty="0" smtClean="0"/>
+              <a:t>.</a:t>
+            </a:r>
+            <a:r>
+              <a:rPr lang="en-US" dirty="0">
+                <a:solidFill>
+                  <a:srgbClr val="FF0000"/>
+                </a:solidFill>
+                <a:latin typeface="ＭＳ ゴシック"/>
+                <a:ea typeface="ＭＳ ゴシック"/>
+                <a:cs typeface="ＭＳ ゴシック"/>
+              </a:rPr>
+              <a:t> ♬</a:t>
+            </a:r>
+            <a:endParaRPr lang="en-US" dirty="0" smtClean="0"/>
           </a:p>
         </p:txBody>
       </p:sp>
@@ -13450,8 +14541,12 @@
           </a:p>
           <a:p>
             <a:r>
-              <a:rPr lang="en-US" dirty="0" smtClean="0"/>
-              <a:t>With calls that involve asynchronous operations, the call is added to the stack.</a:t>
+              <a:rPr lang="en-US" dirty="0"/>
+              <a:t>C</a:t>
+            </a:r>
+            <a:r>
+              <a:rPr lang="en-US" dirty="0" smtClean="0"/>
+              <a:t>alls that involve asynchronous operations are also added to the stack.</a:t>
             </a:r>
           </a:p>
           <a:p>
@@ -13498,7 +14593,324 @@
   <p:timing>
     <p:tnLst>
       <p:par>
-        <p:cTn xmlns:p14="http://schemas.microsoft.com/office/powerpoint/2010/main" id="1" dur="indefinite" restart="never" nodeType="tmRoot"/>
+        <p:cTn xmlns:p14="http://schemas.microsoft.com/office/powerpoint/2010/main" id="1" dur="indefinite" restart="never" nodeType="tmRoot">
+          <p:childTnLst>
+            <p:seq concurrent="1" nextAc="seek">
+              <p:cTn id="2" dur="indefinite" nodeType="mainSeq">
+                <p:childTnLst>
+                  <p:par>
+                    <p:cTn id="3" fill="hold">
+                      <p:stCondLst>
+                        <p:cond delay="indefinite"/>
+                      </p:stCondLst>
+                      <p:childTnLst>
+                        <p:par>
+                          <p:cTn id="4" fill="hold">
+                            <p:stCondLst>
+                              <p:cond delay="0"/>
+                            </p:stCondLst>
+                            <p:childTnLst>
+                              <p:par>
+                                <p:cTn id="5" presetID="1" presetClass="entr" presetSubtype="0" fill="hold" nodeType="clickEffect">
+                                  <p:stCondLst>
+                                    <p:cond delay="0"/>
+                                  </p:stCondLst>
+                                  <p:childTnLst>
+                                    <p:set>
+                                      <p:cBhvr>
+                                        <p:cTn id="6" dur="1" fill="hold">
+                                          <p:stCondLst>
+                                            <p:cond delay="0"/>
+                                          </p:stCondLst>
+                                        </p:cTn>
+                                        <p:tgtEl>
+                                          <p:spTgt spid="3">
+                                            <p:txEl>
+                                              <p:pRg st="2" end="2"/>
+                                            </p:txEl>
+                                          </p:spTgt>
+                                        </p:tgtEl>
+                                        <p:attrNameLst>
+                                          <p:attrName>style.visibility</p:attrName>
+                                        </p:attrNameLst>
+                                      </p:cBhvr>
+                                      <p:to>
+                                        <p:strVal val="visible"/>
+                                      </p:to>
+                                    </p:set>
+                                  </p:childTnLst>
+                                </p:cTn>
+                              </p:par>
+                            </p:childTnLst>
+                          </p:cTn>
+                        </p:par>
+                      </p:childTnLst>
+                    </p:cTn>
+                  </p:par>
+                  <p:par>
+                    <p:cTn id="7" fill="hold">
+                      <p:stCondLst>
+                        <p:cond delay="indefinite"/>
+                      </p:stCondLst>
+                      <p:childTnLst>
+                        <p:par>
+                          <p:cTn id="8" fill="hold">
+                            <p:stCondLst>
+                              <p:cond delay="0"/>
+                            </p:stCondLst>
+                            <p:childTnLst>
+                              <p:par>
+                                <p:cTn id="9" presetID="1" presetClass="entr" presetSubtype="0" fill="hold" nodeType="clickEffect">
+                                  <p:stCondLst>
+                                    <p:cond delay="0"/>
+                                  </p:stCondLst>
+                                  <p:childTnLst>
+                                    <p:set>
+                                      <p:cBhvr>
+                                        <p:cTn id="10" dur="1" fill="hold">
+                                          <p:stCondLst>
+                                            <p:cond delay="0"/>
+                                          </p:stCondLst>
+                                        </p:cTn>
+                                        <p:tgtEl>
+                                          <p:spTgt spid="3">
+                                            <p:txEl>
+                                              <p:pRg st="3" end="3"/>
+                                            </p:txEl>
+                                          </p:spTgt>
+                                        </p:tgtEl>
+                                        <p:attrNameLst>
+                                          <p:attrName>style.visibility</p:attrName>
+                                        </p:attrNameLst>
+                                      </p:cBhvr>
+                                      <p:to>
+                                        <p:strVal val="visible"/>
+                                      </p:to>
+                                    </p:set>
+                                  </p:childTnLst>
+                                </p:cTn>
+                              </p:par>
+                            </p:childTnLst>
+                          </p:cTn>
+                        </p:par>
+                      </p:childTnLst>
+                    </p:cTn>
+                  </p:par>
+                  <p:par>
+                    <p:cTn id="11" fill="hold">
+                      <p:stCondLst>
+                        <p:cond delay="indefinite"/>
+                      </p:stCondLst>
+                      <p:childTnLst>
+                        <p:par>
+                          <p:cTn id="12" fill="hold">
+                            <p:stCondLst>
+                              <p:cond delay="0"/>
+                            </p:stCondLst>
+                            <p:childTnLst>
+                              <p:par>
+                                <p:cTn id="13" presetID="1" presetClass="entr" presetSubtype="0" fill="hold" nodeType="clickEffect">
+                                  <p:stCondLst>
+                                    <p:cond delay="0"/>
+                                  </p:stCondLst>
+                                  <p:childTnLst>
+                                    <p:set>
+                                      <p:cBhvr>
+                                        <p:cTn id="14" dur="1" fill="hold">
+                                          <p:stCondLst>
+                                            <p:cond delay="0"/>
+                                          </p:stCondLst>
+                                        </p:cTn>
+                                        <p:tgtEl>
+                                          <p:spTgt spid="3">
+                                            <p:txEl>
+                                              <p:pRg st="4" end="4"/>
+                                            </p:txEl>
+                                          </p:spTgt>
+                                        </p:tgtEl>
+                                        <p:attrNameLst>
+                                          <p:attrName>style.visibility</p:attrName>
+                                        </p:attrNameLst>
+                                      </p:cBhvr>
+                                      <p:to>
+                                        <p:strVal val="visible"/>
+                                      </p:to>
+                                    </p:set>
+                                  </p:childTnLst>
+                                </p:cTn>
+                              </p:par>
+                            </p:childTnLst>
+                          </p:cTn>
+                        </p:par>
+                      </p:childTnLst>
+                    </p:cTn>
+                  </p:par>
+                  <p:par>
+                    <p:cTn id="15" fill="hold">
+                      <p:stCondLst>
+                        <p:cond delay="indefinite"/>
+                      </p:stCondLst>
+                      <p:childTnLst>
+                        <p:par>
+                          <p:cTn id="16" fill="hold">
+                            <p:stCondLst>
+                              <p:cond delay="0"/>
+                            </p:stCondLst>
+                            <p:childTnLst>
+                              <p:par>
+                                <p:cTn id="17" presetID="1" presetClass="entr" presetSubtype="0" fill="hold" nodeType="clickEffect">
+                                  <p:stCondLst>
+                                    <p:cond delay="0"/>
+                                  </p:stCondLst>
+                                  <p:childTnLst>
+                                    <p:set>
+                                      <p:cBhvr>
+                                        <p:cTn id="18" dur="1" fill="hold">
+                                          <p:stCondLst>
+                                            <p:cond delay="0"/>
+                                          </p:stCondLst>
+                                        </p:cTn>
+                                        <p:tgtEl>
+                                          <p:spTgt spid="3">
+                                            <p:txEl>
+                                              <p:pRg st="5" end="5"/>
+                                            </p:txEl>
+                                          </p:spTgt>
+                                        </p:tgtEl>
+                                        <p:attrNameLst>
+                                          <p:attrName>style.visibility</p:attrName>
+                                        </p:attrNameLst>
+                                      </p:cBhvr>
+                                      <p:to>
+                                        <p:strVal val="visible"/>
+                                      </p:to>
+                                    </p:set>
+                                  </p:childTnLst>
+                                </p:cTn>
+                              </p:par>
+                            </p:childTnLst>
+                          </p:cTn>
+                        </p:par>
+                      </p:childTnLst>
+                    </p:cTn>
+                  </p:par>
+                  <p:par>
+                    <p:cTn id="19" fill="hold">
+                      <p:stCondLst>
+                        <p:cond delay="indefinite"/>
+                      </p:stCondLst>
+                      <p:childTnLst>
+                        <p:par>
+                          <p:cTn id="20" fill="hold">
+                            <p:stCondLst>
+                              <p:cond delay="0"/>
+                            </p:stCondLst>
+                            <p:childTnLst>
+                              <p:par>
+                                <p:cTn id="21" presetID="1" presetClass="entr" presetSubtype="0" fill="hold" nodeType="clickEffect">
+                                  <p:stCondLst>
+                                    <p:cond delay="0"/>
+                                  </p:stCondLst>
+                                  <p:childTnLst>
+                                    <p:set>
+                                      <p:cBhvr>
+                                        <p:cTn id="22" dur="1" fill="hold">
+                                          <p:stCondLst>
+                                            <p:cond delay="0"/>
+                                          </p:stCondLst>
+                                        </p:cTn>
+                                        <p:tgtEl>
+                                          <p:spTgt spid="3">
+                                            <p:txEl>
+                                              <p:pRg st="6" end="6"/>
+                                            </p:txEl>
+                                          </p:spTgt>
+                                        </p:tgtEl>
+                                        <p:attrNameLst>
+                                          <p:attrName>style.visibility</p:attrName>
+                                        </p:attrNameLst>
+                                      </p:cBhvr>
+                                      <p:to>
+                                        <p:strVal val="visible"/>
+                                      </p:to>
+                                    </p:set>
+                                  </p:childTnLst>
+                                </p:cTn>
+                              </p:par>
+                            </p:childTnLst>
+                          </p:cTn>
+                        </p:par>
+                      </p:childTnLst>
+                    </p:cTn>
+                  </p:par>
+                  <p:par>
+                    <p:cTn id="23" fill="hold">
+                      <p:stCondLst>
+                        <p:cond delay="indefinite"/>
+                      </p:stCondLst>
+                      <p:childTnLst>
+                        <p:par>
+                          <p:cTn id="24" fill="hold">
+                            <p:stCondLst>
+                              <p:cond delay="0"/>
+                            </p:stCondLst>
+                            <p:childTnLst>
+                              <p:par>
+                                <p:cTn id="25" presetID="1" presetClass="entr" presetSubtype="0" fill="hold" nodeType="clickEffect">
+                                  <p:stCondLst>
+                                    <p:cond delay="0"/>
+                                  </p:stCondLst>
+                                  <p:childTnLst>
+                                    <p:set>
+                                      <p:cBhvr>
+                                        <p:cTn id="26" dur="1" fill="hold">
+                                          <p:stCondLst>
+                                            <p:cond delay="0"/>
+                                          </p:stCondLst>
+                                        </p:cTn>
+                                        <p:tgtEl>
+                                          <p:spTgt spid="3">
+                                            <p:txEl>
+                                              <p:pRg st="7" end="7"/>
+                                            </p:txEl>
+                                          </p:spTgt>
+                                        </p:tgtEl>
+                                        <p:attrNameLst>
+                                          <p:attrName>style.visibility</p:attrName>
+                                        </p:attrNameLst>
+                                      </p:cBhvr>
+                                      <p:to>
+                                        <p:strVal val="visible"/>
+                                      </p:to>
+                                    </p:set>
+                                  </p:childTnLst>
+                                </p:cTn>
+                              </p:par>
+                            </p:childTnLst>
+                          </p:cTn>
+                        </p:par>
+                      </p:childTnLst>
+                    </p:cTn>
+                  </p:par>
+                </p:childTnLst>
+              </p:cTn>
+              <p:prevCondLst>
+                <p:cond evt="onPrev" delay="0">
+                  <p:tgtEl>
+                    <p:sldTgt/>
+                  </p:tgtEl>
+                </p:cond>
+              </p:prevCondLst>
+              <p:nextCondLst>
+                <p:cond evt="onNext" delay="0">
+                  <p:tgtEl>
+                    <p:sldTgt/>
+                  </p:tgtEl>
+                </p:cond>
+              </p:nextCondLst>
+            </p:seq>
+          </p:childTnLst>
+        </p:cTn>
       </p:par>
     </p:tnLst>
   </p:timing>

</xml_diff>

<commit_message>
Finishing pres, cleaning up code a bit.
</commit_message>
<xml_diff>
--- a/Async_Discussion_9_29_15.pptx
+++ b/Async_Discussion_9_29_15.pptx
@@ -5,7 +5,7 @@
     <p:sldMasterId id="2147483660" r:id="rId1"/>
   </p:sldMasterIdLst>
   <p:notesMasterIdLst>
-    <p:notesMasterId r:id="rId40"/>
+    <p:notesMasterId r:id="rId41"/>
   </p:notesMasterIdLst>
   <p:sldIdLst>
     <p:sldId id="256" r:id="rId2"/>
@@ -41,11 +41,12 @@
     <p:sldId id="298" r:id="rId32"/>
     <p:sldId id="293" r:id="rId33"/>
     <p:sldId id="294" r:id="rId34"/>
-    <p:sldId id="290" r:id="rId35"/>
-    <p:sldId id="291" r:id="rId36"/>
-    <p:sldId id="295" r:id="rId37"/>
-    <p:sldId id="288" r:id="rId38"/>
-    <p:sldId id="289" r:id="rId39"/>
+    <p:sldId id="299" r:id="rId35"/>
+    <p:sldId id="290" r:id="rId36"/>
+    <p:sldId id="291" r:id="rId37"/>
+    <p:sldId id="295" r:id="rId38"/>
+    <p:sldId id="288" r:id="rId39"/>
+    <p:sldId id="289" r:id="rId40"/>
   </p:sldIdLst>
   <p:sldSz cx="9144000" cy="6858000" type="screen4x3"/>
   <p:notesSz cx="6858000" cy="9144000"/>
@@ -182,6 +183,7 @@
             <p14:sldId id="298"/>
             <p14:sldId id="293"/>
             <p14:sldId id="294"/>
+            <p14:sldId id="299"/>
             <p14:sldId id="290"/>
             <p14:sldId id="291"/>
             <p14:sldId id="295"/>
@@ -2158,6 +2160,29 @@
               <a:tabLst/>
               <a:defRPr/>
             </a:pPr>
+            <a:r>
+              <a:rPr lang="en-US" baseline="0" dirty="0" smtClean="0"/>
+              <a:t>Can move the asterisk to just before the function name.</a:t>
+            </a:r>
+          </a:p>
+          <a:p>
+            <a:pPr marL="171450" marR="0" indent="-171450" algn="l" defTabSz="457200" rtl="0" eaLnBrk="1" fontAlgn="auto" latinLnBrk="0" hangingPunct="1">
+              <a:lnSpc>
+                <a:spcPct val="100000"/>
+              </a:lnSpc>
+              <a:spcBef>
+                <a:spcPts val="0"/>
+              </a:spcBef>
+              <a:spcAft>
+                <a:spcPts val="0"/>
+              </a:spcAft>
+              <a:buClrTx/>
+              <a:buSzTx/>
+              <a:buFontTx/>
+              <a:buChar char="-"/>
+              <a:tabLst/>
+              <a:defRPr/>
+            </a:pPr>
             <a:endParaRPr lang="en-US" dirty="0" smtClean="0"/>
           </a:p>
         </p:txBody>
@@ -2432,7 +2457,10 @@
               <a:tabLst/>
               <a:defRPr/>
             </a:pPr>
-            <a:endParaRPr lang="en-US" dirty="0" smtClean="0"/>
+            <a:r>
+              <a:rPr lang="en-US" dirty="0" smtClean="0"/>
+              <a:t>Example: 05_Generators/01_basic_generator.js</a:t>
+            </a:r>
           </a:p>
           <a:p>
             <a:pPr marL="0" indent="0">
@@ -2537,6 +2565,202 @@
           <a:bodyPr/>
           <a:lstStyle/>
           <a:p>
+            <a:pPr marL="171450" indent="-171450">
+              <a:buFontTx/>
+              <a:buChar char="-"/>
+            </a:pPr>
+            <a:r>
+              <a:rPr lang="en-US" baseline="0" dirty="0" smtClean="0"/>
+              <a:t>Example: 05_Generators/02_for_of.js</a:t>
+            </a:r>
+          </a:p>
+          <a:p>
+            <a:pPr marL="171450" indent="-171450">
+              <a:buFontTx/>
+              <a:buChar char="-"/>
+            </a:pPr>
+            <a:endParaRPr lang="en-US" dirty="0"/>
+          </a:p>
+        </p:txBody>
+      </p:sp>
+      <p:sp>
+        <p:nvSpPr>
+          <p:cNvPr id="4" name="Slide Number Placeholder 3"/>
+          <p:cNvSpPr>
+            <a:spLocks noGrp="1"/>
+          </p:cNvSpPr>
+          <p:nvPr>
+            <p:ph type="sldNum" sz="quarter" idx="10"/>
+          </p:nvPr>
+        </p:nvSpPr>
+        <p:spPr/>
+        <p:txBody>
+          <a:bodyPr/>
+          <a:lstStyle/>
+          <a:p>
+            <a:fld id="{6ABAFA45-634E-644E-9C3F-E924E422D512}" type="slidenum">
+              <a:rPr lang="en-US" smtClean="0"/>
+              <a:t>32</a:t>
+            </a:fld>
+            <a:endParaRPr lang="en-US"/>
+          </a:p>
+        </p:txBody>
+      </p:sp>
+    </p:spTree>
+    <p:extLst>
+      <p:ext uri="{BB962C8B-B14F-4D97-AF65-F5344CB8AC3E}">
+        <p14:creationId xmlns:p14="http://schemas.microsoft.com/office/powerpoint/2010/main" val="410985000"/>
+      </p:ext>
+    </p:extLst>
+  </p:cSld>
+  <p:clrMapOvr>
+    <a:masterClrMapping/>
+  </p:clrMapOvr>
+</p:notes>
+</file>
+
+<file path=ppt/notesSlides/notesSlide25.xml><?xml version="1.0" encoding="utf-8"?>
+<p:notes xmlns:a="http://schemas.openxmlformats.org/drawingml/2006/main" xmlns:r="http://schemas.openxmlformats.org/officeDocument/2006/relationships" xmlns:p="http://schemas.openxmlformats.org/presentationml/2006/main">
+  <p:cSld>
+    <p:spTree>
+      <p:nvGrpSpPr>
+        <p:cNvPr id="1" name=""/>
+        <p:cNvGrpSpPr/>
+        <p:nvPr/>
+      </p:nvGrpSpPr>
+      <p:grpSpPr>
+        <a:xfrm>
+          <a:off x="0" y="0"/>
+          <a:ext cx="0" cy="0"/>
+          <a:chOff x="0" y="0"/>
+          <a:chExt cx="0" cy="0"/>
+        </a:xfrm>
+      </p:grpSpPr>
+      <p:sp>
+        <p:nvSpPr>
+          <p:cNvPr id="2" name="Slide Image Placeholder 1"/>
+          <p:cNvSpPr>
+            <a:spLocks noGrp="1" noRot="1" noChangeAspect="1"/>
+          </p:cNvSpPr>
+          <p:nvPr>
+            <p:ph type="sldImg"/>
+          </p:nvPr>
+        </p:nvSpPr>
+        <p:spPr/>
+      </p:sp>
+      <p:sp>
+        <p:nvSpPr>
+          <p:cNvPr id="3" name="Notes Placeholder 2"/>
+          <p:cNvSpPr>
+            <a:spLocks noGrp="1"/>
+          </p:cNvSpPr>
+          <p:nvPr>
+            <p:ph type="body" idx="1"/>
+          </p:nvPr>
+        </p:nvSpPr>
+        <p:spPr/>
+        <p:txBody>
+          <a:bodyPr/>
+          <a:lstStyle/>
+          <a:p>
+            <a:pPr marL="171450" indent="-171450">
+              <a:buFontTx/>
+              <a:buChar char="-"/>
+            </a:pPr>
+            <a:r>
+              <a:rPr lang="en-US" smtClean="0"/>
+              <a:t>Example: 05_Generators/03_generator_async.js</a:t>
+            </a:r>
+          </a:p>
+          <a:p>
+            <a:pPr marL="171450" indent="-171450">
+              <a:buFontTx/>
+              <a:buChar char="-"/>
+            </a:pPr>
+            <a:endParaRPr lang="en-US" dirty="0"/>
+          </a:p>
+        </p:txBody>
+      </p:sp>
+      <p:sp>
+        <p:nvSpPr>
+          <p:cNvPr id="4" name="Slide Number Placeholder 3"/>
+          <p:cNvSpPr>
+            <a:spLocks noGrp="1"/>
+          </p:cNvSpPr>
+          <p:nvPr>
+            <p:ph type="sldNum" sz="quarter" idx="10"/>
+          </p:nvPr>
+        </p:nvSpPr>
+        <p:spPr/>
+        <p:txBody>
+          <a:bodyPr/>
+          <a:lstStyle/>
+          <a:p>
+            <a:fld id="{6ABAFA45-634E-644E-9C3F-E924E422D512}" type="slidenum">
+              <a:rPr lang="en-US" smtClean="0"/>
+              <a:t>33</a:t>
+            </a:fld>
+            <a:endParaRPr lang="en-US"/>
+          </a:p>
+        </p:txBody>
+      </p:sp>
+    </p:spTree>
+    <p:extLst>
+      <p:ext uri="{BB962C8B-B14F-4D97-AF65-F5344CB8AC3E}">
+        <p14:creationId xmlns:p14="http://schemas.microsoft.com/office/powerpoint/2010/main" val="1207560369"/>
+      </p:ext>
+    </p:extLst>
+  </p:cSld>
+  <p:clrMapOvr>
+    <a:masterClrMapping/>
+  </p:clrMapOvr>
+</p:notes>
+</file>
+
+<file path=ppt/notesSlides/notesSlide26.xml><?xml version="1.0" encoding="utf-8"?>
+<p:notes xmlns:a="http://schemas.openxmlformats.org/drawingml/2006/main" xmlns:r="http://schemas.openxmlformats.org/officeDocument/2006/relationships" xmlns:p="http://schemas.openxmlformats.org/presentationml/2006/main">
+  <p:cSld>
+    <p:spTree>
+      <p:nvGrpSpPr>
+        <p:cNvPr id="1" name=""/>
+        <p:cNvGrpSpPr/>
+        <p:nvPr/>
+      </p:nvGrpSpPr>
+      <p:grpSpPr>
+        <a:xfrm>
+          <a:off x="0" y="0"/>
+          <a:ext cx="0" cy="0"/>
+          <a:chOff x="0" y="0"/>
+          <a:chExt cx="0" cy="0"/>
+        </a:xfrm>
+      </p:grpSpPr>
+      <p:sp>
+        <p:nvSpPr>
+          <p:cNvPr id="2" name="Slide Image Placeholder 1"/>
+          <p:cNvSpPr>
+            <a:spLocks noGrp="1" noRot="1" noChangeAspect="1"/>
+          </p:cNvSpPr>
+          <p:nvPr>
+            <p:ph type="sldImg"/>
+          </p:nvPr>
+        </p:nvSpPr>
+        <p:spPr/>
+      </p:sp>
+      <p:sp>
+        <p:nvSpPr>
+          <p:cNvPr id="3" name="Notes Placeholder 2"/>
+          <p:cNvSpPr>
+            <a:spLocks noGrp="1"/>
+          </p:cNvSpPr>
+          <p:nvPr>
+            <p:ph type="body" idx="1"/>
+          </p:nvPr>
+        </p:nvSpPr>
+        <p:spPr/>
+        <p:txBody>
+          <a:bodyPr/>
+          <a:lstStyle/>
+          <a:p>
             <a:pPr marL="171450" marR="0" lvl="1" indent="-171450" algn="l" defTabSz="457200" rtl="0" eaLnBrk="1" fontAlgn="auto" latinLnBrk="0" hangingPunct="1">
               <a:lnSpc>
                 <a:spcPct val="100000"/>
@@ -2601,7 +2825,7 @@
           <a:p>
             <a:fld id="{6ABAFA45-634E-644E-9C3F-E924E422D512}" type="slidenum">
               <a:rPr lang="en-US" smtClean="0"/>
-              <a:t>34</a:t>
+              <a:t>35</a:t>
             </a:fld>
             <a:endParaRPr lang="en-US"/>
           </a:p>
@@ -6691,7 +6915,12 @@
             <p:ph type="ctrTitle"/>
           </p:nvPr>
         </p:nvSpPr>
-        <p:spPr/>
+        <p:spPr>
+          <a:xfrm>
+            <a:off x="685800" y="1330739"/>
+            <a:ext cx="7543800" cy="2593975"/>
+          </a:xfrm>
+        </p:spPr>
         <p:txBody>
           <a:bodyPr/>
           <a:lstStyle/>
@@ -6719,6 +6948,29 @@
           <a:bodyPr/>
           <a:lstStyle/>
           <a:p>
+            <a:r>
+              <a:rPr lang="en-US" dirty="0"/>
+              <a:t>Code: </a:t>
+            </a:r>
+            <a:r>
+              <a:rPr lang="en-US" dirty="0">
+                <a:hlinkClick r:id="rId3"/>
+              </a:rPr>
+              <a:t>https://github.com/cheryly279/</a:t>
+            </a:r>
+            <a:r>
+              <a:rPr lang="en-US" dirty="0" smtClean="0">
+                <a:hlinkClick r:id="rId3"/>
+              </a:rPr>
+              <a:t>AsyncDiscussion</a:t>
+            </a:r>
+            <a:endParaRPr lang="en-US" dirty="0" smtClean="0"/>
+          </a:p>
+          <a:p>
+            <a:r>
+              <a:rPr lang="en-US" dirty="0" smtClean="0"/>
+              <a:t>Presentation: xxx</a:t>
+            </a:r>
             <a:endParaRPr lang="en-US" dirty="0"/>
           </a:p>
         </p:txBody>
@@ -13604,62 +13856,32 @@
               <a:t>declare/define the function with an asterisk (</a:t>
             </a:r>
             <a:r>
+              <a:rPr lang="en-US" dirty="0" smtClean="0">
+                <a:latin typeface="Courier"/>
+                <a:cs typeface="Courier"/>
+              </a:rPr>
+              <a:t>function</a:t>
+            </a:r>
+            <a:r>
               <a:rPr lang="en-US" dirty="0">
                 <a:latin typeface="Courier"/>
                 <a:cs typeface="Courier"/>
               </a:rPr>
-              <a:t>function</a:t>
-            </a:r>
-            <a:r>
-              <a:rPr lang="en-US" dirty="0" smtClean="0">
-                <a:latin typeface="Courier"/>
-                <a:cs typeface="Courier"/>
-              </a:rPr>
               <a:t>*</a:t>
             </a:r>
             <a:r>
+              <a:rPr lang="en-US" dirty="0" smtClean="0"/>
+              <a:t>).</a:t>
+            </a:r>
+          </a:p>
+          <a:p>
+            <a:r>
+              <a:rPr lang="en-US" dirty="0" smtClean="0"/>
+              <a:t>Yield </a:t>
+            </a:r>
+            <a:r>
               <a:rPr lang="en-US" dirty="0"/>
-              <a:t> </a:t>
-            </a:r>
-            <a:r>
-              <a:rPr lang="en-US" dirty="0" smtClean="0">
-                <a:latin typeface="Courier"/>
-                <a:cs typeface="Courier"/>
-              </a:rPr>
-              <a:t>fun1</a:t>
-            </a:r>
-            <a:r>
-              <a:rPr lang="en-US" dirty="0" smtClean="0"/>
-              <a:t>)</a:t>
-            </a:r>
-            <a:r>
-              <a:rPr lang="en-US" dirty="0"/>
-              <a:t>. </a:t>
-            </a:r>
-            <a:r>
-              <a:rPr lang="en-US" sz="1800" dirty="0" smtClean="0"/>
-              <a:t>(Can </a:t>
-            </a:r>
-            <a:r>
-              <a:rPr lang="en-US" sz="1800" dirty="0"/>
-              <a:t>also move the asterisk to just before the function name, as in function </a:t>
-            </a:r>
-            <a:r>
-              <a:rPr lang="en-US" sz="1800" dirty="0">
-                <a:latin typeface="Courier"/>
-                <a:cs typeface="Courier"/>
-              </a:rPr>
-              <a:t>*fun</a:t>
-            </a:r>
-            <a:r>
-              <a:rPr lang="en-US" sz="1800" dirty="0" smtClean="0"/>
-              <a:t>.)</a:t>
-            </a:r>
-          </a:p>
-          <a:p>
-            <a:r>
-              <a:rPr lang="en-US" dirty="0"/>
-              <a:t>Yield expressions indicate where the function can be paused</a:t>
+              <a:t>expressions indicate where the function can be paused</a:t>
             </a:r>
             <a:r>
               <a:rPr lang="en-US" dirty="0" smtClean="0"/>
@@ -13682,7 +13904,337 @@
   <p:timing>
     <p:tnLst>
       <p:par>
-        <p:cTn xmlns:p14="http://schemas.microsoft.com/office/powerpoint/2010/main" id="1" dur="indefinite" restart="never" nodeType="tmRoot"/>
+        <p:cTn xmlns:p14="http://schemas.microsoft.com/office/powerpoint/2010/main" id="1" dur="indefinite" restart="never" nodeType="tmRoot">
+          <p:childTnLst>
+            <p:seq concurrent="1" nextAc="seek">
+              <p:cTn id="2" dur="indefinite" nodeType="mainSeq">
+                <p:childTnLst>
+                  <p:par>
+                    <p:cTn id="3" fill="hold">
+                      <p:stCondLst>
+                        <p:cond delay="indefinite"/>
+                      </p:stCondLst>
+                      <p:childTnLst>
+                        <p:par>
+                          <p:cTn id="4" fill="hold">
+                            <p:stCondLst>
+                              <p:cond delay="0"/>
+                            </p:stCondLst>
+                            <p:childTnLst>
+                              <p:par>
+                                <p:cTn id="5" presetID="1" presetClass="entr" presetSubtype="0" fill="hold" nodeType="clickEffect">
+                                  <p:stCondLst>
+                                    <p:cond delay="0"/>
+                                  </p:stCondLst>
+                                  <p:childTnLst>
+                                    <p:set>
+                                      <p:cBhvr>
+                                        <p:cTn id="6" dur="1" fill="hold">
+                                          <p:stCondLst>
+                                            <p:cond delay="0"/>
+                                          </p:stCondLst>
+                                        </p:cTn>
+                                        <p:tgtEl>
+                                          <p:spTgt spid="3">
+                                            <p:txEl>
+                                              <p:pRg st="0" end="0"/>
+                                            </p:txEl>
+                                          </p:spTgt>
+                                        </p:tgtEl>
+                                        <p:attrNameLst>
+                                          <p:attrName>style.visibility</p:attrName>
+                                        </p:attrNameLst>
+                                      </p:cBhvr>
+                                      <p:to>
+                                        <p:strVal val="visible"/>
+                                      </p:to>
+                                    </p:set>
+                                  </p:childTnLst>
+                                </p:cTn>
+                              </p:par>
+                            </p:childTnLst>
+                          </p:cTn>
+                        </p:par>
+                      </p:childTnLst>
+                    </p:cTn>
+                  </p:par>
+                  <p:par>
+                    <p:cTn id="7" fill="hold">
+                      <p:stCondLst>
+                        <p:cond delay="indefinite"/>
+                      </p:stCondLst>
+                      <p:childTnLst>
+                        <p:par>
+                          <p:cTn id="8" fill="hold">
+                            <p:stCondLst>
+                              <p:cond delay="0"/>
+                            </p:stCondLst>
+                            <p:childTnLst>
+                              <p:par>
+                                <p:cTn id="9" presetID="1" presetClass="entr" presetSubtype="0" fill="hold" nodeType="clickEffect">
+                                  <p:stCondLst>
+                                    <p:cond delay="0"/>
+                                  </p:stCondLst>
+                                  <p:childTnLst>
+                                    <p:set>
+                                      <p:cBhvr>
+                                        <p:cTn id="10" dur="1" fill="hold">
+                                          <p:stCondLst>
+                                            <p:cond delay="0"/>
+                                          </p:stCondLst>
+                                        </p:cTn>
+                                        <p:tgtEl>
+                                          <p:spTgt spid="3">
+                                            <p:txEl>
+                                              <p:pRg st="1" end="1"/>
+                                            </p:txEl>
+                                          </p:spTgt>
+                                        </p:tgtEl>
+                                        <p:attrNameLst>
+                                          <p:attrName>style.visibility</p:attrName>
+                                        </p:attrNameLst>
+                                      </p:cBhvr>
+                                      <p:to>
+                                        <p:strVal val="visible"/>
+                                      </p:to>
+                                    </p:set>
+                                  </p:childTnLst>
+                                </p:cTn>
+                              </p:par>
+                            </p:childTnLst>
+                          </p:cTn>
+                        </p:par>
+                      </p:childTnLst>
+                    </p:cTn>
+                  </p:par>
+                  <p:par>
+                    <p:cTn id="11" fill="hold">
+                      <p:stCondLst>
+                        <p:cond delay="indefinite"/>
+                      </p:stCondLst>
+                      <p:childTnLst>
+                        <p:par>
+                          <p:cTn id="12" fill="hold">
+                            <p:stCondLst>
+                              <p:cond delay="0"/>
+                            </p:stCondLst>
+                            <p:childTnLst>
+                              <p:par>
+                                <p:cTn id="13" presetID="1" presetClass="entr" presetSubtype="0" fill="hold" nodeType="clickEffect">
+                                  <p:stCondLst>
+                                    <p:cond delay="0"/>
+                                  </p:stCondLst>
+                                  <p:childTnLst>
+                                    <p:set>
+                                      <p:cBhvr>
+                                        <p:cTn id="14" dur="1" fill="hold">
+                                          <p:stCondLst>
+                                            <p:cond delay="0"/>
+                                          </p:stCondLst>
+                                        </p:cTn>
+                                        <p:tgtEl>
+                                          <p:spTgt spid="3">
+                                            <p:txEl>
+                                              <p:pRg st="2" end="2"/>
+                                            </p:txEl>
+                                          </p:spTgt>
+                                        </p:tgtEl>
+                                        <p:attrNameLst>
+                                          <p:attrName>style.visibility</p:attrName>
+                                        </p:attrNameLst>
+                                      </p:cBhvr>
+                                      <p:to>
+                                        <p:strVal val="visible"/>
+                                      </p:to>
+                                    </p:set>
+                                  </p:childTnLst>
+                                </p:cTn>
+                              </p:par>
+                              <p:par>
+                                <p:cTn id="15" presetID="1" presetClass="entr" presetSubtype="0" fill="hold" nodeType="withEffect">
+                                  <p:stCondLst>
+                                    <p:cond delay="0"/>
+                                  </p:stCondLst>
+                                  <p:childTnLst>
+                                    <p:set>
+                                      <p:cBhvr>
+                                        <p:cTn id="16" dur="1" fill="hold">
+                                          <p:stCondLst>
+                                            <p:cond delay="0"/>
+                                          </p:stCondLst>
+                                        </p:cTn>
+                                        <p:tgtEl>
+                                          <p:spTgt spid="3">
+                                            <p:txEl>
+                                              <p:pRg st="3" end="3"/>
+                                            </p:txEl>
+                                          </p:spTgt>
+                                        </p:tgtEl>
+                                        <p:attrNameLst>
+                                          <p:attrName>style.visibility</p:attrName>
+                                        </p:attrNameLst>
+                                      </p:cBhvr>
+                                      <p:to>
+                                        <p:strVal val="visible"/>
+                                      </p:to>
+                                    </p:set>
+                                  </p:childTnLst>
+                                </p:cTn>
+                              </p:par>
+                              <p:par>
+                                <p:cTn id="17" presetID="1" presetClass="entr" presetSubtype="0" fill="hold" nodeType="withEffect">
+                                  <p:stCondLst>
+                                    <p:cond delay="0"/>
+                                  </p:stCondLst>
+                                  <p:childTnLst>
+                                    <p:set>
+                                      <p:cBhvr>
+                                        <p:cTn id="18" dur="1" fill="hold">
+                                          <p:stCondLst>
+                                            <p:cond delay="0"/>
+                                          </p:stCondLst>
+                                        </p:cTn>
+                                        <p:tgtEl>
+                                          <p:spTgt spid="3">
+                                            <p:txEl>
+                                              <p:pRg st="4" end="4"/>
+                                            </p:txEl>
+                                          </p:spTgt>
+                                        </p:tgtEl>
+                                        <p:attrNameLst>
+                                          <p:attrName>style.visibility</p:attrName>
+                                        </p:attrNameLst>
+                                      </p:cBhvr>
+                                      <p:to>
+                                        <p:strVal val="visible"/>
+                                      </p:to>
+                                    </p:set>
+                                  </p:childTnLst>
+                                </p:cTn>
+                              </p:par>
+                            </p:childTnLst>
+                          </p:cTn>
+                        </p:par>
+                      </p:childTnLst>
+                    </p:cTn>
+                  </p:par>
+                  <p:par>
+                    <p:cTn id="19" fill="hold">
+                      <p:stCondLst>
+                        <p:cond delay="indefinite"/>
+                      </p:stCondLst>
+                      <p:childTnLst>
+                        <p:par>
+                          <p:cTn id="20" fill="hold">
+                            <p:stCondLst>
+                              <p:cond delay="0"/>
+                            </p:stCondLst>
+                            <p:childTnLst>
+                              <p:par>
+                                <p:cTn id="21" presetID="1" presetClass="entr" presetSubtype="0" fill="hold" nodeType="clickEffect">
+                                  <p:stCondLst>
+                                    <p:cond delay="0"/>
+                                  </p:stCondLst>
+                                  <p:childTnLst>
+                                    <p:set>
+                                      <p:cBhvr>
+                                        <p:cTn id="22" dur="1" fill="hold">
+                                          <p:stCondLst>
+                                            <p:cond delay="0"/>
+                                          </p:stCondLst>
+                                        </p:cTn>
+                                        <p:tgtEl>
+                                          <p:spTgt spid="3">
+                                            <p:txEl>
+                                              <p:pRg st="5" end="5"/>
+                                            </p:txEl>
+                                          </p:spTgt>
+                                        </p:tgtEl>
+                                        <p:attrNameLst>
+                                          <p:attrName>style.visibility</p:attrName>
+                                        </p:attrNameLst>
+                                      </p:cBhvr>
+                                      <p:to>
+                                        <p:strVal val="visible"/>
+                                      </p:to>
+                                    </p:set>
+                                  </p:childTnLst>
+                                </p:cTn>
+                              </p:par>
+                            </p:childTnLst>
+                          </p:cTn>
+                        </p:par>
+                      </p:childTnLst>
+                    </p:cTn>
+                  </p:par>
+                  <p:par>
+                    <p:cTn id="23" fill="hold">
+                      <p:stCondLst>
+                        <p:cond delay="indefinite"/>
+                      </p:stCondLst>
+                      <p:childTnLst>
+                        <p:par>
+                          <p:cTn id="24" fill="hold">
+                            <p:stCondLst>
+                              <p:cond delay="0"/>
+                            </p:stCondLst>
+                            <p:childTnLst>
+                              <p:par>
+                                <p:cTn id="25" presetID="1" presetClass="entr" presetSubtype="0" fill="hold" nodeType="clickEffect">
+                                  <p:stCondLst>
+                                    <p:cond delay="0"/>
+                                  </p:stCondLst>
+                                  <p:childTnLst>
+                                    <p:set>
+                                      <p:cBhvr>
+                                        <p:cTn id="26" dur="1" fill="hold">
+                                          <p:stCondLst>
+                                            <p:cond delay="0"/>
+                                          </p:stCondLst>
+                                        </p:cTn>
+                                        <p:tgtEl>
+                                          <p:spTgt spid="3">
+                                            <p:txEl>
+                                              <p:pRg st="6" end="6"/>
+                                            </p:txEl>
+                                          </p:spTgt>
+                                        </p:tgtEl>
+                                        <p:attrNameLst>
+                                          <p:attrName>style.visibility</p:attrName>
+                                        </p:attrNameLst>
+                                      </p:cBhvr>
+                                      <p:to>
+                                        <p:strVal val="visible"/>
+                                      </p:to>
+                                    </p:set>
+                                  </p:childTnLst>
+                                </p:cTn>
+                              </p:par>
+                            </p:childTnLst>
+                          </p:cTn>
+                        </p:par>
+                      </p:childTnLst>
+                    </p:cTn>
+                  </p:par>
+                </p:childTnLst>
+              </p:cTn>
+              <p:prevCondLst>
+                <p:cond evt="onPrev" delay="0">
+                  <p:tgtEl>
+                    <p:sldTgt/>
+                  </p:tgtEl>
+                </p:cond>
+              </p:prevCondLst>
+              <p:nextCondLst>
+                <p:cond evt="onNext" delay="0">
+                  <p:tgtEl>
+                    <p:sldTgt/>
+                  </p:tgtEl>
+                </p:cond>
+              </p:nextCondLst>
+            </p:seq>
+          </p:childTnLst>
+        </p:cTn>
       </p:par>
     </p:tnLst>
   </p:timing>
@@ -14105,7 +14657,7 @@
           <a:p>
             <a:r>
               <a:rPr lang="en-US" dirty="0" smtClean="0"/>
-              <a:t>We will use this object to run, through the generator function.</a:t>
+              <a:t>We will use this object to run through the generator function.</a:t>
             </a:r>
           </a:p>
           <a:p>
@@ -14189,7 +14741,306 @@
   <p:timing>
     <p:tnLst>
       <p:par>
-        <p:cTn xmlns:p14="http://schemas.microsoft.com/office/powerpoint/2010/main" id="1" dur="indefinite" restart="never" nodeType="tmRoot"/>
+        <p:cTn xmlns:p14="http://schemas.microsoft.com/office/powerpoint/2010/main" id="1" dur="indefinite" restart="never" nodeType="tmRoot">
+          <p:childTnLst>
+            <p:seq concurrent="1" nextAc="seek">
+              <p:cTn id="2" dur="indefinite" nodeType="mainSeq">
+                <p:childTnLst>
+                  <p:par>
+                    <p:cTn id="3" fill="hold">
+                      <p:stCondLst>
+                        <p:cond delay="indefinite"/>
+                      </p:stCondLst>
+                      <p:childTnLst>
+                        <p:par>
+                          <p:cTn id="4" fill="hold">
+                            <p:stCondLst>
+                              <p:cond delay="0"/>
+                            </p:stCondLst>
+                            <p:childTnLst>
+                              <p:par>
+                                <p:cTn id="5" presetID="1" presetClass="entr" presetSubtype="0" fill="hold" nodeType="clickEffect">
+                                  <p:stCondLst>
+                                    <p:cond delay="0"/>
+                                  </p:stCondLst>
+                                  <p:childTnLst>
+                                    <p:set>
+                                      <p:cBhvr>
+                                        <p:cTn id="6" dur="1" fill="hold">
+                                          <p:stCondLst>
+                                            <p:cond delay="0"/>
+                                          </p:stCondLst>
+                                        </p:cTn>
+                                        <p:tgtEl>
+                                          <p:spTgt spid="3">
+                                            <p:txEl>
+                                              <p:pRg st="0" end="0"/>
+                                            </p:txEl>
+                                          </p:spTgt>
+                                        </p:tgtEl>
+                                        <p:attrNameLst>
+                                          <p:attrName>style.visibility</p:attrName>
+                                        </p:attrNameLst>
+                                      </p:cBhvr>
+                                      <p:to>
+                                        <p:strVal val="visible"/>
+                                      </p:to>
+                                    </p:set>
+                                  </p:childTnLst>
+                                </p:cTn>
+                              </p:par>
+                              <p:par>
+                                <p:cTn id="7" presetID="1" presetClass="entr" presetSubtype="0" fill="hold" nodeType="withEffect">
+                                  <p:stCondLst>
+                                    <p:cond delay="0"/>
+                                  </p:stCondLst>
+                                  <p:childTnLst>
+                                    <p:set>
+                                      <p:cBhvr>
+                                        <p:cTn id="8" dur="1" fill="hold">
+                                          <p:stCondLst>
+                                            <p:cond delay="0"/>
+                                          </p:stCondLst>
+                                        </p:cTn>
+                                        <p:tgtEl>
+                                          <p:spTgt spid="3">
+                                            <p:txEl>
+                                              <p:pRg st="1" end="1"/>
+                                            </p:txEl>
+                                          </p:spTgt>
+                                        </p:tgtEl>
+                                        <p:attrNameLst>
+                                          <p:attrName>style.visibility</p:attrName>
+                                        </p:attrNameLst>
+                                      </p:cBhvr>
+                                      <p:to>
+                                        <p:strVal val="visible"/>
+                                      </p:to>
+                                    </p:set>
+                                  </p:childTnLst>
+                                </p:cTn>
+                              </p:par>
+                            </p:childTnLst>
+                          </p:cTn>
+                        </p:par>
+                      </p:childTnLst>
+                    </p:cTn>
+                  </p:par>
+                  <p:par>
+                    <p:cTn id="9" fill="hold">
+                      <p:stCondLst>
+                        <p:cond delay="indefinite"/>
+                      </p:stCondLst>
+                      <p:childTnLst>
+                        <p:par>
+                          <p:cTn id="10" fill="hold">
+                            <p:stCondLst>
+                              <p:cond delay="0"/>
+                            </p:stCondLst>
+                            <p:childTnLst>
+                              <p:par>
+                                <p:cTn id="11" presetID="1" presetClass="entr" presetSubtype="0" fill="hold" nodeType="clickEffect">
+                                  <p:stCondLst>
+                                    <p:cond delay="0"/>
+                                  </p:stCondLst>
+                                  <p:childTnLst>
+                                    <p:set>
+                                      <p:cBhvr>
+                                        <p:cTn id="12" dur="1" fill="hold">
+                                          <p:stCondLst>
+                                            <p:cond delay="0"/>
+                                          </p:stCondLst>
+                                        </p:cTn>
+                                        <p:tgtEl>
+                                          <p:spTgt spid="3">
+                                            <p:txEl>
+                                              <p:pRg st="2" end="2"/>
+                                            </p:txEl>
+                                          </p:spTgt>
+                                        </p:tgtEl>
+                                        <p:attrNameLst>
+                                          <p:attrName>style.visibility</p:attrName>
+                                        </p:attrNameLst>
+                                      </p:cBhvr>
+                                      <p:to>
+                                        <p:strVal val="visible"/>
+                                      </p:to>
+                                    </p:set>
+                                  </p:childTnLst>
+                                </p:cTn>
+                              </p:par>
+                            </p:childTnLst>
+                          </p:cTn>
+                        </p:par>
+                      </p:childTnLst>
+                    </p:cTn>
+                  </p:par>
+                  <p:par>
+                    <p:cTn id="13" fill="hold">
+                      <p:stCondLst>
+                        <p:cond delay="indefinite"/>
+                      </p:stCondLst>
+                      <p:childTnLst>
+                        <p:par>
+                          <p:cTn id="14" fill="hold">
+                            <p:stCondLst>
+                              <p:cond delay="0"/>
+                            </p:stCondLst>
+                            <p:childTnLst>
+                              <p:par>
+                                <p:cTn id="15" presetID="1" presetClass="entr" presetSubtype="0" fill="hold" nodeType="clickEffect">
+                                  <p:stCondLst>
+                                    <p:cond delay="0"/>
+                                  </p:stCondLst>
+                                  <p:childTnLst>
+                                    <p:set>
+                                      <p:cBhvr>
+                                        <p:cTn id="16" dur="1" fill="hold">
+                                          <p:stCondLst>
+                                            <p:cond delay="0"/>
+                                          </p:stCondLst>
+                                        </p:cTn>
+                                        <p:tgtEl>
+                                          <p:spTgt spid="3">
+                                            <p:txEl>
+                                              <p:pRg st="3" end="3"/>
+                                            </p:txEl>
+                                          </p:spTgt>
+                                        </p:tgtEl>
+                                        <p:attrNameLst>
+                                          <p:attrName>style.visibility</p:attrName>
+                                        </p:attrNameLst>
+                                      </p:cBhvr>
+                                      <p:to>
+                                        <p:strVal val="visible"/>
+                                      </p:to>
+                                    </p:set>
+                                  </p:childTnLst>
+                                </p:cTn>
+                              </p:par>
+                            </p:childTnLst>
+                          </p:cTn>
+                        </p:par>
+                      </p:childTnLst>
+                    </p:cTn>
+                  </p:par>
+                  <p:par>
+                    <p:cTn id="17" fill="hold">
+                      <p:stCondLst>
+                        <p:cond delay="indefinite"/>
+                      </p:stCondLst>
+                      <p:childTnLst>
+                        <p:par>
+                          <p:cTn id="18" fill="hold">
+                            <p:stCondLst>
+                              <p:cond delay="0"/>
+                            </p:stCondLst>
+                            <p:childTnLst>
+                              <p:par>
+                                <p:cTn id="19" presetID="1" presetClass="entr" presetSubtype="0" fill="hold" nodeType="clickEffect">
+                                  <p:stCondLst>
+                                    <p:cond delay="0"/>
+                                  </p:stCondLst>
+                                  <p:childTnLst>
+                                    <p:set>
+                                      <p:cBhvr>
+                                        <p:cTn id="20" dur="1" fill="hold">
+                                          <p:stCondLst>
+                                            <p:cond delay="0"/>
+                                          </p:stCondLst>
+                                        </p:cTn>
+                                        <p:tgtEl>
+                                          <p:spTgt spid="3">
+                                            <p:txEl>
+                                              <p:pRg st="4" end="4"/>
+                                            </p:txEl>
+                                          </p:spTgt>
+                                        </p:tgtEl>
+                                        <p:attrNameLst>
+                                          <p:attrName>style.visibility</p:attrName>
+                                        </p:attrNameLst>
+                                      </p:cBhvr>
+                                      <p:to>
+                                        <p:strVal val="visible"/>
+                                      </p:to>
+                                    </p:set>
+                                  </p:childTnLst>
+                                </p:cTn>
+                              </p:par>
+                            </p:childTnLst>
+                          </p:cTn>
+                        </p:par>
+                      </p:childTnLst>
+                    </p:cTn>
+                  </p:par>
+                  <p:par>
+                    <p:cTn id="21" fill="hold">
+                      <p:stCondLst>
+                        <p:cond delay="indefinite"/>
+                      </p:stCondLst>
+                      <p:childTnLst>
+                        <p:par>
+                          <p:cTn id="22" fill="hold">
+                            <p:stCondLst>
+                              <p:cond delay="0"/>
+                            </p:stCondLst>
+                            <p:childTnLst>
+                              <p:par>
+                                <p:cTn id="23" presetID="1" presetClass="entr" presetSubtype="0" fill="hold" nodeType="clickEffect">
+                                  <p:stCondLst>
+                                    <p:cond delay="0"/>
+                                  </p:stCondLst>
+                                  <p:childTnLst>
+                                    <p:set>
+                                      <p:cBhvr>
+                                        <p:cTn id="24" dur="1" fill="hold">
+                                          <p:stCondLst>
+                                            <p:cond delay="0"/>
+                                          </p:stCondLst>
+                                        </p:cTn>
+                                        <p:tgtEl>
+                                          <p:spTgt spid="3">
+                                            <p:txEl>
+                                              <p:pRg st="5" end="5"/>
+                                            </p:txEl>
+                                          </p:spTgt>
+                                        </p:tgtEl>
+                                        <p:attrNameLst>
+                                          <p:attrName>style.visibility</p:attrName>
+                                        </p:attrNameLst>
+                                      </p:cBhvr>
+                                      <p:to>
+                                        <p:strVal val="visible"/>
+                                      </p:to>
+                                    </p:set>
+                                  </p:childTnLst>
+                                </p:cTn>
+                              </p:par>
+                            </p:childTnLst>
+                          </p:cTn>
+                        </p:par>
+                      </p:childTnLst>
+                    </p:cTn>
+                  </p:par>
+                </p:childTnLst>
+              </p:cTn>
+              <p:prevCondLst>
+                <p:cond evt="onPrev" delay="0">
+                  <p:tgtEl>
+                    <p:sldTgt/>
+                  </p:tgtEl>
+                </p:cond>
+              </p:prevCondLst>
+              <p:nextCondLst>
+                <p:cond evt="onNext" delay="0">
+                  <p:tgtEl>
+                    <p:sldTgt/>
+                  </p:tgtEl>
+                </p:cond>
+              </p:nextCondLst>
+            </p:seq>
+          </p:childTnLst>
+        </p:cTn>
       </p:par>
     </p:tnLst>
   </p:timing>
@@ -14354,22 +15205,12 @@
           <a:p>
             <a:r>
               <a:rPr lang="en-US" dirty="0"/>
-              <a:t>This becomes the value that the yield expression evaluates to.</a:t>
-            </a:r>
-            <a:r>
-              <a:rPr lang="en-US" dirty="0">
-                <a:solidFill>
-                  <a:srgbClr val="FF0000"/>
-                </a:solidFill>
-                <a:latin typeface="ＭＳ ゴシック"/>
-                <a:ea typeface="ＭＳ ゴシック"/>
-                <a:cs typeface="ＭＳ ゴシック"/>
-              </a:rPr>
-              <a:t> ♬</a:t>
-            </a:r>
-            <a:endParaRPr lang="en-US" dirty="0"/>
-          </a:p>
-          <a:p>
+              <a:t>This becomes the value that the yield expression evaluates to</a:t>
+            </a:r>
+            <a:r>
+              <a:rPr lang="en-US" dirty="0" smtClean="0"/>
+              <a:t>.</a:t>
+            </a:r>
             <a:endParaRPr lang="en-US" dirty="0"/>
           </a:p>
         </p:txBody>
@@ -14387,7 +15228,208 @@
   <p:timing>
     <p:tnLst>
       <p:par>
-        <p:cTn xmlns:p14="http://schemas.microsoft.com/office/powerpoint/2010/main" id="1" dur="indefinite" restart="never" nodeType="tmRoot"/>
+        <p:cTn xmlns:p14="http://schemas.microsoft.com/office/powerpoint/2010/main" id="1" dur="indefinite" restart="never" nodeType="tmRoot">
+          <p:childTnLst>
+            <p:seq concurrent="1" nextAc="seek">
+              <p:cTn id="2" dur="indefinite" nodeType="mainSeq">
+                <p:childTnLst>
+                  <p:par>
+                    <p:cTn id="3" fill="hold">
+                      <p:stCondLst>
+                        <p:cond delay="indefinite"/>
+                      </p:stCondLst>
+                      <p:childTnLst>
+                        <p:par>
+                          <p:cTn id="4" fill="hold">
+                            <p:stCondLst>
+                              <p:cond delay="0"/>
+                            </p:stCondLst>
+                            <p:childTnLst>
+                              <p:par>
+                                <p:cTn id="5" presetID="1" presetClass="entr" presetSubtype="0" fill="hold" nodeType="clickEffect">
+                                  <p:stCondLst>
+                                    <p:cond delay="0"/>
+                                  </p:stCondLst>
+                                  <p:childTnLst>
+                                    <p:set>
+                                      <p:cBhvr>
+                                        <p:cTn id="6" dur="1" fill="hold">
+                                          <p:stCondLst>
+                                            <p:cond delay="0"/>
+                                          </p:stCondLst>
+                                        </p:cTn>
+                                        <p:tgtEl>
+                                          <p:spTgt spid="3">
+                                            <p:txEl>
+                                              <p:pRg st="1" end="1"/>
+                                            </p:txEl>
+                                          </p:spTgt>
+                                        </p:tgtEl>
+                                        <p:attrNameLst>
+                                          <p:attrName>style.visibility</p:attrName>
+                                        </p:attrNameLst>
+                                      </p:cBhvr>
+                                      <p:to>
+                                        <p:strVal val="visible"/>
+                                      </p:to>
+                                    </p:set>
+                                  </p:childTnLst>
+                                </p:cTn>
+                              </p:par>
+                            </p:childTnLst>
+                          </p:cTn>
+                        </p:par>
+                      </p:childTnLst>
+                    </p:cTn>
+                  </p:par>
+                  <p:par>
+                    <p:cTn id="7" fill="hold">
+                      <p:stCondLst>
+                        <p:cond delay="indefinite"/>
+                      </p:stCondLst>
+                      <p:childTnLst>
+                        <p:par>
+                          <p:cTn id="8" fill="hold">
+                            <p:stCondLst>
+                              <p:cond delay="0"/>
+                            </p:stCondLst>
+                            <p:childTnLst>
+                              <p:par>
+                                <p:cTn id="9" presetID="1" presetClass="entr" presetSubtype="0" fill="hold" nodeType="clickEffect">
+                                  <p:stCondLst>
+                                    <p:cond delay="0"/>
+                                  </p:stCondLst>
+                                  <p:childTnLst>
+                                    <p:set>
+                                      <p:cBhvr>
+                                        <p:cTn id="10" dur="1" fill="hold">
+                                          <p:stCondLst>
+                                            <p:cond delay="0"/>
+                                          </p:stCondLst>
+                                        </p:cTn>
+                                        <p:tgtEl>
+                                          <p:spTgt spid="3">
+                                            <p:txEl>
+                                              <p:pRg st="2" end="2"/>
+                                            </p:txEl>
+                                          </p:spTgt>
+                                        </p:tgtEl>
+                                        <p:attrNameLst>
+                                          <p:attrName>style.visibility</p:attrName>
+                                        </p:attrNameLst>
+                                      </p:cBhvr>
+                                      <p:to>
+                                        <p:strVal val="visible"/>
+                                      </p:to>
+                                    </p:set>
+                                  </p:childTnLst>
+                                </p:cTn>
+                              </p:par>
+                            </p:childTnLst>
+                          </p:cTn>
+                        </p:par>
+                      </p:childTnLst>
+                    </p:cTn>
+                  </p:par>
+                  <p:par>
+                    <p:cTn id="11" fill="hold">
+                      <p:stCondLst>
+                        <p:cond delay="indefinite"/>
+                      </p:stCondLst>
+                      <p:childTnLst>
+                        <p:par>
+                          <p:cTn id="12" fill="hold">
+                            <p:stCondLst>
+                              <p:cond delay="0"/>
+                            </p:stCondLst>
+                            <p:childTnLst>
+                              <p:par>
+                                <p:cTn id="13" presetID="1" presetClass="entr" presetSubtype="0" fill="hold" nodeType="clickEffect">
+                                  <p:stCondLst>
+                                    <p:cond delay="0"/>
+                                  </p:stCondLst>
+                                  <p:childTnLst>
+                                    <p:set>
+                                      <p:cBhvr>
+                                        <p:cTn id="14" dur="1" fill="hold">
+                                          <p:stCondLst>
+                                            <p:cond delay="0"/>
+                                          </p:stCondLst>
+                                        </p:cTn>
+                                        <p:tgtEl>
+                                          <p:spTgt spid="3">
+                                            <p:txEl>
+                                              <p:pRg st="3" end="3"/>
+                                            </p:txEl>
+                                          </p:spTgt>
+                                        </p:tgtEl>
+                                        <p:attrNameLst>
+                                          <p:attrName>style.visibility</p:attrName>
+                                        </p:attrNameLst>
+                                      </p:cBhvr>
+                                      <p:to>
+                                        <p:strVal val="visible"/>
+                                      </p:to>
+                                    </p:set>
+                                  </p:childTnLst>
+                                </p:cTn>
+                              </p:par>
+                              <p:par>
+                                <p:cTn id="15" presetID="1" presetClass="entr" presetSubtype="0" fill="hold" nodeType="withEffect">
+                                  <p:stCondLst>
+                                    <p:cond delay="0"/>
+                                  </p:stCondLst>
+                                  <p:childTnLst>
+                                    <p:set>
+                                      <p:cBhvr>
+                                        <p:cTn id="16" dur="1" fill="hold">
+                                          <p:stCondLst>
+                                            <p:cond delay="0"/>
+                                          </p:stCondLst>
+                                        </p:cTn>
+                                        <p:tgtEl>
+                                          <p:spTgt spid="3">
+                                            <p:txEl>
+                                              <p:pRg st="4" end="4"/>
+                                            </p:txEl>
+                                          </p:spTgt>
+                                        </p:tgtEl>
+                                        <p:attrNameLst>
+                                          <p:attrName>style.visibility</p:attrName>
+                                        </p:attrNameLst>
+                                      </p:cBhvr>
+                                      <p:to>
+                                        <p:strVal val="visible"/>
+                                      </p:to>
+                                    </p:set>
+                                  </p:childTnLst>
+                                </p:cTn>
+                              </p:par>
+                            </p:childTnLst>
+                          </p:cTn>
+                        </p:par>
+                      </p:childTnLst>
+                    </p:cTn>
+                  </p:par>
+                </p:childTnLst>
+              </p:cTn>
+              <p:prevCondLst>
+                <p:cond evt="onPrev" delay="0">
+                  <p:tgtEl>
+                    <p:sldTgt/>
+                  </p:tgtEl>
+                </p:cond>
+              </p:prevCondLst>
+              <p:nextCondLst>
+                <p:cond evt="onNext" delay="0">
+                  <p:tgtEl>
+                    <p:sldTgt/>
+                  </p:tgtEl>
+                </p:cond>
+              </p:nextCondLst>
+            </p:seq>
+          </p:childTnLst>
+        </p:cTn>
       </p:par>
     </p:tnLst>
   </p:timing>
@@ -14428,7 +15470,7 @@
           <a:p>
             <a:r>
               <a:rPr lang="en-US" dirty="0" smtClean="0"/>
-              <a:t>Generators</a:t>
+              <a:t>Generators – for/of structure</a:t>
             </a:r>
             <a:endParaRPr lang="en-US" dirty="0"/>
           </a:p>
@@ -14452,21 +15494,81 @@
           <a:lstStyle/>
           <a:p>
             <a:r>
+              <a:rPr lang="en-US" dirty="0" smtClean="0"/>
+              <a:t>A</a:t>
+            </a:r>
+            <a:r>
+              <a:rPr lang="en-US" dirty="0" smtClean="0"/>
+              <a:t>llows </a:t>
+            </a:r>
+            <a:r>
+              <a:rPr lang="en-US" dirty="0"/>
+              <a:t>you to loop through a </a:t>
+            </a:r>
+            <a:r>
+              <a:rPr lang="en-US" dirty="0" smtClean="0"/>
+              <a:t>generator function </a:t>
+            </a:r>
+            <a:r>
+              <a:rPr lang="en-US" dirty="0"/>
+              <a:t>very easily - the details of creating the generator </a:t>
+            </a:r>
+            <a:r>
+              <a:rPr lang="en-US" dirty="0" smtClean="0"/>
+              <a:t>and </a:t>
+            </a:r>
+            <a:r>
+              <a:rPr lang="en-US" dirty="0"/>
+              <a:t>extracting the value </a:t>
+            </a:r>
+            <a:r>
+              <a:rPr lang="en-US" dirty="0" smtClean="0"/>
+              <a:t>from </a:t>
+            </a:r>
+            <a:r>
+              <a:rPr lang="en-US" dirty="0"/>
+              <a:t>it’s wrapped object are abstracted away for </a:t>
+            </a:r>
+            <a:r>
+              <a:rPr lang="en-US" dirty="0" smtClean="0"/>
+              <a:t>you.</a:t>
+            </a:r>
+          </a:p>
+          <a:p>
+            <a:r>
+              <a:rPr lang="en-US" dirty="0" smtClean="0"/>
+              <a:t>The </a:t>
+            </a:r>
+            <a:r>
+              <a:rPr lang="en-US" dirty="0"/>
+              <a:t>loop completes when </a:t>
+            </a:r>
+            <a:r>
               <a:rPr lang="en-US" dirty="0">
                 <a:latin typeface="Courier"/>
                 <a:cs typeface="Courier"/>
               </a:rPr>
-              <a:t>f</a:t>
-            </a:r>
-            <a:r>
-              <a:rPr lang="en-US" dirty="0" smtClean="0">
+              <a:t>done</a:t>
+            </a:r>
+            <a:r>
+              <a:rPr lang="en-US" dirty="0"/>
+              <a:t> is true.</a:t>
+            </a:r>
+          </a:p>
+          <a:p>
+            <a:r>
+              <a:rPr lang="en-US" dirty="0" smtClean="0"/>
+              <a:t>When using </a:t>
+            </a:r>
+            <a:r>
+              <a:rPr lang="en-US" dirty="0">
                 <a:latin typeface="Courier"/>
                 <a:cs typeface="Courier"/>
               </a:rPr>
-              <a:t>or</a:t>
-            </a:r>
-            <a:r>
-              <a:rPr lang="en-US" dirty="0" smtClean="0"/>
+              <a:t>for</a:t>
+            </a:r>
+            <a:r>
+              <a:rPr lang="en-US" dirty="0"/>
               <a:t>/</a:t>
             </a:r>
             <a:r>
@@ -14478,79 +15580,41 @@
             </a:r>
             <a:r>
               <a:rPr lang="en-US" dirty="0" smtClean="0"/>
-              <a:t> Structure</a:t>
-            </a:r>
-          </a:p>
-          <a:p>
-            <a:pPr lvl="1"/>
+              <a:t>, any </a:t>
+            </a:r>
             <a:r>
               <a:rPr lang="en-US" dirty="0"/>
-              <a:t>A</a:t>
-            </a:r>
-            <a:r>
-              <a:rPr lang="en-US" dirty="0" smtClean="0"/>
-              <a:t>llows </a:t>
+              <a:t>value returned from a return statement at the end of the </a:t>
+            </a:r>
+            <a:r>
+              <a:rPr lang="en-US" dirty="0" smtClean="0"/>
+              <a:t>generator function </a:t>
             </a:r>
             <a:r>
               <a:rPr lang="en-US" dirty="0"/>
-              <a:t>you to loop through a </a:t>
-            </a:r>
-            <a:r>
-              <a:rPr lang="en-US" dirty="0" smtClean="0"/>
-              <a:t>generator function </a:t>
-            </a:r>
-            <a:r>
-              <a:rPr lang="en-US" dirty="0"/>
-              <a:t>very easily - the details of creating the generator </a:t>
-            </a:r>
-            <a:r>
-              <a:rPr lang="en-US" dirty="0" smtClean="0"/>
-              <a:t>and </a:t>
-            </a:r>
-            <a:r>
-              <a:rPr lang="en-US" dirty="0"/>
-              <a:t>extracting the value </a:t>
-            </a:r>
-            <a:r>
-              <a:rPr lang="en-US" dirty="0" smtClean="0"/>
-              <a:t>from </a:t>
-            </a:r>
-            <a:r>
-              <a:rPr lang="en-US" dirty="0"/>
-              <a:t>it’s wrapped object are abstracted away for </a:t>
-            </a:r>
-            <a:r>
-              <a:rPr lang="en-US" dirty="0" smtClean="0"/>
-              <a:t>you.</a:t>
-            </a:r>
-          </a:p>
-          <a:p>
-            <a:pPr lvl="1"/>
-            <a:r>
-              <a:rPr lang="en-US" dirty="0" smtClean="0"/>
-              <a:t>The </a:t>
-            </a:r>
-            <a:r>
-              <a:rPr lang="en-US" dirty="0"/>
-              <a:t>loop completes when </a:t>
+              <a:t>is lost. Instead, the final value you receive is the return value from the final </a:t>
             </a:r>
             <a:r>
               <a:rPr lang="en-US" dirty="0">
                 <a:latin typeface="Courier"/>
                 <a:cs typeface="Courier"/>
               </a:rPr>
-              <a:t>done</a:t>
+              <a:t>yield</a:t>
             </a:r>
             <a:r>
               <a:rPr lang="en-US" dirty="0"/>
-              <a:t> is true.</a:t>
-            </a:r>
-          </a:p>
-          <a:p>
-            <a:pPr lvl="1"/>
-            <a:r>
-              <a:rPr lang="en-US" dirty="0" smtClean="0"/>
-              <a:t>When using </a:t>
+              <a:t>. </a:t>
+            </a:r>
+            <a:endParaRPr lang="en-US" dirty="0" smtClean="0"/>
+          </a:p>
+          <a:p>
+            <a:r>
+              <a:rPr lang="en-US" dirty="0" smtClean="0"/>
+              <a:t>Also</a:t>
+            </a:r>
+            <a:r>
+              <a:rPr lang="en-US" dirty="0"/>
+              <a:t>, no values can be passed back - there is only one-way communication when using </a:t>
             </a:r>
             <a:r>
               <a:rPr lang="en-US" dirty="0">
@@ -14564,63 +15628,6 @@
               <a:t>/</a:t>
             </a:r>
             <a:r>
-              <a:rPr lang="en-US" dirty="0" smtClean="0">
-                <a:latin typeface="Courier"/>
-                <a:cs typeface="Courier"/>
-              </a:rPr>
-              <a:t>of</a:t>
-            </a:r>
-            <a:r>
-              <a:rPr lang="en-US" dirty="0" smtClean="0"/>
-              <a:t>, any </a:t>
-            </a:r>
-            <a:r>
-              <a:rPr lang="en-US" dirty="0"/>
-              <a:t>value returned from a return statement at the end of the </a:t>
-            </a:r>
-            <a:r>
-              <a:rPr lang="en-US" dirty="0" smtClean="0"/>
-              <a:t>generator function </a:t>
-            </a:r>
-            <a:r>
-              <a:rPr lang="en-US" dirty="0"/>
-              <a:t>is lost. Instead, the final value you receive is the return value from the final </a:t>
-            </a:r>
-            <a:r>
-              <a:rPr lang="en-US" dirty="0">
-                <a:latin typeface="Courier"/>
-                <a:cs typeface="Courier"/>
-              </a:rPr>
-              <a:t>yield</a:t>
-            </a:r>
-            <a:r>
-              <a:rPr lang="en-US" dirty="0"/>
-              <a:t>. </a:t>
-            </a:r>
-            <a:endParaRPr lang="en-US" dirty="0" smtClean="0"/>
-          </a:p>
-          <a:p>
-            <a:pPr lvl="1"/>
-            <a:r>
-              <a:rPr lang="en-US" dirty="0" smtClean="0"/>
-              <a:t>Also</a:t>
-            </a:r>
-            <a:r>
-              <a:rPr lang="en-US" dirty="0"/>
-              <a:t>, no values can be passed back - there is only one-way communication when using </a:t>
-            </a:r>
-            <a:r>
-              <a:rPr lang="en-US" dirty="0">
-                <a:latin typeface="Courier"/>
-                <a:cs typeface="Courier"/>
-              </a:rPr>
-              <a:t>for</a:t>
-            </a:r>
-            <a:r>
-              <a:rPr lang="en-US" dirty="0"/>
-              <a:t>/</a:t>
-            </a:r>
-            <a:r>
               <a:rPr lang="en-US" dirty="0">
                 <a:latin typeface="Courier"/>
                 <a:cs typeface="Courier"/>
@@ -14630,17 +15637,6 @@
             <a:r>
               <a:rPr lang="en-US" dirty="0" smtClean="0"/>
               <a:t>.</a:t>
-            </a:r>
-            <a:r>
-              <a:rPr lang="en-US" dirty="0">
-                <a:solidFill>
-                  <a:srgbClr val="FF0000"/>
-                </a:solidFill>
-                <a:latin typeface="ＭＳ ゴシック"/>
-                <a:ea typeface="ＭＳ ゴシック"/>
-                <a:cs typeface="ＭＳ ゴシック"/>
-              </a:rPr>
-              <a:t> ♬</a:t>
             </a:r>
             <a:endParaRPr lang="en-US" dirty="0" smtClean="0"/>
           </a:p>
@@ -14659,7 +15655,226 @@
   <p:timing>
     <p:tnLst>
       <p:par>
-        <p:cTn xmlns:p14="http://schemas.microsoft.com/office/powerpoint/2010/main" id="1" dur="indefinite" restart="never" nodeType="tmRoot"/>
+        <p:cTn xmlns:p14="http://schemas.microsoft.com/office/powerpoint/2010/main" id="1" dur="indefinite" restart="never" nodeType="tmRoot">
+          <p:childTnLst>
+            <p:seq concurrent="1" nextAc="seek">
+              <p:cTn id="2" dur="indefinite" nodeType="mainSeq">
+                <p:childTnLst>
+                  <p:par>
+                    <p:cTn id="3" fill="hold">
+                      <p:stCondLst>
+                        <p:cond delay="indefinite"/>
+                      </p:stCondLst>
+                      <p:childTnLst>
+                        <p:par>
+                          <p:cTn id="4" fill="hold">
+                            <p:stCondLst>
+                              <p:cond delay="0"/>
+                            </p:stCondLst>
+                            <p:childTnLst>
+                              <p:par>
+                                <p:cTn id="5" presetID="1" presetClass="entr" presetSubtype="0" fill="hold" nodeType="clickEffect">
+                                  <p:stCondLst>
+                                    <p:cond delay="0"/>
+                                  </p:stCondLst>
+                                  <p:childTnLst>
+                                    <p:set>
+                                      <p:cBhvr>
+                                        <p:cTn id="6" dur="1" fill="hold">
+                                          <p:stCondLst>
+                                            <p:cond delay="0"/>
+                                          </p:stCondLst>
+                                        </p:cTn>
+                                        <p:tgtEl>
+                                          <p:spTgt spid="3">
+                                            <p:txEl>
+                                              <p:pRg st="0" end="0"/>
+                                            </p:txEl>
+                                          </p:spTgt>
+                                        </p:tgtEl>
+                                        <p:attrNameLst>
+                                          <p:attrName>style.visibility</p:attrName>
+                                        </p:attrNameLst>
+                                      </p:cBhvr>
+                                      <p:to>
+                                        <p:strVal val="visible"/>
+                                      </p:to>
+                                    </p:set>
+                                  </p:childTnLst>
+                                </p:cTn>
+                              </p:par>
+                            </p:childTnLst>
+                          </p:cTn>
+                        </p:par>
+                      </p:childTnLst>
+                    </p:cTn>
+                  </p:par>
+                  <p:par>
+                    <p:cTn id="7" fill="hold">
+                      <p:stCondLst>
+                        <p:cond delay="indefinite"/>
+                      </p:stCondLst>
+                      <p:childTnLst>
+                        <p:par>
+                          <p:cTn id="8" fill="hold">
+                            <p:stCondLst>
+                              <p:cond delay="0"/>
+                            </p:stCondLst>
+                            <p:childTnLst>
+                              <p:par>
+                                <p:cTn id="9" presetID="1" presetClass="entr" presetSubtype="0" fill="hold" nodeType="clickEffect">
+                                  <p:stCondLst>
+                                    <p:cond delay="0"/>
+                                  </p:stCondLst>
+                                  <p:childTnLst>
+                                    <p:set>
+                                      <p:cBhvr>
+                                        <p:cTn id="10" dur="1" fill="hold">
+                                          <p:stCondLst>
+                                            <p:cond delay="0"/>
+                                          </p:stCondLst>
+                                        </p:cTn>
+                                        <p:tgtEl>
+                                          <p:spTgt spid="3">
+                                            <p:txEl>
+                                              <p:pRg st="1" end="1"/>
+                                            </p:txEl>
+                                          </p:spTgt>
+                                        </p:tgtEl>
+                                        <p:attrNameLst>
+                                          <p:attrName>style.visibility</p:attrName>
+                                        </p:attrNameLst>
+                                      </p:cBhvr>
+                                      <p:to>
+                                        <p:strVal val="visible"/>
+                                      </p:to>
+                                    </p:set>
+                                  </p:childTnLst>
+                                </p:cTn>
+                              </p:par>
+                            </p:childTnLst>
+                          </p:cTn>
+                        </p:par>
+                      </p:childTnLst>
+                    </p:cTn>
+                  </p:par>
+                  <p:par>
+                    <p:cTn id="11" fill="hold">
+                      <p:stCondLst>
+                        <p:cond delay="indefinite"/>
+                      </p:stCondLst>
+                      <p:childTnLst>
+                        <p:par>
+                          <p:cTn id="12" fill="hold">
+                            <p:stCondLst>
+                              <p:cond delay="0"/>
+                            </p:stCondLst>
+                            <p:childTnLst>
+                              <p:par>
+                                <p:cTn id="13" presetID="1" presetClass="entr" presetSubtype="0" fill="hold" nodeType="clickEffect">
+                                  <p:stCondLst>
+                                    <p:cond delay="0"/>
+                                  </p:stCondLst>
+                                  <p:childTnLst>
+                                    <p:set>
+                                      <p:cBhvr>
+                                        <p:cTn id="14" dur="1" fill="hold">
+                                          <p:stCondLst>
+                                            <p:cond delay="0"/>
+                                          </p:stCondLst>
+                                        </p:cTn>
+                                        <p:tgtEl>
+                                          <p:spTgt spid="3">
+                                            <p:txEl>
+                                              <p:pRg st="2" end="2"/>
+                                            </p:txEl>
+                                          </p:spTgt>
+                                        </p:tgtEl>
+                                        <p:attrNameLst>
+                                          <p:attrName>style.visibility</p:attrName>
+                                        </p:attrNameLst>
+                                      </p:cBhvr>
+                                      <p:to>
+                                        <p:strVal val="visible"/>
+                                      </p:to>
+                                    </p:set>
+                                  </p:childTnLst>
+                                </p:cTn>
+                              </p:par>
+                            </p:childTnLst>
+                          </p:cTn>
+                        </p:par>
+                      </p:childTnLst>
+                    </p:cTn>
+                  </p:par>
+                  <p:par>
+                    <p:cTn id="15" fill="hold">
+                      <p:stCondLst>
+                        <p:cond delay="indefinite"/>
+                      </p:stCondLst>
+                      <p:childTnLst>
+                        <p:par>
+                          <p:cTn id="16" fill="hold">
+                            <p:stCondLst>
+                              <p:cond delay="0"/>
+                            </p:stCondLst>
+                            <p:childTnLst>
+                              <p:par>
+                                <p:cTn id="17" presetID="1" presetClass="entr" presetSubtype="0" fill="hold" nodeType="clickEffect">
+                                  <p:stCondLst>
+                                    <p:cond delay="0"/>
+                                  </p:stCondLst>
+                                  <p:childTnLst>
+                                    <p:set>
+                                      <p:cBhvr>
+                                        <p:cTn id="18" dur="1" fill="hold">
+                                          <p:stCondLst>
+                                            <p:cond delay="0"/>
+                                          </p:stCondLst>
+                                        </p:cTn>
+                                        <p:tgtEl>
+                                          <p:spTgt spid="3">
+                                            <p:txEl>
+                                              <p:pRg st="3" end="3"/>
+                                            </p:txEl>
+                                          </p:spTgt>
+                                        </p:tgtEl>
+                                        <p:attrNameLst>
+                                          <p:attrName>style.visibility</p:attrName>
+                                        </p:attrNameLst>
+                                      </p:cBhvr>
+                                      <p:to>
+                                        <p:strVal val="visible"/>
+                                      </p:to>
+                                    </p:set>
+                                  </p:childTnLst>
+                                </p:cTn>
+                              </p:par>
+                            </p:childTnLst>
+                          </p:cTn>
+                        </p:par>
+                      </p:childTnLst>
+                    </p:cTn>
+                  </p:par>
+                </p:childTnLst>
+              </p:cTn>
+              <p:prevCondLst>
+                <p:cond evt="onPrev" delay="0">
+                  <p:tgtEl>
+                    <p:sldTgt/>
+                  </p:tgtEl>
+                </p:cond>
+              </p:prevCondLst>
+              <p:nextCondLst>
+                <p:cond evt="onNext" delay="0">
+                  <p:tgtEl>
+                    <p:sldTgt/>
+                  </p:tgtEl>
+                </p:cond>
+              </p:nextCondLst>
+            </p:seq>
+          </p:childTnLst>
+        </p:cTn>
       </p:par>
     </p:tnLst>
   </p:timing>
@@ -14700,7 +15915,15 @@
           <a:p>
             <a:r>
               <a:rPr lang="en-US" dirty="0" smtClean="0"/>
-              <a:t>Generators</a:t>
+              <a:t>Generators – </a:t>
+            </a:r>
+            <a:r>
+              <a:rPr lang="en-US" dirty="0" err="1" smtClean="0"/>
+              <a:t>Async</a:t>
+            </a:r>
+            <a:r>
+              <a:rPr lang="en-US" dirty="0" smtClean="0"/>
+              <a:t> Uses</a:t>
             </a:r>
             <a:endParaRPr lang="en-US" dirty="0"/>
           </a:p>
@@ -14738,34 +15961,47 @@
             </a:pPr>
             <a:r>
               <a:rPr lang="en-US" sz="2200" dirty="0" smtClean="0"/>
-              <a:t>By using a generator iterator we can start a function that will make an async call, and then use the same iterator to return the result of the operation back to the calling function. Using delegation, combined with promises, allows us to define async/await.</a:t>
-            </a:r>
-            <a:r>
-              <a:rPr lang="en-US" sz="2200" dirty="0">
-                <a:solidFill>
-                  <a:srgbClr val="FF0000"/>
-                </a:solidFill>
-                <a:latin typeface="ＭＳ ゴシック"/>
-                <a:ea typeface="ＭＳ ゴシック"/>
-                <a:cs typeface="ＭＳ ゴシック"/>
-              </a:rPr>
-              <a:t> </a:t>
-            </a:r>
-            <a:r>
-              <a:rPr lang="en-US" dirty="0" smtClean="0">
-                <a:solidFill>
-                  <a:srgbClr val="FF0000"/>
-                </a:solidFill>
-                <a:latin typeface="ＭＳ ゴシック"/>
-                <a:ea typeface="ＭＳ ゴシック"/>
-                <a:cs typeface="ＭＳ ゴシック"/>
-              </a:rPr>
-              <a:t>♬</a:t>
+              <a:t>By using a generator iterator we can start a function that will make an async call, and then use the same iterator to return the result of the operation back to the calling function</a:t>
+            </a:r>
+            <a:r>
+              <a:rPr lang="en-US" sz="2200" dirty="0" smtClean="0"/>
+              <a:t>.</a:t>
             </a:r>
             <a:endParaRPr lang="en-US" dirty="0"/>
           </a:p>
         </p:txBody>
       </p:sp>
+      <p:pic>
+        <p:nvPicPr>
+          <p:cNvPr id="4" name="Content Placeholder 3" descr="jen_lawrence.gif"/>
+          <p:cNvPicPr>
+            <a:picLocks noChangeAspect="1"/>
+          </p:cNvPicPr>
+          <p:nvPr/>
+        </p:nvPicPr>
+        <p:blipFill>
+          <a:blip r:embed="rId3">
+            <a:extLst>
+              <a:ext uri="{28A0092B-C50C-407E-A947-70E740481C1C}">
+                <a14:useLocalDpi xmlns:a14="http://schemas.microsoft.com/office/drawing/2010/main" val="0"/>
+              </a:ext>
+            </a:extLst>
+          </a:blip>
+          <a:srcRect l="-42323" r="-42323"/>
+          <a:stretch>
+            <a:fillRect/>
+          </a:stretch>
+        </p:blipFill>
+        <p:spPr>
+          <a:xfrm>
+            <a:off x="2672522" y="4320286"/>
+            <a:ext cx="3074522" cy="1936949"/>
+          </a:xfrm>
+          <a:prstGeom prst="rect">
+            <a:avLst/>
+          </a:prstGeom>
+        </p:spPr>
+      </p:pic>
     </p:spTree>
     <p:extLst>
       <p:ext uri="{BB962C8B-B14F-4D97-AF65-F5344CB8AC3E}">
@@ -14779,7 +16015,173 @@
   <p:timing>
     <p:tnLst>
       <p:par>
-        <p:cTn xmlns:p14="http://schemas.microsoft.com/office/powerpoint/2010/main" id="1" dur="indefinite" restart="never" nodeType="tmRoot"/>
+        <p:cTn xmlns:p14="http://schemas.microsoft.com/office/powerpoint/2010/main" id="1" dur="indefinite" restart="never" nodeType="tmRoot">
+          <p:childTnLst>
+            <p:seq concurrent="1" nextAc="seek">
+              <p:cTn id="2" dur="indefinite" nodeType="mainSeq">
+                <p:childTnLst>
+                  <p:par>
+                    <p:cTn id="3" fill="hold">
+                      <p:stCondLst>
+                        <p:cond delay="indefinite"/>
+                      </p:stCondLst>
+                      <p:childTnLst>
+                        <p:par>
+                          <p:cTn id="4" fill="hold">
+                            <p:stCondLst>
+                              <p:cond delay="0"/>
+                            </p:stCondLst>
+                            <p:childTnLst>
+                              <p:par>
+                                <p:cTn id="5" presetID="1" presetClass="entr" presetSubtype="0" fill="hold" nodeType="clickEffect">
+                                  <p:stCondLst>
+                                    <p:cond delay="0"/>
+                                  </p:stCondLst>
+                                  <p:childTnLst>
+                                    <p:set>
+                                      <p:cBhvr>
+                                        <p:cTn id="6" dur="1" fill="hold">
+                                          <p:stCondLst>
+                                            <p:cond delay="0"/>
+                                          </p:stCondLst>
+                                        </p:cTn>
+                                        <p:tgtEl>
+                                          <p:spTgt spid="3">
+                                            <p:txEl>
+                                              <p:pRg st="0" end="0"/>
+                                            </p:txEl>
+                                          </p:spTgt>
+                                        </p:tgtEl>
+                                        <p:attrNameLst>
+                                          <p:attrName>style.visibility</p:attrName>
+                                        </p:attrNameLst>
+                                      </p:cBhvr>
+                                      <p:to>
+                                        <p:strVal val="visible"/>
+                                      </p:to>
+                                    </p:set>
+                                  </p:childTnLst>
+                                </p:cTn>
+                              </p:par>
+                            </p:childTnLst>
+                          </p:cTn>
+                        </p:par>
+                      </p:childTnLst>
+                    </p:cTn>
+                  </p:par>
+                  <p:par>
+                    <p:cTn id="7" fill="hold">
+                      <p:stCondLst>
+                        <p:cond delay="indefinite"/>
+                      </p:stCondLst>
+                      <p:childTnLst>
+                        <p:par>
+                          <p:cTn id="8" fill="hold">
+                            <p:stCondLst>
+                              <p:cond delay="0"/>
+                            </p:stCondLst>
+                            <p:childTnLst>
+                              <p:par>
+                                <p:cTn id="9" presetID="1" presetClass="entr" presetSubtype="0" fill="hold" nodeType="clickEffect">
+                                  <p:stCondLst>
+                                    <p:cond delay="0"/>
+                                  </p:stCondLst>
+                                  <p:childTnLst>
+                                    <p:set>
+                                      <p:cBhvr>
+                                        <p:cTn id="10" dur="1" fill="hold">
+                                          <p:stCondLst>
+                                            <p:cond delay="0"/>
+                                          </p:stCondLst>
+                                        </p:cTn>
+                                        <p:tgtEl>
+                                          <p:spTgt spid="3">
+                                            <p:txEl>
+                                              <p:pRg st="1" end="1"/>
+                                            </p:txEl>
+                                          </p:spTgt>
+                                        </p:tgtEl>
+                                        <p:attrNameLst>
+                                          <p:attrName>style.visibility</p:attrName>
+                                        </p:attrNameLst>
+                                      </p:cBhvr>
+                                      <p:to>
+                                        <p:strVal val="visible"/>
+                                      </p:to>
+                                    </p:set>
+                                  </p:childTnLst>
+                                </p:cTn>
+                              </p:par>
+                            </p:childTnLst>
+                          </p:cTn>
+                        </p:par>
+                      </p:childTnLst>
+                    </p:cTn>
+                  </p:par>
+                  <p:par>
+                    <p:cTn id="11" fill="hold">
+                      <p:stCondLst>
+                        <p:cond delay="indefinite"/>
+                      </p:stCondLst>
+                      <p:childTnLst>
+                        <p:par>
+                          <p:cTn id="12" fill="hold">
+                            <p:stCondLst>
+                              <p:cond delay="0"/>
+                            </p:stCondLst>
+                            <p:childTnLst>
+                              <p:par>
+                                <p:cTn id="13" presetID="1" presetClass="entr" presetSubtype="0" fill="hold" nodeType="clickEffect">
+                                  <p:stCondLst>
+                                    <p:cond delay="0"/>
+                                  </p:stCondLst>
+                                  <p:childTnLst>
+                                    <p:set>
+                                      <p:cBhvr>
+                                        <p:cTn id="14" dur="1" fill="hold">
+                                          <p:stCondLst>
+                                            <p:cond delay="0"/>
+                                          </p:stCondLst>
+                                        </p:cTn>
+                                        <p:tgtEl>
+                                          <p:spTgt spid="4"/>
+                                        </p:tgtEl>
+                                        <p:attrNameLst>
+                                          <p:attrName>style.visibility</p:attrName>
+                                        </p:attrNameLst>
+                                      </p:cBhvr>
+                                      <p:to>
+                                        <p:strVal val="visible"/>
+                                      </p:to>
+                                    </p:set>
+                                  </p:childTnLst>
+                                </p:cTn>
+                              </p:par>
+                            </p:childTnLst>
+                          </p:cTn>
+                        </p:par>
+                      </p:childTnLst>
+                    </p:cTn>
+                  </p:par>
+                </p:childTnLst>
+              </p:cTn>
+              <p:prevCondLst>
+                <p:cond evt="onPrev" delay="0">
+                  <p:tgtEl>
+                    <p:sldTgt/>
+                  </p:tgtEl>
+                </p:cond>
+              </p:prevCondLst>
+              <p:nextCondLst>
+                <p:cond evt="onNext" delay="0">
+                  <p:tgtEl>
+                    <p:sldTgt/>
+                  </p:tgtEl>
+                </p:cond>
+              </p:nextCondLst>
+            </p:seq>
+          </p:childTnLst>
+        </p:cTn>
       </p:par>
     </p:tnLst>
   </p:timing>
@@ -14787,6 +16189,271 @@
 </file>
 
 <file path=ppt/slides/slide34.xml><?xml version="1.0" encoding="utf-8"?>
+<p:sld xmlns:a="http://schemas.openxmlformats.org/drawingml/2006/main" xmlns:r="http://schemas.openxmlformats.org/officeDocument/2006/relationships" xmlns:p="http://schemas.openxmlformats.org/presentationml/2006/main">
+  <p:cSld>
+    <p:spTree>
+      <p:nvGrpSpPr>
+        <p:cNvPr id="1" name=""/>
+        <p:cNvGrpSpPr/>
+        <p:nvPr/>
+      </p:nvGrpSpPr>
+      <p:grpSpPr>
+        <a:xfrm>
+          <a:off x="0" y="0"/>
+          <a:ext cx="0" cy="0"/>
+          <a:chOff x="0" y="0"/>
+          <a:chExt cx="0" cy="0"/>
+        </a:xfrm>
+      </p:grpSpPr>
+      <p:sp>
+        <p:nvSpPr>
+          <p:cNvPr id="2" name="Title 1"/>
+          <p:cNvSpPr>
+            <a:spLocks noGrp="1"/>
+          </p:cNvSpPr>
+          <p:nvPr>
+            <p:ph type="title"/>
+          </p:nvPr>
+        </p:nvSpPr>
+        <p:spPr/>
+        <p:txBody>
+          <a:bodyPr/>
+          <a:lstStyle/>
+          <a:p>
+            <a:r>
+              <a:rPr lang="en-US" dirty="0" smtClean="0"/>
+              <a:t>Generators</a:t>
+            </a:r>
+            <a:endParaRPr lang="en-US" dirty="0"/>
+          </a:p>
+        </p:txBody>
+      </p:sp>
+      <p:sp>
+        <p:nvSpPr>
+          <p:cNvPr id="3" name="Content Placeholder 2"/>
+          <p:cNvSpPr>
+            <a:spLocks noGrp="1"/>
+          </p:cNvSpPr>
+          <p:nvPr>
+            <p:ph idx="1"/>
+          </p:nvPr>
+        </p:nvSpPr>
+        <p:spPr>
+          <a:xfrm>
+            <a:off x="457200" y="1622286"/>
+            <a:ext cx="7620000" cy="4584149"/>
+          </a:xfrm>
+        </p:spPr>
+        <p:txBody>
+          <a:bodyPr>
+            <a:normAutofit/>
+          </a:bodyPr>
+          <a:lstStyle/>
+          <a:p>
+            <a:pPr marL="114300" indent="0" algn="ctr">
+              <a:buNone/>
+            </a:pPr>
+            <a:r>
+              <a:rPr lang="en-US" sz="3200" dirty="0" smtClean="0">
+                <a:solidFill>
+                  <a:srgbClr val="FF0000"/>
+                </a:solidFill>
+              </a:rPr>
+              <a:t>SURPRISE!</a:t>
+            </a:r>
+          </a:p>
+          <a:p>
+            <a:pPr marL="114300" indent="0" algn="ctr">
+              <a:buNone/>
+            </a:pPr>
+            <a:r>
+              <a:rPr lang="en-US" dirty="0" smtClean="0"/>
+              <a:t>It turns out, we can use generators and promises to simulate </a:t>
+            </a:r>
+            <a:r>
+              <a:rPr lang="en-US" dirty="0" err="1" smtClean="0"/>
+              <a:t>async</a:t>
+            </a:r>
+            <a:r>
+              <a:rPr lang="en-US" dirty="0" smtClean="0"/>
+              <a:t>/await.</a:t>
+            </a:r>
+          </a:p>
+          <a:p>
+            <a:pPr marL="114300" indent="0" algn="ctr">
+              <a:buNone/>
+            </a:pPr>
+            <a:endParaRPr lang="en-US" dirty="0"/>
+          </a:p>
+          <a:p>
+            <a:pPr marL="114300" indent="0" algn="ctr">
+              <a:buNone/>
+            </a:pPr>
+            <a:r>
+              <a:rPr lang="en-US" sz="1800" dirty="0" smtClean="0"/>
+              <a:t>(Sure, we have </a:t>
+            </a:r>
+            <a:r>
+              <a:rPr lang="en-US" sz="1800" dirty="0" err="1" smtClean="0"/>
+              <a:t>async</a:t>
+            </a:r>
+            <a:r>
+              <a:rPr lang="en-US" sz="1800" dirty="0" smtClean="0"/>
+              <a:t>/await with </a:t>
+            </a:r>
+            <a:r>
+              <a:rPr lang="en-US" sz="1800" dirty="0" err="1" smtClean="0"/>
+              <a:t>Traceur</a:t>
+            </a:r>
+            <a:r>
+              <a:rPr lang="en-US" sz="1800" dirty="0" smtClean="0"/>
+              <a:t>, but it’s nice to understand how it works.)</a:t>
+            </a:r>
+          </a:p>
+        </p:txBody>
+      </p:sp>
+    </p:spTree>
+    <p:extLst>
+      <p:ext uri="{BB962C8B-B14F-4D97-AF65-F5344CB8AC3E}">
+        <p14:creationId xmlns:p14="http://schemas.microsoft.com/office/powerpoint/2010/main" val="1596391628"/>
+      </p:ext>
+    </p:extLst>
+  </p:cSld>
+  <p:clrMapOvr>
+    <a:masterClrMapping/>
+  </p:clrMapOvr>
+  <p:timing>
+    <p:tnLst>
+      <p:par>
+        <p:cTn xmlns:p14="http://schemas.microsoft.com/office/powerpoint/2010/main" id="1" dur="indefinite" restart="never" nodeType="tmRoot">
+          <p:childTnLst>
+            <p:seq concurrent="1" nextAc="seek">
+              <p:cTn id="2" dur="indefinite" nodeType="mainSeq">
+                <p:childTnLst>
+                  <p:par>
+                    <p:cTn id="3" fill="hold">
+                      <p:stCondLst>
+                        <p:cond delay="indefinite"/>
+                      </p:stCondLst>
+                      <p:childTnLst>
+                        <p:par>
+                          <p:cTn id="4" fill="hold">
+                            <p:stCondLst>
+                              <p:cond delay="0"/>
+                            </p:stCondLst>
+                            <p:childTnLst>
+                              <p:par>
+                                <p:cTn id="5" presetID="1" presetClass="entr" presetSubtype="0" fill="hold" nodeType="clickEffect">
+                                  <p:stCondLst>
+                                    <p:cond delay="0"/>
+                                  </p:stCondLst>
+                                  <p:childTnLst>
+                                    <p:set>
+                                      <p:cBhvr>
+                                        <p:cTn id="6" dur="1" fill="hold">
+                                          <p:stCondLst>
+                                            <p:cond delay="0"/>
+                                          </p:stCondLst>
+                                        </p:cTn>
+                                        <p:tgtEl>
+                                          <p:spTgt spid="3">
+                                            <p:txEl>
+                                              <p:pRg st="1" end="1"/>
+                                            </p:txEl>
+                                          </p:spTgt>
+                                        </p:tgtEl>
+                                        <p:attrNameLst>
+                                          <p:attrName>style.visibility</p:attrName>
+                                        </p:attrNameLst>
+                                      </p:cBhvr>
+                                      <p:to>
+                                        <p:strVal val="visible"/>
+                                      </p:to>
+                                    </p:set>
+                                  </p:childTnLst>
+                                </p:cTn>
+                              </p:par>
+                            </p:childTnLst>
+                          </p:cTn>
+                        </p:par>
+                      </p:childTnLst>
+                    </p:cTn>
+                  </p:par>
+                  <p:par>
+                    <p:cTn id="7" fill="hold">
+                      <p:stCondLst>
+                        <p:cond delay="indefinite"/>
+                      </p:stCondLst>
+                      <p:childTnLst>
+                        <p:par>
+                          <p:cTn id="8" fill="hold">
+                            <p:stCondLst>
+                              <p:cond delay="0"/>
+                            </p:stCondLst>
+                            <p:childTnLst>
+                              <p:par>
+                                <p:cTn id="9" presetID="1" presetClass="entr" presetSubtype="0" fill="hold" nodeType="clickEffect">
+                                  <p:stCondLst>
+                                    <p:cond delay="0"/>
+                                  </p:stCondLst>
+                                  <p:childTnLst>
+                                    <p:set>
+                                      <p:cBhvr>
+                                        <p:cTn id="10" dur="1" fill="hold">
+                                          <p:stCondLst>
+                                            <p:cond delay="0"/>
+                                          </p:stCondLst>
+                                        </p:cTn>
+                                        <p:tgtEl>
+                                          <p:spTgt spid="3">
+                                            <p:txEl>
+                                              <p:pRg st="3" end="3"/>
+                                            </p:txEl>
+                                          </p:spTgt>
+                                        </p:tgtEl>
+                                        <p:attrNameLst>
+                                          <p:attrName>style.visibility</p:attrName>
+                                        </p:attrNameLst>
+                                      </p:cBhvr>
+                                      <p:to>
+                                        <p:strVal val="visible"/>
+                                      </p:to>
+                                    </p:set>
+                                  </p:childTnLst>
+                                </p:cTn>
+                              </p:par>
+                            </p:childTnLst>
+                          </p:cTn>
+                        </p:par>
+                      </p:childTnLst>
+                    </p:cTn>
+                  </p:par>
+                </p:childTnLst>
+              </p:cTn>
+              <p:prevCondLst>
+                <p:cond evt="onPrev" delay="0">
+                  <p:tgtEl>
+                    <p:sldTgt/>
+                  </p:tgtEl>
+                </p:cond>
+              </p:prevCondLst>
+              <p:nextCondLst>
+                <p:cond evt="onNext" delay="0">
+                  <p:tgtEl>
+                    <p:sldTgt/>
+                  </p:tgtEl>
+                </p:cond>
+              </p:nextCondLst>
+            </p:seq>
+          </p:childTnLst>
+        </p:cTn>
+      </p:par>
+    </p:tnLst>
+  </p:timing>
+</p:sld>
+</file>
+
+<file path=ppt/slides/slide35.xml><?xml version="1.0" encoding="utf-8"?>
 <p:sld xmlns:a="http://schemas.openxmlformats.org/drawingml/2006/main" xmlns:r="http://schemas.openxmlformats.org/officeDocument/2006/relationships" xmlns:p="http://schemas.openxmlformats.org/presentationml/2006/main">
   <p:cSld>
     <p:spTree>
@@ -15346,7 +17013,7 @@
 </p:sld>
 </file>
 
-<file path=ppt/slides/slide35.xml><?xml version="1.0" encoding="utf-8"?>
+<file path=ppt/slides/slide36.xml><?xml version="1.0" encoding="utf-8"?>
 <p:sld xmlns:a="http://schemas.openxmlformats.org/drawingml/2006/main" xmlns:r="http://schemas.openxmlformats.org/officeDocument/2006/relationships" xmlns:p="http://schemas.openxmlformats.org/presentationml/2006/main">
   <p:cSld>
     <p:spTree>
@@ -16123,7 +17790,7 @@
 </p:sld>
 </file>
 
-<file path=ppt/slides/slide36.xml><?xml version="1.0" encoding="utf-8"?>
+<file path=ppt/slides/slide37.xml><?xml version="1.0" encoding="utf-8"?>
 <p:sld xmlns:a="http://schemas.openxmlformats.org/drawingml/2006/main" xmlns:r="http://schemas.openxmlformats.org/officeDocument/2006/relationships" xmlns:p="http://schemas.openxmlformats.org/presentationml/2006/main">
   <p:cSld>
     <p:spTree>
@@ -16430,7 +18097,7 @@
 </p:sld>
 </file>
 
-<file path=ppt/slides/slide37.xml><?xml version="1.0" encoding="utf-8"?>
+<file path=ppt/slides/slide38.xml><?xml version="1.0" encoding="utf-8"?>
 <p:sld xmlns:a="http://schemas.openxmlformats.org/drawingml/2006/main" xmlns:r="http://schemas.openxmlformats.org/officeDocument/2006/relationships" xmlns:p="http://schemas.openxmlformats.org/presentationml/2006/main">
   <p:cSld>
     <p:spTree>
@@ -16808,7 +18475,7 @@
 </p:sld>
 </file>
 
-<file path=ppt/slides/slide38.xml><?xml version="1.0" encoding="utf-8"?>
+<file path=ppt/slides/slide39.xml><?xml version="1.0" encoding="utf-8"?>
 <p:sld xmlns:a="http://schemas.openxmlformats.org/drawingml/2006/main" xmlns:r="http://schemas.openxmlformats.org/officeDocument/2006/relationships" xmlns:p="http://schemas.openxmlformats.org/presentationml/2006/main">
   <p:cSld>
     <p:spTree>

</xml_diff>

<commit_message>
Updating link to preso
</commit_message>
<xml_diff>
--- a/Async_Discussion_9_29_15.pptx
+++ b/Async_Discussion_9_29_15.pptx
@@ -998,11 +998,7 @@
             </a:pPr>
             <a:r>
               <a:rPr lang="en-US" dirty="0" smtClean="0"/>
-              <a:t>- </a:t>
-            </a:r>
-            <a:r>
-              <a:rPr lang="en-US" dirty="0" smtClean="0"/>
-              <a:t>Occasionally you are going to want to define your own promises, so that client code can handle your asynchronous function.</a:t>
+              <a:t>- Occasionally you are going to want to define your own promises, so that client code can handle your asynchronous function.</a:t>
             </a:r>
           </a:p>
           <a:p>
@@ -1590,7 +1586,6 @@
               <a:rPr lang="en-US" dirty="0" smtClean="0"/>
               <a:t>), this won’t always be the case. It’s important to know about the new, cleaner API coming our way.</a:t>
             </a:r>
-            <a:endParaRPr lang="en-US" dirty="0" smtClean="0"/>
           </a:p>
           <a:p>
             <a:pPr marL="171450" indent="-171450">
@@ -1816,17 +1811,12 @@
             </a:pPr>
             <a:r>
               <a:rPr lang="en-US" dirty="0" smtClean="0"/>
-              <a:t>Slow: </a:t>
-            </a:r>
-            <a:r>
-              <a:rPr lang="en-US" dirty="0" smtClean="0"/>
-              <a:t>If a portion of our code takes</a:t>
+              <a:t>Slow: If a portion of our code takes</a:t>
             </a:r>
             <a:r>
               <a:rPr lang="en-US" baseline="0" dirty="0" smtClean="0"/>
               <a:t> a long time to execute, the user is left waiting for it to finish for any other actions to occur.</a:t>
             </a:r>
-            <a:endParaRPr lang="en-US" baseline="0" dirty="0" smtClean="0"/>
           </a:p>
           <a:p>
             <a:pPr marL="171450" indent="-171450">
@@ -2286,11 +2276,7 @@
             </a:pPr>
             <a:r>
               <a:rPr lang="en-US" dirty="0" smtClean="0"/>
-              <a:t>- Call the function… </a:t>
-            </a:r>
-            <a:r>
-              <a:rPr lang="en-US" dirty="0" smtClean="0"/>
-              <a:t>This doesn’t start the execution of the generator, but instead creates something calling a generator iterator. We will use this object to run, or iterate, through the generator</a:t>
+              <a:t>- Call the function… This doesn’t start the execution of the generator, but instead creates something calling a generator iterator. We will use this object to run, or iterate, through the generator</a:t>
             </a:r>
           </a:p>
         </p:txBody>
@@ -6945,7 +6931,9 @@
         </p:nvSpPr>
         <p:spPr/>
         <p:txBody>
-          <a:bodyPr/>
+          <a:bodyPr>
+            <a:normAutofit fontScale="85000" lnSpcReduction="10000"/>
+          </a:bodyPr>
           <a:lstStyle/>
           <a:p>
             <a:r>
@@ -6969,8 +6957,23 @@
           <a:p>
             <a:r>
               <a:rPr lang="en-US" dirty="0" smtClean="0"/>
-              <a:t>Presentation: xxx</a:t>
-            </a:r>
+              <a:t>Presentation: </a:t>
+            </a:r>
+            <a:r>
+              <a:rPr lang="en-US" dirty="0">
+                <a:hlinkClick r:id="rId4"/>
+              </a:rPr>
+              <a:t>http://www.slideshare.net/cherylyaeger/async-discussion-</a:t>
+            </a:r>
+            <a:r>
+              <a:rPr lang="en-US" dirty="0" smtClean="0">
+                <a:hlinkClick r:id="rId4"/>
+              </a:rPr>
+              <a:t>92915</a:t>
+            </a:r>
+            <a:endParaRPr lang="en-US" dirty="0" smtClean="0"/>
+          </a:p>
+          <a:p>
             <a:endParaRPr lang="en-US" dirty="0"/>
           </a:p>
         </p:txBody>
@@ -7623,7 +7626,6 @@
               <a:rPr lang="en-US" dirty="0" smtClean="0"/>
               <a:t>.</a:t>
             </a:r>
-            <a:endParaRPr lang="en-US" dirty="0" smtClean="0"/>
           </a:p>
         </p:txBody>
       </p:sp>
@@ -7867,7 +7869,6 @@
               <a:rPr lang="en-US" dirty="0"/>
               <a:t>.</a:t>
             </a:r>
-            <a:endParaRPr lang="en-US" dirty="0"/>
           </a:p>
         </p:txBody>
       </p:sp>
@@ -8474,11 +8475,7 @@
           <a:p>
             <a:r>
               <a:rPr lang="en-US" dirty="0" smtClean="0"/>
-              <a:t>Promises </a:t>
-            </a:r>
-            <a:r>
-              <a:rPr lang="en-US" dirty="0" smtClean="0"/>
-              <a:t>– Chaining (Notes)</a:t>
+              <a:t>Promises – Chaining (Notes)</a:t>
             </a:r>
             <a:endParaRPr lang="en-US" dirty="0"/>
           </a:p>
@@ -8505,11 +8502,7 @@
             </a:r>
             <a:r>
               <a:rPr lang="en-US" dirty="0" smtClean="0"/>
-              <a:t>ood </a:t>
-            </a:r>
-            <a:r>
-              <a:rPr lang="en-US" dirty="0" smtClean="0"/>
-              <a:t>practice </a:t>
+              <a:t>ood practice </a:t>
             </a:r>
             <a:r>
               <a:rPr lang="en-US" dirty="0"/>
@@ -8568,7 +8561,6 @@
               <a:rPr lang="en-US" dirty="0" smtClean="0"/>
               <a:t>.</a:t>
             </a:r>
-            <a:endParaRPr lang="en-US" dirty="0" smtClean="0"/>
           </a:p>
           <a:p>
             <a:r>
@@ -8669,11 +8661,7 @@
             </a:r>
             <a:r>
               <a:rPr lang="en-US" dirty="0" smtClean="0"/>
-              <a:t> </a:t>
-            </a:r>
-            <a:r>
-              <a:rPr lang="en-US" dirty="0" smtClean="0"/>
-              <a:t>is </a:t>
+              <a:t> is </a:t>
             </a:r>
             <a:r>
               <a:rPr lang="en-US" dirty="0"/>
@@ -8688,11 +8676,7 @@
             <a:pPr lvl="1"/>
             <a:r>
               <a:rPr lang="en-US" dirty="0" smtClean="0"/>
-              <a:t>If </a:t>
-            </a:r>
-            <a:r>
-              <a:rPr lang="en-US" dirty="0" smtClean="0"/>
-              <a:t>we were instead to pass </a:t>
+              <a:t>If we were instead to pass </a:t>
             </a:r>
             <a:r>
               <a:rPr lang="en-US" dirty="0"/>
@@ -8711,11 +8695,7 @@
             </a:r>
             <a:r>
               <a:rPr lang="en-US" dirty="0" smtClean="0"/>
-              <a:t>, </a:t>
-            </a:r>
-            <a:r>
-              <a:rPr lang="en-US" dirty="0" smtClean="0"/>
-              <a:t>errors in the first callback will not be handled by the second callback.</a:t>
+              <a:t>, errors in the first callback will not be handled by the second callback.</a:t>
             </a:r>
             <a:endParaRPr lang="en-US" dirty="0"/>
           </a:p>
@@ -9390,13 +9370,8 @@
           <a:p>
             <a:r>
               <a:rPr lang="en-US" dirty="0" smtClean="0"/>
-              <a:t>Call reject to </a:t>
-            </a:r>
-            <a:r>
-              <a:rPr lang="en-US" dirty="0" smtClean="0"/>
-              <a:t>pass back an error that has occurred</a:t>
-            </a:r>
-            <a:endParaRPr lang="en-US" dirty="0" smtClean="0"/>
+              <a:t>Call reject to pass back an error that has occurred</a:t>
+            </a:r>
           </a:p>
         </p:txBody>
       </p:sp>
@@ -9659,7 +9634,6 @@
               <a:rPr lang="en-US" dirty="0" smtClean="0"/>
               <a:t> </a:t>
             </a:r>
-            <a:endParaRPr lang="en-US" dirty="0" smtClean="0"/>
           </a:p>
           <a:p>
             <a:r>
@@ -9748,7 +9722,6 @@
               <a:rPr lang="en-US" dirty="0" smtClean="0"/>
               <a:t>standard</a:t>
             </a:r>
-            <a:endParaRPr lang="en-US" dirty="0" smtClean="0"/>
           </a:p>
           <a:p>
             <a:r>
@@ -10358,11 +10331,7 @@
             </a:r>
             <a:r>
               <a:rPr lang="en-US" dirty="0" smtClean="0"/>
-              <a:t>promises</a:t>
-            </a:r>
-            <a:r>
-              <a:rPr lang="en-US" dirty="0" smtClean="0"/>
-              <a:t> provide </a:t>
+              <a:t>promises provide </a:t>
             </a:r>
             <a:r>
               <a:rPr lang="en-US" dirty="0"/>
@@ -10475,21 +10444,13 @@
             </a:r>
             <a:r>
               <a:rPr lang="en-US" dirty="0" smtClean="0"/>
-              <a:t>thing fails</a:t>
-            </a:r>
-            <a:r>
-              <a:rPr lang="en-US" dirty="0" smtClean="0"/>
-              <a:t>.</a:t>
-            </a:r>
-          </a:p>
-          <a:p>
-            <a:r>
-              <a:rPr lang="en-US" dirty="0" smtClean="0"/>
-              <a:t>The array of results will be in </a:t>
-            </a:r>
-            <a:r>
-              <a:rPr lang="en-US" dirty="0" smtClean="0"/>
-              <a:t>order.</a:t>
+              <a:t>thing fails.</a:t>
+            </a:r>
+          </a:p>
+          <a:p>
+            <a:r>
+              <a:rPr lang="en-US" dirty="0" smtClean="0"/>
+              <a:t>The array of results will be in order.</a:t>
             </a:r>
             <a:endParaRPr lang="en-US" dirty="0"/>
           </a:p>
@@ -10912,11 +10873,7 @@
             </a:r>
             <a:r>
               <a:rPr lang="en-US" dirty="0" smtClean="0"/>
-              <a:t>(</a:t>
-            </a:r>
-            <a:r>
-              <a:rPr lang="en-US" dirty="0" smtClean="0"/>
-              <a:t>still </a:t>
+              <a:t>(still </a:t>
             </a:r>
             <a:r>
               <a:rPr lang="en-US" dirty="0"/>
@@ -11592,15 +11549,7 @@
           <a:p>
             <a:r>
               <a:rPr lang="en-US" dirty="0" smtClean="0"/>
-              <a:t>Common</a:t>
-            </a:r>
-            <a:r>
-              <a:rPr lang="en-US" dirty="0" smtClean="0"/>
-              <a:t> </a:t>
-            </a:r>
-            <a:r>
-              <a:rPr lang="en-US" dirty="0" smtClean="0"/>
-              <a:t>methods:</a:t>
+              <a:t>Common methods:</a:t>
             </a:r>
           </a:p>
           <a:p>
@@ -11938,11 +11887,7 @@
             </a:r>
             <a:r>
               <a:rPr lang="en-US" dirty="0" smtClean="0"/>
-              <a:t>to replace</a:t>
-            </a:r>
-            <a:r>
-              <a:rPr lang="en-US" dirty="0" smtClean="0"/>
-              <a:t> </a:t>
+              <a:t>to replace </a:t>
             </a:r>
             <a:r>
               <a:rPr lang="en-US" dirty="0" err="1"/>
@@ -12884,11 +12829,7 @@
             </a:r>
             <a:r>
               <a:rPr lang="en-US" dirty="0" smtClean="0"/>
-              <a:t>Google</a:t>
-            </a:r>
-            <a:r>
-              <a:rPr lang="en-US" dirty="0" smtClean="0"/>
-              <a:t>.)</a:t>
+              <a:t>Google.)</a:t>
             </a:r>
             <a:endParaRPr lang="en-US" dirty="0"/>
           </a:p>
@@ -13306,11 +13247,7 @@
             </a:r>
             <a:r>
               <a:rPr lang="en-US" dirty="0" smtClean="0"/>
-              <a:t> function, y</a:t>
-            </a:r>
-            <a:r>
-              <a:rPr lang="en-US" dirty="0" smtClean="0"/>
-              <a:t>ou can precede any asynchronous calls with </a:t>
+              <a:t> function, you can precede any asynchronous calls with </a:t>
             </a:r>
             <a:r>
               <a:rPr lang="en-US" dirty="0" smtClean="0">
@@ -14298,21 +14235,13 @@
           <a:p>
             <a:r>
               <a:rPr lang="en-US" dirty="0" smtClean="0"/>
-              <a:t>When </a:t>
-            </a:r>
-            <a:r>
-              <a:rPr lang="en-US" dirty="0" smtClean="0"/>
-              <a:t>we first start programming, we learn how to code synchronously.</a:t>
-            </a:r>
-          </a:p>
-          <a:p>
-            <a:r>
-              <a:rPr lang="en-US" dirty="0" smtClean="0"/>
-              <a:t>Every statement runs to completion, followed by the next statement in the control flow, until the application completes</a:t>
-            </a:r>
-            <a:r>
-              <a:rPr lang="en-US" dirty="0" smtClean="0"/>
-              <a:t>.</a:t>
+              <a:t>When we first start programming, we learn how to code synchronously.</a:t>
+            </a:r>
+          </a:p>
+          <a:p>
+            <a:r>
+              <a:rPr lang="en-US" dirty="0" smtClean="0"/>
+              <a:t>Every statement runs to completion, followed by the next statement in the control flow, until the application completes.</a:t>
             </a:r>
           </a:p>
           <a:p>
@@ -14348,7 +14277,6 @@
               <a:rPr lang="en-US" dirty="0" smtClean="0"/>
               <a:t>Poor interactivity and user experience</a:t>
             </a:r>
-            <a:endParaRPr lang="en-US" dirty="0" smtClean="0"/>
           </a:p>
           <a:p>
             <a:pPr marL="114300" indent="0">
@@ -14684,11 +14612,7 @@
           <a:p>
             <a:r>
               <a:rPr lang="en-US" dirty="0" smtClean="0"/>
-              <a:t>When </a:t>
-            </a:r>
-            <a:r>
-              <a:rPr lang="en-US" dirty="0" smtClean="0"/>
-              <a:t>the function encounters a </a:t>
+              <a:t>When the function encounters a </a:t>
             </a:r>
             <a:r>
               <a:rPr lang="en-US" dirty="0" smtClean="0">
@@ -14724,7 +14648,6 @@
               <a:rPr lang="en-US" dirty="0" smtClean="0"/>
               <a:t>After the last yield, the generator must call next once more to finish the method.</a:t>
             </a:r>
-            <a:endParaRPr lang="en-US" dirty="0" smtClean="0"/>
           </a:p>
         </p:txBody>
       </p:sp>
@@ -15495,11 +15418,7 @@
           <a:p>
             <a:r>
               <a:rPr lang="en-US" dirty="0" smtClean="0"/>
-              <a:t>A</a:t>
-            </a:r>
-            <a:r>
-              <a:rPr lang="en-US" dirty="0" smtClean="0"/>
-              <a:t>llows </a:t>
+              <a:t>Allows </a:t>
             </a:r>
             <a:r>
               <a:rPr lang="en-US" dirty="0"/>
@@ -15638,7 +15557,6 @@
               <a:rPr lang="en-US" dirty="0" smtClean="0"/>
               <a:t>.</a:t>
             </a:r>
-            <a:endParaRPr lang="en-US" dirty="0" smtClean="0"/>
           </a:p>
         </p:txBody>
       </p:sp>
@@ -15961,11 +15879,7 @@
             </a:pPr>
             <a:r>
               <a:rPr lang="en-US" sz="2200" dirty="0" smtClean="0"/>
-              <a:t>By using a generator iterator we can start a function that will make an async call, and then use the same iterator to return the result of the operation back to the calling function</a:t>
-            </a:r>
-            <a:r>
-              <a:rPr lang="en-US" sz="2200" dirty="0" smtClean="0"/>
-              <a:t>.</a:t>
+              <a:t>By using a generator iterator we can start a function that will make an async call, and then use the same iterator to return the result of the operation back to the calling function.</a:t>
             </a:r>
             <a:endParaRPr lang="en-US" dirty="0"/>
           </a:p>
@@ -16588,27 +16502,7 @@
             <a:pPr lvl="1"/>
             <a:r>
               <a:rPr lang="en-US" dirty="0" smtClean="0"/>
-              <a:t>When the </a:t>
-            </a:r>
-            <a:r>
-              <a:rPr lang="en-US" dirty="0" smtClean="0"/>
-              <a:t>promise and </a:t>
-            </a:r>
-            <a:r>
-              <a:rPr lang="en-US" dirty="0" smtClean="0"/>
-              <a:t>resulting assertions are </a:t>
-            </a:r>
-            <a:r>
-              <a:rPr lang="en-US" dirty="0" smtClean="0"/>
-              <a:t>finished</a:t>
-            </a:r>
-            <a:r>
-              <a:rPr lang="en-US" dirty="0" smtClean="0"/>
-              <a:t>, </a:t>
-            </a:r>
-            <a:r>
-              <a:rPr lang="en-US" dirty="0" smtClean="0"/>
-              <a:t>calling </a:t>
+              <a:t>When the promise and resulting assertions are finished, calling </a:t>
             </a:r>
             <a:r>
               <a:rPr lang="en-US" dirty="0" smtClean="0">
@@ -16619,33 +16513,13 @@
             </a:r>
             <a:r>
               <a:rPr lang="en-US" dirty="0" smtClean="0"/>
-              <a:t> signals </a:t>
-            </a:r>
-            <a:r>
-              <a:rPr lang="en-US" dirty="0" smtClean="0"/>
-              <a:t>that the </a:t>
-            </a:r>
-            <a:r>
-              <a:rPr lang="en-US" dirty="0" smtClean="0"/>
-              <a:t>asynchronous </a:t>
-            </a:r>
-            <a:r>
-              <a:rPr lang="en-US" dirty="0" smtClean="0"/>
-              <a:t>work has completed.</a:t>
-            </a:r>
-          </a:p>
-          <a:p>
-            <a:r>
-              <a:rPr lang="en-US" dirty="0" smtClean="0"/>
-              <a:t>To test, call the </a:t>
-            </a:r>
-            <a:r>
-              <a:rPr lang="en-US" dirty="0" smtClean="0"/>
-              <a:t>promise as </a:t>
-            </a:r>
-            <a:r>
-              <a:rPr lang="en-US" dirty="0" smtClean="0"/>
-              <a:t>you normally would.</a:t>
+              <a:t> signals that the asynchronous work has completed.</a:t>
+            </a:r>
+          </a:p>
+          <a:p>
+            <a:r>
+              <a:rPr lang="en-US" dirty="0" smtClean="0"/>
+              <a:t>To test, call the promise as you normally would.</a:t>
             </a:r>
           </a:p>
           <a:p>
@@ -16663,21 +16537,8 @@
             </a:r>
             <a:r>
               <a:rPr lang="en-US" dirty="0" smtClean="0"/>
-              <a:t> </a:t>
-            </a:r>
-            <a:r>
-              <a:rPr lang="en-US" dirty="0" smtClean="0"/>
-              <a:t>handler, </a:t>
-            </a:r>
-            <a:r>
-              <a:rPr lang="en-US" dirty="0" smtClean="0"/>
-              <a:t>test for the result you would expect from the resolve promise</a:t>
-            </a:r>
-            <a:r>
-              <a:rPr lang="en-US" dirty="0" smtClean="0"/>
-              <a:t>.</a:t>
-            </a:r>
-            <a:endParaRPr lang="en-US" dirty="0" smtClean="0"/>
+              <a:t> handler, test for the result you would expect from the resolve promise.</a:t>
+            </a:r>
           </a:p>
           <a:p>
             <a:pPr lvl="1"/>
@@ -16694,19 +16555,7 @@
             </a:r>
             <a:r>
               <a:rPr lang="en-US" dirty="0" smtClean="0"/>
-              <a:t> </a:t>
-            </a:r>
-            <a:r>
-              <a:rPr lang="en-US" dirty="0" smtClean="0"/>
-              <a:t>handler, </a:t>
-            </a:r>
-            <a:r>
-              <a:rPr lang="en-US" dirty="0" smtClean="0"/>
-              <a:t>test for the result you would expect from the rejected promise</a:t>
-            </a:r>
-            <a:r>
-              <a:rPr lang="en-US" dirty="0" smtClean="0"/>
-              <a:t>.</a:t>
+              <a:t> handler, test for the result you would expect from the rejected promise.</a:t>
             </a:r>
             <a:endParaRPr lang="en-US" dirty="0"/>
           </a:p>
@@ -17181,21 +17030,8 @@
           <a:p>
             <a:r>
               <a:rPr lang="en-US" dirty="0" smtClean="0"/>
-              <a:t>Spy on the function that returns the promise, and have it return a promise that is always resolved (</a:t>
-            </a:r>
-            <a:r>
-              <a:rPr lang="en-US" dirty="0" smtClean="0"/>
-              <a:t>or always </a:t>
-            </a:r>
-            <a:r>
-              <a:rPr lang="en-US" dirty="0" smtClean="0"/>
-              <a:t>rejected)</a:t>
-            </a:r>
-            <a:r>
-              <a:rPr lang="en-US" dirty="0" smtClean="0"/>
-              <a:t>.</a:t>
-            </a:r>
-            <a:endParaRPr lang="en-US" dirty="0" smtClean="0"/>
+              <a:t>Spy on the function that returns the promise, and have it return a promise that is always resolved (or always rejected).</a:t>
+            </a:r>
           </a:p>
           <a:p>
             <a:endParaRPr lang="en-US" dirty="0" smtClean="0"/>
@@ -17222,11 +17058,7 @@
             </a:r>
             <a:r>
               <a:rPr lang="en-US" dirty="0" smtClean="0"/>
-              <a:t>, you can use a similar technique</a:t>
-            </a:r>
-            <a:r>
-              <a:rPr lang="en-US" dirty="0" smtClean="0"/>
-              <a:t>.</a:t>
+              <a:t>, you can use a similar technique.</a:t>
             </a:r>
           </a:p>
         </p:txBody>
@@ -18161,30 +17993,14 @@
             <a:pPr lvl="1"/>
             <a:r>
               <a:rPr lang="en-US" dirty="0" smtClean="0"/>
-              <a:t>A</a:t>
-            </a:r>
-            <a:r>
-              <a:rPr lang="en-US" dirty="0" smtClean="0"/>
-              <a:t> </a:t>
-            </a:r>
-            <a:r>
-              <a:rPr lang="en-US" dirty="0" smtClean="0"/>
-              <a:t>way for your web app to perform tasks using background threads.</a:t>
+              <a:t>A way for your web app to perform tasks using background threads.</a:t>
             </a:r>
           </a:p>
           <a:p>
             <a:pPr lvl="1"/>
             <a:r>
               <a:rPr lang="en-US" dirty="0" smtClean="0"/>
-              <a:t>While these actions perform separately, you can communicate with the main </a:t>
-            </a:r>
-            <a:r>
-              <a:rPr lang="en-US" dirty="0" smtClean="0"/>
-              <a:t>JavaScript </a:t>
-            </a:r>
-            <a:r>
-              <a:rPr lang="en-US" dirty="0" smtClean="0"/>
-              <a:t>thread.</a:t>
+              <a:t>While these actions perform separately, you can communicate with the main JavaScript thread.</a:t>
             </a:r>
           </a:p>
           <a:p>
@@ -19243,7 +19059,6 @@
               <a:rPr lang="en-US" dirty="0" smtClean="0"/>
               <a:t>Traditional methods: multithreading, multiprocessing.</a:t>
             </a:r>
-            <a:endParaRPr lang="en-US" dirty="0" smtClean="0"/>
           </a:p>
           <a:p>
             <a:r>
@@ -19263,11 +19078,7 @@
             <a:pPr lvl="1"/>
             <a:r>
               <a:rPr lang="en-US" dirty="0" smtClean="0"/>
-              <a:t>Asynchronous code </a:t>
-            </a:r>
-            <a:r>
-              <a:rPr lang="en-US" dirty="0" smtClean="0"/>
-              <a:t>is wrapped in a function.</a:t>
+              <a:t>Asynchronous code is wrapped in a function.</a:t>
             </a:r>
           </a:p>
           <a:p>
@@ -19278,23 +19089,7 @@
             </a:r>
             <a:r>
               <a:rPr lang="en-US" dirty="0" smtClean="0"/>
-              <a:t>unction takes arguments to </a:t>
-            </a:r>
-            <a:r>
-              <a:rPr lang="en-US" dirty="0" smtClean="0"/>
-              <a:t>perform it’s task, but </a:t>
-            </a:r>
-            <a:r>
-              <a:rPr lang="en-US" dirty="0" smtClean="0"/>
-              <a:t>also callback </a:t>
-            </a:r>
-            <a:r>
-              <a:rPr lang="en-US" dirty="0" smtClean="0"/>
-              <a:t>functions</a:t>
-            </a:r>
-            <a:r>
-              <a:rPr lang="en-US" dirty="0" smtClean="0"/>
-              <a:t>. </a:t>
+              <a:t>unction takes arguments to perform it’s task, but also callback functions. </a:t>
             </a:r>
           </a:p>
           <a:p>
@@ -19829,19 +19624,7 @@
             </a:r>
             <a:r>
               <a:rPr lang="en-US" dirty="0" smtClean="0"/>
-              <a:t>unction </a:t>
-            </a:r>
-            <a:r>
-              <a:rPr lang="en-US" dirty="0" smtClean="0"/>
-              <a:t>calls </a:t>
-            </a:r>
-            <a:r>
-              <a:rPr lang="en-US" dirty="0" smtClean="0"/>
-              <a:t>are added </a:t>
-            </a:r>
-            <a:r>
-              <a:rPr lang="en-US" dirty="0" smtClean="0"/>
-              <a:t>to the call stack. When a function returns, it is popped off the stack.</a:t>
+              <a:t>unction calls are added to the call stack. When a function returns, it is popped off the stack.</a:t>
             </a:r>
           </a:p>
           <a:p>
@@ -19863,11 +19646,7 @@
           <a:p>
             <a:r>
               <a:rPr lang="en-US" dirty="0" smtClean="0"/>
-              <a:t>That function is then popped off the stack, as if it </a:t>
-            </a:r>
-            <a:r>
-              <a:rPr lang="en-US" dirty="0" smtClean="0"/>
-              <a:t>completed.</a:t>
+              <a:t>That function is then popped off the stack, as if it completed.</a:t>
             </a:r>
           </a:p>
           <a:p>
@@ -23615,7 +23394,6 @@
               <a:rPr lang="en-US" dirty="0" smtClean="0"/>
               <a:t>Using callbacks for asynchronous code has it’s drawbacks:</a:t>
             </a:r>
-            <a:endParaRPr lang="en-US" dirty="0" smtClean="0"/>
           </a:p>
           <a:p>
             <a:pPr lvl="1"/>

</xml_diff>

<commit_message>
Some final animations, maybe.
</commit_message>
<xml_diff>
--- a/Async_Discussion_9_29_15.pptx
+++ b/Async_Discussion_9_29_15.pptx
@@ -279,7 +279,7 @@
           <a:p>
             <a:fld id="{0FE6ED01-4D4B-2B45-B62B-1A50C36CA659}" type="datetimeFigureOut">
               <a:rPr lang="en-US" smtClean="0"/>
-              <a:t>9/26/15</a:t>
+              <a:t>10/17/15</a:t>
             </a:fld>
             <a:endParaRPr lang="en-US"/>
           </a:p>
@@ -4021,7 +4021,7 @@
           <a:p>
             <a:fld id="{DDAA701C-81C8-694C-BB01-105E7F20F4A5}" type="datetimeFigureOut">
               <a:rPr lang="en-US" smtClean="0"/>
-              <a:t>9/26/15</a:t>
+              <a:t>10/17/15</a:t>
             </a:fld>
             <a:endParaRPr lang="en-US"/>
           </a:p>
@@ -4186,7 +4186,7 @@
           <a:p>
             <a:fld id="{DDAA701C-81C8-694C-BB01-105E7F20F4A5}" type="datetimeFigureOut">
               <a:rPr lang="en-US" smtClean="0"/>
-              <a:t>9/26/15</a:t>
+              <a:t>10/17/15</a:t>
             </a:fld>
             <a:endParaRPr lang="en-US"/>
           </a:p>
@@ -4361,7 +4361,7 @@
           <a:p>
             <a:fld id="{DDAA701C-81C8-694C-BB01-105E7F20F4A5}" type="datetimeFigureOut">
               <a:rPr lang="en-US" smtClean="0"/>
-              <a:t>9/26/15</a:t>
+              <a:t>10/17/15</a:t>
             </a:fld>
             <a:endParaRPr lang="en-US"/>
           </a:p>
@@ -4526,7 +4526,7 @@
           <a:p>
             <a:fld id="{DDAA701C-81C8-694C-BB01-105E7F20F4A5}" type="datetimeFigureOut">
               <a:rPr lang="en-US" smtClean="0"/>
-              <a:t>9/26/15</a:t>
+              <a:t>10/17/15</a:t>
             </a:fld>
             <a:endParaRPr lang="en-US"/>
           </a:p>
@@ -4767,7 +4767,7 @@
           <a:p>
             <a:fld id="{DDAA701C-81C8-694C-BB01-105E7F20F4A5}" type="datetimeFigureOut">
               <a:rPr lang="en-US" smtClean="0"/>
-              <a:t>9/26/15</a:t>
+              <a:t>10/17/15</a:t>
             </a:fld>
             <a:endParaRPr lang="en-US"/>
           </a:p>
@@ -5050,7 +5050,7 @@
           <a:p>
             <a:fld id="{DDAA701C-81C8-694C-BB01-105E7F20F4A5}" type="datetimeFigureOut">
               <a:rPr lang="en-US" smtClean="0"/>
-              <a:t>9/26/15</a:t>
+              <a:t>10/17/15</a:t>
             </a:fld>
             <a:endParaRPr lang="en-US"/>
           </a:p>
@@ -5479,7 +5479,7 @@
           <a:p>
             <a:fld id="{DDAA701C-81C8-694C-BB01-105E7F20F4A5}" type="datetimeFigureOut">
               <a:rPr lang="en-US" smtClean="0"/>
-              <a:t>9/26/15</a:t>
+              <a:t>10/17/15</a:t>
             </a:fld>
             <a:endParaRPr lang="en-US"/>
           </a:p>
@@ -5592,7 +5592,7 @@
           <a:p>
             <a:fld id="{DDAA701C-81C8-694C-BB01-105E7F20F4A5}" type="datetimeFigureOut">
               <a:rPr lang="en-US" smtClean="0"/>
-              <a:t>9/26/15</a:t>
+              <a:t>10/17/15</a:t>
             </a:fld>
             <a:endParaRPr lang="en-US"/>
           </a:p>
@@ -5682,7 +5682,7 @@
           <a:p>
             <a:fld id="{DDAA701C-81C8-694C-BB01-105E7F20F4A5}" type="datetimeFigureOut">
               <a:rPr lang="en-US" smtClean="0"/>
-              <a:t>9/26/15</a:t>
+              <a:t>10/17/15</a:t>
             </a:fld>
             <a:endParaRPr lang="en-US"/>
           </a:p>
@@ -5871,7 +5871,7 @@
           <a:p>
             <a:fld id="{DDAA701C-81C8-694C-BB01-105E7F20F4A5}" type="datetimeFigureOut">
               <a:rPr lang="en-US" smtClean="0"/>
-              <a:t>9/26/15</a:t>
+              <a:t>10/17/15</a:t>
             </a:fld>
             <a:endParaRPr lang="en-US"/>
           </a:p>
@@ -6189,7 +6189,7 @@
           <a:p>
             <a:fld id="{DDAA701C-81C8-694C-BB01-105E7F20F4A5}" type="datetimeFigureOut">
               <a:rPr lang="en-US" smtClean="0"/>
-              <a:t>9/26/15</a:t>
+              <a:t>10/17/15</a:t>
             </a:fld>
             <a:endParaRPr lang="en-US"/>
           </a:p>
@@ -6568,7 +6568,7 @@
           <a:p>
             <a:fld id="{DDAA701C-81C8-694C-BB01-105E7F20F4A5}" type="datetimeFigureOut">
               <a:rPr lang="en-US" smtClean="0"/>
-              <a:t>9/26/15</a:t>
+              <a:t>10/17/15</a:t>
             </a:fld>
             <a:endParaRPr lang="en-US"/>
           </a:p>
@@ -20725,7 +20725,7 @@
         <p:spPr>
           <a:xfrm>
             <a:off x="4314825" y="2828347"/>
-            <a:ext cx="2416175" cy="0"/>
+            <a:ext cx="2736850" cy="0"/>
           </a:xfrm>
           <a:prstGeom prst="line">
             <a:avLst/>
@@ -20759,7 +20759,7 @@
         </p:nvCxnSpPr>
         <p:spPr>
           <a:xfrm>
-            <a:off x="6718300" y="2828347"/>
+            <a:off x="7040166" y="2828347"/>
             <a:ext cx="0" cy="1584325"/>
           </a:xfrm>
           <a:prstGeom prst="straightConnector1">
@@ -20795,8 +20795,8 @@
         </p:nvSpPr>
         <p:spPr>
           <a:xfrm>
-            <a:off x="1104900" y="2739447"/>
-            <a:ext cx="914400" cy="2083378"/>
+            <a:off x="810205" y="3050001"/>
+            <a:ext cx="1139797" cy="2083378"/>
           </a:xfrm>
           <a:prstGeom prst="roundRect">
             <a:avLst/>
@@ -20824,7 +20824,7 @@
           <a:lstStyle/>
           <a:p>
             <a:pPr algn="ctr"/>
-            <a:endParaRPr lang="en-US"/>
+            <a:endParaRPr lang="en-US" dirty="0"/>
           </a:p>
         </p:txBody>
       </p:sp>
@@ -20836,8 +20836,8 @@
         </p:nvCxnSpPr>
         <p:spPr>
           <a:xfrm>
-            <a:off x="1104900" y="3051175"/>
-            <a:ext cx="914400" cy="0"/>
+            <a:off x="810205" y="3361729"/>
+            <a:ext cx="1139797" cy="0"/>
           </a:xfrm>
           <a:prstGeom prst="line">
             <a:avLst/>
@@ -20871,8 +20871,8 @@
         </p:nvCxnSpPr>
         <p:spPr>
           <a:xfrm>
-            <a:off x="1104900" y="3333750"/>
-            <a:ext cx="914400" cy="0"/>
+            <a:off x="810205" y="3644304"/>
+            <a:ext cx="1139797" cy="0"/>
           </a:xfrm>
           <a:prstGeom prst="line">
             <a:avLst/>
@@ -20906,8 +20906,8 @@
         </p:nvCxnSpPr>
         <p:spPr>
           <a:xfrm>
-            <a:off x="1104900" y="3613150"/>
-            <a:ext cx="914400" cy="0"/>
+            <a:off x="810205" y="3923704"/>
+            <a:ext cx="1139797" cy="0"/>
           </a:xfrm>
           <a:prstGeom prst="line">
             <a:avLst/>
@@ -20941,8 +20941,8 @@
         </p:nvCxnSpPr>
         <p:spPr>
           <a:xfrm>
-            <a:off x="1104900" y="3905250"/>
-            <a:ext cx="914400" cy="0"/>
+            <a:off x="810205" y="4215804"/>
+            <a:ext cx="1139797" cy="0"/>
           </a:xfrm>
           <a:prstGeom prst="line">
             <a:avLst/>
@@ -20976,8 +20976,8 @@
         </p:nvCxnSpPr>
         <p:spPr>
           <a:xfrm flipH="1">
-            <a:off x="2082800" y="2863851"/>
-            <a:ext cx="692150" cy="53974"/>
+            <a:off x="1982518" y="2881717"/>
+            <a:ext cx="822960" cy="353848"/>
           </a:xfrm>
           <a:prstGeom prst="straightConnector1">
             <a:avLst/>
@@ -21012,8 +21012,8 @@
         </p:nvCxnSpPr>
         <p:spPr>
           <a:xfrm flipH="1" flipV="1">
-            <a:off x="2082800" y="3479800"/>
-            <a:ext cx="692150" cy="384176"/>
+            <a:off x="2007173" y="3190902"/>
+            <a:ext cx="771240" cy="175416"/>
           </a:xfrm>
           <a:prstGeom prst="straightConnector1">
             <a:avLst/>
@@ -21043,15 +21043,13 @@
       <p:cxnSp>
         <p:nvCxnSpPr>
           <p:cNvPr id="48" name="Straight Arrow Connector 47"/>
-          <p:cNvCxnSpPr>
-            <a:stCxn id="4" idx="1"/>
-          </p:cNvCxnSpPr>
+          <p:cNvCxnSpPr/>
           <p:nvPr/>
         </p:nvCxnSpPr>
         <p:spPr>
-          <a:xfrm flipH="1" flipV="1">
-            <a:off x="2082802" y="3206751"/>
-            <a:ext cx="632111" cy="150042"/>
+          <a:xfrm flipH="1">
+            <a:off x="2007173" y="3146909"/>
+            <a:ext cx="707741" cy="43993"/>
           </a:xfrm>
           <a:prstGeom prst="straightConnector1">
             <a:avLst/>
@@ -21086,7 +21084,7 @@
         </p:nvSpPr>
         <p:spPr>
           <a:xfrm>
-            <a:off x="1543050" y="4066597"/>
+            <a:off x="1356968" y="4377151"/>
             <a:ext cx="57150" cy="63500"/>
           </a:xfrm>
           <a:prstGeom prst="ellipse">
@@ -21132,7 +21130,7 @@
         </p:nvSpPr>
         <p:spPr>
           <a:xfrm>
-            <a:off x="1543050" y="4218997"/>
+            <a:off x="1356968" y="4529551"/>
             <a:ext cx="57150" cy="63500"/>
           </a:xfrm>
           <a:prstGeom prst="ellipse">
@@ -21178,7 +21176,7 @@
         </p:nvSpPr>
         <p:spPr>
           <a:xfrm>
-            <a:off x="1543050" y="4367066"/>
+            <a:off x="1356968" y="4677620"/>
             <a:ext cx="57150" cy="63500"/>
           </a:xfrm>
           <a:prstGeom prst="ellipse">
@@ -21224,7 +21222,7 @@
         </p:nvSpPr>
         <p:spPr>
           <a:xfrm>
-            <a:off x="1219200" y="2362200"/>
+            <a:off x="1014566" y="2619848"/>
             <a:ext cx="684803" cy="369332"/>
           </a:xfrm>
           <a:prstGeom prst="rect">
@@ -21276,6 +21274,553 @@
           </a:p>
         </p:txBody>
       </p:sp>
+      <p:cxnSp>
+        <p:nvCxnSpPr>
+          <p:cNvPr id="36" name="Straight Arrow Connector 35"/>
+          <p:cNvCxnSpPr/>
+          <p:nvPr/>
+        </p:nvCxnSpPr>
+        <p:spPr>
+          <a:xfrm flipH="1" flipV="1">
+            <a:off x="2007173" y="3235565"/>
+            <a:ext cx="759844" cy="388122"/>
+          </a:xfrm>
+          <a:prstGeom prst="straightConnector1">
+            <a:avLst/>
+          </a:prstGeom>
+          <a:ln>
+            <a:solidFill>
+              <a:srgbClr val="2F2B20"/>
+            </a:solidFill>
+            <a:tailEnd type="arrow"/>
+          </a:ln>
+        </p:spPr>
+        <p:style>
+          <a:lnRef idx="2">
+            <a:schemeClr val="accent1"/>
+          </a:lnRef>
+          <a:fillRef idx="0">
+            <a:schemeClr val="accent1"/>
+          </a:fillRef>
+          <a:effectRef idx="1">
+            <a:schemeClr val="accent1"/>
+          </a:effectRef>
+          <a:fontRef idx="minor">
+            <a:schemeClr val="tx1"/>
+          </a:fontRef>
+        </p:style>
+      </p:cxnSp>
+      <p:cxnSp>
+        <p:nvCxnSpPr>
+          <p:cNvPr id="39" name="Straight Arrow Connector 38"/>
+          <p:cNvCxnSpPr/>
+          <p:nvPr/>
+        </p:nvCxnSpPr>
+        <p:spPr>
+          <a:xfrm flipH="1" flipV="1">
+            <a:off x="2007173" y="3235565"/>
+            <a:ext cx="758328" cy="629571"/>
+          </a:xfrm>
+          <a:prstGeom prst="straightConnector1">
+            <a:avLst/>
+          </a:prstGeom>
+          <a:ln>
+            <a:solidFill>
+              <a:srgbClr val="2F2B20"/>
+            </a:solidFill>
+            <a:tailEnd type="arrow"/>
+          </a:ln>
+        </p:spPr>
+        <p:style>
+          <a:lnRef idx="2">
+            <a:schemeClr val="accent1"/>
+          </a:lnRef>
+          <a:fillRef idx="0">
+            <a:schemeClr val="accent1"/>
+          </a:fillRef>
+          <a:effectRef idx="1">
+            <a:schemeClr val="accent1"/>
+          </a:effectRef>
+          <a:fontRef idx="minor">
+            <a:schemeClr val="tx1"/>
+          </a:fontRef>
+        </p:style>
+      </p:cxnSp>
+      <p:cxnSp>
+        <p:nvCxnSpPr>
+          <p:cNvPr id="42" name="Straight Arrow Connector 41"/>
+          <p:cNvCxnSpPr/>
+          <p:nvPr/>
+        </p:nvCxnSpPr>
+        <p:spPr>
+          <a:xfrm flipV="1">
+            <a:off x="2007173" y="2875367"/>
+            <a:ext cx="808851" cy="315535"/>
+          </a:xfrm>
+          <a:prstGeom prst="straightConnector1">
+            <a:avLst/>
+          </a:prstGeom>
+          <a:ln>
+            <a:solidFill>
+              <a:srgbClr val="2F2B20"/>
+            </a:solidFill>
+            <a:tailEnd type="arrow"/>
+          </a:ln>
+        </p:spPr>
+        <p:style>
+          <a:lnRef idx="2">
+            <a:schemeClr val="accent1"/>
+          </a:lnRef>
+          <a:fillRef idx="0">
+            <a:schemeClr val="accent1"/>
+          </a:fillRef>
+          <a:effectRef idx="1">
+            <a:schemeClr val="accent1"/>
+          </a:effectRef>
+          <a:fontRef idx="minor">
+            <a:schemeClr val="tx1"/>
+          </a:fontRef>
+        </p:style>
+      </p:cxnSp>
+      <p:cxnSp>
+        <p:nvCxnSpPr>
+          <p:cNvPr id="44" name="Straight Arrow Connector 43"/>
+          <p:cNvCxnSpPr/>
+          <p:nvPr/>
+        </p:nvCxnSpPr>
+        <p:spPr>
+          <a:xfrm flipV="1">
+            <a:off x="2007173" y="3146909"/>
+            <a:ext cx="798305" cy="43993"/>
+          </a:xfrm>
+          <a:prstGeom prst="straightConnector1">
+            <a:avLst/>
+          </a:prstGeom>
+          <a:ln>
+            <a:solidFill>
+              <a:srgbClr val="2F2B20"/>
+            </a:solidFill>
+            <a:tailEnd type="arrow"/>
+          </a:ln>
+        </p:spPr>
+        <p:style>
+          <a:lnRef idx="2">
+            <a:schemeClr val="accent1"/>
+          </a:lnRef>
+          <a:fillRef idx="0">
+            <a:schemeClr val="accent1"/>
+          </a:fillRef>
+          <a:effectRef idx="1">
+            <a:schemeClr val="accent1"/>
+          </a:effectRef>
+          <a:fontRef idx="minor">
+            <a:schemeClr val="tx1"/>
+          </a:fontRef>
+        </p:style>
+      </p:cxnSp>
+      <p:cxnSp>
+        <p:nvCxnSpPr>
+          <p:cNvPr id="58" name="Straight Arrow Connector 57"/>
+          <p:cNvCxnSpPr/>
+          <p:nvPr/>
+        </p:nvCxnSpPr>
+        <p:spPr>
+          <a:xfrm>
+            <a:off x="2020894" y="3200427"/>
+            <a:ext cx="795130" cy="165891"/>
+          </a:xfrm>
+          <a:prstGeom prst="straightConnector1">
+            <a:avLst/>
+          </a:prstGeom>
+          <a:ln>
+            <a:solidFill>
+              <a:srgbClr val="2F2B20"/>
+            </a:solidFill>
+            <a:tailEnd type="arrow"/>
+          </a:ln>
+        </p:spPr>
+        <p:style>
+          <a:lnRef idx="2">
+            <a:schemeClr val="accent1"/>
+          </a:lnRef>
+          <a:fillRef idx="0">
+            <a:schemeClr val="accent1"/>
+          </a:fillRef>
+          <a:effectRef idx="1">
+            <a:schemeClr val="accent1"/>
+          </a:effectRef>
+          <a:fontRef idx="minor">
+            <a:schemeClr val="tx1"/>
+          </a:fontRef>
+        </p:style>
+      </p:cxnSp>
+      <p:cxnSp>
+        <p:nvCxnSpPr>
+          <p:cNvPr id="67" name="Straight Arrow Connector 66"/>
+          <p:cNvCxnSpPr/>
+          <p:nvPr/>
+        </p:nvCxnSpPr>
+        <p:spPr>
+          <a:xfrm>
+            <a:off x="2020894" y="3235565"/>
+            <a:ext cx="741431" cy="388122"/>
+          </a:xfrm>
+          <a:prstGeom prst="straightConnector1">
+            <a:avLst/>
+          </a:prstGeom>
+          <a:ln>
+            <a:solidFill>
+              <a:srgbClr val="2F2B20"/>
+            </a:solidFill>
+            <a:tailEnd type="arrow"/>
+          </a:ln>
+        </p:spPr>
+        <p:style>
+          <a:lnRef idx="2">
+            <a:schemeClr val="accent1"/>
+          </a:lnRef>
+          <a:fillRef idx="0">
+            <a:schemeClr val="accent1"/>
+          </a:fillRef>
+          <a:effectRef idx="1">
+            <a:schemeClr val="accent1"/>
+          </a:effectRef>
+          <a:fontRef idx="minor">
+            <a:schemeClr val="tx1"/>
+          </a:fontRef>
+        </p:style>
+      </p:cxnSp>
+      <p:cxnSp>
+        <p:nvCxnSpPr>
+          <p:cNvPr id="70" name="Straight Arrow Connector 69"/>
+          <p:cNvCxnSpPr/>
+          <p:nvPr/>
+        </p:nvCxnSpPr>
+        <p:spPr>
+          <a:xfrm>
+            <a:off x="2007173" y="3235565"/>
+            <a:ext cx="764677" cy="626396"/>
+          </a:xfrm>
+          <a:prstGeom prst="straightConnector1">
+            <a:avLst/>
+          </a:prstGeom>
+          <a:ln>
+            <a:solidFill>
+              <a:srgbClr val="2F2B20"/>
+            </a:solidFill>
+            <a:tailEnd type="arrow"/>
+          </a:ln>
+        </p:spPr>
+        <p:style>
+          <a:lnRef idx="2">
+            <a:schemeClr val="accent1"/>
+          </a:lnRef>
+          <a:fillRef idx="0">
+            <a:schemeClr val="accent1"/>
+          </a:fillRef>
+          <a:effectRef idx="1">
+            <a:schemeClr val="accent1"/>
+          </a:effectRef>
+          <a:fontRef idx="minor">
+            <a:schemeClr val="tx1"/>
+          </a:fontRef>
+        </p:style>
+      </p:cxnSp>
+      <p:sp>
+        <p:nvSpPr>
+          <p:cNvPr id="82" name="TextBox 81"/>
+          <p:cNvSpPr txBox="1"/>
+          <p:nvPr/>
+        </p:nvSpPr>
+        <p:spPr>
+          <a:xfrm>
+            <a:off x="1078686" y="3067534"/>
+            <a:ext cx="556563" cy="276999"/>
+          </a:xfrm>
+          <a:prstGeom prst="rect">
+            <a:avLst/>
+          </a:prstGeom>
+          <a:noFill/>
+        </p:spPr>
+        <p:txBody>
+          <a:bodyPr wrap="none" rtlCol="0">
+            <a:spAutoFit/>
+          </a:bodyPr>
+          <a:lstStyle/>
+          <a:p>
+            <a:r>
+              <a:rPr lang="en-US" sz="1200" dirty="0" smtClean="0">
+                <a:latin typeface="Courier"/>
+                <a:cs typeface="Courier"/>
+              </a:rPr>
+              <a:t>fun1</a:t>
+            </a:r>
+            <a:endParaRPr lang="en-US" sz="1200" dirty="0">
+              <a:latin typeface="Courier"/>
+              <a:cs typeface="Courier"/>
+            </a:endParaRPr>
+          </a:p>
+        </p:txBody>
+      </p:sp>
+      <p:sp>
+        <p:nvSpPr>
+          <p:cNvPr id="83" name="TextBox 82"/>
+          <p:cNvSpPr txBox="1"/>
+          <p:nvPr/>
+        </p:nvSpPr>
+        <p:spPr>
+          <a:xfrm>
+            <a:off x="1099503" y="3066940"/>
+            <a:ext cx="554058" cy="276999"/>
+          </a:xfrm>
+          <a:prstGeom prst="rect">
+            <a:avLst/>
+          </a:prstGeom>
+          <a:noFill/>
+        </p:spPr>
+        <p:txBody>
+          <a:bodyPr wrap="none" rtlCol="0">
+            <a:spAutoFit/>
+          </a:bodyPr>
+          <a:lstStyle/>
+          <a:p>
+            <a:r>
+              <a:rPr lang="en-US" sz="1200" dirty="0" smtClean="0">
+                <a:latin typeface="Courier"/>
+                <a:cs typeface="Courier"/>
+              </a:rPr>
+              <a:t>fun3</a:t>
+            </a:r>
+            <a:endParaRPr lang="en-US" sz="1200" dirty="0">
+              <a:latin typeface="Courier"/>
+              <a:cs typeface="Courier"/>
+            </a:endParaRPr>
+          </a:p>
+        </p:txBody>
+      </p:sp>
+      <p:sp>
+        <p:nvSpPr>
+          <p:cNvPr id="84" name="TextBox 83"/>
+          <p:cNvSpPr txBox="1"/>
+          <p:nvPr/>
+        </p:nvSpPr>
+        <p:spPr>
+          <a:xfrm>
+            <a:off x="826755" y="3050001"/>
+            <a:ext cx="1155763" cy="276999"/>
+          </a:xfrm>
+          <a:prstGeom prst="rect">
+            <a:avLst/>
+          </a:prstGeom>
+          <a:noFill/>
+        </p:spPr>
+        <p:txBody>
+          <a:bodyPr wrap="square" rtlCol="0">
+            <a:spAutoFit/>
+          </a:bodyPr>
+          <a:lstStyle/>
+          <a:p>
+            <a:r>
+              <a:rPr lang="en-US" sz="1200" dirty="0" err="1" smtClean="0">
+                <a:latin typeface="Courier"/>
+                <a:cs typeface="Courier"/>
+              </a:rPr>
+              <a:t>setTimeout</a:t>
+            </a:r>
+            <a:endParaRPr lang="en-US" sz="1200" dirty="0">
+              <a:latin typeface="Courier"/>
+              <a:cs typeface="Courier"/>
+            </a:endParaRPr>
+          </a:p>
+        </p:txBody>
+      </p:sp>
+      <p:sp>
+        <p:nvSpPr>
+          <p:cNvPr id="85" name="TextBox 84"/>
+          <p:cNvSpPr txBox="1"/>
+          <p:nvPr/>
+        </p:nvSpPr>
+        <p:spPr>
+          <a:xfrm>
+            <a:off x="751095" y="3050001"/>
+            <a:ext cx="1231423" cy="276999"/>
+          </a:xfrm>
+          <a:prstGeom prst="rect">
+            <a:avLst/>
+          </a:prstGeom>
+          <a:noFill/>
+        </p:spPr>
+        <p:txBody>
+          <a:bodyPr wrap="square" rtlCol="0">
+            <a:spAutoFit/>
+          </a:bodyPr>
+          <a:lstStyle/>
+          <a:p>
+            <a:r>
+              <a:rPr lang="en-US" sz="1200" dirty="0" err="1">
+                <a:latin typeface="Courier"/>
+                <a:cs typeface="Courier"/>
+              </a:rPr>
+              <a:t>c</a:t>
+            </a:r>
+            <a:r>
+              <a:rPr lang="en-US" sz="1200" dirty="0" err="1" smtClean="0">
+                <a:latin typeface="Courier"/>
+                <a:cs typeface="Courier"/>
+              </a:rPr>
+              <a:t>onsole.log</a:t>
+            </a:r>
+            <a:endParaRPr lang="en-US" sz="1200" dirty="0">
+              <a:latin typeface="Courier"/>
+              <a:cs typeface="Courier"/>
+            </a:endParaRPr>
+          </a:p>
+        </p:txBody>
+      </p:sp>
+      <p:sp>
+        <p:nvSpPr>
+          <p:cNvPr id="93" name="TextBox 92"/>
+          <p:cNvSpPr txBox="1"/>
+          <p:nvPr/>
+        </p:nvSpPr>
+        <p:spPr>
+          <a:xfrm>
+            <a:off x="810205" y="3050001"/>
+            <a:ext cx="1155763" cy="276999"/>
+          </a:xfrm>
+          <a:prstGeom prst="rect">
+            <a:avLst/>
+          </a:prstGeom>
+          <a:noFill/>
+        </p:spPr>
+        <p:txBody>
+          <a:bodyPr wrap="square" rtlCol="0">
+            <a:spAutoFit/>
+          </a:bodyPr>
+          <a:lstStyle/>
+          <a:p>
+            <a:r>
+              <a:rPr lang="en-US" sz="1200" dirty="0" err="1" smtClean="0">
+                <a:latin typeface="Courier"/>
+                <a:cs typeface="Courier"/>
+              </a:rPr>
+              <a:t>setTimeout</a:t>
+            </a:r>
+            <a:endParaRPr lang="en-US" sz="1200" dirty="0">
+              <a:latin typeface="Courier"/>
+              <a:cs typeface="Courier"/>
+            </a:endParaRPr>
+          </a:p>
+        </p:txBody>
+      </p:sp>
+      <p:sp>
+        <p:nvSpPr>
+          <p:cNvPr id="94" name="TextBox 93"/>
+          <p:cNvSpPr txBox="1"/>
+          <p:nvPr/>
+        </p:nvSpPr>
+        <p:spPr>
+          <a:xfrm rot="5400000">
+            <a:off x="6728996" y="4756773"/>
+            <a:ext cx="554058" cy="276999"/>
+          </a:xfrm>
+          <a:prstGeom prst="rect">
+            <a:avLst/>
+          </a:prstGeom>
+          <a:noFill/>
+        </p:spPr>
+        <p:txBody>
+          <a:bodyPr wrap="none" rtlCol="0">
+            <a:spAutoFit/>
+          </a:bodyPr>
+          <a:lstStyle/>
+          <a:p>
+            <a:r>
+              <a:rPr lang="en-US" sz="1200" dirty="0" smtClean="0">
+                <a:latin typeface="Courier"/>
+                <a:cs typeface="Courier"/>
+              </a:rPr>
+              <a:t>fun2</a:t>
+            </a:r>
+            <a:endParaRPr lang="en-US" sz="1200" dirty="0">
+              <a:latin typeface="Courier"/>
+              <a:cs typeface="Courier"/>
+            </a:endParaRPr>
+          </a:p>
+        </p:txBody>
+      </p:sp>
+      <p:sp>
+        <p:nvSpPr>
+          <p:cNvPr id="95" name="TextBox 94"/>
+          <p:cNvSpPr txBox="1"/>
+          <p:nvPr/>
+        </p:nvSpPr>
+        <p:spPr>
+          <a:xfrm rot="5400000">
+            <a:off x="6726646" y="4755954"/>
+            <a:ext cx="554058" cy="276999"/>
+          </a:xfrm>
+          <a:prstGeom prst="rect">
+            <a:avLst/>
+          </a:prstGeom>
+          <a:noFill/>
+        </p:spPr>
+        <p:txBody>
+          <a:bodyPr wrap="none" rtlCol="0">
+            <a:spAutoFit/>
+          </a:bodyPr>
+          <a:lstStyle/>
+          <a:p>
+            <a:r>
+              <a:rPr lang="en-US" sz="1200" dirty="0" smtClean="0">
+                <a:latin typeface="Courier"/>
+                <a:cs typeface="Courier"/>
+              </a:rPr>
+              <a:t>fun4</a:t>
+            </a:r>
+            <a:endParaRPr lang="en-US" sz="1200" dirty="0">
+              <a:latin typeface="Courier"/>
+              <a:cs typeface="Courier"/>
+            </a:endParaRPr>
+          </a:p>
+        </p:txBody>
+      </p:sp>
+      <p:sp>
+        <p:nvSpPr>
+          <p:cNvPr id="96" name="TextBox 95"/>
+          <p:cNvSpPr txBox="1"/>
+          <p:nvPr/>
+        </p:nvSpPr>
+        <p:spPr>
+          <a:xfrm rot="5400000">
+            <a:off x="6436895" y="4755954"/>
+            <a:ext cx="554058" cy="276999"/>
+          </a:xfrm>
+          <a:prstGeom prst="rect">
+            <a:avLst/>
+          </a:prstGeom>
+          <a:noFill/>
+        </p:spPr>
+        <p:txBody>
+          <a:bodyPr wrap="none" rtlCol="0">
+            <a:spAutoFit/>
+          </a:bodyPr>
+          <a:lstStyle/>
+          <a:p>
+            <a:r>
+              <a:rPr lang="en-US" sz="1200" dirty="0" smtClean="0">
+                <a:latin typeface="Courier"/>
+                <a:cs typeface="Courier"/>
+              </a:rPr>
+              <a:t>fun2</a:t>
+            </a:r>
+            <a:endParaRPr lang="en-US" sz="1200" dirty="0">
+              <a:latin typeface="Courier"/>
+              <a:cs typeface="Courier"/>
+            </a:endParaRPr>
+          </a:p>
+        </p:txBody>
+      </p:sp>
     </p:spTree>
     <p:extLst>
       <p:ext uri="{BB962C8B-B14F-4D97-AF65-F5344CB8AC3E}">
@@ -21289,9 +21834,1524 @@
   <p:timing>
     <p:tnLst>
       <p:par>
-        <p:cTn xmlns:p14="http://schemas.microsoft.com/office/powerpoint/2010/main" id="1" dur="indefinite" restart="never" nodeType="tmRoot"/>
+        <p:cTn xmlns:p14="http://schemas.microsoft.com/office/powerpoint/2010/main" id="1" dur="indefinite" restart="never" nodeType="tmRoot">
+          <p:childTnLst>
+            <p:seq concurrent="1" nextAc="seek">
+              <p:cTn id="2" dur="indefinite" nodeType="mainSeq">
+                <p:childTnLst>
+                  <p:par>
+                    <p:cTn id="3" fill="hold">
+                      <p:stCondLst>
+                        <p:cond delay="indefinite"/>
+                      </p:stCondLst>
+                      <p:childTnLst>
+                        <p:par>
+                          <p:cTn id="4" fill="hold">
+                            <p:stCondLst>
+                              <p:cond delay="0"/>
+                            </p:stCondLst>
+                            <p:childTnLst>
+                              <p:par>
+                                <p:cTn id="5" presetID="1" presetClass="entr" presetSubtype="0" fill="hold" nodeType="clickEffect">
+                                  <p:stCondLst>
+                                    <p:cond delay="0"/>
+                                  </p:stCondLst>
+                                  <p:childTnLst>
+                                    <p:set>
+                                      <p:cBhvr>
+                                        <p:cTn id="6" dur="1" fill="hold">
+                                          <p:stCondLst>
+                                            <p:cond delay="0"/>
+                                          </p:stCondLst>
+                                        </p:cTn>
+                                        <p:tgtEl>
+                                          <p:spTgt spid="28"/>
+                                        </p:tgtEl>
+                                        <p:attrNameLst>
+                                          <p:attrName>style.visibility</p:attrName>
+                                        </p:attrNameLst>
+                                      </p:cBhvr>
+                                      <p:to>
+                                        <p:strVal val="visible"/>
+                                      </p:to>
+                                    </p:set>
+                                  </p:childTnLst>
+                                </p:cTn>
+                              </p:par>
+                              <p:par>
+                                <p:cTn id="7" presetID="1" presetClass="entr" presetSubtype="0" fill="hold" grpId="0" nodeType="withEffect">
+                                  <p:stCondLst>
+                                    <p:cond delay="0"/>
+                                  </p:stCondLst>
+                                  <p:childTnLst>
+                                    <p:set>
+                                      <p:cBhvr>
+                                        <p:cTn id="8" dur="1" fill="hold">
+                                          <p:stCondLst>
+                                            <p:cond delay="0"/>
+                                          </p:stCondLst>
+                                        </p:cTn>
+                                        <p:tgtEl>
+                                          <p:spTgt spid="82"/>
+                                        </p:tgtEl>
+                                        <p:attrNameLst>
+                                          <p:attrName>style.visibility</p:attrName>
+                                        </p:attrNameLst>
+                                      </p:cBhvr>
+                                      <p:to>
+                                        <p:strVal val="visible"/>
+                                      </p:to>
+                                    </p:set>
+                                  </p:childTnLst>
+                                </p:cTn>
+                              </p:par>
+                            </p:childTnLst>
+                          </p:cTn>
+                        </p:par>
+                      </p:childTnLst>
+                    </p:cTn>
+                  </p:par>
+                  <p:par>
+                    <p:cTn id="9" fill="hold">
+                      <p:stCondLst>
+                        <p:cond delay="indefinite"/>
+                      </p:stCondLst>
+                      <p:childTnLst>
+                        <p:par>
+                          <p:cTn id="10" fill="hold">
+                            <p:stCondLst>
+                              <p:cond delay="0"/>
+                            </p:stCondLst>
+                            <p:childTnLst>
+                              <p:par>
+                                <p:cTn id="11" presetID="1" presetClass="exit" presetSubtype="0" fill="hold" nodeType="clickEffect">
+                                  <p:stCondLst>
+                                    <p:cond delay="0"/>
+                                  </p:stCondLst>
+                                  <p:childTnLst>
+                                    <p:set>
+                                      <p:cBhvr>
+                                        <p:cTn id="12" dur="1" fill="hold">
+                                          <p:stCondLst>
+                                            <p:cond delay="0"/>
+                                          </p:stCondLst>
+                                        </p:cTn>
+                                        <p:tgtEl>
+                                          <p:spTgt spid="28"/>
+                                        </p:tgtEl>
+                                        <p:attrNameLst>
+                                          <p:attrName>style.visibility</p:attrName>
+                                        </p:attrNameLst>
+                                      </p:cBhvr>
+                                      <p:to>
+                                        <p:strVal val="hidden"/>
+                                      </p:to>
+                                    </p:set>
+                                  </p:childTnLst>
+                                </p:cTn>
+                              </p:par>
+                              <p:par>
+                                <p:cTn id="13" presetID="1" presetClass="entr" presetSubtype="0" fill="hold" nodeType="withEffect">
+                                  <p:stCondLst>
+                                    <p:cond delay="0"/>
+                                  </p:stCondLst>
+                                  <p:childTnLst>
+                                    <p:set>
+                                      <p:cBhvr>
+                                        <p:cTn id="14" dur="1" fill="hold">
+                                          <p:stCondLst>
+                                            <p:cond delay="0"/>
+                                          </p:stCondLst>
+                                        </p:cTn>
+                                        <p:tgtEl>
+                                          <p:spTgt spid="42"/>
+                                        </p:tgtEl>
+                                        <p:attrNameLst>
+                                          <p:attrName>style.visibility</p:attrName>
+                                        </p:attrNameLst>
+                                      </p:cBhvr>
+                                      <p:to>
+                                        <p:strVal val="visible"/>
+                                      </p:to>
+                                    </p:set>
+                                  </p:childTnLst>
+                                </p:cTn>
+                              </p:par>
+                            </p:childTnLst>
+                          </p:cTn>
+                        </p:par>
+                      </p:childTnLst>
+                    </p:cTn>
+                  </p:par>
+                  <p:par>
+                    <p:cTn id="15" fill="hold">
+                      <p:stCondLst>
+                        <p:cond delay="indefinite"/>
+                      </p:stCondLst>
+                      <p:childTnLst>
+                        <p:par>
+                          <p:cTn id="16" fill="hold">
+                            <p:stCondLst>
+                              <p:cond delay="0"/>
+                            </p:stCondLst>
+                            <p:childTnLst>
+                              <p:par>
+                                <p:cTn id="17" presetID="1" presetClass="exit" presetSubtype="0" fill="hold" nodeType="clickEffect">
+                                  <p:stCondLst>
+                                    <p:cond delay="0"/>
+                                  </p:stCondLst>
+                                  <p:childTnLst>
+                                    <p:set>
+                                      <p:cBhvr>
+                                        <p:cTn id="18" dur="1" fill="hold">
+                                          <p:stCondLst>
+                                            <p:cond delay="0"/>
+                                          </p:stCondLst>
+                                        </p:cTn>
+                                        <p:tgtEl>
+                                          <p:spTgt spid="42"/>
+                                        </p:tgtEl>
+                                        <p:attrNameLst>
+                                          <p:attrName>style.visibility</p:attrName>
+                                        </p:attrNameLst>
+                                      </p:cBhvr>
+                                      <p:to>
+                                        <p:strVal val="hidden"/>
+                                      </p:to>
+                                    </p:set>
+                                  </p:childTnLst>
+                                </p:cTn>
+                              </p:par>
+                              <p:par>
+                                <p:cTn id="19" presetID="1" presetClass="exit" presetSubtype="0" fill="hold" grpId="1" nodeType="withEffect">
+                                  <p:stCondLst>
+                                    <p:cond delay="0"/>
+                                  </p:stCondLst>
+                                  <p:childTnLst>
+                                    <p:set>
+                                      <p:cBhvr>
+                                        <p:cTn id="20" dur="1" fill="hold">
+                                          <p:stCondLst>
+                                            <p:cond delay="0"/>
+                                          </p:stCondLst>
+                                        </p:cTn>
+                                        <p:tgtEl>
+                                          <p:spTgt spid="82"/>
+                                        </p:tgtEl>
+                                        <p:attrNameLst>
+                                          <p:attrName>style.visibility</p:attrName>
+                                        </p:attrNameLst>
+                                      </p:cBhvr>
+                                      <p:to>
+                                        <p:strVal val="hidden"/>
+                                      </p:to>
+                                    </p:set>
+                                  </p:childTnLst>
+                                </p:cTn>
+                              </p:par>
+                              <p:par>
+                                <p:cTn id="21" presetID="1" presetClass="entr" presetSubtype="0" fill="hold" nodeType="withEffect">
+                                  <p:stCondLst>
+                                    <p:cond delay="0"/>
+                                  </p:stCondLst>
+                                  <p:childTnLst>
+                                    <p:set>
+                                      <p:cBhvr>
+                                        <p:cTn id="22" dur="1" fill="hold">
+                                          <p:stCondLst>
+                                            <p:cond delay="0"/>
+                                          </p:stCondLst>
+                                        </p:cTn>
+                                        <p:tgtEl>
+                                          <p:spTgt spid="48"/>
+                                        </p:tgtEl>
+                                        <p:attrNameLst>
+                                          <p:attrName>style.visibility</p:attrName>
+                                        </p:attrNameLst>
+                                      </p:cBhvr>
+                                      <p:to>
+                                        <p:strVal val="visible"/>
+                                      </p:to>
+                                    </p:set>
+                                  </p:childTnLst>
+                                </p:cTn>
+                              </p:par>
+                              <p:par>
+                                <p:cTn id="23" presetID="1" presetClass="entr" presetSubtype="0" fill="hold" grpId="0" nodeType="withEffect">
+                                  <p:stCondLst>
+                                    <p:cond delay="0"/>
+                                  </p:stCondLst>
+                                  <p:childTnLst>
+                                    <p:set>
+                                      <p:cBhvr>
+                                        <p:cTn id="24" dur="1" fill="hold">
+                                          <p:stCondLst>
+                                            <p:cond delay="0"/>
+                                          </p:stCondLst>
+                                        </p:cTn>
+                                        <p:tgtEl>
+                                          <p:spTgt spid="84"/>
+                                        </p:tgtEl>
+                                        <p:attrNameLst>
+                                          <p:attrName>style.visibility</p:attrName>
+                                        </p:attrNameLst>
+                                      </p:cBhvr>
+                                      <p:to>
+                                        <p:strVal val="visible"/>
+                                      </p:to>
+                                    </p:set>
+                                  </p:childTnLst>
+                                </p:cTn>
+                              </p:par>
+                            </p:childTnLst>
+                          </p:cTn>
+                        </p:par>
+                      </p:childTnLst>
+                    </p:cTn>
+                  </p:par>
+                  <p:par>
+                    <p:cTn id="25" fill="hold">
+                      <p:stCondLst>
+                        <p:cond delay="indefinite"/>
+                      </p:stCondLst>
+                      <p:childTnLst>
+                        <p:par>
+                          <p:cTn id="26" fill="hold">
+                            <p:stCondLst>
+                              <p:cond delay="0"/>
+                            </p:stCondLst>
+                            <p:childTnLst>
+                              <p:par>
+                                <p:cTn id="27" presetID="1" presetClass="exit" presetSubtype="0" fill="hold" nodeType="clickEffect">
+                                  <p:stCondLst>
+                                    <p:cond delay="0"/>
+                                  </p:stCondLst>
+                                  <p:childTnLst>
+                                    <p:set>
+                                      <p:cBhvr>
+                                        <p:cTn id="28" dur="1" fill="hold">
+                                          <p:stCondLst>
+                                            <p:cond delay="0"/>
+                                          </p:stCondLst>
+                                        </p:cTn>
+                                        <p:tgtEl>
+                                          <p:spTgt spid="48"/>
+                                        </p:tgtEl>
+                                        <p:attrNameLst>
+                                          <p:attrName>style.visibility</p:attrName>
+                                        </p:attrNameLst>
+                                      </p:cBhvr>
+                                      <p:to>
+                                        <p:strVal val="hidden"/>
+                                      </p:to>
+                                    </p:set>
+                                  </p:childTnLst>
+                                </p:cTn>
+                              </p:par>
+                              <p:par>
+                                <p:cTn id="29" presetID="1" presetClass="entr" presetSubtype="0" fill="hold" nodeType="withEffect">
+                                  <p:stCondLst>
+                                    <p:cond delay="0"/>
+                                  </p:stCondLst>
+                                  <p:childTnLst>
+                                    <p:set>
+                                      <p:cBhvr>
+                                        <p:cTn id="30" dur="1" fill="hold">
+                                          <p:stCondLst>
+                                            <p:cond delay="0"/>
+                                          </p:stCondLst>
+                                        </p:cTn>
+                                        <p:tgtEl>
+                                          <p:spTgt spid="16"/>
+                                        </p:tgtEl>
+                                        <p:attrNameLst>
+                                          <p:attrName>style.visibility</p:attrName>
+                                        </p:attrNameLst>
+                                      </p:cBhvr>
+                                      <p:to>
+                                        <p:strVal val="visible"/>
+                                      </p:to>
+                                    </p:set>
+                                  </p:childTnLst>
+                                </p:cTn>
+                              </p:par>
+                              <p:par>
+                                <p:cTn id="31" presetID="1" presetClass="entr" presetSubtype="0" fill="hold" nodeType="withEffect">
+                                  <p:stCondLst>
+                                    <p:cond delay="0"/>
+                                  </p:stCondLst>
+                                  <p:childTnLst>
+                                    <p:set>
+                                      <p:cBhvr>
+                                        <p:cTn id="32" dur="1" fill="hold">
+                                          <p:stCondLst>
+                                            <p:cond delay="0"/>
+                                          </p:stCondLst>
+                                        </p:cTn>
+                                        <p:tgtEl>
+                                          <p:spTgt spid="17"/>
+                                        </p:tgtEl>
+                                        <p:attrNameLst>
+                                          <p:attrName>style.visibility</p:attrName>
+                                        </p:attrNameLst>
+                                      </p:cBhvr>
+                                      <p:to>
+                                        <p:strVal val="visible"/>
+                                      </p:to>
+                                    </p:set>
+                                  </p:childTnLst>
+                                </p:cTn>
+                              </p:par>
+                              <p:par>
+                                <p:cTn id="33" presetID="1" presetClass="entr" presetSubtype="0" fill="hold" nodeType="withEffect">
+                                  <p:stCondLst>
+                                    <p:cond delay="0"/>
+                                  </p:stCondLst>
+                                  <p:childTnLst>
+                                    <p:set>
+                                      <p:cBhvr>
+                                        <p:cTn id="34" dur="1" fill="hold">
+                                          <p:stCondLst>
+                                            <p:cond delay="0"/>
+                                          </p:stCondLst>
+                                        </p:cTn>
+                                        <p:tgtEl>
+                                          <p:spTgt spid="18"/>
+                                        </p:tgtEl>
+                                        <p:attrNameLst>
+                                          <p:attrName>style.visibility</p:attrName>
+                                        </p:attrNameLst>
+                                      </p:cBhvr>
+                                      <p:to>
+                                        <p:strVal val="visible"/>
+                                      </p:to>
+                                    </p:set>
+                                  </p:childTnLst>
+                                </p:cTn>
+                              </p:par>
+                              <p:par>
+                                <p:cTn id="35" presetID="1" presetClass="entr" presetSubtype="0" fill="hold" grpId="0" nodeType="withEffect">
+                                  <p:stCondLst>
+                                    <p:cond delay="0"/>
+                                  </p:stCondLst>
+                                  <p:childTnLst>
+                                    <p:set>
+                                      <p:cBhvr>
+                                        <p:cTn id="36" dur="1" fill="hold">
+                                          <p:stCondLst>
+                                            <p:cond delay="0"/>
+                                          </p:stCondLst>
+                                        </p:cTn>
+                                        <p:tgtEl>
+                                          <p:spTgt spid="94"/>
+                                        </p:tgtEl>
+                                        <p:attrNameLst>
+                                          <p:attrName>style.visibility</p:attrName>
+                                        </p:attrNameLst>
+                                      </p:cBhvr>
+                                      <p:to>
+                                        <p:strVal val="visible"/>
+                                      </p:to>
+                                    </p:set>
+                                  </p:childTnLst>
+                                </p:cTn>
+                              </p:par>
+                            </p:childTnLst>
+                          </p:cTn>
+                        </p:par>
+                      </p:childTnLst>
+                    </p:cTn>
+                  </p:par>
+                  <p:par>
+                    <p:cTn id="37" fill="hold">
+                      <p:stCondLst>
+                        <p:cond delay="indefinite"/>
+                      </p:stCondLst>
+                      <p:childTnLst>
+                        <p:par>
+                          <p:cTn id="38" fill="hold">
+                            <p:stCondLst>
+                              <p:cond delay="0"/>
+                            </p:stCondLst>
+                            <p:childTnLst>
+                              <p:par>
+                                <p:cTn id="39" presetID="1" presetClass="exit" presetSubtype="0" fill="hold" nodeType="clickEffect">
+                                  <p:stCondLst>
+                                    <p:cond delay="0"/>
+                                  </p:stCondLst>
+                                  <p:childTnLst>
+                                    <p:set>
+                                      <p:cBhvr>
+                                        <p:cTn id="40" dur="1" fill="hold">
+                                          <p:stCondLst>
+                                            <p:cond delay="0"/>
+                                          </p:stCondLst>
+                                        </p:cTn>
+                                        <p:tgtEl>
+                                          <p:spTgt spid="16"/>
+                                        </p:tgtEl>
+                                        <p:attrNameLst>
+                                          <p:attrName>style.visibility</p:attrName>
+                                        </p:attrNameLst>
+                                      </p:cBhvr>
+                                      <p:to>
+                                        <p:strVal val="hidden"/>
+                                      </p:to>
+                                    </p:set>
+                                  </p:childTnLst>
+                                </p:cTn>
+                              </p:par>
+                              <p:par>
+                                <p:cTn id="41" presetID="1" presetClass="exit" presetSubtype="0" fill="hold" nodeType="withEffect">
+                                  <p:stCondLst>
+                                    <p:cond delay="0"/>
+                                  </p:stCondLst>
+                                  <p:childTnLst>
+                                    <p:set>
+                                      <p:cBhvr>
+                                        <p:cTn id="42" dur="1" fill="hold">
+                                          <p:stCondLst>
+                                            <p:cond delay="0"/>
+                                          </p:stCondLst>
+                                        </p:cTn>
+                                        <p:tgtEl>
+                                          <p:spTgt spid="17"/>
+                                        </p:tgtEl>
+                                        <p:attrNameLst>
+                                          <p:attrName>style.visibility</p:attrName>
+                                        </p:attrNameLst>
+                                      </p:cBhvr>
+                                      <p:to>
+                                        <p:strVal val="hidden"/>
+                                      </p:to>
+                                    </p:set>
+                                  </p:childTnLst>
+                                </p:cTn>
+                              </p:par>
+                              <p:par>
+                                <p:cTn id="43" presetID="1" presetClass="exit" presetSubtype="0" fill="hold" nodeType="withEffect">
+                                  <p:stCondLst>
+                                    <p:cond delay="0"/>
+                                  </p:stCondLst>
+                                  <p:childTnLst>
+                                    <p:set>
+                                      <p:cBhvr>
+                                        <p:cTn id="44" dur="1" fill="hold">
+                                          <p:stCondLst>
+                                            <p:cond delay="0"/>
+                                          </p:stCondLst>
+                                        </p:cTn>
+                                        <p:tgtEl>
+                                          <p:spTgt spid="18"/>
+                                        </p:tgtEl>
+                                        <p:attrNameLst>
+                                          <p:attrName>style.visibility</p:attrName>
+                                        </p:attrNameLst>
+                                      </p:cBhvr>
+                                      <p:to>
+                                        <p:strVal val="hidden"/>
+                                      </p:to>
+                                    </p:set>
+                                  </p:childTnLst>
+                                </p:cTn>
+                              </p:par>
+                              <p:par>
+                                <p:cTn id="45" presetID="1" presetClass="entr" presetSubtype="0" fill="hold" nodeType="withEffect">
+                                  <p:stCondLst>
+                                    <p:cond delay="0"/>
+                                  </p:stCondLst>
+                                  <p:childTnLst>
+                                    <p:set>
+                                      <p:cBhvr>
+                                        <p:cTn id="46" dur="1" fill="hold">
+                                          <p:stCondLst>
+                                            <p:cond delay="0"/>
+                                          </p:stCondLst>
+                                        </p:cTn>
+                                        <p:tgtEl>
+                                          <p:spTgt spid="44"/>
+                                        </p:tgtEl>
+                                        <p:attrNameLst>
+                                          <p:attrName>style.visibility</p:attrName>
+                                        </p:attrNameLst>
+                                      </p:cBhvr>
+                                      <p:to>
+                                        <p:strVal val="visible"/>
+                                      </p:to>
+                                    </p:set>
+                                  </p:childTnLst>
+                                </p:cTn>
+                              </p:par>
+                            </p:childTnLst>
+                          </p:cTn>
+                        </p:par>
+                      </p:childTnLst>
+                    </p:cTn>
+                  </p:par>
+                  <p:par>
+                    <p:cTn id="47" fill="hold">
+                      <p:stCondLst>
+                        <p:cond delay="indefinite"/>
+                      </p:stCondLst>
+                      <p:childTnLst>
+                        <p:par>
+                          <p:cTn id="48" fill="hold">
+                            <p:stCondLst>
+                              <p:cond delay="0"/>
+                            </p:stCondLst>
+                            <p:childTnLst>
+                              <p:par>
+                                <p:cTn id="49" presetID="1" presetClass="exit" presetSubtype="0" fill="hold" nodeType="clickEffect">
+                                  <p:stCondLst>
+                                    <p:cond delay="0"/>
+                                  </p:stCondLst>
+                                  <p:childTnLst>
+                                    <p:set>
+                                      <p:cBhvr>
+                                        <p:cTn id="50" dur="1" fill="hold">
+                                          <p:stCondLst>
+                                            <p:cond delay="0"/>
+                                          </p:stCondLst>
+                                        </p:cTn>
+                                        <p:tgtEl>
+                                          <p:spTgt spid="44"/>
+                                        </p:tgtEl>
+                                        <p:attrNameLst>
+                                          <p:attrName>style.visibility</p:attrName>
+                                        </p:attrNameLst>
+                                      </p:cBhvr>
+                                      <p:to>
+                                        <p:strVal val="hidden"/>
+                                      </p:to>
+                                    </p:set>
+                                  </p:childTnLst>
+                                </p:cTn>
+                              </p:par>
+                              <p:par>
+                                <p:cTn id="51" presetID="1" presetClass="exit" presetSubtype="0" fill="hold" grpId="1" nodeType="withEffect">
+                                  <p:stCondLst>
+                                    <p:cond delay="0"/>
+                                  </p:stCondLst>
+                                  <p:childTnLst>
+                                    <p:set>
+                                      <p:cBhvr>
+                                        <p:cTn id="52" dur="1" fill="hold">
+                                          <p:stCondLst>
+                                            <p:cond delay="0"/>
+                                          </p:stCondLst>
+                                        </p:cTn>
+                                        <p:tgtEl>
+                                          <p:spTgt spid="84"/>
+                                        </p:tgtEl>
+                                        <p:attrNameLst>
+                                          <p:attrName>style.visibility</p:attrName>
+                                        </p:attrNameLst>
+                                      </p:cBhvr>
+                                      <p:to>
+                                        <p:strVal val="hidden"/>
+                                      </p:to>
+                                    </p:set>
+                                  </p:childTnLst>
+                                </p:cTn>
+                              </p:par>
+                              <p:par>
+                                <p:cTn id="53" presetID="1" presetClass="entr" presetSubtype="0" fill="hold" nodeType="withEffect">
+                                  <p:stCondLst>
+                                    <p:cond delay="0"/>
+                                  </p:stCondLst>
+                                  <p:childTnLst>
+                                    <p:set>
+                                      <p:cBhvr>
+                                        <p:cTn id="54" dur="1" fill="hold">
+                                          <p:stCondLst>
+                                            <p:cond delay="0"/>
+                                          </p:stCondLst>
+                                        </p:cTn>
+                                        <p:tgtEl>
+                                          <p:spTgt spid="38"/>
+                                        </p:tgtEl>
+                                        <p:attrNameLst>
+                                          <p:attrName>style.visibility</p:attrName>
+                                        </p:attrNameLst>
+                                      </p:cBhvr>
+                                      <p:to>
+                                        <p:strVal val="visible"/>
+                                      </p:to>
+                                    </p:set>
+                                  </p:childTnLst>
+                                </p:cTn>
+                              </p:par>
+                              <p:par>
+                                <p:cTn id="55" presetID="1" presetClass="entr" presetSubtype="0" fill="hold" grpId="0" nodeType="withEffect">
+                                  <p:stCondLst>
+                                    <p:cond delay="0"/>
+                                  </p:stCondLst>
+                                  <p:childTnLst>
+                                    <p:set>
+                                      <p:cBhvr>
+                                        <p:cTn id="56" dur="1" fill="hold">
+                                          <p:stCondLst>
+                                            <p:cond delay="0"/>
+                                          </p:stCondLst>
+                                        </p:cTn>
+                                        <p:tgtEl>
+                                          <p:spTgt spid="83"/>
+                                        </p:tgtEl>
+                                        <p:attrNameLst>
+                                          <p:attrName>style.visibility</p:attrName>
+                                        </p:attrNameLst>
+                                      </p:cBhvr>
+                                      <p:to>
+                                        <p:strVal val="visible"/>
+                                      </p:to>
+                                    </p:set>
+                                  </p:childTnLst>
+                                </p:cTn>
+                              </p:par>
+                            </p:childTnLst>
+                          </p:cTn>
+                        </p:par>
+                      </p:childTnLst>
+                    </p:cTn>
+                  </p:par>
+                  <p:par>
+                    <p:cTn id="57" fill="hold">
+                      <p:stCondLst>
+                        <p:cond delay="indefinite"/>
+                      </p:stCondLst>
+                      <p:childTnLst>
+                        <p:par>
+                          <p:cTn id="58" fill="hold">
+                            <p:stCondLst>
+                              <p:cond delay="0"/>
+                            </p:stCondLst>
+                            <p:childTnLst>
+                              <p:par>
+                                <p:cTn id="59" presetID="1" presetClass="exit" presetSubtype="0" fill="hold" nodeType="clickEffect">
+                                  <p:stCondLst>
+                                    <p:cond delay="0"/>
+                                  </p:stCondLst>
+                                  <p:childTnLst>
+                                    <p:set>
+                                      <p:cBhvr>
+                                        <p:cTn id="60" dur="1" fill="hold">
+                                          <p:stCondLst>
+                                            <p:cond delay="0"/>
+                                          </p:stCondLst>
+                                        </p:cTn>
+                                        <p:tgtEl>
+                                          <p:spTgt spid="38"/>
+                                        </p:tgtEl>
+                                        <p:attrNameLst>
+                                          <p:attrName>style.visibility</p:attrName>
+                                        </p:attrNameLst>
+                                      </p:cBhvr>
+                                      <p:to>
+                                        <p:strVal val="hidden"/>
+                                      </p:to>
+                                    </p:set>
+                                  </p:childTnLst>
+                                </p:cTn>
+                              </p:par>
+                              <p:par>
+                                <p:cTn id="61" presetID="1" presetClass="entr" presetSubtype="0" fill="hold" nodeType="withEffect">
+                                  <p:stCondLst>
+                                    <p:cond delay="0"/>
+                                  </p:stCondLst>
+                                  <p:childTnLst>
+                                    <p:set>
+                                      <p:cBhvr>
+                                        <p:cTn id="62" dur="1" fill="hold">
+                                          <p:stCondLst>
+                                            <p:cond delay="0"/>
+                                          </p:stCondLst>
+                                        </p:cTn>
+                                        <p:tgtEl>
+                                          <p:spTgt spid="58"/>
+                                        </p:tgtEl>
+                                        <p:attrNameLst>
+                                          <p:attrName>style.visibility</p:attrName>
+                                        </p:attrNameLst>
+                                      </p:cBhvr>
+                                      <p:to>
+                                        <p:strVal val="visible"/>
+                                      </p:to>
+                                    </p:set>
+                                  </p:childTnLst>
+                                </p:cTn>
+                              </p:par>
+                            </p:childTnLst>
+                          </p:cTn>
+                        </p:par>
+                      </p:childTnLst>
+                    </p:cTn>
+                  </p:par>
+                  <p:par>
+                    <p:cTn id="63" fill="hold">
+                      <p:stCondLst>
+                        <p:cond delay="indefinite"/>
+                      </p:stCondLst>
+                      <p:childTnLst>
+                        <p:par>
+                          <p:cTn id="64" fill="hold">
+                            <p:stCondLst>
+                              <p:cond delay="0"/>
+                            </p:stCondLst>
+                            <p:childTnLst>
+                              <p:par>
+                                <p:cTn id="65" presetID="1" presetClass="exit" presetSubtype="0" fill="hold" nodeType="clickEffect">
+                                  <p:stCondLst>
+                                    <p:cond delay="0"/>
+                                  </p:stCondLst>
+                                  <p:childTnLst>
+                                    <p:set>
+                                      <p:cBhvr>
+                                        <p:cTn id="66" dur="1" fill="hold">
+                                          <p:stCondLst>
+                                            <p:cond delay="0"/>
+                                          </p:stCondLst>
+                                        </p:cTn>
+                                        <p:tgtEl>
+                                          <p:spTgt spid="58"/>
+                                        </p:tgtEl>
+                                        <p:attrNameLst>
+                                          <p:attrName>style.visibility</p:attrName>
+                                        </p:attrNameLst>
+                                      </p:cBhvr>
+                                      <p:to>
+                                        <p:strVal val="hidden"/>
+                                      </p:to>
+                                    </p:set>
+                                  </p:childTnLst>
+                                </p:cTn>
+                              </p:par>
+                              <p:par>
+                                <p:cTn id="67" presetID="1" presetClass="entr" presetSubtype="0" fill="hold" nodeType="withEffect">
+                                  <p:stCondLst>
+                                    <p:cond delay="0"/>
+                                  </p:stCondLst>
+                                  <p:childTnLst>
+                                    <p:set>
+                                      <p:cBhvr>
+                                        <p:cTn id="68" dur="1" fill="hold">
+                                          <p:stCondLst>
+                                            <p:cond delay="0"/>
+                                          </p:stCondLst>
+                                        </p:cTn>
+                                        <p:tgtEl>
+                                          <p:spTgt spid="36"/>
+                                        </p:tgtEl>
+                                        <p:attrNameLst>
+                                          <p:attrName>style.visibility</p:attrName>
+                                        </p:attrNameLst>
+                                      </p:cBhvr>
+                                      <p:to>
+                                        <p:strVal val="visible"/>
+                                      </p:to>
+                                    </p:set>
+                                  </p:childTnLst>
+                                </p:cTn>
+                              </p:par>
+                              <p:par>
+                                <p:cTn id="69" presetID="1" presetClass="exit" presetSubtype="0" fill="hold" grpId="1" nodeType="withEffect">
+                                  <p:stCondLst>
+                                    <p:cond delay="0"/>
+                                  </p:stCondLst>
+                                  <p:childTnLst>
+                                    <p:set>
+                                      <p:cBhvr>
+                                        <p:cTn id="70" dur="1" fill="hold">
+                                          <p:stCondLst>
+                                            <p:cond delay="0"/>
+                                          </p:stCondLst>
+                                        </p:cTn>
+                                        <p:tgtEl>
+                                          <p:spTgt spid="83"/>
+                                        </p:tgtEl>
+                                        <p:attrNameLst>
+                                          <p:attrName>style.visibility</p:attrName>
+                                        </p:attrNameLst>
+                                      </p:cBhvr>
+                                      <p:to>
+                                        <p:strVal val="hidden"/>
+                                      </p:to>
+                                    </p:set>
+                                  </p:childTnLst>
+                                </p:cTn>
+                              </p:par>
+                              <p:par>
+                                <p:cTn id="71" presetID="1" presetClass="entr" presetSubtype="0" fill="hold" grpId="0" nodeType="withEffect">
+                                  <p:stCondLst>
+                                    <p:cond delay="0"/>
+                                  </p:stCondLst>
+                                  <p:childTnLst>
+                                    <p:set>
+                                      <p:cBhvr>
+                                        <p:cTn id="72" dur="1" fill="hold">
+                                          <p:stCondLst>
+                                            <p:cond delay="0"/>
+                                          </p:stCondLst>
+                                        </p:cTn>
+                                        <p:tgtEl>
+                                          <p:spTgt spid="93"/>
+                                        </p:tgtEl>
+                                        <p:attrNameLst>
+                                          <p:attrName>style.visibility</p:attrName>
+                                        </p:attrNameLst>
+                                      </p:cBhvr>
+                                      <p:to>
+                                        <p:strVal val="visible"/>
+                                      </p:to>
+                                    </p:set>
+                                  </p:childTnLst>
+                                </p:cTn>
+                              </p:par>
+                            </p:childTnLst>
+                          </p:cTn>
+                        </p:par>
+                      </p:childTnLst>
+                    </p:cTn>
+                  </p:par>
+                  <p:par>
+                    <p:cTn id="73" fill="hold">
+                      <p:stCondLst>
+                        <p:cond delay="indefinite"/>
+                      </p:stCondLst>
+                      <p:childTnLst>
+                        <p:par>
+                          <p:cTn id="74" fill="hold">
+                            <p:stCondLst>
+                              <p:cond delay="0"/>
+                            </p:stCondLst>
+                            <p:childTnLst>
+                              <p:par>
+                                <p:cTn id="75" presetID="1" presetClass="exit" presetSubtype="0" fill="hold" nodeType="clickEffect">
+                                  <p:stCondLst>
+                                    <p:cond delay="0"/>
+                                  </p:stCondLst>
+                                  <p:childTnLst>
+                                    <p:set>
+                                      <p:cBhvr>
+                                        <p:cTn id="76" dur="1" fill="hold">
+                                          <p:stCondLst>
+                                            <p:cond delay="0"/>
+                                          </p:stCondLst>
+                                        </p:cTn>
+                                        <p:tgtEl>
+                                          <p:spTgt spid="36"/>
+                                        </p:tgtEl>
+                                        <p:attrNameLst>
+                                          <p:attrName>style.visibility</p:attrName>
+                                        </p:attrNameLst>
+                                      </p:cBhvr>
+                                      <p:to>
+                                        <p:strVal val="hidden"/>
+                                      </p:to>
+                                    </p:set>
+                                  </p:childTnLst>
+                                </p:cTn>
+                              </p:par>
+                              <p:par>
+                                <p:cTn id="77" presetID="1" presetClass="entr" presetSubtype="0" fill="hold" nodeType="withEffect">
+                                  <p:stCondLst>
+                                    <p:cond delay="0"/>
+                                  </p:stCondLst>
+                                  <p:childTnLst>
+                                    <p:set>
+                                      <p:cBhvr>
+                                        <p:cTn id="78" dur="1" fill="hold">
+                                          <p:stCondLst>
+                                            <p:cond delay="0"/>
+                                          </p:stCondLst>
+                                        </p:cTn>
+                                        <p:tgtEl>
+                                          <p:spTgt spid="13"/>
+                                        </p:tgtEl>
+                                        <p:attrNameLst>
+                                          <p:attrName>style.visibility</p:attrName>
+                                        </p:attrNameLst>
+                                      </p:cBhvr>
+                                      <p:to>
+                                        <p:strVal val="visible"/>
+                                      </p:to>
+                                    </p:set>
+                                  </p:childTnLst>
+                                </p:cTn>
+                              </p:par>
+                              <p:par>
+                                <p:cTn id="79" presetID="1" presetClass="entr" presetSubtype="0" fill="hold" nodeType="withEffect">
+                                  <p:stCondLst>
+                                    <p:cond delay="0"/>
+                                  </p:stCondLst>
+                                  <p:childTnLst>
+                                    <p:set>
+                                      <p:cBhvr>
+                                        <p:cTn id="80" dur="1" fill="hold">
+                                          <p:stCondLst>
+                                            <p:cond delay="0"/>
+                                          </p:stCondLst>
+                                        </p:cTn>
+                                        <p:tgtEl>
+                                          <p:spTgt spid="14"/>
+                                        </p:tgtEl>
+                                        <p:attrNameLst>
+                                          <p:attrName>style.visibility</p:attrName>
+                                        </p:attrNameLst>
+                                      </p:cBhvr>
+                                      <p:to>
+                                        <p:strVal val="visible"/>
+                                      </p:to>
+                                    </p:set>
+                                  </p:childTnLst>
+                                </p:cTn>
+                              </p:par>
+                              <p:par>
+                                <p:cTn id="81" presetID="1" presetClass="entr" presetSubtype="0" fill="hold" nodeType="withEffect">
+                                  <p:stCondLst>
+                                    <p:cond delay="0"/>
+                                  </p:stCondLst>
+                                  <p:childTnLst>
+                                    <p:set>
+                                      <p:cBhvr>
+                                        <p:cTn id="82" dur="1" fill="hold">
+                                          <p:stCondLst>
+                                            <p:cond delay="0"/>
+                                          </p:stCondLst>
+                                        </p:cTn>
+                                        <p:tgtEl>
+                                          <p:spTgt spid="15"/>
+                                        </p:tgtEl>
+                                        <p:attrNameLst>
+                                          <p:attrName>style.visibility</p:attrName>
+                                        </p:attrNameLst>
+                                      </p:cBhvr>
+                                      <p:to>
+                                        <p:strVal val="visible"/>
+                                      </p:to>
+                                    </p:set>
+                                  </p:childTnLst>
+                                </p:cTn>
+                              </p:par>
+                              <p:par>
+                                <p:cTn id="83" presetID="1" presetClass="exit" presetSubtype="0" fill="hold" grpId="1" nodeType="withEffect">
+                                  <p:stCondLst>
+                                    <p:cond delay="0"/>
+                                  </p:stCondLst>
+                                  <p:childTnLst>
+                                    <p:set>
+                                      <p:cBhvr>
+                                        <p:cTn id="84" dur="1" fill="hold">
+                                          <p:stCondLst>
+                                            <p:cond delay="0"/>
+                                          </p:stCondLst>
+                                        </p:cTn>
+                                        <p:tgtEl>
+                                          <p:spTgt spid="94"/>
+                                        </p:tgtEl>
+                                        <p:attrNameLst>
+                                          <p:attrName>style.visibility</p:attrName>
+                                        </p:attrNameLst>
+                                      </p:cBhvr>
+                                      <p:to>
+                                        <p:strVal val="hidden"/>
+                                      </p:to>
+                                    </p:set>
+                                  </p:childTnLst>
+                                </p:cTn>
+                              </p:par>
+                              <p:par>
+                                <p:cTn id="85" presetID="1" presetClass="entr" presetSubtype="0" fill="hold" grpId="0" nodeType="withEffect">
+                                  <p:stCondLst>
+                                    <p:cond delay="0"/>
+                                  </p:stCondLst>
+                                  <p:childTnLst>
+                                    <p:set>
+                                      <p:cBhvr>
+                                        <p:cTn id="86" dur="1" fill="hold">
+                                          <p:stCondLst>
+                                            <p:cond delay="0"/>
+                                          </p:stCondLst>
+                                        </p:cTn>
+                                        <p:tgtEl>
+                                          <p:spTgt spid="95"/>
+                                        </p:tgtEl>
+                                        <p:attrNameLst>
+                                          <p:attrName>style.visibility</p:attrName>
+                                        </p:attrNameLst>
+                                      </p:cBhvr>
+                                      <p:to>
+                                        <p:strVal val="visible"/>
+                                      </p:to>
+                                    </p:set>
+                                  </p:childTnLst>
+                                </p:cTn>
+                              </p:par>
+                              <p:par>
+                                <p:cTn id="87" presetID="1" presetClass="entr" presetSubtype="0" fill="hold" grpId="0" nodeType="withEffect">
+                                  <p:stCondLst>
+                                    <p:cond delay="0"/>
+                                  </p:stCondLst>
+                                  <p:childTnLst>
+                                    <p:set>
+                                      <p:cBhvr>
+                                        <p:cTn id="88" dur="1" fill="hold">
+                                          <p:stCondLst>
+                                            <p:cond delay="0"/>
+                                          </p:stCondLst>
+                                        </p:cTn>
+                                        <p:tgtEl>
+                                          <p:spTgt spid="96"/>
+                                        </p:tgtEl>
+                                        <p:attrNameLst>
+                                          <p:attrName>style.visibility</p:attrName>
+                                        </p:attrNameLst>
+                                      </p:cBhvr>
+                                      <p:to>
+                                        <p:strVal val="visible"/>
+                                      </p:to>
+                                    </p:set>
+                                  </p:childTnLst>
+                                </p:cTn>
+                              </p:par>
+                            </p:childTnLst>
+                          </p:cTn>
+                        </p:par>
+                      </p:childTnLst>
+                    </p:cTn>
+                  </p:par>
+                  <p:par>
+                    <p:cTn id="89" fill="hold">
+                      <p:stCondLst>
+                        <p:cond delay="indefinite"/>
+                      </p:stCondLst>
+                      <p:childTnLst>
+                        <p:par>
+                          <p:cTn id="90" fill="hold">
+                            <p:stCondLst>
+                              <p:cond delay="0"/>
+                            </p:stCondLst>
+                            <p:childTnLst>
+                              <p:par>
+                                <p:cTn id="91" presetID="1" presetClass="exit" presetSubtype="0" fill="hold" nodeType="clickEffect">
+                                  <p:stCondLst>
+                                    <p:cond delay="0"/>
+                                  </p:stCondLst>
+                                  <p:childTnLst>
+                                    <p:set>
+                                      <p:cBhvr>
+                                        <p:cTn id="92" dur="1" fill="hold">
+                                          <p:stCondLst>
+                                            <p:cond delay="0"/>
+                                          </p:stCondLst>
+                                        </p:cTn>
+                                        <p:tgtEl>
+                                          <p:spTgt spid="15"/>
+                                        </p:tgtEl>
+                                        <p:attrNameLst>
+                                          <p:attrName>style.visibility</p:attrName>
+                                        </p:attrNameLst>
+                                      </p:cBhvr>
+                                      <p:to>
+                                        <p:strVal val="hidden"/>
+                                      </p:to>
+                                    </p:set>
+                                  </p:childTnLst>
+                                </p:cTn>
+                              </p:par>
+                              <p:par>
+                                <p:cTn id="93" presetID="1" presetClass="exit" presetSubtype="0" fill="hold" nodeType="withEffect">
+                                  <p:stCondLst>
+                                    <p:cond delay="0"/>
+                                  </p:stCondLst>
+                                  <p:childTnLst>
+                                    <p:set>
+                                      <p:cBhvr>
+                                        <p:cTn id="94" dur="1" fill="hold">
+                                          <p:stCondLst>
+                                            <p:cond delay="0"/>
+                                          </p:stCondLst>
+                                        </p:cTn>
+                                        <p:tgtEl>
+                                          <p:spTgt spid="14"/>
+                                        </p:tgtEl>
+                                        <p:attrNameLst>
+                                          <p:attrName>style.visibility</p:attrName>
+                                        </p:attrNameLst>
+                                      </p:cBhvr>
+                                      <p:to>
+                                        <p:strVal val="hidden"/>
+                                      </p:to>
+                                    </p:set>
+                                  </p:childTnLst>
+                                </p:cTn>
+                              </p:par>
+                              <p:par>
+                                <p:cTn id="95" presetID="1" presetClass="exit" presetSubtype="0" fill="hold" nodeType="withEffect">
+                                  <p:stCondLst>
+                                    <p:cond delay="0"/>
+                                  </p:stCondLst>
+                                  <p:childTnLst>
+                                    <p:set>
+                                      <p:cBhvr>
+                                        <p:cTn id="96" dur="1" fill="hold">
+                                          <p:stCondLst>
+                                            <p:cond delay="0"/>
+                                          </p:stCondLst>
+                                        </p:cTn>
+                                        <p:tgtEl>
+                                          <p:spTgt spid="13"/>
+                                        </p:tgtEl>
+                                        <p:attrNameLst>
+                                          <p:attrName>style.visibility</p:attrName>
+                                        </p:attrNameLst>
+                                      </p:cBhvr>
+                                      <p:to>
+                                        <p:strVal val="hidden"/>
+                                      </p:to>
+                                    </p:set>
+                                  </p:childTnLst>
+                                </p:cTn>
+                              </p:par>
+                              <p:par>
+                                <p:cTn id="97" presetID="1" presetClass="entr" presetSubtype="0" fill="hold" nodeType="withEffect">
+                                  <p:stCondLst>
+                                    <p:cond delay="0"/>
+                                  </p:stCondLst>
+                                  <p:childTnLst>
+                                    <p:set>
+                                      <p:cBhvr>
+                                        <p:cTn id="98" dur="1" fill="hold">
+                                          <p:stCondLst>
+                                            <p:cond delay="0"/>
+                                          </p:stCondLst>
+                                        </p:cTn>
+                                        <p:tgtEl>
+                                          <p:spTgt spid="67"/>
+                                        </p:tgtEl>
+                                        <p:attrNameLst>
+                                          <p:attrName>style.visibility</p:attrName>
+                                        </p:attrNameLst>
+                                      </p:cBhvr>
+                                      <p:to>
+                                        <p:strVal val="visible"/>
+                                      </p:to>
+                                    </p:set>
+                                  </p:childTnLst>
+                                </p:cTn>
+                              </p:par>
+                            </p:childTnLst>
+                          </p:cTn>
+                        </p:par>
+                      </p:childTnLst>
+                    </p:cTn>
+                  </p:par>
+                  <p:par>
+                    <p:cTn id="99" fill="hold">
+                      <p:stCondLst>
+                        <p:cond delay="indefinite"/>
+                      </p:stCondLst>
+                      <p:childTnLst>
+                        <p:par>
+                          <p:cTn id="100" fill="hold">
+                            <p:stCondLst>
+                              <p:cond delay="0"/>
+                            </p:stCondLst>
+                            <p:childTnLst>
+                              <p:par>
+                                <p:cTn id="101" presetID="1" presetClass="exit" presetSubtype="0" fill="hold" nodeType="clickEffect">
+                                  <p:stCondLst>
+                                    <p:cond delay="0"/>
+                                  </p:stCondLst>
+                                  <p:childTnLst>
+                                    <p:set>
+                                      <p:cBhvr>
+                                        <p:cTn id="102" dur="1" fill="hold">
+                                          <p:stCondLst>
+                                            <p:cond delay="0"/>
+                                          </p:stCondLst>
+                                        </p:cTn>
+                                        <p:tgtEl>
+                                          <p:spTgt spid="67"/>
+                                        </p:tgtEl>
+                                        <p:attrNameLst>
+                                          <p:attrName>style.visibility</p:attrName>
+                                        </p:attrNameLst>
+                                      </p:cBhvr>
+                                      <p:to>
+                                        <p:strVal val="hidden"/>
+                                      </p:to>
+                                    </p:set>
+                                  </p:childTnLst>
+                                </p:cTn>
+                              </p:par>
+                              <p:par>
+                                <p:cTn id="103" presetID="1" presetClass="exit" presetSubtype="0" fill="hold" grpId="1" nodeType="withEffect">
+                                  <p:stCondLst>
+                                    <p:cond delay="0"/>
+                                  </p:stCondLst>
+                                  <p:childTnLst>
+                                    <p:set>
+                                      <p:cBhvr>
+                                        <p:cTn id="104" dur="1" fill="hold">
+                                          <p:stCondLst>
+                                            <p:cond delay="0"/>
+                                          </p:stCondLst>
+                                        </p:cTn>
+                                        <p:tgtEl>
+                                          <p:spTgt spid="93"/>
+                                        </p:tgtEl>
+                                        <p:attrNameLst>
+                                          <p:attrName>style.visibility</p:attrName>
+                                        </p:attrNameLst>
+                                      </p:cBhvr>
+                                      <p:to>
+                                        <p:strVal val="hidden"/>
+                                      </p:to>
+                                    </p:set>
+                                  </p:childTnLst>
+                                </p:cTn>
+                              </p:par>
+                              <p:par>
+                                <p:cTn id="105" presetID="1" presetClass="entr" presetSubtype="0" fill="hold" nodeType="withEffect">
+                                  <p:stCondLst>
+                                    <p:cond delay="0"/>
+                                  </p:stCondLst>
+                                  <p:childTnLst>
+                                    <p:set>
+                                      <p:cBhvr>
+                                        <p:cTn id="106" dur="1" fill="hold">
+                                          <p:stCondLst>
+                                            <p:cond delay="0"/>
+                                          </p:stCondLst>
+                                        </p:cTn>
+                                        <p:tgtEl>
+                                          <p:spTgt spid="39"/>
+                                        </p:tgtEl>
+                                        <p:attrNameLst>
+                                          <p:attrName>style.visibility</p:attrName>
+                                        </p:attrNameLst>
+                                      </p:cBhvr>
+                                      <p:to>
+                                        <p:strVal val="visible"/>
+                                      </p:to>
+                                    </p:set>
+                                  </p:childTnLst>
+                                </p:cTn>
+                              </p:par>
+                              <p:par>
+                                <p:cTn id="107" presetID="1" presetClass="entr" presetSubtype="0" fill="hold" grpId="0" nodeType="withEffect">
+                                  <p:stCondLst>
+                                    <p:cond delay="0"/>
+                                  </p:stCondLst>
+                                  <p:childTnLst>
+                                    <p:set>
+                                      <p:cBhvr>
+                                        <p:cTn id="108" dur="1" fill="hold">
+                                          <p:stCondLst>
+                                            <p:cond delay="0"/>
+                                          </p:stCondLst>
+                                        </p:cTn>
+                                        <p:tgtEl>
+                                          <p:spTgt spid="85"/>
+                                        </p:tgtEl>
+                                        <p:attrNameLst>
+                                          <p:attrName>style.visibility</p:attrName>
+                                        </p:attrNameLst>
+                                      </p:cBhvr>
+                                      <p:to>
+                                        <p:strVal val="visible"/>
+                                      </p:to>
+                                    </p:set>
+                                  </p:childTnLst>
+                                </p:cTn>
+                              </p:par>
+                            </p:childTnLst>
+                          </p:cTn>
+                        </p:par>
+                      </p:childTnLst>
+                    </p:cTn>
+                  </p:par>
+                  <p:par>
+                    <p:cTn id="109" fill="hold">
+                      <p:stCondLst>
+                        <p:cond delay="indefinite"/>
+                      </p:stCondLst>
+                      <p:childTnLst>
+                        <p:par>
+                          <p:cTn id="110" fill="hold">
+                            <p:stCondLst>
+                              <p:cond delay="0"/>
+                            </p:stCondLst>
+                            <p:childTnLst>
+                              <p:par>
+                                <p:cTn id="111" presetID="1" presetClass="exit" presetSubtype="0" fill="hold" nodeType="clickEffect">
+                                  <p:stCondLst>
+                                    <p:cond delay="0"/>
+                                  </p:stCondLst>
+                                  <p:childTnLst>
+                                    <p:set>
+                                      <p:cBhvr>
+                                        <p:cTn id="112" dur="1" fill="hold">
+                                          <p:stCondLst>
+                                            <p:cond delay="0"/>
+                                          </p:stCondLst>
+                                        </p:cTn>
+                                        <p:tgtEl>
+                                          <p:spTgt spid="39"/>
+                                        </p:tgtEl>
+                                        <p:attrNameLst>
+                                          <p:attrName>style.visibility</p:attrName>
+                                        </p:attrNameLst>
+                                      </p:cBhvr>
+                                      <p:to>
+                                        <p:strVal val="hidden"/>
+                                      </p:to>
+                                    </p:set>
+                                  </p:childTnLst>
+                                </p:cTn>
+                              </p:par>
+                              <p:par>
+                                <p:cTn id="113" presetID="1" presetClass="entr" presetSubtype="0" fill="hold" nodeType="withEffect">
+                                  <p:stCondLst>
+                                    <p:cond delay="0"/>
+                                  </p:stCondLst>
+                                  <p:childTnLst>
+                                    <p:set>
+                                      <p:cBhvr>
+                                        <p:cTn id="114" dur="1" fill="hold">
+                                          <p:stCondLst>
+                                            <p:cond delay="0"/>
+                                          </p:stCondLst>
+                                        </p:cTn>
+                                        <p:tgtEl>
+                                          <p:spTgt spid="70"/>
+                                        </p:tgtEl>
+                                        <p:attrNameLst>
+                                          <p:attrName>style.visibility</p:attrName>
+                                        </p:attrNameLst>
+                                      </p:cBhvr>
+                                      <p:to>
+                                        <p:strVal val="visible"/>
+                                      </p:to>
+                                    </p:set>
+                                  </p:childTnLst>
+                                </p:cTn>
+                              </p:par>
+                            </p:childTnLst>
+                          </p:cTn>
+                        </p:par>
+                      </p:childTnLst>
+                    </p:cTn>
+                  </p:par>
+                  <p:par>
+                    <p:cTn id="115" fill="hold">
+                      <p:stCondLst>
+                        <p:cond delay="indefinite"/>
+                      </p:stCondLst>
+                      <p:childTnLst>
+                        <p:par>
+                          <p:cTn id="116" fill="hold">
+                            <p:stCondLst>
+                              <p:cond delay="0"/>
+                            </p:stCondLst>
+                            <p:childTnLst>
+                              <p:par>
+                                <p:cTn id="117" presetID="1" presetClass="exit" presetSubtype="0" fill="hold" nodeType="clickEffect">
+                                  <p:stCondLst>
+                                    <p:cond delay="0"/>
+                                  </p:stCondLst>
+                                  <p:childTnLst>
+                                    <p:set>
+                                      <p:cBhvr>
+                                        <p:cTn id="118" dur="1" fill="hold">
+                                          <p:stCondLst>
+                                            <p:cond delay="0"/>
+                                          </p:stCondLst>
+                                        </p:cTn>
+                                        <p:tgtEl>
+                                          <p:spTgt spid="70"/>
+                                        </p:tgtEl>
+                                        <p:attrNameLst>
+                                          <p:attrName>style.visibility</p:attrName>
+                                        </p:attrNameLst>
+                                      </p:cBhvr>
+                                      <p:to>
+                                        <p:strVal val="hidden"/>
+                                      </p:to>
+                                    </p:set>
+                                  </p:childTnLst>
+                                </p:cTn>
+                              </p:par>
+                              <p:par>
+                                <p:cTn id="119" presetID="1" presetClass="exit" presetSubtype="0" fill="hold" grpId="1" nodeType="withEffect">
+                                  <p:stCondLst>
+                                    <p:cond delay="0"/>
+                                  </p:stCondLst>
+                                  <p:childTnLst>
+                                    <p:set>
+                                      <p:cBhvr>
+                                        <p:cTn id="120" dur="1" fill="hold">
+                                          <p:stCondLst>
+                                            <p:cond delay="0"/>
+                                          </p:stCondLst>
+                                        </p:cTn>
+                                        <p:tgtEl>
+                                          <p:spTgt spid="85"/>
+                                        </p:tgtEl>
+                                        <p:attrNameLst>
+                                          <p:attrName>style.visibility</p:attrName>
+                                        </p:attrNameLst>
+                                      </p:cBhvr>
+                                      <p:to>
+                                        <p:strVal val="hidden"/>
+                                      </p:to>
+                                    </p:set>
+                                  </p:childTnLst>
+                                </p:cTn>
+                              </p:par>
+                            </p:childTnLst>
+                          </p:cTn>
+                        </p:par>
+                      </p:childTnLst>
+                    </p:cTn>
+                  </p:par>
+                </p:childTnLst>
+              </p:cTn>
+              <p:prevCondLst>
+                <p:cond evt="onPrev" delay="0">
+                  <p:tgtEl>
+                    <p:sldTgt/>
+                  </p:tgtEl>
+                </p:cond>
+              </p:prevCondLst>
+              <p:nextCondLst>
+                <p:cond evt="onNext" delay="0">
+                  <p:tgtEl>
+                    <p:sldTgt/>
+                  </p:tgtEl>
+                </p:cond>
+              </p:nextCondLst>
+            </p:seq>
+          </p:childTnLst>
+        </p:cTn>
       </p:par>
     </p:tnLst>
+    <p:bldLst>
+      <p:bldP spid="82" grpId="0"/>
+      <p:bldP spid="82" grpId="1"/>
+      <p:bldP spid="83" grpId="0"/>
+      <p:bldP spid="83" grpId="1"/>
+      <p:bldP spid="84" grpId="0"/>
+      <p:bldP spid="84" grpId="1"/>
+      <p:bldP spid="85" grpId="0"/>
+      <p:bldP spid="85" grpId="1"/>
+      <p:bldP spid="93" grpId="0"/>
+      <p:bldP spid="93" grpId="1"/>
+      <p:bldP spid="94" grpId="0"/>
+      <p:bldP spid="94" grpId="1"/>
+      <p:bldP spid="95" grpId="0"/>
+      <p:bldP spid="96" grpId="0"/>
+    </p:bldLst>
   </p:timing>
 </p:sld>
 </file>
@@ -22228,116 +24288,6 @@
           </a:fontRef>
         </p:style>
       </p:cxnSp>
-      <p:cxnSp>
-        <p:nvCxnSpPr>
-          <p:cNvPr id="25" name="Straight Arrow Connector 24"/>
-          <p:cNvCxnSpPr/>
-          <p:nvPr/>
-        </p:nvCxnSpPr>
-        <p:spPr>
-          <a:xfrm flipH="1">
-            <a:off x="1714500" y="1936751"/>
-            <a:ext cx="692150" cy="53974"/>
-          </a:xfrm>
-          <a:prstGeom prst="straightConnector1">
-            <a:avLst/>
-          </a:prstGeom>
-          <a:ln>
-            <a:solidFill>
-              <a:srgbClr val="BFBFBF"/>
-            </a:solidFill>
-            <a:tailEnd type="arrow"/>
-          </a:ln>
-        </p:spPr>
-        <p:style>
-          <a:lnRef idx="2">
-            <a:schemeClr val="accent1"/>
-          </a:lnRef>
-          <a:fillRef idx="0">
-            <a:schemeClr val="accent1"/>
-          </a:fillRef>
-          <a:effectRef idx="1">
-            <a:schemeClr val="accent1"/>
-          </a:effectRef>
-          <a:fontRef idx="minor">
-            <a:schemeClr val="tx1"/>
-          </a:fontRef>
-        </p:style>
-      </p:cxnSp>
-      <p:cxnSp>
-        <p:nvCxnSpPr>
-          <p:cNvPr id="26" name="Straight Arrow Connector 25"/>
-          <p:cNvCxnSpPr/>
-          <p:nvPr/>
-        </p:nvCxnSpPr>
-        <p:spPr>
-          <a:xfrm flipH="1" flipV="1">
-            <a:off x="1714500" y="2552700"/>
-            <a:ext cx="692150" cy="384176"/>
-          </a:xfrm>
-          <a:prstGeom prst="straightConnector1">
-            <a:avLst/>
-          </a:prstGeom>
-          <a:ln>
-            <a:solidFill>
-              <a:srgbClr val="BFBFBF"/>
-            </a:solidFill>
-            <a:tailEnd type="arrow"/>
-          </a:ln>
-        </p:spPr>
-        <p:style>
-          <a:lnRef idx="2">
-            <a:schemeClr val="accent1"/>
-          </a:lnRef>
-          <a:fillRef idx="0">
-            <a:schemeClr val="accent1"/>
-          </a:fillRef>
-          <a:effectRef idx="1">
-            <a:schemeClr val="accent1"/>
-          </a:effectRef>
-          <a:fontRef idx="minor">
-            <a:schemeClr val="tx1"/>
-          </a:fontRef>
-        </p:style>
-      </p:cxnSp>
-      <p:cxnSp>
-        <p:nvCxnSpPr>
-          <p:cNvPr id="27" name="Straight Arrow Connector 26"/>
-          <p:cNvCxnSpPr>
-            <a:stCxn id="5" idx="1"/>
-          </p:cNvCxnSpPr>
-          <p:nvPr/>
-        </p:nvCxnSpPr>
-        <p:spPr>
-          <a:xfrm flipH="1" flipV="1">
-            <a:off x="1714502" y="2279651"/>
-            <a:ext cx="632111" cy="150042"/>
-          </a:xfrm>
-          <a:prstGeom prst="straightConnector1">
-            <a:avLst/>
-          </a:prstGeom>
-          <a:ln>
-            <a:solidFill>
-              <a:srgbClr val="BFBFBF"/>
-            </a:solidFill>
-            <a:tailEnd type="arrow"/>
-          </a:ln>
-        </p:spPr>
-        <p:style>
-          <a:lnRef idx="2">
-            <a:schemeClr val="accent1"/>
-          </a:lnRef>
-          <a:fillRef idx="0">
-            <a:schemeClr val="accent1"/>
-          </a:fillRef>
-          <a:effectRef idx="1">
-            <a:schemeClr val="accent1"/>
-          </a:effectRef>
-          <a:fontRef idx="minor">
-            <a:schemeClr val="tx1"/>
-          </a:fontRef>
-        </p:style>
-      </p:cxnSp>
       <p:sp>
         <p:nvSpPr>
           <p:cNvPr id="28" name="Oval 27"/>
@@ -23154,6 +25104,188 @@
           </a:p>
         </p:txBody>
       </p:sp>
+      <p:sp>
+        <p:nvSpPr>
+          <p:cNvPr id="3" name="TextBox 2"/>
+          <p:cNvSpPr txBox="1"/>
+          <p:nvPr/>
+        </p:nvSpPr>
+        <p:spPr>
+          <a:xfrm rot="5400000">
+            <a:off x="6085671" y="3825381"/>
+            <a:ext cx="554058" cy="276999"/>
+          </a:xfrm>
+          <a:prstGeom prst="rect">
+            <a:avLst/>
+          </a:prstGeom>
+          <a:noFill/>
+        </p:spPr>
+        <p:txBody>
+          <a:bodyPr wrap="none" rtlCol="0">
+            <a:spAutoFit/>
+          </a:bodyPr>
+          <a:lstStyle/>
+          <a:p>
+            <a:r>
+              <a:rPr lang="en-US" sz="1200" dirty="0">
+                <a:latin typeface="Courier"/>
+                <a:cs typeface="Courier"/>
+              </a:rPr>
+              <a:t>f</a:t>
+            </a:r>
+            <a:r>
+              <a:rPr lang="en-US" sz="1200" dirty="0" smtClean="0">
+                <a:latin typeface="Courier"/>
+                <a:cs typeface="Courier"/>
+              </a:rPr>
+              <a:t>un2</a:t>
+            </a:r>
+          </a:p>
+        </p:txBody>
+      </p:sp>
+      <p:sp>
+        <p:nvSpPr>
+          <p:cNvPr id="50" name="TextBox 49"/>
+          <p:cNvSpPr txBox="1"/>
+          <p:nvPr/>
+        </p:nvSpPr>
+        <p:spPr>
+          <a:xfrm rot="5400000">
+            <a:off x="6360696" y="3829673"/>
+            <a:ext cx="554058" cy="276999"/>
+          </a:xfrm>
+          <a:prstGeom prst="rect">
+            <a:avLst/>
+          </a:prstGeom>
+          <a:noFill/>
+        </p:spPr>
+        <p:txBody>
+          <a:bodyPr wrap="none" rtlCol="0">
+            <a:spAutoFit/>
+          </a:bodyPr>
+          <a:lstStyle/>
+          <a:p>
+            <a:r>
+              <a:rPr lang="en-US" sz="1200" dirty="0" smtClean="0">
+                <a:latin typeface="Courier"/>
+                <a:cs typeface="Courier"/>
+              </a:rPr>
+              <a:t>fun4</a:t>
+            </a:r>
+          </a:p>
+        </p:txBody>
+      </p:sp>
+      <p:sp>
+        <p:nvSpPr>
+          <p:cNvPr id="52" name="TextBox 51"/>
+          <p:cNvSpPr txBox="1"/>
+          <p:nvPr/>
+        </p:nvSpPr>
+        <p:spPr>
+          <a:xfrm rot="5400000">
+            <a:off x="6364010" y="3829674"/>
+            <a:ext cx="554058" cy="276999"/>
+          </a:xfrm>
+          <a:prstGeom prst="rect">
+            <a:avLst/>
+          </a:prstGeom>
+          <a:noFill/>
+        </p:spPr>
+        <p:txBody>
+          <a:bodyPr wrap="none" rtlCol="0">
+            <a:spAutoFit/>
+          </a:bodyPr>
+          <a:lstStyle/>
+          <a:p>
+            <a:r>
+              <a:rPr lang="en-US" sz="1200" dirty="0">
+                <a:latin typeface="Courier"/>
+                <a:cs typeface="Courier"/>
+              </a:rPr>
+              <a:t>f</a:t>
+            </a:r>
+            <a:r>
+              <a:rPr lang="en-US" sz="1200" dirty="0" smtClean="0">
+                <a:latin typeface="Courier"/>
+                <a:cs typeface="Courier"/>
+              </a:rPr>
+              <a:t>un2</a:t>
+            </a:r>
+          </a:p>
+        </p:txBody>
+      </p:sp>
+      <p:sp>
+        <p:nvSpPr>
+          <p:cNvPr id="4" name="TextBox 3"/>
+          <p:cNvSpPr txBox="1"/>
+          <p:nvPr/>
+        </p:nvSpPr>
+        <p:spPr>
+          <a:xfrm>
+            <a:off x="914401" y="1813209"/>
+            <a:ext cx="554058" cy="276999"/>
+          </a:xfrm>
+          <a:prstGeom prst="rect">
+            <a:avLst/>
+          </a:prstGeom>
+          <a:noFill/>
+        </p:spPr>
+        <p:txBody>
+          <a:bodyPr wrap="none" rtlCol="0">
+            <a:spAutoFit/>
+          </a:bodyPr>
+          <a:lstStyle/>
+          <a:p>
+            <a:r>
+              <a:rPr lang="en-US" sz="1200" dirty="0" smtClean="0">
+                <a:latin typeface="Courier"/>
+                <a:cs typeface="Courier"/>
+              </a:rPr>
+              <a:t>fun2</a:t>
+            </a:r>
+            <a:endParaRPr lang="en-US" sz="1200" dirty="0">
+              <a:latin typeface="Courier"/>
+              <a:cs typeface="Courier"/>
+            </a:endParaRPr>
+          </a:p>
+        </p:txBody>
+      </p:sp>
+      <p:sp>
+        <p:nvSpPr>
+          <p:cNvPr id="53" name="TextBox 52"/>
+          <p:cNvSpPr txBox="1"/>
+          <p:nvPr/>
+        </p:nvSpPr>
+        <p:spPr>
+          <a:xfrm>
+            <a:off x="912536" y="1813208"/>
+            <a:ext cx="554058" cy="276999"/>
+          </a:xfrm>
+          <a:prstGeom prst="rect">
+            <a:avLst/>
+          </a:prstGeom>
+          <a:noFill/>
+        </p:spPr>
+        <p:txBody>
+          <a:bodyPr wrap="none" rtlCol="0">
+            <a:spAutoFit/>
+          </a:bodyPr>
+          <a:lstStyle/>
+          <a:p>
+            <a:r>
+              <a:rPr lang="en-US" sz="1200" dirty="0" smtClean="0">
+                <a:latin typeface="Courier"/>
+                <a:cs typeface="Courier"/>
+              </a:rPr>
+              <a:t>fun4</a:t>
+            </a:r>
+            <a:endParaRPr lang="en-US" sz="1200" dirty="0">
+              <a:latin typeface="Courier"/>
+              <a:cs typeface="Courier"/>
+            </a:endParaRPr>
+          </a:p>
+        </p:txBody>
+      </p:sp>
     </p:spTree>
     <p:extLst>
       <p:ext uri="{BB962C8B-B14F-4D97-AF65-F5344CB8AC3E}">
@@ -23185,7 +25317,7 @@
                             </p:stCondLst>
                             <p:childTnLst>
                               <p:par>
-                                <p:cTn id="5" presetID="1" presetClass="entr" presetSubtype="0" fill="hold" grpId="0" nodeType="clickEffect">
+                                <p:cTn id="5" presetID="1" presetClass="entr" presetSubtype="0" fill="hold" nodeType="clickEffect">
                                   <p:stCondLst>
                                     <p:cond delay="0"/>
                                   </p:stCondLst>
@@ -23193,6 +25325,348 @@
                                     <p:set>
                                       <p:cBhvr>
                                         <p:cTn id="6" dur="1" fill="hold">
+                                          <p:stCondLst>
+                                            <p:cond delay="0"/>
+                                          </p:stCondLst>
+                                        </p:cTn>
+                                        <p:tgtEl>
+                                          <p:spTgt spid="47"/>
+                                        </p:tgtEl>
+                                        <p:attrNameLst>
+                                          <p:attrName>style.visibility</p:attrName>
+                                        </p:attrNameLst>
+                                      </p:cBhvr>
+                                      <p:to>
+                                        <p:strVal val="visible"/>
+                                      </p:to>
+                                    </p:set>
+                                  </p:childTnLst>
+                                </p:cTn>
+                              </p:par>
+                              <p:par>
+                                <p:cTn id="7" presetID="1" presetClass="entr" presetSubtype="0" fill="hold" nodeType="withEffect">
+                                  <p:stCondLst>
+                                    <p:cond delay="0"/>
+                                  </p:stCondLst>
+                                  <p:childTnLst>
+                                    <p:set>
+                                      <p:cBhvr>
+                                        <p:cTn id="8" dur="1" fill="hold">
+                                          <p:stCondLst>
+                                            <p:cond delay="0"/>
+                                          </p:stCondLst>
+                                        </p:cTn>
+                                        <p:tgtEl>
+                                          <p:spTgt spid="49"/>
+                                        </p:tgtEl>
+                                        <p:attrNameLst>
+                                          <p:attrName>style.visibility</p:attrName>
+                                        </p:attrNameLst>
+                                      </p:cBhvr>
+                                      <p:to>
+                                        <p:strVal val="visible"/>
+                                      </p:to>
+                                    </p:set>
+                                  </p:childTnLst>
+                                </p:cTn>
+                              </p:par>
+                              <p:par>
+                                <p:cTn id="9" presetID="1" presetClass="entr" presetSubtype="0" fill="hold" nodeType="withEffect">
+                                  <p:stCondLst>
+                                    <p:cond delay="0"/>
+                                  </p:stCondLst>
+                                  <p:childTnLst>
+                                    <p:set>
+                                      <p:cBhvr>
+                                        <p:cTn id="10" dur="1" fill="hold">
+                                          <p:stCondLst>
+                                            <p:cond delay="0"/>
+                                          </p:stCondLst>
+                                        </p:cTn>
+                                        <p:tgtEl>
+                                          <p:spTgt spid="65"/>
+                                        </p:tgtEl>
+                                        <p:attrNameLst>
+                                          <p:attrName>style.visibility</p:attrName>
+                                        </p:attrNameLst>
+                                      </p:cBhvr>
+                                      <p:to>
+                                        <p:strVal val="visible"/>
+                                      </p:to>
+                                    </p:set>
+                                  </p:childTnLst>
+                                </p:cTn>
+                              </p:par>
+                              <p:par>
+                                <p:cTn id="11" presetID="1" presetClass="entr" presetSubtype="0" fill="hold" nodeType="withEffect">
+                                  <p:stCondLst>
+                                    <p:cond delay="0"/>
+                                  </p:stCondLst>
+                                  <p:childTnLst>
+                                    <p:set>
+                                      <p:cBhvr>
+                                        <p:cTn id="12" dur="1" fill="hold">
+                                          <p:stCondLst>
+                                            <p:cond delay="0"/>
+                                          </p:stCondLst>
+                                        </p:cTn>
+                                        <p:tgtEl>
+                                          <p:spTgt spid="51"/>
+                                        </p:tgtEl>
+                                        <p:attrNameLst>
+                                          <p:attrName>style.visibility</p:attrName>
+                                        </p:attrNameLst>
+                                      </p:cBhvr>
+                                      <p:to>
+                                        <p:strVal val="visible"/>
+                                      </p:to>
+                                    </p:set>
+                                  </p:childTnLst>
+                                </p:cTn>
+                              </p:par>
+                              <p:par>
+                                <p:cTn id="13" presetID="1" presetClass="entr" presetSubtype="0" fill="hold" grpId="1" nodeType="withEffect">
+                                  <p:stCondLst>
+                                    <p:cond delay="0"/>
+                                  </p:stCondLst>
+                                  <p:childTnLst>
+                                    <p:set>
+                                      <p:cBhvr>
+                                        <p:cTn id="14" dur="1" fill="hold">
+                                          <p:stCondLst>
+                                            <p:cond delay="0"/>
+                                          </p:stCondLst>
+                                        </p:cTn>
+                                        <p:tgtEl>
+                                          <p:spTgt spid="66"/>
+                                        </p:tgtEl>
+                                        <p:attrNameLst>
+                                          <p:attrName>style.visibility</p:attrName>
+                                        </p:attrNameLst>
+                                      </p:cBhvr>
+                                      <p:to>
+                                        <p:strVal val="visible"/>
+                                      </p:to>
+                                    </p:set>
+                                  </p:childTnLst>
+                                </p:cTn>
+                              </p:par>
+                              <p:par>
+                                <p:cTn id="15" presetID="1" presetClass="entr" presetSubtype="0" fill="hold" nodeType="withEffect">
+                                  <p:stCondLst>
+                                    <p:cond delay="0"/>
+                                  </p:stCondLst>
+                                  <p:childTnLst>
+                                    <p:set>
+                                      <p:cBhvr>
+                                        <p:cTn id="16" dur="1" fill="hold">
+                                          <p:stCondLst>
+                                            <p:cond delay="0"/>
+                                          </p:stCondLst>
+                                        </p:cTn>
+                                        <p:tgtEl>
+                                          <p:spTgt spid="56"/>
+                                        </p:tgtEl>
+                                        <p:attrNameLst>
+                                          <p:attrName>style.visibility</p:attrName>
+                                        </p:attrNameLst>
+                                      </p:cBhvr>
+                                      <p:to>
+                                        <p:strVal val="visible"/>
+                                      </p:to>
+                                    </p:set>
+                                  </p:childTnLst>
+                                </p:cTn>
+                              </p:par>
+                              <p:par>
+                                <p:cTn id="17" presetID="1" presetClass="entr" presetSubtype="0" fill="hold" grpId="1" nodeType="withEffect">
+                                  <p:stCondLst>
+                                    <p:cond delay="0"/>
+                                  </p:stCondLst>
+                                  <p:childTnLst>
+                                    <p:set>
+                                      <p:cBhvr>
+                                        <p:cTn id="18" dur="1" fill="hold">
+                                          <p:stCondLst>
+                                            <p:cond delay="0"/>
+                                          </p:stCondLst>
+                                        </p:cTn>
+                                        <p:tgtEl>
+                                          <p:spTgt spid="54"/>
+                                        </p:tgtEl>
+                                        <p:attrNameLst>
+                                          <p:attrName>style.visibility</p:attrName>
+                                        </p:attrNameLst>
+                                      </p:cBhvr>
+                                      <p:to>
+                                        <p:strVal val="visible"/>
+                                      </p:to>
+                                    </p:set>
+                                  </p:childTnLst>
+                                </p:cTn>
+                              </p:par>
+                              <p:par>
+                                <p:cTn id="19" presetID="1" presetClass="entr" presetSubtype="0" fill="hold" nodeType="withEffect">
+                                  <p:stCondLst>
+                                    <p:cond delay="0"/>
+                                  </p:stCondLst>
+                                  <p:childTnLst>
+                                    <p:set>
+                                      <p:cBhvr>
+                                        <p:cTn id="20" dur="1" fill="hold">
+                                          <p:stCondLst>
+                                            <p:cond delay="0"/>
+                                          </p:stCondLst>
+                                        </p:cTn>
+                                        <p:tgtEl>
+                                          <p:spTgt spid="58"/>
+                                        </p:tgtEl>
+                                        <p:attrNameLst>
+                                          <p:attrName>style.visibility</p:attrName>
+                                        </p:attrNameLst>
+                                      </p:cBhvr>
+                                      <p:to>
+                                        <p:strVal val="visible"/>
+                                      </p:to>
+                                    </p:set>
+                                  </p:childTnLst>
+                                </p:cTn>
+                              </p:par>
+                              <p:par>
+                                <p:cTn id="21" presetID="1" presetClass="entr" presetSubtype="0" fill="hold" grpId="0" nodeType="withEffect">
+                                  <p:stCondLst>
+                                    <p:cond delay="0"/>
+                                  </p:stCondLst>
+                                  <p:childTnLst>
+                                    <p:set>
+                                      <p:cBhvr>
+                                        <p:cTn id="22" dur="1" fill="hold">
+                                          <p:stCondLst>
+                                            <p:cond delay="0"/>
+                                          </p:stCondLst>
+                                        </p:cTn>
+                                        <p:tgtEl>
+                                          <p:spTgt spid="53"/>
+                                        </p:tgtEl>
+                                        <p:attrNameLst>
+                                          <p:attrName>style.visibility</p:attrName>
+                                        </p:attrNameLst>
+                                      </p:cBhvr>
+                                      <p:to>
+                                        <p:strVal val="visible"/>
+                                      </p:to>
+                                    </p:set>
+                                  </p:childTnLst>
+                                </p:cTn>
+                              </p:par>
+                            </p:childTnLst>
+                          </p:cTn>
+                        </p:par>
+                      </p:childTnLst>
+                    </p:cTn>
+                  </p:par>
+                  <p:par>
+                    <p:cTn id="23" fill="hold">
+                      <p:stCondLst>
+                        <p:cond delay="indefinite"/>
+                      </p:stCondLst>
+                      <p:childTnLst>
+                        <p:par>
+                          <p:cTn id="24" fill="hold">
+                            <p:stCondLst>
+                              <p:cond delay="0"/>
+                            </p:stCondLst>
+                            <p:childTnLst>
+                              <p:par>
+                                <p:cTn id="25" presetID="1" presetClass="exit" presetSubtype="0" fill="hold" grpId="0" nodeType="clickEffect">
+                                  <p:stCondLst>
+                                    <p:cond delay="0"/>
+                                  </p:stCondLst>
+                                  <p:childTnLst>
+                                    <p:set>
+                                      <p:cBhvr>
+                                        <p:cTn id="26" dur="1" fill="hold">
+                                          <p:stCondLst>
+                                            <p:cond delay="0"/>
+                                          </p:stCondLst>
+                                        </p:cTn>
+                                        <p:tgtEl>
+                                          <p:spTgt spid="54"/>
+                                        </p:tgtEl>
+                                        <p:attrNameLst>
+                                          <p:attrName>style.visibility</p:attrName>
+                                        </p:attrNameLst>
+                                      </p:cBhvr>
+                                      <p:to>
+                                        <p:strVal val="hidden"/>
+                                      </p:to>
+                                    </p:set>
+                                  </p:childTnLst>
+                                </p:cTn>
+                              </p:par>
+                              <p:par>
+                                <p:cTn id="27" presetID="1" presetClass="exit" presetSubtype="0" fill="hold" grpId="0" nodeType="withEffect">
+                                  <p:stCondLst>
+                                    <p:cond delay="0"/>
+                                  </p:stCondLst>
+                                  <p:childTnLst>
+                                    <p:set>
+                                      <p:cBhvr>
+                                        <p:cTn id="28" dur="1" fill="hold">
+                                          <p:stCondLst>
+                                            <p:cond delay="0"/>
+                                          </p:stCondLst>
+                                        </p:cTn>
+                                        <p:tgtEl>
+                                          <p:spTgt spid="66"/>
+                                        </p:tgtEl>
+                                        <p:attrNameLst>
+                                          <p:attrName>style.visibility</p:attrName>
+                                        </p:attrNameLst>
+                                      </p:cBhvr>
+                                      <p:to>
+                                        <p:strVal val="hidden"/>
+                                      </p:to>
+                                    </p:set>
+                                  </p:childTnLst>
+                                </p:cTn>
+                              </p:par>
+                              <p:par>
+                                <p:cTn id="29" presetID="1" presetClass="entr" presetSubtype="0" fill="hold" grpId="0" nodeType="withEffect">
+                                  <p:stCondLst>
+                                    <p:cond delay="0"/>
+                                  </p:stCondLst>
+                                  <p:childTnLst>
+                                    <p:set>
+                                      <p:cBhvr>
+                                        <p:cTn id="30" dur="1" fill="hold">
+                                          <p:stCondLst>
+                                            <p:cond delay="0"/>
+                                          </p:stCondLst>
+                                        </p:cTn>
+                                        <p:tgtEl>
+                                          <p:spTgt spid="68"/>
+                                        </p:tgtEl>
+                                        <p:attrNameLst>
+                                          <p:attrName>style.visibility</p:attrName>
+                                        </p:attrNameLst>
+                                      </p:cBhvr>
+                                      <p:to>
+                                        <p:strVal val="visible"/>
+                                      </p:to>
+                                    </p:set>
+                                  </p:childTnLst>
+                                </p:cTn>
+                              </p:par>
+                              <p:par>
+                                <p:cTn id="31" presetID="1" presetClass="entr" presetSubtype="0" fill="hold" grpId="0" nodeType="withEffect">
+                                  <p:stCondLst>
+                                    <p:cond delay="0"/>
+                                  </p:stCondLst>
+                                  <p:childTnLst>
+                                    <p:set>
+                                      <p:cBhvr>
+                                        <p:cTn id="32" dur="1" fill="hold">
                                           <p:stCondLst>
                                             <p:cond delay="0"/>
                                           </p:stCondLst>
@@ -23212,20 +25686,74 @@
                                 </p:cTn>
                               </p:par>
                               <p:par>
-                                <p:cTn id="7" presetID="1" presetClass="entr" presetSubtype="0" fill="hold" grpId="0" nodeType="withEffect">
+                                <p:cTn id="33" presetID="1" presetClass="exit" presetSubtype="0" fill="hold" grpId="0" nodeType="withEffect">
                                   <p:stCondLst>
                                     <p:cond delay="0"/>
                                   </p:stCondLst>
                                   <p:childTnLst>
                                     <p:set>
                                       <p:cBhvr>
-                                        <p:cTn id="8" dur="1" fill="hold">
+                                        <p:cTn id="34" dur="1" fill="hold">
                                           <p:stCondLst>
                                             <p:cond delay="0"/>
                                           </p:stCondLst>
                                         </p:cTn>
                                         <p:tgtEl>
-                                          <p:spTgt spid="68"/>
+                                          <p:spTgt spid="50"/>
+                                        </p:tgtEl>
+                                        <p:attrNameLst>
+                                          <p:attrName>style.visibility</p:attrName>
+                                        </p:attrNameLst>
+                                      </p:cBhvr>
+                                      <p:to>
+                                        <p:strVal val="hidden"/>
+                                      </p:to>
+                                    </p:set>
+                                  </p:childTnLst>
+                                </p:cTn>
+                              </p:par>
+                              <p:par>
+                                <p:cTn id="35" presetID="1" presetClass="exit" presetSubtype="0" fill="hold" grpId="0" nodeType="withEffect">
+                                  <p:stCondLst>
+                                    <p:cond delay="0"/>
+                                  </p:stCondLst>
+                                  <p:childTnLst>
+                                    <p:set>
+                                      <p:cBhvr>
+                                        <p:cTn id="36" dur="1" fill="hold">
+                                          <p:stCondLst>
+                                            <p:cond delay="0"/>
+                                          </p:stCondLst>
+                                        </p:cTn>
+                                        <p:tgtEl>
+                                          <p:spTgt spid="3"/>
+                                        </p:tgtEl>
+                                        <p:attrNameLst>
+                                          <p:attrName>style.visibility</p:attrName>
+                                        </p:attrNameLst>
+                                      </p:cBhvr>
+                                      <p:to>
+                                        <p:strVal val="hidden"/>
+                                      </p:to>
+                                    </p:set>
+                                  </p:childTnLst>
+                                </p:cTn>
+                              </p:par>
+                              <p:par>
+                                <p:cTn id="37" presetID="1" presetClass="entr" presetSubtype="0" fill="hold" grpId="0" nodeType="withEffect">
+                                  <p:stCondLst>
+                                    <p:cond delay="0"/>
+                                  </p:stCondLst>
+                                  <p:childTnLst>
+                                    <p:set>
+                                      <p:cBhvr>
+                                        <p:cTn id="38" dur="1" fill="hold">
+                                          <p:stCondLst>
+                                            <p:cond delay="0"/>
+                                          </p:stCondLst>
+                                        </p:cTn>
+                                        <p:tgtEl>
+                                          <p:spTgt spid="52"/>
                                         </p:tgtEl>
                                         <p:attrNameLst>
                                           <p:attrName>style.visibility</p:attrName>
@@ -23239,20 +25767,20 @@
                                 </p:cTn>
                               </p:par>
                               <p:par>
-                                <p:cTn id="9" presetID="1" presetClass="exit" presetSubtype="0" fill="hold" grpId="0" nodeType="withEffect">
+                                <p:cTn id="39" presetID="1" presetClass="exit" presetSubtype="0" fill="hold" grpId="1" nodeType="withEffect">
                                   <p:stCondLst>
                                     <p:cond delay="0"/>
                                   </p:stCondLst>
                                   <p:childTnLst>
                                     <p:set>
                                       <p:cBhvr>
-                                        <p:cTn id="10" dur="1" fill="hold">
+                                        <p:cTn id="40" dur="1" fill="hold">
                                           <p:stCondLst>
                                             <p:cond delay="0"/>
                                           </p:stCondLst>
                                         </p:cTn>
                                         <p:tgtEl>
-                                          <p:spTgt spid="54"/>
+                                          <p:spTgt spid="53"/>
                                         </p:tgtEl>
                                         <p:attrNameLst>
                                           <p:attrName>style.visibility</p:attrName>
@@ -23266,27 +25794,27 @@
                                 </p:cTn>
                               </p:par>
                               <p:par>
-                                <p:cTn id="11" presetID="1" presetClass="exit" presetSubtype="0" fill="hold" grpId="0" nodeType="withEffect">
+                                <p:cTn id="41" presetID="1" presetClass="entr" presetSubtype="0" fill="hold" grpId="0" nodeType="withEffect">
                                   <p:stCondLst>
                                     <p:cond delay="0"/>
                                   </p:stCondLst>
                                   <p:childTnLst>
                                     <p:set>
                                       <p:cBhvr>
-                                        <p:cTn id="12" dur="1" fill="hold">
+                                        <p:cTn id="42" dur="1" fill="hold">
                                           <p:stCondLst>
                                             <p:cond delay="0"/>
                                           </p:stCondLst>
                                         </p:cTn>
                                         <p:tgtEl>
-                                          <p:spTgt spid="66"/>
+                                          <p:spTgt spid="4"/>
                                         </p:tgtEl>
                                         <p:attrNameLst>
                                           <p:attrName>style.visibility</p:attrName>
                                         </p:attrNameLst>
                                       </p:cBhvr>
                                       <p:to>
-                                        <p:strVal val="hidden"/>
+                                        <p:strVal val="visible"/>
                                       </p:to>
                                     </p:set>
                                   </p:childTnLst>
@@ -23321,9 +25849,17 @@
     </p:tnLst>
     <p:bldLst>
       <p:bldP spid="54" grpId="0"/>
+      <p:bldP spid="54" grpId="1"/>
       <p:bldP spid="66" grpId="0"/>
+      <p:bldP spid="66" grpId="1"/>
       <p:bldP spid="67" grpId="0"/>
       <p:bldP spid="68" grpId="0"/>
+      <p:bldP spid="3" grpId="0"/>
+      <p:bldP spid="50" grpId="0"/>
+      <p:bldP spid="52" grpId="0"/>
+      <p:bldP spid="4" grpId="0"/>
+      <p:bldP spid="53" grpId="0"/>
+      <p:bldP spid="53" grpId="1"/>
     </p:bldLst>
   </p:timing>
 </p:sld>

</xml_diff>

<commit_message>
Some cleaner generator slides.
</commit_message>
<xml_diff>
--- a/Async_Discussion_9_29_15.pptx
+++ b/Async_Discussion_9_29_15.pptx
@@ -279,7 +279,7 @@
           <a:p>
             <a:fld id="{0FE6ED01-4D4B-2B45-B62B-1A50C36CA659}" type="datetimeFigureOut">
               <a:rPr lang="en-US" smtClean="0"/>
-              <a:t>10/17/15</a:t>
+              <a:t>10/20/15</a:t>
             </a:fld>
             <a:endParaRPr lang="en-US"/>
           </a:p>
@@ -2009,11 +2009,7 @@
             </a:r>
             <a:r>
               <a:rPr lang="en-US" dirty="0" smtClean="0"/>
-              <a:t>04_Async_Await</a:t>
-            </a:r>
-            <a:r>
-              <a:rPr lang="en-US" dirty="0" smtClean="0"/>
-              <a:t>/01_async_await.js (also see compiled version)</a:t>
+              <a:t>04_Async_Await/01_async_await.js (also see compiled version)</a:t>
             </a:r>
           </a:p>
           <a:p>
@@ -2685,19 +2681,9 @@
           <a:bodyPr/>
           <a:lstStyle/>
           <a:p>
-            <a:pPr marL="171450" indent="-171450">
+            <a:pPr marL="0" indent="0">
               <a:buFontTx/>
-              <a:buChar char="-"/>
-            </a:pPr>
-            <a:r>
-              <a:rPr lang="en-US" smtClean="0"/>
-              <a:t>Example: 05_Generators/03_generator_async.js</a:t>
-            </a:r>
-          </a:p>
-          <a:p>
-            <a:pPr marL="171450" indent="-171450">
-              <a:buFontTx/>
-              <a:buChar char="-"/>
+              <a:buNone/>
             </a:pPr>
             <a:endParaRPr lang="en-US" dirty="0"/>
           </a:p>
@@ -2783,6 +2769,113 @@
           <a:bodyPr/>
           <a:lstStyle/>
           <a:p>
+            <a:pPr marL="0" marR="0" indent="0" algn="l" defTabSz="457200" rtl="0" eaLnBrk="1" fontAlgn="auto" latinLnBrk="0" hangingPunct="1">
+              <a:lnSpc>
+                <a:spcPct val="100000"/>
+              </a:lnSpc>
+              <a:spcBef>
+                <a:spcPts val="0"/>
+              </a:spcBef>
+              <a:spcAft>
+                <a:spcPts val="0"/>
+              </a:spcAft>
+              <a:buClrTx/>
+              <a:buSzTx/>
+              <a:buFontTx/>
+              <a:buNone/>
+              <a:tabLst/>
+              <a:defRPr/>
+            </a:pPr>
+            <a:r>
+              <a:rPr lang="en-US" dirty="0" smtClean="0"/>
+              <a:t>- Example: 05_Generators/03_generator_async.js</a:t>
+            </a:r>
+          </a:p>
+          <a:p>
+            <a:endParaRPr lang="en-US" dirty="0"/>
+          </a:p>
+        </p:txBody>
+      </p:sp>
+      <p:sp>
+        <p:nvSpPr>
+          <p:cNvPr id="4" name="Slide Number Placeholder 3"/>
+          <p:cNvSpPr>
+            <a:spLocks noGrp="1"/>
+          </p:cNvSpPr>
+          <p:nvPr>
+            <p:ph type="sldNum" sz="quarter" idx="10"/>
+          </p:nvPr>
+        </p:nvSpPr>
+        <p:spPr/>
+        <p:txBody>
+          <a:bodyPr/>
+          <a:lstStyle/>
+          <a:p>
+            <a:fld id="{6ABAFA45-634E-644E-9C3F-E924E422D512}" type="slidenum">
+              <a:rPr lang="en-US" smtClean="0"/>
+              <a:t>34</a:t>
+            </a:fld>
+            <a:endParaRPr lang="en-US"/>
+          </a:p>
+        </p:txBody>
+      </p:sp>
+    </p:spTree>
+    <p:extLst>
+      <p:ext uri="{BB962C8B-B14F-4D97-AF65-F5344CB8AC3E}">
+        <p14:creationId xmlns:p14="http://schemas.microsoft.com/office/powerpoint/2010/main" val="573411452"/>
+      </p:ext>
+    </p:extLst>
+  </p:cSld>
+  <p:clrMapOvr>
+    <a:masterClrMapping/>
+  </p:clrMapOvr>
+</p:notes>
+</file>
+
+<file path=ppt/notesSlides/notesSlide27.xml><?xml version="1.0" encoding="utf-8"?>
+<p:notes xmlns:a="http://schemas.openxmlformats.org/drawingml/2006/main" xmlns:r="http://schemas.openxmlformats.org/officeDocument/2006/relationships" xmlns:p="http://schemas.openxmlformats.org/presentationml/2006/main">
+  <p:cSld>
+    <p:spTree>
+      <p:nvGrpSpPr>
+        <p:cNvPr id="1" name=""/>
+        <p:cNvGrpSpPr/>
+        <p:nvPr/>
+      </p:nvGrpSpPr>
+      <p:grpSpPr>
+        <a:xfrm>
+          <a:off x="0" y="0"/>
+          <a:ext cx="0" cy="0"/>
+          <a:chOff x="0" y="0"/>
+          <a:chExt cx="0" cy="0"/>
+        </a:xfrm>
+      </p:grpSpPr>
+      <p:sp>
+        <p:nvSpPr>
+          <p:cNvPr id="2" name="Slide Image Placeholder 1"/>
+          <p:cNvSpPr>
+            <a:spLocks noGrp="1" noRot="1" noChangeAspect="1"/>
+          </p:cNvSpPr>
+          <p:nvPr>
+            <p:ph type="sldImg"/>
+          </p:nvPr>
+        </p:nvSpPr>
+        <p:spPr/>
+      </p:sp>
+      <p:sp>
+        <p:nvSpPr>
+          <p:cNvPr id="3" name="Notes Placeholder 2"/>
+          <p:cNvSpPr>
+            <a:spLocks noGrp="1"/>
+          </p:cNvSpPr>
+          <p:nvPr>
+            <p:ph type="body" idx="1"/>
+          </p:nvPr>
+        </p:nvSpPr>
+        <p:spPr/>
+        <p:txBody>
+          <a:bodyPr/>
+          <a:lstStyle/>
+          <a:p>
             <a:pPr marL="171450" marR="0" lvl="1" indent="-171450" algn="l" defTabSz="457200" rtl="0" eaLnBrk="1" fontAlgn="auto" latinLnBrk="0" hangingPunct="1">
               <a:lnSpc>
                 <a:spcPct val="100000"/>
@@ -2940,13 +3033,8 @@
             </a:pPr>
             <a:r>
               <a:rPr lang="en-US" baseline="0" dirty="0" smtClean="0"/>
-              <a:t>Allows applications to be executed in a way that makes the most of the system’s processing power</a:t>
-            </a:r>
-            <a:r>
-              <a:rPr lang="en-US" baseline="0" dirty="0" smtClean="0"/>
-              <a:t>.</a:t>
-            </a:r>
-            <a:endParaRPr lang="en-US" baseline="0" dirty="0" smtClean="0"/>
+              <a:t>Allows applications to be executed in a way that makes the most of the system’s processing power.</a:t>
+            </a:r>
           </a:p>
           <a:p>
             <a:pPr marL="171450" indent="-171450">
@@ -3571,15 +3659,7 @@
             </a:pPr>
             <a:r>
               <a:rPr lang="en-US" baseline="0" dirty="0" smtClean="0"/>
-              <a:t>We </a:t>
-            </a:r>
-            <a:r>
-              <a:rPr lang="en-US" baseline="0" dirty="0" smtClean="0"/>
-              <a:t>can now code in a way that is closer to how we would if we had the result </a:t>
-            </a:r>
-            <a:r>
-              <a:rPr lang="en-US" baseline="0" dirty="0" smtClean="0"/>
-              <a:t>synchronously.</a:t>
+              <a:t>We can now code in a way that is closer to how we would if we had the result synchronously.</a:t>
             </a:r>
             <a:endParaRPr lang="en-US" dirty="0"/>
           </a:p>
@@ -3814,11 +3894,7 @@
             </a:r>
             <a:r>
               <a:rPr lang="en-US" baseline="0" dirty="0" smtClean="0"/>
-              <a:t> 02_Promises</a:t>
-            </a:r>
-            <a:r>
-              <a:rPr lang="en-US" baseline="0" dirty="0" smtClean="0"/>
-              <a:t>/02_simple_then.js, 03_then_two_args.js, 04_then_catch.js</a:t>
+              <a:t> 02_Promises/02_simple_then.js, 03_then_two_args.js, 04_then_catch.js</a:t>
             </a:r>
             <a:endParaRPr lang="en-US" dirty="0"/>
           </a:p>
@@ -4054,7 +4130,7 @@
           <a:p>
             <a:fld id="{DDAA701C-81C8-694C-BB01-105E7F20F4A5}" type="datetimeFigureOut">
               <a:rPr lang="en-US" smtClean="0"/>
-              <a:t>10/17/15</a:t>
+              <a:t>10/20/15</a:t>
             </a:fld>
             <a:endParaRPr lang="en-US"/>
           </a:p>
@@ -4219,7 +4295,7 @@
           <a:p>
             <a:fld id="{DDAA701C-81C8-694C-BB01-105E7F20F4A5}" type="datetimeFigureOut">
               <a:rPr lang="en-US" smtClean="0"/>
-              <a:t>10/17/15</a:t>
+              <a:t>10/20/15</a:t>
             </a:fld>
             <a:endParaRPr lang="en-US"/>
           </a:p>
@@ -4394,7 +4470,7 @@
           <a:p>
             <a:fld id="{DDAA701C-81C8-694C-BB01-105E7F20F4A5}" type="datetimeFigureOut">
               <a:rPr lang="en-US" smtClean="0"/>
-              <a:t>10/17/15</a:t>
+              <a:t>10/20/15</a:t>
             </a:fld>
             <a:endParaRPr lang="en-US"/>
           </a:p>
@@ -4559,7 +4635,7 @@
           <a:p>
             <a:fld id="{DDAA701C-81C8-694C-BB01-105E7F20F4A5}" type="datetimeFigureOut">
               <a:rPr lang="en-US" smtClean="0"/>
-              <a:t>10/17/15</a:t>
+              <a:t>10/20/15</a:t>
             </a:fld>
             <a:endParaRPr lang="en-US"/>
           </a:p>
@@ -4800,7 +4876,7 @@
           <a:p>
             <a:fld id="{DDAA701C-81C8-694C-BB01-105E7F20F4A5}" type="datetimeFigureOut">
               <a:rPr lang="en-US" smtClean="0"/>
-              <a:t>10/17/15</a:t>
+              <a:t>10/20/15</a:t>
             </a:fld>
             <a:endParaRPr lang="en-US"/>
           </a:p>
@@ -5083,7 +5159,7 @@
           <a:p>
             <a:fld id="{DDAA701C-81C8-694C-BB01-105E7F20F4A5}" type="datetimeFigureOut">
               <a:rPr lang="en-US" smtClean="0"/>
-              <a:t>10/17/15</a:t>
+              <a:t>10/20/15</a:t>
             </a:fld>
             <a:endParaRPr lang="en-US"/>
           </a:p>
@@ -5512,7 +5588,7 @@
           <a:p>
             <a:fld id="{DDAA701C-81C8-694C-BB01-105E7F20F4A5}" type="datetimeFigureOut">
               <a:rPr lang="en-US" smtClean="0"/>
-              <a:t>10/17/15</a:t>
+              <a:t>10/20/15</a:t>
             </a:fld>
             <a:endParaRPr lang="en-US"/>
           </a:p>
@@ -5625,7 +5701,7 @@
           <a:p>
             <a:fld id="{DDAA701C-81C8-694C-BB01-105E7F20F4A5}" type="datetimeFigureOut">
               <a:rPr lang="en-US" smtClean="0"/>
-              <a:t>10/17/15</a:t>
+              <a:t>10/20/15</a:t>
             </a:fld>
             <a:endParaRPr lang="en-US"/>
           </a:p>
@@ -5715,7 +5791,7 @@
           <a:p>
             <a:fld id="{DDAA701C-81C8-694C-BB01-105E7F20F4A5}" type="datetimeFigureOut">
               <a:rPr lang="en-US" smtClean="0"/>
-              <a:t>10/17/15</a:t>
+              <a:t>10/20/15</a:t>
             </a:fld>
             <a:endParaRPr lang="en-US"/>
           </a:p>
@@ -5904,7 +5980,7 @@
           <a:p>
             <a:fld id="{DDAA701C-81C8-694C-BB01-105E7F20F4A5}" type="datetimeFigureOut">
               <a:rPr lang="en-US" smtClean="0"/>
-              <a:t>10/17/15</a:t>
+              <a:t>10/20/15</a:t>
             </a:fld>
             <a:endParaRPr lang="en-US"/>
           </a:p>
@@ -6222,7 +6298,7 @@
           <a:p>
             <a:fld id="{DDAA701C-81C8-694C-BB01-105E7F20F4A5}" type="datetimeFigureOut">
               <a:rPr lang="en-US" smtClean="0"/>
-              <a:t>10/17/15</a:t>
+              <a:t>10/20/15</a:t>
             </a:fld>
             <a:endParaRPr lang="en-US"/>
           </a:p>
@@ -6601,7 +6677,7 @@
           <a:p>
             <a:fld id="{DDAA701C-81C8-694C-BB01-105E7F20F4A5}" type="datetimeFigureOut">
               <a:rPr lang="en-US" smtClean="0"/>
-              <a:t>10/17/15</a:t>
+              <a:t>10/20/15</a:t>
             </a:fld>
             <a:endParaRPr lang="en-US"/>
           </a:p>
@@ -15870,15 +15946,11 @@
           <a:p>
             <a:r>
               <a:rPr lang="en-US" dirty="0" smtClean="0"/>
-              <a:t>Generators – </a:t>
-            </a:r>
-            <a:r>
-              <a:rPr lang="en-US" dirty="0" err="1" smtClean="0"/>
-              <a:t>Async</a:t>
-            </a:r>
-            <a:r>
-              <a:rPr lang="en-US" dirty="0" smtClean="0"/>
-              <a:t> Uses</a:t>
+              <a:t>Generators </a:t>
+            </a:r>
+            <a:r>
+              <a:rPr lang="en-US" smtClean="0"/>
+              <a:t>– Delegation</a:t>
             </a:r>
             <a:endParaRPr lang="en-US" dirty="0"/>
           </a:p>
@@ -15901,13 +15973,251 @@
           <a:p>
             <a:r>
               <a:rPr lang="en-US" dirty="0"/>
-              <a:t>Generators can “delegate” control to another iterator, where the generator iterator continues to iterate, but control passes to the other generator (and eventually back to the original generator when complete)</a:t>
+              <a:t>Generators can “delegate” control to another iterator, where </a:t>
+            </a:r>
+            <a:r>
+              <a:rPr lang="en-US" dirty="0" smtClean="0"/>
+              <a:t>you continue </a:t>
+            </a:r>
+            <a:r>
+              <a:rPr lang="en-US" dirty="0"/>
+              <a:t>to iterate, but control passes to the other generator (and eventually back to the original generator when complete)</a:t>
             </a:r>
             <a:r>
               <a:rPr lang="en-US" dirty="0" smtClean="0"/>
               <a:t>.</a:t>
             </a:r>
           </a:p>
+          <a:p>
+            <a:pPr lvl="1"/>
+            <a:r>
+              <a:rPr lang="en-US" dirty="0" smtClean="0"/>
+              <a:t>Fancy speak for: Using </a:t>
+            </a:r>
+            <a:r>
+              <a:rPr lang="en-US" dirty="0" smtClean="0">
+                <a:latin typeface="Courier"/>
+                <a:cs typeface="Courier"/>
+              </a:rPr>
+              <a:t>yield*</a:t>
+            </a:r>
+            <a:r>
+              <a:rPr lang="en-US" dirty="0" smtClean="0"/>
+              <a:t>, you can call another generator function that itself will yield results to the original iterator.</a:t>
+            </a:r>
+          </a:p>
+        </p:txBody>
+      </p:sp>
+    </p:spTree>
+    <p:extLst>
+      <p:ext uri="{BB962C8B-B14F-4D97-AF65-F5344CB8AC3E}">
+        <p14:creationId xmlns:p14="http://schemas.microsoft.com/office/powerpoint/2010/main" val="202541741"/>
+      </p:ext>
+    </p:extLst>
+  </p:cSld>
+  <p:clrMapOvr>
+    <a:masterClrMapping/>
+  </p:clrMapOvr>
+  <p:timing>
+    <p:tnLst>
+      <p:par>
+        <p:cTn xmlns:p14="http://schemas.microsoft.com/office/powerpoint/2010/main" id="1" dur="indefinite" restart="never" nodeType="tmRoot">
+          <p:childTnLst>
+            <p:seq concurrent="1" nextAc="seek">
+              <p:cTn id="2" dur="indefinite" nodeType="mainSeq">
+                <p:childTnLst>
+                  <p:par>
+                    <p:cTn id="3" fill="hold">
+                      <p:stCondLst>
+                        <p:cond delay="indefinite"/>
+                      </p:stCondLst>
+                      <p:childTnLst>
+                        <p:par>
+                          <p:cTn id="4" fill="hold">
+                            <p:stCondLst>
+                              <p:cond delay="0"/>
+                            </p:stCondLst>
+                            <p:childTnLst>
+                              <p:par>
+                                <p:cTn id="5" presetID="1" presetClass="entr" presetSubtype="0" fill="hold" nodeType="clickEffect">
+                                  <p:stCondLst>
+                                    <p:cond delay="0"/>
+                                  </p:stCondLst>
+                                  <p:childTnLst>
+                                    <p:set>
+                                      <p:cBhvr>
+                                        <p:cTn id="6" dur="1" fill="hold">
+                                          <p:stCondLst>
+                                            <p:cond delay="0"/>
+                                          </p:stCondLst>
+                                        </p:cTn>
+                                        <p:tgtEl>
+                                          <p:spTgt spid="3">
+                                            <p:txEl>
+                                              <p:pRg st="0" end="0"/>
+                                            </p:txEl>
+                                          </p:spTgt>
+                                        </p:tgtEl>
+                                        <p:attrNameLst>
+                                          <p:attrName>style.visibility</p:attrName>
+                                        </p:attrNameLst>
+                                      </p:cBhvr>
+                                      <p:to>
+                                        <p:strVal val="visible"/>
+                                      </p:to>
+                                    </p:set>
+                                  </p:childTnLst>
+                                </p:cTn>
+                              </p:par>
+                            </p:childTnLst>
+                          </p:cTn>
+                        </p:par>
+                      </p:childTnLst>
+                    </p:cTn>
+                  </p:par>
+                  <p:par>
+                    <p:cTn id="7" fill="hold">
+                      <p:stCondLst>
+                        <p:cond delay="indefinite"/>
+                      </p:stCondLst>
+                      <p:childTnLst>
+                        <p:par>
+                          <p:cTn id="8" fill="hold">
+                            <p:stCondLst>
+                              <p:cond delay="0"/>
+                            </p:stCondLst>
+                            <p:childTnLst>
+                              <p:par>
+                                <p:cTn id="9" presetID="1" presetClass="entr" presetSubtype="0" fill="hold" nodeType="clickEffect">
+                                  <p:stCondLst>
+                                    <p:cond delay="0"/>
+                                  </p:stCondLst>
+                                  <p:childTnLst>
+                                    <p:set>
+                                      <p:cBhvr>
+                                        <p:cTn id="10" dur="1" fill="hold">
+                                          <p:stCondLst>
+                                            <p:cond delay="0"/>
+                                          </p:stCondLst>
+                                        </p:cTn>
+                                        <p:tgtEl>
+                                          <p:spTgt spid="3">
+                                            <p:txEl>
+                                              <p:pRg st="1" end="1"/>
+                                            </p:txEl>
+                                          </p:spTgt>
+                                        </p:tgtEl>
+                                        <p:attrNameLst>
+                                          <p:attrName>style.visibility</p:attrName>
+                                        </p:attrNameLst>
+                                      </p:cBhvr>
+                                      <p:to>
+                                        <p:strVal val="visible"/>
+                                      </p:to>
+                                    </p:set>
+                                  </p:childTnLst>
+                                </p:cTn>
+                              </p:par>
+                            </p:childTnLst>
+                          </p:cTn>
+                        </p:par>
+                      </p:childTnLst>
+                    </p:cTn>
+                  </p:par>
+                </p:childTnLst>
+              </p:cTn>
+              <p:prevCondLst>
+                <p:cond evt="onPrev" delay="0">
+                  <p:tgtEl>
+                    <p:sldTgt/>
+                  </p:tgtEl>
+                </p:cond>
+              </p:prevCondLst>
+              <p:nextCondLst>
+                <p:cond evt="onNext" delay="0">
+                  <p:tgtEl>
+                    <p:sldTgt/>
+                  </p:tgtEl>
+                </p:cond>
+              </p:nextCondLst>
+            </p:seq>
+          </p:childTnLst>
+        </p:cTn>
+      </p:par>
+    </p:tnLst>
+  </p:timing>
+</p:sld>
+</file>
+
+<file path=ppt/slides/slide34.xml><?xml version="1.0" encoding="utf-8"?>
+<p:sld xmlns:a="http://schemas.openxmlformats.org/drawingml/2006/main" xmlns:r="http://schemas.openxmlformats.org/officeDocument/2006/relationships" xmlns:p="http://schemas.openxmlformats.org/presentationml/2006/main">
+  <p:cSld>
+    <p:spTree>
+      <p:nvGrpSpPr>
+        <p:cNvPr id="1" name=""/>
+        <p:cNvGrpSpPr/>
+        <p:nvPr/>
+      </p:nvGrpSpPr>
+      <p:grpSpPr>
+        <a:xfrm>
+          <a:off x="0" y="0"/>
+          <a:ext cx="0" cy="0"/>
+          <a:chOff x="0" y="0"/>
+          <a:chExt cx="0" cy="0"/>
+        </a:xfrm>
+      </p:grpSpPr>
+      <p:sp>
+        <p:nvSpPr>
+          <p:cNvPr id="2" name="Title 1"/>
+          <p:cNvSpPr>
+            <a:spLocks noGrp="1"/>
+          </p:cNvSpPr>
+          <p:nvPr>
+            <p:ph type="title"/>
+          </p:nvPr>
+        </p:nvSpPr>
+        <p:spPr/>
+        <p:txBody>
+          <a:bodyPr/>
+          <a:lstStyle/>
+          <a:p>
+            <a:r>
+              <a:rPr lang="en-US" dirty="0" smtClean="0"/>
+              <a:t>Generators – </a:t>
+            </a:r>
+            <a:r>
+              <a:rPr lang="en-US" dirty="0" err="1" smtClean="0"/>
+              <a:t>Async</a:t>
+            </a:r>
+            <a:r>
+              <a:rPr lang="en-US" dirty="0" smtClean="0"/>
+              <a:t> Example</a:t>
+            </a:r>
+            <a:endParaRPr lang="en-US" dirty="0"/>
+          </a:p>
+        </p:txBody>
+      </p:sp>
+      <p:sp>
+        <p:nvSpPr>
+          <p:cNvPr id="3" name="Content Placeholder 2"/>
+          <p:cNvSpPr>
+            <a:spLocks noGrp="1"/>
+          </p:cNvSpPr>
+          <p:nvPr>
+            <p:ph idx="1"/>
+          </p:nvPr>
+        </p:nvSpPr>
+        <p:spPr>
+          <a:xfrm>
+            <a:off x="457200" y="1622286"/>
+            <a:ext cx="7620000" cy="4584149"/>
+          </a:xfrm>
+        </p:spPr>
+        <p:txBody>
+          <a:bodyPr>
+            <a:normAutofit/>
+          </a:bodyPr>
+          <a:lstStyle/>
           <a:p>
             <a:pPr marL="342900" lvl="1">
               <a:buClr>
@@ -15916,47 +16226,109 @@
             </a:pPr>
             <a:r>
               <a:rPr lang="en-US" sz="2200" dirty="0" smtClean="0"/>
-              <a:t>By using a generator iterator we can start a function that will make an async call, and then use the same iterator to return the result of the operation back to the calling function.</a:t>
-            </a:r>
+              <a:t>We can iterate through a generator </a:t>
+            </a:r>
+            <a:r>
+              <a:rPr lang="en-US" sz="2200" dirty="0"/>
+              <a:t>function that </a:t>
+            </a:r>
+            <a:r>
+              <a:rPr lang="en-US" sz="2200" dirty="0" smtClean="0"/>
+              <a:t>makes an </a:t>
+            </a:r>
+            <a:r>
+              <a:rPr lang="en-US" sz="2200" dirty="0" err="1"/>
+              <a:t>async</a:t>
+            </a:r>
+            <a:r>
+              <a:rPr lang="en-US" sz="2200" dirty="0"/>
+              <a:t> call, and then use the same iterator to return the </a:t>
+            </a:r>
+            <a:r>
+              <a:rPr lang="en-US" sz="2200" dirty="0" err="1" smtClean="0"/>
+              <a:t>async</a:t>
+            </a:r>
+            <a:r>
+              <a:rPr lang="en-US" sz="2200" dirty="0" smtClean="0"/>
+              <a:t> result back </a:t>
+            </a:r>
+            <a:r>
+              <a:rPr lang="en-US" sz="2200" dirty="0"/>
+              <a:t>to the </a:t>
+            </a:r>
+            <a:r>
+              <a:rPr lang="en-US" sz="2200" dirty="0" smtClean="0"/>
+              <a:t>generator function.</a:t>
+            </a:r>
+            <a:endParaRPr lang="en-US" sz="3200" dirty="0" smtClean="0"/>
+          </a:p>
+          <a:p>
+            <a:pPr marL="114300" indent="0" algn="ctr">
+              <a:buNone/>
+            </a:pPr>
+            <a:r>
+              <a:rPr lang="en-US" sz="3200" dirty="0" smtClean="0">
+                <a:solidFill>
+                  <a:srgbClr val="FF0000"/>
+                </a:solidFill>
+              </a:rPr>
+              <a:t>SURPRISE!</a:t>
+            </a:r>
+          </a:p>
+          <a:p>
+            <a:pPr marL="114300" indent="0" algn="ctr">
+              <a:buNone/>
+            </a:pPr>
+            <a:r>
+              <a:rPr lang="en-US" dirty="0" smtClean="0"/>
+              <a:t>It turns out, we can use generators and promises to simulate </a:t>
+            </a:r>
+            <a:r>
+              <a:rPr lang="en-US" dirty="0" err="1" smtClean="0"/>
+              <a:t>async</a:t>
+            </a:r>
+            <a:r>
+              <a:rPr lang="en-US" dirty="0" smtClean="0"/>
+              <a:t>/await.</a:t>
+            </a:r>
+          </a:p>
+          <a:p>
+            <a:pPr marL="114300" indent="0" algn="ctr">
+              <a:buNone/>
+            </a:pPr>
             <a:endParaRPr lang="en-US" dirty="0"/>
           </a:p>
+          <a:p>
+            <a:pPr marL="114300" indent="0" algn="ctr">
+              <a:buNone/>
+            </a:pPr>
+            <a:r>
+              <a:rPr lang="en-US" sz="1800" dirty="0" smtClean="0"/>
+              <a:t>(Sure, we have </a:t>
+            </a:r>
+            <a:r>
+              <a:rPr lang="en-US" sz="1800" dirty="0" err="1" smtClean="0"/>
+              <a:t>async</a:t>
+            </a:r>
+            <a:r>
+              <a:rPr lang="en-US" sz="1800" dirty="0" smtClean="0"/>
+              <a:t>/await with </a:t>
+            </a:r>
+            <a:r>
+              <a:rPr lang="en-US" sz="1800" dirty="0" err="1" smtClean="0"/>
+              <a:t>Traceur</a:t>
+            </a:r>
+            <a:r>
+              <a:rPr lang="en-US" sz="1800" dirty="0" smtClean="0"/>
+              <a:t>, but it’s nice to understand how it works.)</a:t>
+            </a:r>
+          </a:p>
         </p:txBody>
       </p:sp>
-      <p:pic>
-        <p:nvPicPr>
-          <p:cNvPr id="4" name="Content Placeholder 3" descr="jen_lawrence.gif"/>
-          <p:cNvPicPr>
-            <a:picLocks noChangeAspect="1"/>
-          </p:cNvPicPr>
-          <p:nvPr/>
-        </p:nvPicPr>
-        <p:blipFill>
-          <a:blip r:embed="rId3">
-            <a:extLst>
-              <a:ext uri="{28A0092B-C50C-407E-A947-70E740481C1C}">
-                <a14:useLocalDpi xmlns:a14="http://schemas.microsoft.com/office/drawing/2010/main" val="0"/>
-              </a:ext>
-            </a:extLst>
-          </a:blip>
-          <a:srcRect l="-42323" r="-42323"/>
-          <a:stretch>
-            <a:fillRect/>
-          </a:stretch>
-        </p:blipFill>
-        <p:spPr>
-          <a:xfrm>
-            <a:off x="2672522" y="4320286"/>
-            <a:ext cx="3074522" cy="1936949"/>
-          </a:xfrm>
-          <a:prstGeom prst="rect">
-            <a:avLst/>
-          </a:prstGeom>
-        </p:spPr>
-      </p:pic>
     </p:spTree>
     <p:extLst>
       <p:ext uri="{BB962C8B-B14F-4D97-AF65-F5344CB8AC3E}">
-        <p14:creationId xmlns:p14="http://schemas.microsoft.com/office/powerpoint/2010/main" val="202541741"/>
+        <p14:creationId xmlns:p14="http://schemas.microsoft.com/office/powerpoint/2010/main" val="1596391628"/>
       </p:ext>
     </p:extLst>
   </p:cSld>
@@ -16095,221 +16467,9 @@
                                           </p:stCondLst>
                                         </p:cTn>
                                         <p:tgtEl>
-                                          <p:spTgt spid="4"/>
-                                        </p:tgtEl>
-                                        <p:attrNameLst>
-                                          <p:attrName>style.visibility</p:attrName>
-                                        </p:attrNameLst>
-                                      </p:cBhvr>
-                                      <p:to>
-                                        <p:strVal val="visible"/>
-                                      </p:to>
-                                    </p:set>
-                                  </p:childTnLst>
-                                </p:cTn>
-                              </p:par>
-                            </p:childTnLst>
-                          </p:cTn>
-                        </p:par>
-                      </p:childTnLst>
-                    </p:cTn>
-                  </p:par>
-                </p:childTnLst>
-              </p:cTn>
-              <p:prevCondLst>
-                <p:cond evt="onPrev" delay="0">
-                  <p:tgtEl>
-                    <p:sldTgt/>
-                  </p:tgtEl>
-                </p:cond>
-              </p:prevCondLst>
-              <p:nextCondLst>
-                <p:cond evt="onNext" delay="0">
-                  <p:tgtEl>
-                    <p:sldTgt/>
-                  </p:tgtEl>
-                </p:cond>
-              </p:nextCondLst>
-            </p:seq>
-          </p:childTnLst>
-        </p:cTn>
-      </p:par>
-    </p:tnLst>
-  </p:timing>
-</p:sld>
-</file>
-
-<file path=ppt/slides/slide34.xml><?xml version="1.0" encoding="utf-8"?>
-<p:sld xmlns:a="http://schemas.openxmlformats.org/drawingml/2006/main" xmlns:r="http://schemas.openxmlformats.org/officeDocument/2006/relationships" xmlns:p="http://schemas.openxmlformats.org/presentationml/2006/main">
-  <p:cSld>
-    <p:spTree>
-      <p:nvGrpSpPr>
-        <p:cNvPr id="1" name=""/>
-        <p:cNvGrpSpPr/>
-        <p:nvPr/>
-      </p:nvGrpSpPr>
-      <p:grpSpPr>
-        <a:xfrm>
-          <a:off x="0" y="0"/>
-          <a:ext cx="0" cy="0"/>
-          <a:chOff x="0" y="0"/>
-          <a:chExt cx="0" cy="0"/>
-        </a:xfrm>
-      </p:grpSpPr>
-      <p:sp>
-        <p:nvSpPr>
-          <p:cNvPr id="2" name="Title 1"/>
-          <p:cNvSpPr>
-            <a:spLocks noGrp="1"/>
-          </p:cNvSpPr>
-          <p:nvPr>
-            <p:ph type="title"/>
-          </p:nvPr>
-        </p:nvSpPr>
-        <p:spPr/>
-        <p:txBody>
-          <a:bodyPr/>
-          <a:lstStyle/>
-          <a:p>
-            <a:r>
-              <a:rPr lang="en-US" dirty="0" smtClean="0"/>
-              <a:t>Generators</a:t>
-            </a:r>
-            <a:endParaRPr lang="en-US" dirty="0"/>
-          </a:p>
-        </p:txBody>
-      </p:sp>
-      <p:sp>
-        <p:nvSpPr>
-          <p:cNvPr id="3" name="Content Placeholder 2"/>
-          <p:cNvSpPr>
-            <a:spLocks noGrp="1"/>
-          </p:cNvSpPr>
-          <p:nvPr>
-            <p:ph idx="1"/>
-          </p:nvPr>
-        </p:nvSpPr>
-        <p:spPr>
-          <a:xfrm>
-            <a:off x="457200" y="1622286"/>
-            <a:ext cx="7620000" cy="4584149"/>
-          </a:xfrm>
-        </p:spPr>
-        <p:txBody>
-          <a:bodyPr>
-            <a:normAutofit/>
-          </a:bodyPr>
-          <a:lstStyle/>
-          <a:p>
-            <a:pPr marL="114300" indent="0" algn="ctr">
-              <a:buNone/>
-            </a:pPr>
-            <a:r>
-              <a:rPr lang="en-US" sz="3200" dirty="0" smtClean="0">
-                <a:solidFill>
-                  <a:srgbClr val="FF0000"/>
-                </a:solidFill>
-              </a:rPr>
-              <a:t>SURPRISE!</a:t>
-            </a:r>
-          </a:p>
-          <a:p>
-            <a:pPr marL="114300" indent="0" algn="ctr">
-              <a:buNone/>
-            </a:pPr>
-            <a:r>
-              <a:rPr lang="en-US" dirty="0" smtClean="0"/>
-              <a:t>It turns out, we can use generators and promises to simulate </a:t>
-            </a:r>
-            <a:r>
-              <a:rPr lang="en-US" dirty="0" err="1" smtClean="0"/>
-              <a:t>async</a:t>
-            </a:r>
-            <a:r>
-              <a:rPr lang="en-US" dirty="0" smtClean="0"/>
-              <a:t>/await.</a:t>
-            </a:r>
-          </a:p>
-          <a:p>
-            <a:pPr marL="114300" indent="0" algn="ctr">
-              <a:buNone/>
-            </a:pPr>
-            <a:endParaRPr lang="en-US" dirty="0"/>
-          </a:p>
-          <a:p>
-            <a:pPr marL="114300" indent="0" algn="ctr">
-              <a:buNone/>
-            </a:pPr>
-            <a:r>
-              <a:rPr lang="en-US" sz="1800" dirty="0" smtClean="0"/>
-              <a:t>(Sure, we have </a:t>
-            </a:r>
-            <a:r>
-              <a:rPr lang="en-US" sz="1800" dirty="0" err="1" smtClean="0"/>
-              <a:t>async</a:t>
-            </a:r>
-            <a:r>
-              <a:rPr lang="en-US" sz="1800" dirty="0" smtClean="0"/>
-              <a:t>/await with </a:t>
-            </a:r>
-            <a:r>
-              <a:rPr lang="en-US" sz="1800" dirty="0" err="1" smtClean="0"/>
-              <a:t>Traceur</a:t>
-            </a:r>
-            <a:r>
-              <a:rPr lang="en-US" sz="1800" dirty="0" smtClean="0"/>
-              <a:t>, but it’s nice to understand how it works.)</a:t>
-            </a:r>
-          </a:p>
-        </p:txBody>
-      </p:sp>
-    </p:spTree>
-    <p:extLst>
-      <p:ext uri="{BB962C8B-B14F-4D97-AF65-F5344CB8AC3E}">
-        <p14:creationId xmlns:p14="http://schemas.microsoft.com/office/powerpoint/2010/main" val="1596391628"/>
-      </p:ext>
-    </p:extLst>
-  </p:cSld>
-  <p:clrMapOvr>
-    <a:masterClrMapping/>
-  </p:clrMapOvr>
-  <p:timing>
-    <p:tnLst>
-      <p:par>
-        <p:cTn xmlns:p14="http://schemas.microsoft.com/office/powerpoint/2010/main" id="1" dur="indefinite" restart="never" nodeType="tmRoot">
-          <p:childTnLst>
-            <p:seq concurrent="1" nextAc="seek">
-              <p:cTn id="2" dur="indefinite" nodeType="mainSeq">
-                <p:childTnLst>
-                  <p:par>
-                    <p:cTn id="3" fill="hold">
-                      <p:stCondLst>
-                        <p:cond delay="indefinite"/>
-                      </p:stCondLst>
-                      <p:childTnLst>
-                        <p:par>
-                          <p:cTn id="4" fill="hold">
-                            <p:stCondLst>
-                              <p:cond delay="0"/>
-                            </p:stCondLst>
-                            <p:childTnLst>
-                              <p:par>
-                                <p:cTn id="5" presetID="1" presetClass="entr" presetSubtype="0" fill="hold" nodeType="clickEffect">
-                                  <p:stCondLst>
-                                    <p:cond delay="0"/>
-                                  </p:stCondLst>
-                                  <p:childTnLst>
-                                    <p:set>
-                                      <p:cBhvr>
-                                        <p:cTn id="6" dur="1" fill="hold">
-                                          <p:stCondLst>
-                                            <p:cond delay="0"/>
-                                          </p:stCondLst>
-                                        </p:cTn>
-                                        <p:tgtEl>
                                           <p:spTgt spid="3">
                                             <p:txEl>
-                                              <p:pRg st="1" end="1"/>
+                                              <p:pRg st="2" end="2"/>
                                             </p:txEl>
                                           </p:spTgt>
                                         </p:tgtEl>
@@ -16331,26 +16491,26 @@
                     </p:cTn>
                   </p:par>
                   <p:par>
-                    <p:cTn id="7" fill="hold">
+                    <p:cTn id="15" fill="hold">
                       <p:stCondLst>
                         <p:cond delay="indefinite"/>
                       </p:stCondLst>
                       <p:childTnLst>
                         <p:par>
-                          <p:cTn id="8" fill="hold">
+                          <p:cTn id="16" fill="hold">
                             <p:stCondLst>
                               <p:cond delay="0"/>
                             </p:stCondLst>
                             <p:childTnLst>
                               <p:par>
-                                <p:cTn id="9" presetID="1" presetClass="entr" presetSubtype="0" fill="hold" nodeType="clickEffect">
+                                <p:cTn id="17" presetID="1" presetClass="entr" presetSubtype="0" fill="hold" nodeType="clickEffect">
                                   <p:stCondLst>
                                     <p:cond delay="0"/>
                                   </p:stCondLst>
                                   <p:childTnLst>
                                     <p:set>
                                       <p:cBhvr>
-                                        <p:cTn id="10" dur="1" fill="hold">
+                                        <p:cTn id="18" dur="1" fill="hold">
                                           <p:stCondLst>
                                             <p:cond delay="0"/>
                                           </p:stCondLst>
@@ -16358,7 +16518,7 @@
                                         <p:tgtEl>
                                           <p:spTgt spid="3">
                                             <p:txEl>
-                                              <p:pRg st="3" end="3"/>
+                                              <p:pRg st="4" end="4"/>
                                             </p:txEl>
                                           </p:spTgt>
                                         </p:tgtEl>
@@ -16550,8 +16710,32 @@
             </a:r>
             <a:r>
               <a:rPr lang="en-US" dirty="0" smtClean="0"/>
-              <a:t> signals that the asynchronous work has completed.</a:t>
-            </a:r>
+              <a:t> signals that the asynchronous work has completed</a:t>
+            </a:r>
+            <a:r>
+              <a:rPr lang="en-US" dirty="0" smtClean="0"/>
+              <a:t>.</a:t>
+            </a:r>
+          </a:p>
+          <a:p>
+            <a:pPr lvl="1"/>
+            <a:r>
+              <a:rPr lang="en-US" dirty="0" smtClean="0"/>
+              <a:t>By default, Jasmine waits 5 seconds for an </a:t>
+            </a:r>
+            <a:r>
+              <a:rPr lang="en-US" dirty="0" err="1" smtClean="0"/>
+              <a:t>async</a:t>
+            </a:r>
+            <a:r>
+              <a:rPr lang="en-US" dirty="0" smtClean="0"/>
+              <a:t> call to complete or for done to </a:t>
+            </a:r>
+            <a:r>
+              <a:rPr lang="en-US" smtClean="0"/>
+              <a:t>be called.</a:t>
+            </a:r>
+            <a:endParaRPr lang="en-US" dirty="0" smtClean="0"/>
           </a:p>
           <a:p>
             <a:r>
@@ -16806,15 +16990,33 @@
                                   </p:childTnLst>
                                 </p:cTn>
                               </p:par>
+                            </p:childTnLst>
+                          </p:cTn>
+                        </p:par>
+                      </p:childTnLst>
+                    </p:cTn>
+                  </p:par>
+                  <p:par>
+                    <p:cTn id="19" fill="hold">
+                      <p:stCondLst>
+                        <p:cond delay="indefinite"/>
+                      </p:stCondLst>
+                      <p:childTnLst>
+                        <p:par>
+                          <p:cTn id="20" fill="hold">
+                            <p:stCondLst>
+                              <p:cond delay="0"/>
+                            </p:stCondLst>
+                            <p:childTnLst>
                               <p:par>
-                                <p:cTn id="19" presetID="1" presetClass="entr" presetSubtype="0" fill="hold" nodeType="withEffect">
+                                <p:cTn id="21" presetID="1" presetClass="entr" presetSubtype="0" fill="hold" nodeType="clickEffect">
                                   <p:stCondLst>
                                     <p:cond delay="0"/>
                                   </p:stCondLst>
                                   <p:childTnLst>
                                     <p:set>
                                       <p:cBhvr>
-                                        <p:cTn id="20" dur="1" fill="hold">
+                                        <p:cTn id="22" dur="1" fill="hold">
                                           <p:stCondLst>
                                             <p:cond delay="0"/>
                                           </p:stCondLst>
@@ -16838,14 +17040,14 @@
                                 </p:cTn>
                               </p:par>
                               <p:par>
-                                <p:cTn id="21" presetID="1" presetClass="entr" presetSubtype="0" fill="hold" nodeType="withEffect">
+                                <p:cTn id="23" presetID="1" presetClass="entr" presetSubtype="0" fill="hold" nodeType="withEffect">
                                   <p:stCondLst>
                                     <p:cond delay="0"/>
                                   </p:stCondLst>
                                   <p:childTnLst>
                                     <p:set>
                                       <p:cBhvr>
-                                        <p:cTn id="22" dur="1" fill="hold">
+                                        <p:cTn id="24" dur="1" fill="hold">
                                           <p:stCondLst>
                                             <p:cond delay="0"/>
                                           </p:stCondLst>
@@ -16854,6 +17056,37 @@
                                           <p:spTgt spid="3">
                                             <p:txEl>
                                               <p:pRg st="6" end="6"/>
+                                            </p:txEl>
+                                          </p:spTgt>
+                                        </p:tgtEl>
+                                        <p:attrNameLst>
+                                          <p:attrName>style.visibility</p:attrName>
+                                        </p:attrNameLst>
+                                      </p:cBhvr>
+                                      <p:to>
+                                        <p:strVal val="visible"/>
+                                      </p:to>
+                                    </p:set>
+                                  </p:childTnLst>
+                                </p:cTn>
+                              </p:par>
+                              <p:par>
+                                <p:cTn id="25" presetID="1" presetClass="entr" presetSubtype="0" fill="hold" nodeType="withEffect">
+                                  <p:stCondLst>
+                                    <p:cond delay="0"/>
+                                  </p:stCondLst>
+                                  <p:childTnLst>
+                                    <p:set>
+                                      <p:cBhvr>
+                                        <p:cTn id="26" dur="1" fill="hold">
+                                          <p:stCondLst>
+                                            <p:cond delay="0"/>
+                                          </p:stCondLst>
+                                        </p:cTn>
+                                        <p:tgtEl>
+                                          <p:spTgt spid="3">
+                                            <p:txEl>
+                                              <p:pRg st="7" end="7"/>
                                             </p:txEl>
                                           </p:spTgt>
                                         </p:tgtEl>
@@ -17269,7 +17502,14 @@
                 <a:latin typeface="Courier"/>
                 <a:cs typeface="Courier"/>
               </a:rPr>
-              <a:t> ,‘save’</a:t>
+              <a:t>, ‘</a:t>
+            </a:r>
+            <a:r>
+              <a:rPr lang="en-US" dirty="0" smtClean="0">
+                <a:latin typeface="Courier"/>
+                <a:cs typeface="Courier"/>
+              </a:rPr>
+              <a:t>save’</a:t>
             </a:r>
             <a:r>
               <a:rPr lang="en-US" dirty="0">
@@ -17723,15 +17963,11 @@
             <a:pPr lvl="1"/>
             <a:r>
               <a:rPr lang="en-US" dirty="0" smtClean="0"/>
-              <a:t>Mocha: can be used to make </a:t>
-            </a:r>
-            <a:r>
-              <a:rPr lang="en-US" dirty="0" smtClean="0"/>
-              <a:t>a test fail where a promise </a:t>
-            </a:r>
-            <a:r>
-              <a:rPr lang="en-US" smtClean="0"/>
-              <a:t>is rejected. </a:t>
+              <a:t>Mocha: can be used to make a test fail where a promise is </a:t>
+            </a:r>
+            <a:r>
+              <a:rPr lang="en-US" dirty="0" smtClean="0"/>
+              <a:t>rejected – if you test returns a rejected promise, the test automatically fails. </a:t>
             </a:r>
             <a:r>
               <a:rPr lang="en-US" dirty="0" smtClean="0"/>
@@ -17745,12 +17981,26 @@
               <a:t>Chai-as-promised: Allows for cleaner assertions with </a:t>
             </a:r>
             <a:r>
-              <a:rPr lang="en-US" dirty="0" err="1" smtClean="0"/>
-              <a:t>to.eventually.equal</a:t>
-            </a:r>
-            <a:r>
-              <a:rPr lang="en-US" dirty="0" smtClean="0"/>
-              <a:t> rather than using </a:t>
+              <a:rPr lang="en-US" dirty="0" err="1" smtClean="0">
+                <a:latin typeface="Courier"/>
+                <a:cs typeface="Courier"/>
+              </a:rPr>
+              <a:t>should</a:t>
+            </a:r>
+            <a:r>
+              <a:rPr lang="en-US" dirty="0" err="1" smtClean="0">
+                <a:latin typeface="Courier"/>
+                <a:cs typeface="Courier"/>
+              </a:rPr>
+              <a:t>.eventually.equal</a:t>
+            </a:r>
+            <a:r>
+              <a:rPr lang="en-US" dirty="0" smtClean="0"/>
+              <a:t> </a:t>
+            </a:r>
+            <a:r>
+              <a:rPr lang="en-US" dirty="0" smtClean="0"/>
+              <a:t>rather than using </a:t>
             </a:r>
             <a:r>
               <a:rPr lang="en-US" dirty="0" smtClean="0">
@@ -20280,14 +20530,7 @@
                 <a:latin typeface="Courier"/>
                 <a:cs typeface="Courier"/>
               </a:rPr>
-              <a:t>000</a:t>
-            </a:r>
-            <a:r>
-              <a:rPr lang="en-US" sz="1600" dirty="0" smtClean="0">
-                <a:latin typeface="Courier"/>
-                <a:cs typeface="Courier"/>
-              </a:rPr>
-              <a:t>);</a:t>
+              <a:t>000);</a:t>
             </a:r>
             <a:endParaRPr lang="en-US" sz="1600" dirty="0">
               <a:latin typeface="Courier"/>
@@ -23604,17 +23847,7 @@
                 <a:latin typeface="Courier"/>
                 <a:cs typeface="Courier"/>
               </a:rPr>
-              <a:t>000</a:t>
-            </a:r>
-            <a:r>
-              <a:rPr lang="en-US" sz="1600" dirty="0" smtClean="0">
-                <a:solidFill>
-                  <a:srgbClr val="BFBFBF"/>
-                </a:solidFill>
-                <a:latin typeface="Courier"/>
-                <a:cs typeface="Courier"/>
-              </a:rPr>
-              <a:t>);</a:t>
+              <a:t>000);</a:t>
             </a:r>
             <a:endParaRPr lang="en-US" sz="1600" dirty="0">
               <a:solidFill>
@@ -25737,23 +25970,23 @@
           <a:p>
             <a:r>
               <a:rPr lang="en-US" dirty="0"/>
-              <a:t>Promises, which are new in </a:t>
-            </a:r>
-            <a:r>
-              <a:rPr lang="en-US" strike="sngStrike" dirty="0"/>
-              <a:t>ES6</a:t>
+              <a:t>Promises, which are new </a:t>
+            </a:r>
+            <a:r>
+              <a:rPr lang="en-US"/>
+              <a:t>in </a:t>
+            </a:r>
+            <a:r>
+              <a:rPr lang="en-US" smtClean="0"/>
+              <a:t>ECMAScript</a:t>
+            </a:r>
+            <a:r>
+              <a:rPr lang="en-US" dirty="0" smtClean="0"/>
+              <a:t> </a:t>
             </a:r>
             <a:r>
               <a:rPr lang="en-US" dirty="0"/>
-              <a:t> </a:t>
-            </a:r>
-            <a:r>
-              <a:rPr lang="en-US" strike="sngStrike" dirty="0"/>
-              <a:t>JavaScript 2015</a:t>
-            </a:r>
-            <a:r>
-              <a:rPr lang="en-US" dirty="0"/>
-              <a:t> ECMAScript 2015, are created to help solve these problems</a:t>
+              <a:t>2015, are created to help solve these problems</a:t>
             </a:r>
             <a:r>
               <a:rPr lang="en-US" dirty="0" smtClean="0"/>

</xml_diff>

<commit_message>
Adding numbers to slides.
</commit_message>
<xml_diff>
--- a/Async_Discussion_9_29_15.pptx
+++ b/Async_Discussion_9_29_15.pptx
@@ -7,6 +7,9 @@
   <p:notesMasterIdLst>
     <p:notesMasterId r:id="rId41"/>
   </p:notesMasterIdLst>
+  <p:handoutMasterIdLst>
+    <p:handoutMasterId r:id="rId42"/>
+  </p:handoutMasterIdLst>
   <p:sldIdLst>
     <p:sldId id="256" r:id="rId2"/>
     <p:sldId id="257" r:id="rId3"/>
@@ -197,6 +200,172 @@
 </p:presentation>
 </file>
 
+<file path=ppt/handoutMasters/handoutMaster1.xml><?xml version="1.0" encoding="utf-8"?>
+<p:handoutMaster xmlns:a="http://schemas.openxmlformats.org/drawingml/2006/main" xmlns:r="http://schemas.openxmlformats.org/officeDocument/2006/relationships" xmlns:p="http://schemas.openxmlformats.org/presentationml/2006/main">
+  <p:cSld>
+    <p:bg>
+      <p:bgRef idx="1001">
+        <a:schemeClr val="bg1"/>
+      </p:bgRef>
+    </p:bg>
+    <p:spTree>
+      <p:nvGrpSpPr>
+        <p:cNvPr id="1" name=""/>
+        <p:cNvGrpSpPr/>
+        <p:nvPr/>
+      </p:nvGrpSpPr>
+      <p:grpSpPr>
+        <a:xfrm>
+          <a:off x="0" y="0"/>
+          <a:ext cx="0" cy="0"/>
+          <a:chOff x="0" y="0"/>
+          <a:chExt cx="0" cy="0"/>
+        </a:xfrm>
+      </p:grpSpPr>
+      <p:sp>
+        <p:nvSpPr>
+          <p:cNvPr id="2" name="Header Placeholder 1"/>
+          <p:cNvSpPr>
+            <a:spLocks noGrp="1"/>
+          </p:cNvSpPr>
+          <p:nvPr>
+            <p:ph type="hdr" sz="quarter"/>
+          </p:nvPr>
+        </p:nvSpPr>
+        <p:spPr>
+          <a:xfrm>
+            <a:off x="0" y="0"/>
+            <a:ext cx="2971800" cy="457200"/>
+          </a:xfrm>
+          <a:prstGeom prst="rect">
+            <a:avLst/>
+          </a:prstGeom>
+        </p:spPr>
+        <p:txBody>
+          <a:bodyPr vert="horz" lIns="91440" tIns="45720" rIns="91440" bIns="45720" rtlCol="0"/>
+          <a:lstStyle>
+            <a:lvl1pPr algn="l">
+              <a:defRPr sz="1200"/>
+            </a:lvl1pPr>
+          </a:lstStyle>
+          <a:p>
+            <a:endParaRPr lang="en-US"/>
+          </a:p>
+        </p:txBody>
+      </p:sp>
+      <p:sp>
+        <p:nvSpPr>
+          <p:cNvPr id="3" name="Date Placeholder 2"/>
+          <p:cNvSpPr>
+            <a:spLocks noGrp="1"/>
+          </p:cNvSpPr>
+          <p:nvPr>
+            <p:ph type="dt" sz="quarter" idx="1"/>
+          </p:nvPr>
+        </p:nvSpPr>
+        <p:spPr>
+          <a:xfrm>
+            <a:off x="3884613" y="0"/>
+            <a:ext cx="2971800" cy="457200"/>
+          </a:xfrm>
+          <a:prstGeom prst="rect">
+            <a:avLst/>
+          </a:prstGeom>
+        </p:spPr>
+        <p:txBody>
+          <a:bodyPr vert="horz" lIns="91440" tIns="45720" rIns="91440" bIns="45720" rtlCol="0"/>
+          <a:lstStyle>
+            <a:lvl1pPr algn="r">
+              <a:defRPr sz="1200"/>
+            </a:lvl1pPr>
+          </a:lstStyle>
+          <a:p>
+            <a:fld id="{D45613BC-389C-4748-912F-4A8EC296CD28}" type="datetime1">
+              <a:rPr lang="en-US" smtClean="0"/>
+              <a:t>10/20/15</a:t>
+            </a:fld>
+            <a:endParaRPr lang="en-US"/>
+          </a:p>
+        </p:txBody>
+      </p:sp>
+      <p:sp>
+        <p:nvSpPr>
+          <p:cNvPr id="4" name="Footer Placeholder 3"/>
+          <p:cNvSpPr>
+            <a:spLocks noGrp="1"/>
+          </p:cNvSpPr>
+          <p:nvPr>
+            <p:ph type="ftr" sz="quarter" idx="2"/>
+          </p:nvPr>
+        </p:nvSpPr>
+        <p:spPr>
+          <a:xfrm>
+            <a:off x="0" y="8685213"/>
+            <a:ext cx="2971800" cy="457200"/>
+          </a:xfrm>
+          <a:prstGeom prst="rect">
+            <a:avLst/>
+          </a:prstGeom>
+        </p:spPr>
+        <p:txBody>
+          <a:bodyPr vert="horz" lIns="91440" tIns="45720" rIns="91440" bIns="45720" rtlCol="0" anchor="b"/>
+          <a:lstStyle>
+            <a:lvl1pPr algn="l">
+              <a:defRPr sz="1200"/>
+            </a:lvl1pPr>
+          </a:lstStyle>
+          <a:p>
+            <a:endParaRPr lang="en-US"/>
+          </a:p>
+        </p:txBody>
+      </p:sp>
+      <p:sp>
+        <p:nvSpPr>
+          <p:cNvPr id="5" name="Slide Number Placeholder 4"/>
+          <p:cNvSpPr>
+            <a:spLocks noGrp="1"/>
+          </p:cNvSpPr>
+          <p:nvPr>
+            <p:ph type="sldNum" sz="quarter" idx="3"/>
+          </p:nvPr>
+        </p:nvSpPr>
+        <p:spPr>
+          <a:xfrm>
+            <a:off x="3884613" y="8685213"/>
+            <a:ext cx="2971800" cy="457200"/>
+          </a:xfrm>
+          <a:prstGeom prst="rect">
+            <a:avLst/>
+          </a:prstGeom>
+        </p:spPr>
+        <p:txBody>
+          <a:bodyPr vert="horz" lIns="91440" tIns="45720" rIns="91440" bIns="45720" rtlCol="0" anchor="b"/>
+          <a:lstStyle>
+            <a:lvl1pPr algn="r">
+              <a:defRPr sz="1200"/>
+            </a:lvl1pPr>
+          </a:lstStyle>
+          <a:p>
+            <a:fld id="{C4E30705-77DA-A141-8A08-F94B1C7CCEE5}" type="slidenum">
+              <a:rPr lang="en-US" smtClean="0"/>
+              <a:t>‹#›</a:t>
+            </a:fld>
+            <a:endParaRPr lang="en-US"/>
+          </a:p>
+        </p:txBody>
+      </p:sp>
+    </p:spTree>
+    <p:extLst>
+      <p:ext uri="{BB962C8B-B14F-4D97-AF65-F5344CB8AC3E}">
+        <p14:creationId xmlns:p14="http://schemas.microsoft.com/office/powerpoint/2010/main" val="2760448163"/>
+      </p:ext>
+    </p:extLst>
+  </p:cSld>
+  <p:clrMap bg1="lt1" tx1="dk1" bg2="lt2" tx2="dk2" accent1="accent1" accent2="accent2" accent3="accent3" accent4="accent4" accent5="accent5" accent6="accent6" hlink="hlink" folHlink="folHlink"/>
+  <p:hf hdr="0" ftr="0" dt="0"/>
+</p:handoutMaster>
+</file>
+
 <file path=ppt/notesMasters/notesMaster1.xml><?xml version="1.0" encoding="utf-8"?>
 <p:notesMaster xmlns:a="http://schemas.openxmlformats.org/drawingml/2006/main" xmlns:r="http://schemas.openxmlformats.org/officeDocument/2006/relationships" xmlns:p="http://schemas.openxmlformats.org/presentationml/2006/main">
   <p:cSld>
@@ -277,7 +446,7 @@
             </a:lvl1pPr>
           </a:lstStyle>
           <a:p>
-            <a:fld id="{0FE6ED01-4D4B-2B45-B62B-1A50C36CA659}" type="datetimeFigureOut">
+            <a:fld id="{3B59F596-E4DE-AE48-858C-B1A284B58952}" type="datetime1">
               <a:rPr lang="en-US" smtClean="0"/>
               <a:t>10/20/15</a:t>
             </a:fld>
@@ -452,6 +621,7 @@
     </p:extLst>
   </p:cSld>
   <p:clrMap bg1="lt1" tx1="dk1" bg2="lt2" tx2="dk2" accent1="accent1" accent2="accent2" accent3="accent3" accent4="accent4" accent5="accent5" accent6="accent6" hlink="hlink" folHlink="folHlink"/>
+  <p:hf hdr="0" ftr="0" dt="0"/>
   <p:notesStyle>
     <a:lvl1pPr marL="0" algn="l" defTabSz="457200" rtl="0" eaLnBrk="1" latinLnBrk="0" hangingPunct="1">
       <a:defRPr sz="1200" kern="1200">
@@ -4128,7 +4298,7 @@
           <a:bodyPr/>
           <a:lstStyle/>
           <a:p>
-            <a:fld id="{DDAA701C-81C8-694C-BB01-105E7F20F4A5}" type="datetimeFigureOut">
+            <a:fld id="{28D84D86-9F9F-C248-B01E-04219179DB3D}" type="datetime1">
               <a:rPr lang="en-US" smtClean="0"/>
               <a:t>10/20/15</a:t>
             </a:fld>
@@ -4293,7 +4463,7 @@
           <a:bodyPr/>
           <a:lstStyle/>
           <a:p>
-            <a:fld id="{DDAA701C-81C8-694C-BB01-105E7F20F4A5}" type="datetimeFigureOut">
+            <a:fld id="{0A5D86CE-129F-E046-825D-1AC7D66C1673}" type="datetime1">
               <a:rPr lang="en-US" smtClean="0"/>
               <a:t>10/20/15</a:t>
             </a:fld>
@@ -4468,7 +4638,7 @@
           <a:bodyPr/>
           <a:lstStyle/>
           <a:p>
-            <a:fld id="{DDAA701C-81C8-694C-BB01-105E7F20F4A5}" type="datetimeFigureOut">
+            <a:fld id="{674A19AF-96CC-B945-9B6D-B6341987EA2C}" type="datetime1">
               <a:rPr lang="en-US" smtClean="0"/>
               <a:t>10/20/15</a:t>
             </a:fld>
@@ -4633,7 +4803,7 @@
           <a:bodyPr/>
           <a:lstStyle/>
           <a:p>
-            <a:fld id="{DDAA701C-81C8-694C-BB01-105E7F20F4A5}" type="datetimeFigureOut">
+            <a:fld id="{6D20C2C8-0B17-7E46-A2F3-EA346EBAE9B6}" type="datetime1">
               <a:rPr lang="en-US" smtClean="0"/>
               <a:t>10/20/15</a:t>
             </a:fld>
@@ -4874,7 +5044,7 @@
           <a:bodyPr/>
           <a:lstStyle/>
           <a:p>
-            <a:fld id="{DDAA701C-81C8-694C-BB01-105E7F20F4A5}" type="datetimeFigureOut">
+            <a:fld id="{D30E7486-EE22-7F4A-94D0-6364F5D2F018}" type="datetime1">
               <a:rPr lang="en-US" smtClean="0"/>
               <a:t>10/20/15</a:t>
             </a:fld>
@@ -5157,7 +5327,7 @@
           <a:bodyPr/>
           <a:lstStyle/>
           <a:p>
-            <a:fld id="{DDAA701C-81C8-694C-BB01-105E7F20F4A5}" type="datetimeFigureOut">
+            <a:fld id="{C224CCC7-0D8B-C643-B3D0-510885F0A95A}" type="datetime1">
               <a:rPr lang="en-US" smtClean="0"/>
               <a:t>10/20/15</a:t>
             </a:fld>
@@ -5586,7 +5756,7 @@
           <a:bodyPr/>
           <a:lstStyle/>
           <a:p>
-            <a:fld id="{DDAA701C-81C8-694C-BB01-105E7F20F4A5}" type="datetimeFigureOut">
+            <a:fld id="{916D4677-B63A-9A4D-8D4F-A122D0127C36}" type="datetime1">
               <a:rPr lang="en-US" smtClean="0"/>
               <a:t>10/20/15</a:t>
             </a:fld>
@@ -5699,7 +5869,7 @@
           <a:bodyPr/>
           <a:lstStyle/>
           <a:p>
-            <a:fld id="{DDAA701C-81C8-694C-BB01-105E7F20F4A5}" type="datetimeFigureOut">
+            <a:fld id="{8A81249B-7E7F-FC48-A020-9619549C1BA6}" type="datetime1">
               <a:rPr lang="en-US" smtClean="0"/>
               <a:t>10/20/15</a:t>
             </a:fld>
@@ -5789,7 +5959,7 @@
           <a:bodyPr/>
           <a:lstStyle/>
           <a:p>
-            <a:fld id="{DDAA701C-81C8-694C-BB01-105E7F20F4A5}" type="datetimeFigureOut">
+            <a:fld id="{0BF78DDF-0EC3-494F-BBEB-143D2B8E4107}" type="datetime1">
               <a:rPr lang="en-US" smtClean="0"/>
               <a:t>10/20/15</a:t>
             </a:fld>
@@ -5978,7 +6148,7 @@
           <a:bodyPr/>
           <a:lstStyle/>
           <a:p>
-            <a:fld id="{DDAA701C-81C8-694C-BB01-105E7F20F4A5}" type="datetimeFigureOut">
+            <a:fld id="{9B8DED0C-1C69-5748-9362-8304920BD2C9}" type="datetime1">
               <a:rPr lang="en-US" smtClean="0"/>
               <a:t>10/20/15</a:t>
             </a:fld>
@@ -6296,7 +6466,7 @@
           <a:bodyPr/>
           <a:lstStyle/>
           <a:p>
-            <a:fld id="{DDAA701C-81C8-694C-BB01-105E7F20F4A5}" type="datetimeFigureOut">
+            <a:fld id="{03B81C5E-BAB2-2D43-929D-71DF374961F5}" type="datetime1">
               <a:rPr lang="en-US" smtClean="0"/>
               <a:t>10/20/15</a:t>
             </a:fld>
@@ -6675,7 +6845,7 @@
             </a:lvl1pPr>
           </a:lstStyle>
           <a:p>
-            <a:fld id="{DDAA701C-81C8-694C-BB01-105E7F20F4A5}" type="datetimeFigureOut">
+            <a:fld id="{06D767A7-33D1-AD45-8886-67E0AAFEFAD6}" type="datetime1">
               <a:rPr lang="en-US" smtClean="0"/>
               <a:t>10/20/15</a:t>
             </a:fld>
@@ -6699,6 +6869,7 @@
     <p:sldLayoutId id="2147483670" r:id="rId10"/>
     <p:sldLayoutId id="2147483671" r:id="rId11"/>
   </p:sldLayoutIdLst>
+  <p:hf hdr="0" ftr="0" dt="0"/>
   <p:txStyles>
     <p:titleStyle>
       <a:lvl1pPr algn="l" defTabSz="914400" rtl="0" eaLnBrk="1" latinLnBrk="0" hangingPunct="1">
@@ -7087,6 +7258,29 @@
           </a:p>
         </p:txBody>
       </p:sp>
+      <p:sp>
+        <p:nvSpPr>
+          <p:cNvPr id="4" name="Slide Number Placeholder 3"/>
+          <p:cNvSpPr>
+            <a:spLocks noGrp="1"/>
+          </p:cNvSpPr>
+          <p:nvPr>
+            <p:ph type="sldNum" sz="quarter" idx="12"/>
+          </p:nvPr>
+        </p:nvSpPr>
+        <p:spPr/>
+        <p:txBody>
+          <a:bodyPr/>
+          <a:lstStyle/>
+          <a:p>
+            <a:fld id="{B80A01DB-F3F9-0B4D-83C1-A66A06F2C152}" type="slidenum">
+              <a:rPr lang="en-US" smtClean="0"/>
+              <a:t>1</a:t>
+            </a:fld>
+            <a:endParaRPr lang="en-US"/>
+          </a:p>
+        </p:txBody>
+      </p:sp>
     </p:spTree>
     <p:extLst>
       <p:ext uri="{BB962C8B-B14F-4D97-AF65-F5344CB8AC3E}">
@@ -7238,6 +7432,29 @@
               <a:t>.</a:t>
             </a:r>
             <a:endParaRPr lang="en-US" dirty="0"/>
+          </a:p>
+        </p:txBody>
+      </p:sp>
+      <p:sp>
+        <p:nvSpPr>
+          <p:cNvPr id="4" name="Slide Number Placeholder 3"/>
+          <p:cNvSpPr>
+            <a:spLocks noGrp="1"/>
+          </p:cNvSpPr>
+          <p:nvPr>
+            <p:ph type="sldNum" sz="quarter" idx="12"/>
+          </p:nvPr>
+        </p:nvSpPr>
+        <p:spPr/>
+        <p:txBody>
+          <a:bodyPr/>
+          <a:lstStyle/>
+          <a:p>
+            <a:fld id="{B80A01DB-F3F9-0B4D-83C1-A66A06F2C152}" type="slidenum">
+              <a:rPr lang="en-US" smtClean="0"/>
+              <a:t>10</a:t>
+            </a:fld>
+            <a:endParaRPr lang="en-US"/>
           </a:p>
         </p:txBody>
       </p:sp>
@@ -7527,6 +7744,29 @@
           </a:xfrm>
         </p:spPr>
       </p:pic>
+      <p:sp>
+        <p:nvSpPr>
+          <p:cNvPr id="2" name="Slide Number Placeholder 1"/>
+          <p:cNvSpPr>
+            <a:spLocks noGrp="1"/>
+          </p:cNvSpPr>
+          <p:nvPr>
+            <p:ph type="sldNum" sz="quarter" idx="12"/>
+          </p:nvPr>
+        </p:nvSpPr>
+        <p:spPr/>
+        <p:txBody>
+          <a:bodyPr/>
+          <a:lstStyle/>
+          <a:p>
+            <a:fld id="{B80A01DB-F3F9-0B4D-83C1-A66A06F2C152}" type="slidenum">
+              <a:rPr lang="en-US" smtClean="0"/>
+              <a:t>11</a:t>
+            </a:fld>
+            <a:endParaRPr lang="en-US"/>
+          </a:p>
+        </p:txBody>
+      </p:sp>
     </p:spTree>
     <p:extLst>
       <p:ext uri="{BB962C8B-B14F-4D97-AF65-F5344CB8AC3E}">
@@ -7735,6 +7975,29 @@
               <a:rPr lang="en-US" dirty="0" smtClean="0"/>
               <a:t>.</a:t>
             </a:r>
+          </a:p>
+        </p:txBody>
+      </p:sp>
+      <p:sp>
+        <p:nvSpPr>
+          <p:cNvPr id="4" name="Slide Number Placeholder 3"/>
+          <p:cNvSpPr>
+            <a:spLocks noGrp="1"/>
+          </p:cNvSpPr>
+          <p:nvPr>
+            <p:ph type="sldNum" sz="quarter" idx="12"/>
+          </p:nvPr>
+        </p:nvSpPr>
+        <p:spPr/>
+        <p:txBody>
+          <a:bodyPr/>
+          <a:lstStyle/>
+          <a:p>
+            <a:fld id="{B80A01DB-F3F9-0B4D-83C1-A66A06F2C152}" type="slidenum">
+              <a:rPr lang="en-US" smtClean="0"/>
+              <a:t>12</a:t>
+            </a:fld>
+            <a:endParaRPr lang="en-US"/>
           </a:p>
         </p:txBody>
       </p:sp>
@@ -7981,6 +8244,29 @@
           </a:p>
         </p:txBody>
       </p:sp>
+      <p:sp>
+        <p:nvSpPr>
+          <p:cNvPr id="4" name="Slide Number Placeholder 3"/>
+          <p:cNvSpPr>
+            <a:spLocks noGrp="1"/>
+          </p:cNvSpPr>
+          <p:nvPr>
+            <p:ph type="sldNum" sz="quarter" idx="12"/>
+          </p:nvPr>
+        </p:nvSpPr>
+        <p:spPr/>
+        <p:txBody>
+          <a:bodyPr/>
+          <a:lstStyle/>
+          <a:p>
+            <a:fld id="{B80A01DB-F3F9-0B4D-83C1-A66A06F2C152}" type="slidenum">
+              <a:rPr lang="en-US" smtClean="0"/>
+              <a:t>13</a:t>
+            </a:fld>
+            <a:endParaRPr lang="en-US"/>
+          </a:p>
+        </p:txBody>
+      </p:sp>
     </p:spTree>
     <p:extLst>
       <p:ext uri="{BB962C8B-B14F-4D97-AF65-F5344CB8AC3E}">
@@ -8113,6 +8399,29 @@
           </a:p>
         </p:txBody>
       </p:sp>
+      <p:sp>
+        <p:nvSpPr>
+          <p:cNvPr id="4" name="Slide Number Placeholder 3"/>
+          <p:cNvSpPr>
+            <a:spLocks noGrp="1"/>
+          </p:cNvSpPr>
+          <p:nvPr>
+            <p:ph type="sldNum" sz="quarter" idx="12"/>
+          </p:nvPr>
+        </p:nvSpPr>
+        <p:spPr/>
+        <p:txBody>
+          <a:bodyPr/>
+          <a:lstStyle/>
+          <a:p>
+            <a:fld id="{B80A01DB-F3F9-0B4D-83C1-A66A06F2C152}" type="slidenum">
+              <a:rPr lang="en-US" smtClean="0"/>
+              <a:t>14</a:t>
+            </a:fld>
+            <a:endParaRPr lang="en-US"/>
+          </a:p>
+        </p:txBody>
+      </p:sp>
     </p:spTree>
     <p:extLst>
       <p:ext uri="{BB962C8B-B14F-4D97-AF65-F5344CB8AC3E}">
@@ -8295,6 +8604,29 @@
               <a:t>If an error is thrown, it is wrapped in a promise that rejects with that error.</a:t>
             </a:r>
             <a:endParaRPr lang="en-US" dirty="0"/>
+          </a:p>
+        </p:txBody>
+      </p:sp>
+      <p:sp>
+        <p:nvSpPr>
+          <p:cNvPr id="4" name="Slide Number Placeholder 3"/>
+          <p:cNvSpPr>
+            <a:spLocks noGrp="1"/>
+          </p:cNvSpPr>
+          <p:nvPr>
+            <p:ph type="sldNum" sz="quarter" idx="12"/>
+          </p:nvPr>
+        </p:nvSpPr>
+        <p:spPr/>
+        <p:txBody>
+          <a:bodyPr/>
+          <a:lstStyle/>
+          <a:p>
+            <a:fld id="{B80A01DB-F3F9-0B4D-83C1-A66A06F2C152}" type="slidenum">
+              <a:rPr lang="en-US" smtClean="0"/>
+              <a:t>15</a:t>
+            </a:fld>
+            <a:endParaRPr lang="en-US"/>
           </a:p>
         </p:txBody>
       </p:sp>
@@ -8810,6 +9142,29 @@
           </a:p>
         </p:txBody>
       </p:sp>
+      <p:sp>
+        <p:nvSpPr>
+          <p:cNvPr id="4" name="Slide Number Placeholder 3"/>
+          <p:cNvSpPr>
+            <a:spLocks noGrp="1"/>
+          </p:cNvSpPr>
+          <p:nvPr>
+            <p:ph type="sldNum" sz="quarter" idx="12"/>
+          </p:nvPr>
+        </p:nvSpPr>
+        <p:spPr/>
+        <p:txBody>
+          <a:bodyPr/>
+          <a:lstStyle/>
+          <a:p>
+            <a:fld id="{B80A01DB-F3F9-0B4D-83C1-A66A06F2C152}" type="slidenum">
+              <a:rPr lang="en-US" smtClean="0"/>
+              <a:t>16</a:t>
+            </a:fld>
+            <a:endParaRPr lang="en-US"/>
+          </a:p>
+        </p:txBody>
+      </p:sp>
     </p:spTree>
     <p:extLst>
       <p:ext uri="{BB962C8B-B14F-4D97-AF65-F5344CB8AC3E}">
@@ -9020,6 +9375,29 @@
                 <a:srgbClr val="31B32F"/>
               </a:solidFill>
             </a:endParaRPr>
+          </a:p>
+        </p:txBody>
+      </p:sp>
+      <p:sp>
+        <p:nvSpPr>
+          <p:cNvPr id="4" name="Slide Number Placeholder 3"/>
+          <p:cNvSpPr>
+            <a:spLocks noGrp="1"/>
+          </p:cNvSpPr>
+          <p:nvPr>
+            <p:ph type="sldNum" sz="quarter" idx="12"/>
+          </p:nvPr>
+        </p:nvSpPr>
+        <p:spPr/>
+        <p:txBody>
+          <a:bodyPr/>
+          <a:lstStyle/>
+          <a:p>
+            <a:fld id="{B80A01DB-F3F9-0B4D-83C1-A66A06F2C152}" type="slidenum">
+              <a:rPr lang="en-US" smtClean="0"/>
+              <a:t>17</a:t>
+            </a:fld>
+            <a:endParaRPr lang="en-US"/>
           </a:p>
         </p:txBody>
       </p:sp>
@@ -9484,6 +9862,29 @@
           </a:p>
         </p:txBody>
       </p:sp>
+      <p:sp>
+        <p:nvSpPr>
+          <p:cNvPr id="5" name="Slide Number Placeholder 4"/>
+          <p:cNvSpPr>
+            <a:spLocks noGrp="1"/>
+          </p:cNvSpPr>
+          <p:nvPr>
+            <p:ph type="sldNum" sz="quarter" idx="12"/>
+          </p:nvPr>
+        </p:nvSpPr>
+        <p:spPr/>
+        <p:txBody>
+          <a:bodyPr/>
+          <a:lstStyle/>
+          <a:p>
+            <a:fld id="{B80A01DB-F3F9-0B4D-83C1-A66A06F2C152}" type="slidenum">
+              <a:rPr lang="en-US" smtClean="0"/>
+              <a:t>18</a:t>
+            </a:fld>
+            <a:endParaRPr lang="en-US"/>
+          </a:p>
+        </p:txBody>
+      </p:sp>
     </p:spTree>
     <p:extLst>
       <p:ext uri="{BB962C8B-B14F-4D97-AF65-F5344CB8AC3E}">
@@ -9846,6 +10247,29 @@
               <a:t>testing</a:t>
             </a:r>
             <a:endParaRPr lang="en-US" dirty="0"/>
+          </a:p>
+        </p:txBody>
+      </p:sp>
+      <p:sp>
+        <p:nvSpPr>
+          <p:cNvPr id="6" name="Slide Number Placeholder 5"/>
+          <p:cNvSpPr>
+            <a:spLocks noGrp="1"/>
+          </p:cNvSpPr>
+          <p:nvPr>
+            <p:ph type="sldNum" sz="quarter" idx="12"/>
+          </p:nvPr>
+        </p:nvSpPr>
+        <p:spPr/>
+        <p:txBody>
+          <a:bodyPr/>
+          <a:lstStyle/>
+          <a:p>
+            <a:fld id="{B80A01DB-F3F9-0B4D-83C1-A66A06F2C152}" type="slidenum">
+              <a:rPr lang="en-US" smtClean="0"/>
+              <a:t>19</a:t>
+            </a:fld>
+            <a:endParaRPr lang="en-US"/>
           </a:p>
         </p:txBody>
       </p:sp>
@@ -10065,6 +10489,29 @@
           </a:xfrm>
         </p:spPr>
       </p:pic>
+      <p:sp>
+        <p:nvSpPr>
+          <p:cNvPr id="3" name="Slide Number Placeholder 2"/>
+          <p:cNvSpPr>
+            <a:spLocks noGrp="1"/>
+          </p:cNvSpPr>
+          <p:nvPr>
+            <p:ph type="sldNum" sz="quarter" idx="12"/>
+          </p:nvPr>
+        </p:nvSpPr>
+        <p:spPr/>
+        <p:txBody>
+          <a:bodyPr/>
+          <a:lstStyle/>
+          <a:p>
+            <a:fld id="{B80A01DB-F3F9-0B4D-83C1-A66A06F2C152}" type="slidenum">
+              <a:rPr lang="en-US" smtClean="0"/>
+              <a:t>2</a:t>
+            </a:fld>
+            <a:endParaRPr lang="en-US"/>
+          </a:p>
+        </p:txBody>
+      </p:sp>
     </p:spTree>
     <p:extLst>
       <p:ext uri="{BB962C8B-B14F-4D97-AF65-F5344CB8AC3E}">
@@ -10235,6 +10682,29 @@
               <a:rPr lang="en-US" dirty="0"/>
               <a:t> to access the result.</a:t>
             </a:r>
+          </a:p>
+        </p:txBody>
+      </p:sp>
+      <p:sp>
+        <p:nvSpPr>
+          <p:cNvPr id="4" name="Slide Number Placeholder 3"/>
+          <p:cNvSpPr>
+            <a:spLocks noGrp="1"/>
+          </p:cNvSpPr>
+          <p:nvPr>
+            <p:ph type="sldNum" sz="quarter" idx="12"/>
+          </p:nvPr>
+        </p:nvSpPr>
+        <p:spPr/>
+        <p:txBody>
+          <a:bodyPr/>
+          <a:lstStyle/>
+          <a:p>
+            <a:fld id="{B80A01DB-F3F9-0B4D-83C1-A66A06F2C152}" type="slidenum">
+              <a:rPr lang="en-US" smtClean="0"/>
+              <a:t>20</a:t>
+            </a:fld>
+            <a:endParaRPr lang="en-US"/>
           </a:p>
         </p:txBody>
       </p:sp>
@@ -10565,6 +11035,29 @@
           </a:p>
           <a:p>
             <a:endParaRPr lang="en-US" dirty="0"/>
+          </a:p>
+        </p:txBody>
+      </p:sp>
+      <p:sp>
+        <p:nvSpPr>
+          <p:cNvPr id="4" name="Slide Number Placeholder 3"/>
+          <p:cNvSpPr>
+            <a:spLocks noGrp="1"/>
+          </p:cNvSpPr>
+          <p:nvPr>
+            <p:ph type="sldNum" sz="quarter" idx="12"/>
+          </p:nvPr>
+        </p:nvSpPr>
+        <p:spPr/>
+        <p:txBody>
+          <a:bodyPr/>
+          <a:lstStyle/>
+          <a:p>
+            <a:fld id="{B80A01DB-F3F9-0B4D-83C1-A66A06F2C152}" type="slidenum">
+              <a:rPr lang="en-US" smtClean="0"/>
+              <a:t>21</a:t>
+            </a:fld>
+            <a:endParaRPr lang="en-US"/>
           </a:p>
         </p:txBody>
       </p:sp>
@@ -11017,6 +11510,29 @@
               <a:t>.</a:t>
             </a:r>
             <a:endParaRPr lang="en-US" dirty="0"/>
+          </a:p>
+        </p:txBody>
+      </p:sp>
+      <p:sp>
+        <p:nvSpPr>
+          <p:cNvPr id="4" name="Slide Number Placeholder 3"/>
+          <p:cNvSpPr>
+            <a:spLocks noGrp="1"/>
+          </p:cNvSpPr>
+          <p:nvPr>
+            <p:ph type="sldNum" sz="quarter" idx="12"/>
+          </p:nvPr>
+        </p:nvSpPr>
+        <p:spPr/>
+        <p:txBody>
+          <a:bodyPr/>
+          <a:lstStyle/>
+          <a:p>
+            <a:fld id="{B80A01DB-F3F9-0B4D-83C1-A66A06F2C152}" type="slidenum">
+              <a:rPr lang="en-US" smtClean="0"/>
+              <a:t>22</a:t>
+            </a:fld>
+            <a:endParaRPr lang="en-US"/>
           </a:p>
         </p:txBody>
       </p:sp>
@@ -11405,6 +11921,29 @@
           </a:p>
         </p:txBody>
       </p:sp>
+      <p:sp>
+        <p:nvSpPr>
+          <p:cNvPr id="4" name="Slide Number Placeholder 3"/>
+          <p:cNvSpPr>
+            <a:spLocks noGrp="1"/>
+          </p:cNvSpPr>
+          <p:nvPr>
+            <p:ph type="sldNum" sz="quarter" idx="12"/>
+          </p:nvPr>
+        </p:nvSpPr>
+        <p:spPr/>
+        <p:txBody>
+          <a:bodyPr/>
+          <a:lstStyle/>
+          <a:p>
+            <a:fld id="{B80A01DB-F3F9-0B4D-83C1-A66A06F2C152}" type="slidenum">
+              <a:rPr lang="en-US" smtClean="0"/>
+              <a:t>23</a:t>
+            </a:fld>
+            <a:endParaRPr lang="en-US"/>
+          </a:p>
+        </p:txBody>
+      </p:sp>
     </p:spTree>
     <p:extLst>
       <p:ext uri="{BB962C8B-B14F-4D97-AF65-F5344CB8AC3E}">
@@ -11837,6 +12376,29 @@
           </a:p>
         </p:txBody>
       </p:sp>
+      <p:sp>
+        <p:nvSpPr>
+          <p:cNvPr id="4" name="Slide Number Placeholder 3"/>
+          <p:cNvSpPr>
+            <a:spLocks noGrp="1"/>
+          </p:cNvSpPr>
+          <p:nvPr>
+            <p:ph type="sldNum" sz="quarter" idx="12"/>
+          </p:nvPr>
+        </p:nvSpPr>
+        <p:spPr/>
+        <p:txBody>
+          <a:bodyPr/>
+          <a:lstStyle/>
+          <a:p>
+            <a:fld id="{B80A01DB-F3F9-0B4D-83C1-A66A06F2C152}" type="slidenum">
+              <a:rPr lang="en-US" smtClean="0"/>
+              <a:t>24</a:t>
+            </a:fld>
+            <a:endParaRPr lang="en-US"/>
+          </a:p>
+        </p:txBody>
+      </p:sp>
     </p:spTree>
     <p:extLst>
       <p:ext uri="{BB962C8B-B14F-4D97-AF65-F5344CB8AC3E}">
@@ -12097,6 +12659,29 @@
               <a:t>with helpful methods for getting at the returned data.</a:t>
             </a:r>
             <a:endParaRPr lang="en-US" dirty="0"/>
+          </a:p>
+        </p:txBody>
+      </p:sp>
+      <p:sp>
+        <p:nvSpPr>
+          <p:cNvPr id="4" name="Slide Number Placeholder 3"/>
+          <p:cNvSpPr>
+            <a:spLocks noGrp="1"/>
+          </p:cNvSpPr>
+          <p:nvPr>
+            <p:ph type="sldNum" sz="quarter" idx="12"/>
+          </p:nvPr>
+        </p:nvSpPr>
+        <p:spPr/>
+        <p:txBody>
+          <a:bodyPr/>
+          <a:lstStyle/>
+          <a:p>
+            <a:fld id="{B80A01DB-F3F9-0B4D-83C1-A66A06F2C152}" type="slidenum">
+              <a:rPr lang="en-US" smtClean="0"/>
+              <a:t>25</a:t>
+            </a:fld>
+            <a:endParaRPr lang="en-US"/>
           </a:p>
         </p:txBody>
       </p:sp>
@@ -12500,6 +13085,29 @@
               <a:t>.</a:t>
             </a:r>
             <a:endParaRPr lang="en-US" dirty="0"/>
+          </a:p>
+        </p:txBody>
+      </p:sp>
+      <p:sp>
+        <p:nvSpPr>
+          <p:cNvPr id="4" name="Slide Number Placeholder 3"/>
+          <p:cNvSpPr>
+            <a:spLocks noGrp="1"/>
+          </p:cNvSpPr>
+          <p:nvPr>
+            <p:ph type="sldNum" sz="quarter" idx="12"/>
+          </p:nvPr>
+        </p:nvSpPr>
+        <p:spPr/>
+        <p:txBody>
+          <a:bodyPr/>
+          <a:lstStyle/>
+          <a:p>
+            <a:fld id="{B80A01DB-F3F9-0B4D-83C1-A66A06F2C152}" type="slidenum">
+              <a:rPr lang="en-US" smtClean="0"/>
+              <a:t>26</a:t>
+            </a:fld>
+            <a:endParaRPr lang="en-US"/>
           </a:p>
         </p:txBody>
       </p:sp>
@@ -13001,6 +13609,29 @@
           </a:prstGeom>
         </p:spPr>
       </p:pic>
+      <p:sp>
+        <p:nvSpPr>
+          <p:cNvPr id="5" name="Slide Number Placeholder 4"/>
+          <p:cNvSpPr>
+            <a:spLocks noGrp="1"/>
+          </p:cNvSpPr>
+          <p:nvPr>
+            <p:ph type="sldNum" sz="quarter" idx="12"/>
+          </p:nvPr>
+        </p:nvSpPr>
+        <p:spPr/>
+        <p:txBody>
+          <a:bodyPr/>
+          <a:lstStyle/>
+          <a:p>
+            <a:fld id="{B80A01DB-F3F9-0B4D-83C1-A66A06F2C152}" type="slidenum">
+              <a:rPr lang="en-US" smtClean="0"/>
+              <a:t>27</a:t>
+            </a:fld>
+            <a:endParaRPr lang="en-US"/>
+          </a:p>
+        </p:txBody>
+      </p:sp>
     </p:spTree>
     <p:extLst>
       <p:ext uri="{BB962C8B-B14F-4D97-AF65-F5344CB8AC3E}">
@@ -13424,6 +14055,29 @@
               <a:t>.</a:t>
             </a:r>
             <a:endParaRPr lang="en-US" dirty="0"/>
+          </a:p>
+        </p:txBody>
+      </p:sp>
+      <p:sp>
+        <p:nvSpPr>
+          <p:cNvPr id="4" name="Slide Number Placeholder 3"/>
+          <p:cNvSpPr>
+            <a:spLocks noGrp="1"/>
+          </p:cNvSpPr>
+          <p:nvPr>
+            <p:ph type="sldNum" sz="quarter" idx="12"/>
+          </p:nvPr>
+        </p:nvSpPr>
+        <p:spPr/>
+        <p:txBody>
+          <a:bodyPr/>
+          <a:lstStyle/>
+          <a:p>
+            <a:fld id="{B80A01DB-F3F9-0B4D-83C1-A66A06F2C152}" type="slidenum">
+              <a:rPr lang="en-US" smtClean="0"/>
+              <a:t>28</a:t>
+            </a:fld>
+            <a:endParaRPr lang="en-US"/>
           </a:p>
         </p:txBody>
       </p:sp>
@@ -13938,6 +14592,29 @@
               <a:t>.</a:t>
             </a:r>
             <a:endParaRPr lang="en-US" dirty="0"/>
+          </a:p>
+        </p:txBody>
+      </p:sp>
+      <p:sp>
+        <p:nvSpPr>
+          <p:cNvPr id="4" name="Slide Number Placeholder 3"/>
+          <p:cNvSpPr>
+            <a:spLocks noGrp="1"/>
+          </p:cNvSpPr>
+          <p:nvPr>
+            <p:ph type="sldNum" sz="quarter" idx="12"/>
+          </p:nvPr>
+        </p:nvSpPr>
+        <p:spPr/>
+        <p:txBody>
+          <a:bodyPr/>
+          <a:lstStyle/>
+          <a:p>
+            <a:fld id="{B80A01DB-F3F9-0B4D-83C1-A66A06F2C152}" type="slidenum">
+              <a:rPr lang="en-US" smtClean="0"/>
+              <a:t>29</a:t>
+            </a:fld>
+            <a:endParaRPr lang="en-US"/>
           </a:p>
         </p:txBody>
       </p:sp>
@@ -14399,6 +15076,29 @@
           </a:p>
         </p:txBody>
       </p:sp>
+      <p:sp>
+        <p:nvSpPr>
+          <p:cNvPr id="4" name="Slide Number Placeholder 3"/>
+          <p:cNvSpPr>
+            <a:spLocks noGrp="1"/>
+          </p:cNvSpPr>
+          <p:nvPr>
+            <p:ph type="sldNum" sz="quarter" idx="12"/>
+          </p:nvPr>
+        </p:nvSpPr>
+        <p:spPr/>
+        <p:txBody>
+          <a:bodyPr/>
+          <a:lstStyle/>
+          <a:p>
+            <a:fld id="{B80A01DB-F3F9-0B4D-83C1-A66A06F2C152}" type="slidenum">
+              <a:rPr lang="en-US" smtClean="0"/>
+              <a:t>3</a:t>
+            </a:fld>
+            <a:endParaRPr lang="en-US"/>
+          </a:p>
+        </p:txBody>
+      </p:sp>
     </p:spTree>
     <p:extLst>
       <p:ext uri="{BB962C8B-B14F-4D97-AF65-F5344CB8AC3E}">
@@ -14761,6 +15461,29 @@
               <a:rPr lang="en-US" dirty="0" smtClean="0"/>
               <a:t>After the last yield, the generator must call next once more to finish the method.</a:t>
             </a:r>
+          </a:p>
+        </p:txBody>
+      </p:sp>
+      <p:sp>
+        <p:nvSpPr>
+          <p:cNvPr id="4" name="Slide Number Placeholder 3"/>
+          <p:cNvSpPr>
+            <a:spLocks noGrp="1"/>
+          </p:cNvSpPr>
+          <p:nvPr>
+            <p:ph type="sldNum" sz="quarter" idx="12"/>
+          </p:nvPr>
+        </p:nvSpPr>
+        <p:spPr/>
+        <p:txBody>
+          <a:bodyPr/>
+          <a:lstStyle/>
+          <a:p>
+            <a:fld id="{B80A01DB-F3F9-0B4D-83C1-A66A06F2C152}" type="slidenum">
+              <a:rPr lang="en-US" smtClean="0"/>
+              <a:t>30</a:t>
+            </a:fld>
+            <a:endParaRPr lang="en-US"/>
           </a:p>
         </p:txBody>
       </p:sp>
@@ -15251,6 +15974,29 @@
           </a:p>
         </p:txBody>
       </p:sp>
+      <p:sp>
+        <p:nvSpPr>
+          <p:cNvPr id="4" name="Slide Number Placeholder 3"/>
+          <p:cNvSpPr>
+            <a:spLocks noGrp="1"/>
+          </p:cNvSpPr>
+          <p:nvPr>
+            <p:ph type="sldNum" sz="quarter" idx="12"/>
+          </p:nvPr>
+        </p:nvSpPr>
+        <p:spPr/>
+        <p:txBody>
+          <a:bodyPr/>
+          <a:lstStyle/>
+          <a:p>
+            <a:fld id="{B80A01DB-F3F9-0B4D-83C1-A66A06F2C152}" type="slidenum">
+              <a:rPr lang="en-US" smtClean="0"/>
+              <a:t>31</a:t>
+            </a:fld>
+            <a:endParaRPr lang="en-US"/>
+          </a:p>
+        </p:txBody>
+      </p:sp>
     </p:spTree>
     <p:extLst>
       <p:ext uri="{BB962C8B-B14F-4D97-AF65-F5344CB8AC3E}">
@@ -15670,6 +16416,29 @@
               <a:rPr lang="en-US" dirty="0" smtClean="0"/>
               <a:t>.</a:t>
             </a:r>
+          </a:p>
+        </p:txBody>
+      </p:sp>
+      <p:sp>
+        <p:nvSpPr>
+          <p:cNvPr id="4" name="Slide Number Placeholder 3"/>
+          <p:cNvSpPr>
+            <a:spLocks noGrp="1"/>
+          </p:cNvSpPr>
+          <p:nvPr>
+            <p:ph type="sldNum" sz="quarter" idx="12"/>
+          </p:nvPr>
+        </p:nvSpPr>
+        <p:spPr/>
+        <p:txBody>
+          <a:bodyPr/>
+          <a:lstStyle/>
+          <a:p>
+            <a:fld id="{B80A01DB-F3F9-0B4D-83C1-A66A06F2C152}" type="slidenum">
+              <a:rPr lang="en-US" smtClean="0"/>
+              <a:t>32</a:t>
+            </a:fld>
+            <a:endParaRPr lang="en-US"/>
           </a:p>
         </p:txBody>
       </p:sp>
@@ -16008,6 +16777,29 @@
           </a:p>
         </p:txBody>
       </p:sp>
+      <p:sp>
+        <p:nvSpPr>
+          <p:cNvPr id="4" name="Slide Number Placeholder 3"/>
+          <p:cNvSpPr>
+            <a:spLocks noGrp="1"/>
+          </p:cNvSpPr>
+          <p:nvPr>
+            <p:ph type="sldNum" sz="quarter" idx="12"/>
+          </p:nvPr>
+        </p:nvSpPr>
+        <p:spPr/>
+        <p:txBody>
+          <a:bodyPr/>
+          <a:lstStyle/>
+          <a:p>
+            <a:fld id="{B80A01DB-F3F9-0B4D-83C1-A66A06F2C152}" type="slidenum">
+              <a:rPr lang="en-US" smtClean="0"/>
+              <a:t>33</a:t>
+            </a:fld>
+            <a:endParaRPr lang="en-US"/>
+          </a:p>
+        </p:txBody>
+      </p:sp>
     </p:spTree>
     <p:extLst>
       <p:ext uri="{BB962C8B-B14F-4D97-AF65-F5344CB8AC3E}">
@@ -16322,6 +17114,29 @@
               <a:rPr lang="en-US" sz="1800" dirty="0" smtClean="0"/>
               <a:t>, but it’s nice to understand how it works.)</a:t>
             </a:r>
+          </a:p>
+        </p:txBody>
+      </p:sp>
+      <p:sp>
+        <p:nvSpPr>
+          <p:cNvPr id="4" name="Slide Number Placeholder 3"/>
+          <p:cNvSpPr>
+            <a:spLocks noGrp="1"/>
+          </p:cNvSpPr>
+          <p:nvPr>
+            <p:ph type="sldNum" sz="quarter" idx="12"/>
+          </p:nvPr>
+        </p:nvSpPr>
+        <p:spPr/>
+        <p:txBody>
+          <a:bodyPr/>
+          <a:lstStyle/>
+          <a:p>
+            <a:fld id="{B80A01DB-F3F9-0B4D-83C1-A66A06F2C152}" type="slidenum">
+              <a:rPr lang="en-US" smtClean="0"/>
+              <a:t>34</a:t>
+            </a:fld>
+            <a:endParaRPr lang="en-US"/>
           </a:p>
         </p:txBody>
       </p:sp>
@@ -16729,11 +17544,7 @@
             </a:r>
             <a:r>
               <a:rPr lang="en-US" dirty="0" smtClean="0"/>
-              <a:t> call to complete or for done to </a:t>
-            </a:r>
-            <a:r>
-              <a:rPr lang="en-US" smtClean="0"/>
-              <a:t>be called.</a:t>
+              <a:t> call to complete or for done to be called.</a:t>
             </a:r>
             <a:endParaRPr lang="en-US" dirty="0" smtClean="0"/>
           </a:p>
@@ -16779,6 +17590,29 @@
               <a:t> handler, test for the result you would expect from the rejected promise.</a:t>
             </a:r>
             <a:endParaRPr lang="en-US" dirty="0"/>
+          </a:p>
+        </p:txBody>
+      </p:sp>
+      <p:sp>
+        <p:nvSpPr>
+          <p:cNvPr id="4" name="Slide Number Placeholder 3"/>
+          <p:cNvSpPr>
+            <a:spLocks noGrp="1"/>
+          </p:cNvSpPr>
+          <p:nvPr>
+            <p:ph type="sldNum" sz="quarter" idx="12"/>
+          </p:nvPr>
+        </p:nvSpPr>
+        <p:spPr/>
+        <p:txBody>
+          <a:bodyPr/>
+          <a:lstStyle/>
+          <a:p>
+            <a:fld id="{B80A01DB-F3F9-0B4D-83C1-A66A06F2C152}" type="slidenum">
+              <a:rPr lang="en-US" smtClean="0"/>
+              <a:t>35</a:t>
+            </a:fld>
+            <a:endParaRPr lang="en-US"/>
           </a:p>
         </p:txBody>
       </p:sp>
@@ -17559,6 +18393,29 @@
           </a:p>
         </p:txBody>
       </p:sp>
+      <p:sp>
+        <p:nvSpPr>
+          <p:cNvPr id="8" name="Slide Number Placeholder 7"/>
+          <p:cNvSpPr>
+            <a:spLocks noGrp="1"/>
+          </p:cNvSpPr>
+          <p:nvPr>
+            <p:ph type="sldNum" sz="quarter" idx="12"/>
+          </p:nvPr>
+        </p:nvSpPr>
+        <p:spPr/>
+        <p:txBody>
+          <a:bodyPr/>
+          <a:lstStyle/>
+          <a:p>
+            <a:fld id="{B80A01DB-F3F9-0B4D-83C1-A66A06F2C152}" type="slidenum">
+              <a:rPr lang="en-US" smtClean="0"/>
+              <a:t>36</a:t>
+            </a:fld>
+            <a:endParaRPr lang="en-US"/>
+          </a:p>
+        </p:txBody>
+      </p:sp>
     </p:spTree>
     <p:extLst>
       <p:ext uri="{BB962C8B-B14F-4D97-AF65-F5344CB8AC3E}">
@@ -18038,6 +18895,29 @@
           </a:p>
         </p:txBody>
       </p:sp>
+      <p:sp>
+        <p:nvSpPr>
+          <p:cNvPr id="4" name="Slide Number Placeholder 3"/>
+          <p:cNvSpPr>
+            <a:spLocks noGrp="1"/>
+          </p:cNvSpPr>
+          <p:nvPr>
+            <p:ph type="sldNum" sz="quarter" idx="12"/>
+          </p:nvPr>
+        </p:nvSpPr>
+        <p:spPr/>
+        <p:txBody>
+          <a:bodyPr/>
+          <a:lstStyle/>
+          <a:p>
+            <a:fld id="{B80A01DB-F3F9-0B4D-83C1-A66A06F2C152}" type="slidenum">
+              <a:rPr lang="en-US" smtClean="0"/>
+              <a:t>37</a:t>
+            </a:fld>
+            <a:endParaRPr lang="en-US"/>
+          </a:p>
+        </p:txBody>
+      </p:sp>
     </p:spTree>
     <p:extLst>
       <p:ext uri="{BB962C8B-B14F-4D97-AF65-F5344CB8AC3E}">
@@ -18322,6 +19202,29 @@
               <a:t>Will eventually allow for actions such as push notifications.</a:t>
             </a:r>
             <a:endParaRPr lang="en-US" dirty="0"/>
+          </a:p>
+        </p:txBody>
+      </p:sp>
+      <p:sp>
+        <p:nvSpPr>
+          <p:cNvPr id="4" name="Slide Number Placeholder 3"/>
+          <p:cNvSpPr>
+            <a:spLocks noGrp="1"/>
+          </p:cNvSpPr>
+          <p:nvPr>
+            <p:ph type="sldNum" sz="quarter" idx="12"/>
+          </p:nvPr>
+        </p:nvSpPr>
+        <p:spPr/>
+        <p:txBody>
+          <a:bodyPr/>
+          <a:lstStyle/>
+          <a:p>
+            <a:fld id="{B80A01DB-F3F9-0B4D-83C1-A66A06F2C152}" type="slidenum">
+              <a:rPr lang="en-US" smtClean="0"/>
+              <a:t>38</a:t>
+            </a:fld>
+            <a:endParaRPr lang="en-US"/>
           </a:p>
         </p:txBody>
       </p:sp>
@@ -18799,6 +19702,29 @@
           </a:p>
         </p:txBody>
       </p:sp>
+      <p:sp>
+        <p:nvSpPr>
+          <p:cNvPr id="4" name="Slide Number Placeholder 3"/>
+          <p:cNvSpPr>
+            <a:spLocks noGrp="1"/>
+          </p:cNvSpPr>
+          <p:nvPr>
+            <p:ph type="sldNum" sz="quarter" idx="12"/>
+          </p:nvPr>
+        </p:nvSpPr>
+        <p:spPr/>
+        <p:txBody>
+          <a:bodyPr/>
+          <a:lstStyle/>
+          <a:p>
+            <a:fld id="{B80A01DB-F3F9-0B4D-83C1-A66A06F2C152}" type="slidenum">
+              <a:rPr lang="en-US" smtClean="0"/>
+              <a:t>39</a:t>
+            </a:fld>
+            <a:endParaRPr lang="en-US"/>
+          </a:p>
+        </p:txBody>
+      </p:sp>
     </p:spTree>
     <p:extLst>
       <p:ext uri="{BB962C8B-B14F-4D97-AF65-F5344CB8AC3E}">
@@ -18957,6 +19883,29 @@
           </a:p>
           <a:p>
             <a:endParaRPr lang="en-US" dirty="0"/>
+          </a:p>
+        </p:txBody>
+      </p:sp>
+      <p:sp>
+        <p:nvSpPr>
+          <p:cNvPr id="4" name="Slide Number Placeholder 3"/>
+          <p:cNvSpPr>
+            <a:spLocks noGrp="1"/>
+          </p:cNvSpPr>
+          <p:nvPr>
+            <p:ph type="sldNum" sz="quarter" idx="12"/>
+          </p:nvPr>
+        </p:nvSpPr>
+        <p:spPr/>
+        <p:txBody>
+          <a:bodyPr/>
+          <a:lstStyle/>
+          <a:p>
+            <a:fld id="{B80A01DB-F3F9-0B4D-83C1-A66A06F2C152}" type="slidenum">
+              <a:rPr lang="en-US" smtClean="0"/>
+              <a:t>4</a:t>
+            </a:fld>
+            <a:endParaRPr lang="en-US"/>
           </a:p>
         </p:txBody>
       </p:sp>
@@ -19440,6 +20389,29 @@
               <a:t>.</a:t>
             </a:r>
             <a:endParaRPr lang="en-US" dirty="0"/>
+          </a:p>
+        </p:txBody>
+      </p:sp>
+      <p:sp>
+        <p:nvSpPr>
+          <p:cNvPr id="5" name="Slide Number Placeholder 4"/>
+          <p:cNvSpPr>
+            <a:spLocks noGrp="1"/>
+          </p:cNvSpPr>
+          <p:nvPr>
+            <p:ph type="sldNum" sz="quarter" idx="12"/>
+          </p:nvPr>
+        </p:nvSpPr>
+        <p:spPr/>
+        <p:txBody>
+          <a:bodyPr/>
+          <a:lstStyle/>
+          <a:p>
+            <a:fld id="{B80A01DB-F3F9-0B4D-83C1-A66A06F2C152}" type="slidenum">
+              <a:rPr lang="en-US" smtClean="0"/>
+              <a:t>5</a:t>
+            </a:fld>
+            <a:endParaRPr lang="en-US"/>
           </a:p>
         </p:txBody>
       </p:sp>
@@ -20012,6 +20984,29 @@
           </a:p>
         </p:txBody>
       </p:sp>
+      <p:sp>
+        <p:nvSpPr>
+          <p:cNvPr id="4" name="Slide Number Placeholder 3"/>
+          <p:cNvSpPr>
+            <a:spLocks noGrp="1"/>
+          </p:cNvSpPr>
+          <p:nvPr>
+            <p:ph type="sldNum" sz="quarter" idx="12"/>
+          </p:nvPr>
+        </p:nvSpPr>
+        <p:spPr/>
+        <p:txBody>
+          <a:bodyPr/>
+          <a:lstStyle/>
+          <a:p>
+            <a:fld id="{B80A01DB-F3F9-0B4D-83C1-A66A06F2C152}" type="slidenum">
+              <a:rPr lang="en-US" smtClean="0"/>
+              <a:t>6</a:t>
+            </a:fld>
+            <a:endParaRPr lang="en-US"/>
+          </a:p>
+        </p:txBody>
+      </p:sp>
     </p:spTree>
     <p:extLst>
       <p:ext uri="{BB962C8B-B14F-4D97-AF65-F5344CB8AC3E}">
@@ -22136,6 +23131,29 @@
           </a:fontRef>
         </p:style>
       </p:cxnSp>
+      <p:sp>
+        <p:nvSpPr>
+          <p:cNvPr id="3" name="Slide Number Placeholder 2"/>
+          <p:cNvSpPr>
+            <a:spLocks noGrp="1"/>
+          </p:cNvSpPr>
+          <p:nvPr>
+            <p:ph type="sldNum" sz="quarter" idx="12"/>
+          </p:nvPr>
+        </p:nvSpPr>
+        <p:spPr/>
+        <p:txBody>
+          <a:bodyPr/>
+          <a:lstStyle/>
+          <a:p>
+            <a:fld id="{B80A01DB-F3F9-0B4D-83C1-A66A06F2C152}" type="slidenum">
+              <a:rPr lang="en-US" smtClean="0"/>
+              <a:t>7</a:t>
+            </a:fld>
+            <a:endParaRPr lang="en-US"/>
+          </a:p>
+        </p:txBody>
+      </p:sp>
     </p:spTree>
     <p:extLst>
       <p:ext uri="{BB962C8B-B14F-4D97-AF65-F5344CB8AC3E}">
@@ -25234,6 +26252,29 @@
           </a:p>
         </p:txBody>
       </p:sp>
+      <p:sp>
+        <p:nvSpPr>
+          <p:cNvPr id="14" name="Slide Number Placeholder 13"/>
+          <p:cNvSpPr>
+            <a:spLocks noGrp="1"/>
+          </p:cNvSpPr>
+          <p:nvPr>
+            <p:ph type="sldNum" sz="quarter" idx="12"/>
+          </p:nvPr>
+        </p:nvSpPr>
+        <p:spPr/>
+        <p:txBody>
+          <a:bodyPr/>
+          <a:lstStyle/>
+          <a:p>
+            <a:fld id="{B80A01DB-F3F9-0B4D-83C1-A66A06F2C152}" type="slidenum">
+              <a:rPr lang="en-US" smtClean="0"/>
+              <a:t>8</a:t>
+            </a:fld>
+            <a:endParaRPr lang="en-US"/>
+          </a:p>
+        </p:txBody>
+      </p:sp>
     </p:spTree>
     <p:extLst>
       <p:ext uri="{BB962C8B-B14F-4D97-AF65-F5344CB8AC3E}">
@@ -25993,6 +27034,29 @@
               <a:t>.</a:t>
             </a:r>
             <a:endParaRPr lang="en-US" dirty="0"/>
+          </a:p>
+        </p:txBody>
+      </p:sp>
+      <p:sp>
+        <p:nvSpPr>
+          <p:cNvPr id="4" name="Slide Number Placeholder 3"/>
+          <p:cNvSpPr>
+            <a:spLocks noGrp="1"/>
+          </p:cNvSpPr>
+          <p:nvPr>
+            <p:ph type="sldNum" sz="quarter" idx="12"/>
+          </p:nvPr>
+        </p:nvSpPr>
+        <p:spPr/>
+        <p:txBody>
+          <a:bodyPr/>
+          <a:lstStyle/>
+          <a:p>
+            <a:fld id="{B80A01DB-F3F9-0B4D-83C1-A66A06F2C152}" type="slidenum">
+              <a:rPr lang="en-US" smtClean="0"/>
+              <a:t>9</a:t>
+            </a:fld>
+            <a:endParaRPr lang="en-US"/>
           </a:p>
         </p:txBody>
       </p:sp>
@@ -26835,4 +27899,324 @@
   </a:objectDefaults>
   <a:extraClrSchemeLst/>
 </a:theme>
+</file>
+
+<file path=ppt/theme/theme3.xml><?xml version="1.0" encoding="utf-8"?>
+<a:theme xmlns:a="http://schemas.openxmlformats.org/drawingml/2006/main" name="Office Theme">
+  <a:themeElements>
+    <a:clrScheme name="Office">
+      <a:dk1>
+        <a:sysClr val="windowText" lastClr="000000"/>
+      </a:dk1>
+      <a:lt1>
+        <a:sysClr val="window" lastClr="FFFFFF"/>
+      </a:lt1>
+      <a:dk2>
+        <a:srgbClr val="1F497D"/>
+      </a:dk2>
+      <a:lt2>
+        <a:srgbClr val="EEECE1"/>
+      </a:lt2>
+      <a:accent1>
+        <a:srgbClr val="4F81BD"/>
+      </a:accent1>
+      <a:accent2>
+        <a:srgbClr val="C0504D"/>
+      </a:accent2>
+      <a:accent3>
+        <a:srgbClr val="9BBB59"/>
+      </a:accent3>
+      <a:accent4>
+        <a:srgbClr val="8064A2"/>
+      </a:accent4>
+      <a:accent5>
+        <a:srgbClr val="4BACC6"/>
+      </a:accent5>
+      <a:accent6>
+        <a:srgbClr val="F79646"/>
+      </a:accent6>
+      <a:hlink>
+        <a:srgbClr val="0000FF"/>
+      </a:hlink>
+      <a:folHlink>
+        <a:srgbClr val="800080"/>
+      </a:folHlink>
+    </a:clrScheme>
+    <a:fontScheme name="Office">
+      <a:majorFont>
+        <a:latin typeface="Calibri"/>
+        <a:ea typeface=""/>
+        <a:cs typeface=""/>
+        <a:font script="Jpan" typeface="ＭＳ Ｐゴシック"/>
+        <a:font script="Hang" typeface="맑은 고딕"/>
+        <a:font script="Hans" typeface="宋体"/>
+        <a:font script="Hant" typeface="新細明體"/>
+        <a:font script="Arab" typeface="Times New Roman"/>
+        <a:font script="Hebr" typeface="Times New Roman"/>
+        <a:font script="Thai" typeface="Angsana New"/>
+        <a:font script="Ethi" typeface="Nyala"/>
+        <a:font script="Beng" typeface="Vrinda"/>
+        <a:font script="Gujr" typeface="Shruti"/>
+        <a:font script="Khmr" typeface="MoolBoran"/>
+        <a:font script="Knda" typeface="Tunga"/>
+        <a:font script="Guru" typeface="Raavi"/>
+        <a:font script="Cans" typeface="Euphemia"/>
+        <a:font script="Cher" typeface="Plantagenet Cherokee"/>
+        <a:font script="Yiii" typeface="Microsoft Yi Baiti"/>
+        <a:font script="Tibt" typeface="Microsoft Himalaya"/>
+        <a:font script="Thaa" typeface="MV Boli"/>
+        <a:font script="Deva" typeface="Mangal"/>
+        <a:font script="Telu" typeface="Gautami"/>
+        <a:font script="Taml" typeface="Latha"/>
+        <a:font script="Syrc" typeface="Estrangelo Edessa"/>
+        <a:font script="Orya" typeface="Kalinga"/>
+        <a:font script="Mlym" typeface="Kartika"/>
+        <a:font script="Laoo" typeface="DokChampa"/>
+        <a:font script="Sinh" typeface="Iskoola Pota"/>
+        <a:font script="Mong" typeface="Mongolian Baiti"/>
+        <a:font script="Viet" typeface="Times New Roman"/>
+        <a:font script="Uigh" typeface="Microsoft Uighur"/>
+        <a:font script="Geor" typeface="Sylfaen"/>
+      </a:majorFont>
+      <a:minorFont>
+        <a:latin typeface="Calibri"/>
+        <a:ea typeface=""/>
+        <a:cs typeface=""/>
+        <a:font script="Jpan" typeface="ＭＳ Ｐゴシック"/>
+        <a:font script="Hang" typeface="맑은 고딕"/>
+        <a:font script="Hans" typeface="宋体"/>
+        <a:font script="Hant" typeface="新細明體"/>
+        <a:font script="Arab" typeface="Arial"/>
+        <a:font script="Hebr" typeface="Arial"/>
+        <a:font script="Thai" typeface="Cordia New"/>
+        <a:font script="Ethi" typeface="Nyala"/>
+        <a:font script="Beng" typeface="Vrinda"/>
+        <a:font script="Gujr" typeface="Shruti"/>
+        <a:font script="Khmr" typeface="DaunPenh"/>
+        <a:font script="Knda" typeface="Tunga"/>
+        <a:font script="Guru" typeface="Raavi"/>
+        <a:font script="Cans" typeface="Euphemia"/>
+        <a:font script="Cher" typeface="Plantagenet Cherokee"/>
+        <a:font script="Yiii" typeface="Microsoft Yi Baiti"/>
+        <a:font script="Tibt" typeface="Microsoft Himalaya"/>
+        <a:font script="Thaa" typeface="MV Boli"/>
+        <a:font script="Deva" typeface="Mangal"/>
+        <a:font script="Telu" typeface="Gautami"/>
+        <a:font script="Taml" typeface="Latha"/>
+        <a:font script="Syrc" typeface="Estrangelo Edessa"/>
+        <a:font script="Orya" typeface="Kalinga"/>
+        <a:font script="Mlym" typeface="Kartika"/>
+        <a:font script="Laoo" typeface="DokChampa"/>
+        <a:font script="Sinh" typeface="Iskoola Pota"/>
+        <a:font script="Mong" typeface="Mongolian Baiti"/>
+        <a:font script="Viet" typeface="Arial"/>
+        <a:font script="Uigh" typeface="Microsoft Uighur"/>
+        <a:font script="Geor" typeface="Sylfaen"/>
+      </a:minorFont>
+    </a:fontScheme>
+    <a:fmtScheme name="Office">
+      <a:fillStyleLst>
+        <a:solidFill>
+          <a:schemeClr val="phClr"/>
+        </a:solidFill>
+        <a:gradFill rotWithShape="1">
+          <a:gsLst>
+            <a:gs pos="0">
+              <a:schemeClr val="phClr">
+                <a:tint val="50000"/>
+                <a:satMod val="300000"/>
+              </a:schemeClr>
+            </a:gs>
+            <a:gs pos="35000">
+              <a:schemeClr val="phClr">
+                <a:tint val="37000"/>
+                <a:satMod val="300000"/>
+              </a:schemeClr>
+            </a:gs>
+            <a:gs pos="100000">
+              <a:schemeClr val="phClr">
+                <a:tint val="15000"/>
+                <a:satMod val="350000"/>
+              </a:schemeClr>
+            </a:gs>
+          </a:gsLst>
+          <a:lin ang="16200000" scaled="1"/>
+        </a:gradFill>
+        <a:gradFill rotWithShape="1">
+          <a:gsLst>
+            <a:gs pos="0">
+              <a:schemeClr val="phClr">
+                <a:tint val="100000"/>
+                <a:shade val="100000"/>
+                <a:satMod val="130000"/>
+              </a:schemeClr>
+            </a:gs>
+            <a:gs pos="100000">
+              <a:schemeClr val="phClr">
+                <a:tint val="50000"/>
+                <a:shade val="100000"/>
+                <a:satMod val="350000"/>
+              </a:schemeClr>
+            </a:gs>
+          </a:gsLst>
+          <a:lin ang="16200000" scaled="0"/>
+        </a:gradFill>
+      </a:fillStyleLst>
+      <a:lnStyleLst>
+        <a:ln w="9525" cap="flat" cmpd="sng" algn="ctr">
+          <a:solidFill>
+            <a:schemeClr val="phClr">
+              <a:shade val="95000"/>
+              <a:satMod val="105000"/>
+            </a:schemeClr>
+          </a:solidFill>
+          <a:prstDash val="solid"/>
+        </a:ln>
+        <a:ln w="25400" cap="flat" cmpd="sng" algn="ctr">
+          <a:solidFill>
+            <a:schemeClr val="phClr"/>
+          </a:solidFill>
+          <a:prstDash val="solid"/>
+        </a:ln>
+        <a:ln w="38100" cap="flat" cmpd="sng" algn="ctr">
+          <a:solidFill>
+            <a:schemeClr val="phClr"/>
+          </a:solidFill>
+          <a:prstDash val="solid"/>
+        </a:ln>
+      </a:lnStyleLst>
+      <a:effectStyleLst>
+        <a:effectStyle>
+          <a:effectLst>
+            <a:outerShdw blurRad="40000" dist="20000" dir="5400000" rotWithShape="0">
+              <a:srgbClr val="000000">
+                <a:alpha val="38000"/>
+              </a:srgbClr>
+            </a:outerShdw>
+          </a:effectLst>
+        </a:effectStyle>
+        <a:effectStyle>
+          <a:effectLst>
+            <a:outerShdw blurRad="40000" dist="23000" dir="5400000" rotWithShape="0">
+              <a:srgbClr val="000000">
+                <a:alpha val="35000"/>
+              </a:srgbClr>
+            </a:outerShdw>
+          </a:effectLst>
+        </a:effectStyle>
+        <a:effectStyle>
+          <a:effectLst>
+            <a:outerShdw blurRad="40000" dist="23000" dir="5400000" rotWithShape="0">
+              <a:srgbClr val="000000">
+                <a:alpha val="35000"/>
+              </a:srgbClr>
+            </a:outerShdw>
+          </a:effectLst>
+          <a:scene3d>
+            <a:camera prst="orthographicFront">
+              <a:rot lat="0" lon="0" rev="0"/>
+            </a:camera>
+            <a:lightRig rig="threePt" dir="t">
+              <a:rot lat="0" lon="0" rev="1200000"/>
+            </a:lightRig>
+          </a:scene3d>
+          <a:sp3d>
+            <a:bevelT w="63500" h="25400"/>
+          </a:sp3d>
+        </a:effectStyle>
+      </a:effectStyleLst>
+      <a:bgFillStyleLst>
+        <a:solidFill>
+          <a:schemeClr val="phClr"/>
+        </a:solidFill>
+        <a:gradFill rotWithShape="1">
+          <a:gsLst>
+            <a:gs pos="0">
+              <a:schemeClr val="phClr">
+                <a:tint val="40000"/>
+                <a:satMod val="350000"/>
+              </a:schemeClr>
+            </a:gs>
+            <a:gs pos="40000">
+              <a:schemeClr val="phClr">
+                <a:tint val="45000"/>
+                <a:shade val="99000"/>
+                <a:satMod val="350000"/>
+              </a:schemeClr>
+            </a:gs>
+            <a:gs pos="100000">
+              <a:schemeClr val="phClr">
+                <a:shade val="20000"/>
+                <a:satMod val="255000"/>
+              </a:schemeClr>
+            </a:gs>
+          </a:gsLst>
+          <a:path path="circle">
+            <a:fillToRect l="50000" t="-80000" r="50000" b="180000"/>
+          </a:path>
+        </a:gradFill>
+        <a:gradFill rotWithShape="1">
+          <a:gsLst>
+            <a:gs pos="0">
+              <a:schemeClr val="phClr">
+                <a:tint val="80000"/>
+                <a:satMod val="300000"/>
+              </a:schemeClr>
+            </a:gs>
+            <a:gs pos="100000">
+              <a:schemeClr val="phClr">
+                <a:shade val="30000"/>
+                <a:satMod val="200000"/>
+              </a:schemeClr>
+            </a:gs>
+          </a:gsLst>
+          <a:path path="circle">
+            <a:fillToRect l="50000" t="50000" r="50000" b="50000"/>
+          </a:path>
+        </a:gradFill>
+      </a:bgFillStyleLst>
+    </a:fmtScheme>
+  </a:themeElements>
+  <a:objectDefaults>
+    <a:spDef>
+      <a:spPr/>
+      <a:bodyPr/>
+      <a:lstStyle/>
+      <a:style>
+        <a:lnRef idx="1">
+          <a:schemeClr val="accent1"/>
+        </a:lnRef>
+        <a:fillRef idx="3">
+          <a:schemeClr val="accent1"/>
+        </a:fillRef>
+        <a:effectRef idx="2">
+          <a:schemeClr val="accent1"/>
+        </a:effectRef>
+        <a:fontRef idx="minor">
+          <a:schemeClr val="lt1"/>
+        </a:fontRef>
+      </a:style>
+    </a:spDef>
+    <a:lnDef>
+      <a:spPr/>
+      <a:bodyPr/>
+      <a:lstStyle/>
+      <a:style>
+        <a:lnRef idx="2">
+          <a:schemeClr val="accent1"/>
+        </a:lnRef>
+        <a:fillRef idx="0">
+          <a:schemeClr val="accent1"/>
+        </a:fillRef>
+        <a:effectRef idx="1">
+          <a:schemeClr val="accent1"/>
+        </a:effectRef>
+        <a:fontRef idx="minor">
+          <a:schemeClr val="tx1"/>
+        </a:fontRef>
+      </a:style>
+    </a:lnDef>
+  </a:objectDefaults>
+  <a:extraClrSchemeLst/>
+</a:theme>
 </file>
</xml_diff>